<commit_message>
Comecei a fazer a minha parta da apresentação
</commit_message>
<xml_diff>
--- a/Guia e Tarefas/Apresentação Primeira Entrega.pptx
+++ b/Guia e Tarefas/Apresentação Primeira Entrega.pptx
@@ -5,18 +5,20 @@
     <p:sldMasterId id="2147483648" r:id="rId1"/>
   </p:sldMasterIdLst>
   <p:notesMasterIdLst>
-    <p:notesMasterId r:id="rId11"/>
+    <p:notesMasterId r:id="rId13"/>
   </p:notesMasterIdLst>
   <p:sldIdLst>
     <p:sldId id="282" r:id="rId2"/>
     <p:sldId id="273" r:id="rId3"/>
-    <p:sldId id="289" r:id="rId4"/>
-    <p:sldId id="257" r:id="rId5"/>
-    <p:sldId id="287" r:id="rId6"/>
-    <p:sldId id="290" r:id="rId7"/>
-    <p:sldId id="288" r:id="rId8"/>
-    <p:sldId id="291" r:id="rId9"/>
-    <p:sldId id="275" r:id="rId10"/>
+    <p:sldId id="288" r:id="rId4"/>
+    <p:sldId id="293" r:id="rId5"/>
+    <p:sldId id="289" r:id="rId6"/>
+    <p:sldId id="257" r:id="rId7"/>
+    <p:sldId id="287" r:id="rId8"/>
+    <p:sldId id="290" r:id="rId9"/>
+    <p:sldId id="291" r:id="rId10"/>
+    <p:sldId id="292" r:id="rId11"/>
+    <p:sldId id="275" r:id="rId12"/>
   </p:sldIdLst>
   <p:sldSz cx="9144000" cy="6858000" type="screen4x3"/>
   <p:notesSz cx="6858000" cy="9144000"/>
@@ -216,7 +218,7 @@
           <a:p>
             <a:fld id="{12028CC1-B90E-47D8-99C5-6BAA1811C342}" type="datetimeFigureOut">
               <a:rPr lang="pt-BR" smtClean="0"/>
-              <a:t>23/08/2018</a:t>
+              <a:t>05/09/2018</a:t>
             </a:fld>
             <a:endParaRPr lang="pt-BR" dirty="0"/>
           </a:p>
@@ -662,7 +664,7 @@
           <a:p>
             <a:fld id="{F3B4B977-AD5C-4F3D-992F-860711DBDA8C}" type="datetimeFigureOut">
               <a:rPr lang="pt-BR" smtClean="0"/>
-              <a:t>23/08/2018</a:t>
+              <a:t>05/09/2018</a:t>
             </a:fld>
             <a:endParaRPr lang="pt-BR" dirty="0"/>
           </a:p>
@@ -830,7 +832,7 @@
           <a:p>
             <a:fld id="{F3B4B977-AD5C-4F3D-992F-860711DBDA8C}" type="datetimeFigureOut">
               <a:rPr lang="pt-BR" smtClean="0"/>
-              <a:t>23/08/2018</a:t>
+              <a:t>05/09/2018</a:t>
             </a:fld>
             <a:endParaRPr lang="pt-BR" dirty="0"/>
           </a:p>
@@ -1008,7 +1010,7 @@
           <a:p>
             <a:fld id="{F3B4B977-AD5C-4F3D-992F-860711DBDA8C}" type="datetimeFigureOut">
               <a:rPr lang="pt-BR" smtClean="0"/>
-              <a:t>23/08/2018</a:t>
+              <a:t>05/09/2018</a:t>
             </a:fld>
             <a:endParaRPr lang="pt-BR" dirty="0"/>
           </a:p>
@@ -1176,7 +1178,7 @@
           <a:p>
             <a:fld id="{F3B4B977-AD5C-4F3D-992F-860711DBDA8C}" type="datetimeFigureOut">
               <a:rPr lang="pt-BR" smtClean="0"/>
-              <a:t>23/08/2018</a:t>
+              <a:t>05/09/2018</a:t>
             </a:fld>
             <a:endParaRPr lang="pt-BR" dirty="0"/>
           </a:p>
@@ -1421,7 +1423,7 @@
           <a:p>
             <a:fld id="{F3B4B977-AD5C-4F3D-992F-860711DBDA8C}" type="datetimeFigureOut">
               <a:rPr lang="pt-BR" smtClean="0"/>
-              <a:t>23/08/2018</a:t>
+              <a:t>05/09/2018</a:t>
             </a:fld>
             <a:endParaRPr lang="pt-BR" dirty="0"/>
           </a:p>
@@ -1706,7 +1708,7 @@
           <a:p>
             <a:fld id="{F3B4B977-AD5C-4F3D-992F-860711DBDA8C}" type="datetimeFigureOut">
               <a:rPr lang="pt-BR" smtClean="0"/>
-              <a:t>23/08/2018</a:t>
+              <a:t>05/09/2018</a:t>
             </a:fld>
             <a:endParaRPr lang="pt-BR" dirty="0"/>
           </a:p>
@@ -2125,7 +2127,7 @@
           <a:p>
             <a:fld id="{F3B4B977-AD5C-4F3D-992F-860711DBDA8C}" type="datetimeFigureOut">
               <a:rPr lang="pt-BR" smtClean="0"/>
-              <a:t>23/08/2018</a:t>
+              <a:t>05/09/2018</a:t>
             </a:fld>
             <a:endParaRPr lang="pt-BR" dirty="0"/>
           </a:p>
@@ -2242,7 +2244,7 @@
           <a:p>
             <a:fld id="{F3B4B977-AD5C-4F3D-992F-860711DBDA8C}" type="datetimeFigureOut">
               <a:rPr lang="pt-BR" smtClean="0"/>
-              <a:t>23/08/2018</a:t>
+              <a:t>05/09/2018</a:t>
             </a:fld>
             <a:endParaRPr lang="pt-BR" dirty="0"/>
           </a:p>
@@ -2337,7 +2339,7 @@
           <a:p>
             <a:fld id="{F3B4B977-AD5C-4F3D-992F-860711DBDA8C}" type="datetimeFigureOut">
               <a:rPr lang="pt-BR" smtClean="0"/>
-              <a:t>23/08/2018</a:t>
+              <a:t>05/09/2018</a:t>
             </a:fld>
             <a:endParaRPr lang="pt-BR" dirty="0"/>
           </a:p>
@@ -2612,7 +2614,7 @@
           <a:p>
             <a:fld id="{F3B4B977-AD5C-4F3D-992F-860711DBDA8C}" type="datetimeFigureOut">
               <a:rPr lang="pt-BR" smtClean="0"/>
-              <a:t>23/08/2018</a:t>
+              <a:t>05/09/2018</a:t>
             </a:fld>
             <a:endParaRPr lang="pt-BR" dirty="0"/>
           </a:p>
@@ -2864,7 +2866,7 @@
           <a:p>
             <a:fld id="{F3B4B977-AD5C-4F3D-992F-860711DBDA8C}" type="datetimeFigureOut">
               <a:rPr lang="pt-BR" smtClean="0"/>
-              <a:t>23/08/2018</a:t>
+              <a:t>05/09/2018</a:t>
             </a:fld>
             <a:endParaRPr lang="pt-BR" dirty="0"/>
           </a:p>
@@ -3080,7 +3082,7 @@
           <a:p>
             <a:fld id="{F3B4B977-AD5C-4F3D-992F-860711DBDA8C}" type="datetimeFigureOut">
               <a:rPr lang="pt-BR" smtClean="0"/>
-              <a:t>23/08/2018</a:t>
+              <a:t>05/09/2018</a:t>
             </a:fld>
             <a:endParaRPr lang="pt-BR" dirty="0"/>
           </a:p>
@@ -3724,7 +3726,7 @@
 </p:sld>
 </file>
 
-<file path=ppt/slides/slide2.xml><?xml version="1.0" encoding="utf-8"?>
+<file path=ppt/slides/slide10.xml><?xml version="1.0" encoding="utf-8"?>
 <p:sld xmlns:a="http://schemas.openxmlformats.org/drawingml/2006/main" xmlns:r="http://schemas.openxmlformats.org/officeDocument/2006/relationships" xmlns:p="http://schemas.openxmlformats.org/presentationml/2006/main">
   <p:cSld>
     <p:spTree>
@@ -3743,14 +3745,14 @@
       </p:grpSpPr>
       <p:sp>
         <p:nvSpPr>
-          <p:cNvPr id="17" name="CaixaDeTexto 16"/>
+          <p:cNvPr id="8" name="CaixaDeTexto 7"/>
           <p:cNvSpPr txBox="1"/>
           <p:nvPr/>
         </p:nvSpPr>
         <p:spPr>
           <a:xfrm>
-            <a:off x="393549" y="333523"/>
-            <a:ext cx="6192688" cy="646331"/>
+            <a:off x="755576" y="1124744"/>
+            <a:ext cx="5904656" cy="2062103"/>
           </a:xfrm>
           <a:prstGeom prst="rect">
             <a:avLst/>
@@ -3764,46 +3766,14 @@
           <a:lstStyle/>
           <a:p>
             <a:r>
-              <a:rPr lang="pt-BR" sz="3600" b="1" dirty="0">
-                <a:latin typeface="Verdana" panose="020B0604030504040204" pitchFamily="34" charset="0"/>
-                <a:ea typeface="Verdana" panose="020B0604030504040204" pitchFamily="34" charset="0"/>
-                <a:cs typeface="Verdana" panose="020B0604030504040204" pitchFamily="34" charset="0"/>
-              </a:rPr>
-              <a:t>Problema</a:t>
-            </a:r>
-          </a:p>
-        </p:txBody>
-      </p:sp>
-      <p:sp>
-        <p:nvSpPr>
-          <p:cNvPr id="19" name="CaixaDeTexto 18"/>
-          <p:cNvSpPr txBox="1"/>
-          <p:nvPr/>
-        </p:nvSpPr>
-        <p:spPr>
-          <a:xfrm>
-            <a:off x="1123204" y="2567225"/>
-            <a:ext cx="5904656" cy="1723549"/>
-          </a:xfrm>
-          <a:prstGeom prst="rect">
-            <a:avLst/>
-          </a:prstGeom>
-          <a:noFill/>
-        </p:spPr>
-        <p:txBody>
-          <a:bodyPr wrap="square" rtlCol="0">
-            <a:spAutoFit/>
-          </a:bodyPr>
-          <a:lstStyle/>
-          <a:p>
-            <a:pPr algn="just"/>
-            <a:r>
-              <a:rPr lang="pt-BR" dirty="0"/>
-              <a:t>O problema consiste em selecionar M elementos dentre um conjunto de N elementos, sendo o subconjunto selecionado o mais diversificado possível.</a:t>
-            </a:r>
-          </a:p>
-          <a:p>
-            <a:endParaRPr lang="en-US" sz="1700" dirty="0">
+              <a:rPr lang="pt-BR" sz="1600" dirty="0" err="1"/>
+              <a:t>Takane</a:t>
+            </a:r>
+            <a:r>
+              <a:rPr lang="pt-BR" sz="1600" dirty="0"/>
+              <a:t>, Bruno. "Um algoritmo exato para o problema da diversidade máxima." (2011).</a:t>
+            </a:r>
+            <a:endParaRPr lang="en-US" sz="1600" dirty="0">
               <a:latin typeface="Verdana" panose="020B0604030504040204" pitchFamily="34" charset="0"/>
               <a:ea typeface="Verdana" panose="020B0604030504040204" pitchFamily="34" charset="0"/>
               <a:cs typeface="Verdana" panose="020B0604030504040204" pitchFamily="34" charset="0"/>
@@ -3814,72 +3784,66 @@
               <a:buFont typeface="Arial" panose="020B0604020202020204" pitchFamily="34" charset="0"/>
               <a:buChar char="•"/>
             </a:pPr>
-            <a:r>
-              <a:rPr lang="pt-BR" b="1" dirty="0">
-                <a:latin typeface="Verdana" panose="020B0604030504040204" pitchFamily="34" charset="0"/>
-                <a:ea typeface="Verdana" panose="020B0604030504040204" pitchFamily="34" charset="0"/>
-                <a:cs typeface="Verdana" panose="020B0604030504040204" pitchFamily="34" charset="0"/>
-              </a:rPr>
-              <a:t>Exemplo</a:t>
-            </a:r>
-            <a:endParaRPr lang="pt-BR" dirty="0">
+            <a:endParaRPr lang="en-US" sz="1600" b="1" dirty="0">
               <a:latin typeface="Verdana" panose="020B0604030504040204" pitchFamily="34" charset="0"/>
               <a:ea typeface="Verdana" panose="020B0604030504040204" pitchFamily="34" charset="0"/>
               <a:cs typeface="Verdana" panose="020B0604030504040204" pitchFamily="34" charset="0"/>
             </a:endParaRPr>
           </a:p>
           <a:p>
-            <a:endParaRPr lang="pt-BR" sz="1700" dirty="0">
+            <a:pPr marL="285750" indent="-285750">
+              <a:buFont typeface="Arial" panose="020B0604020202020204" pitchFamily="34" charset="0"/>
+              <a:buChar char="•"/>
+            </a:pPr>
+            <a:endParaRPr lang="en-US" sz="1600" b="1" dirty="0">
               <a:latin typeface="Verdana" panose="020B0604030504040204" pitchFamily="34" charset="0"/>
               <a:ea typeface="Verdana" panose="020B0604030504040204" pitchFamily="34" charset="0"/>
               <a:cs typeface="Verdana" panose="020B0604030504040204" pitchFamily="34" charset="0"/>
             </a:endParaRPr>
           </a:p>
-        </p:txBody>
-      </p:sp>
-      <p:sp>
-        <p:nvSpPr>
-          <p:cNvPr id="20" name="Retângulo 19"/>
-          <p:cNvSpPr/>
-          <p:nvPr/>
-        </p:nvSpPr>
-        <p:spPr>
-          <a:xfrm flipV="1">
-            <a:off x="-36512" y="476670"/>
-            <a:ext cx="323528" cy="360039"/>
-          </a:xfrm>
-          <a:prstGeom prst="rect">
-            <a:avLst/>
-          </a:prstGeom>
-          <a:solidFill>
-            <a:srgbClr val="149B55"/>
-          </a:solidFill>
-          <a:ln>
-            <a:noFill/>
-          </a:ln>
-        </p:spPr>
-        <p:style>
-          <a:lnRef idx="2">
-            <a:schemeClr val="accent1">
-              <a:shade val="50000"/>
-            </a:schemeClr>
-          </a:lnRef>
-          <a:fillRef idx="1">
-            <a:schemeClr val="accent1"/>
-          </a:fillRef>
-          <a:effectRef idx="0">
-            <a:schemeClr val="accent1"/>
-          </a:effectRef>
-          <a:fontRef idx="minor">
-            <a:schemeClr val="lt1"/>
-          </a:fontRef>
-        </p:style>
-        <p:txBody>
-          <a:bodyPr rtlCol="0" anchor="ctr"/>
-          <a:lstStyle/>
-          <a:p>
-            <a:pPr algn="ctr"/>
-            <a:endParaRPr lang="pt-BR" dirty="0"/>
+          <a:p>
+            <a:pPr marL="285750" indent="-285750">
+              <a:buFont typeface="Arial" panose="020B0604020202020204" pitchFamily="34" charset="0"/>
+              <a:buChar char="•"/>
+            </a:pPr>
+            <a:endParaRPr lang="en-US" sz="1600" b="1" dirty="0">
+              <a:latin typeface="Verdana" panose="020B0604030504040204" pitchFamily="34" charset="0"/>
+              <a:ea typeface="Verdana" panose="020B0604030504040204" pitchFamily="34" charset="0"/>
+              <a:cs typeface="Verdana" panose="020B0604030504040204" pitchFamily="34" charset="0"/>
+            </a:endParaRPr>
+          </a:p>
+          <a:p>
+            <a:pPr marL="285750" indent="-285750">
+              <a:buFont typeface="Arial" panose="020B0604020202020204" pitchFamily="34" charset="0"/>
+              <a:buChar char="•"/>
+            </a:pPr>
+            <a:endParaRPr lang="en-US" sz="1600" b="1" dirty="0">
+              <a:latin typeface="Verdana" panose="020B0604030504040204" pitchFamily="34" charset="0"/>
+              <a:ea typeface="Verdana" panose="020B0604030504040204" pitchFamily="34" charset="0"/>
+              <a:cs typeface="Verdana" panose="020B0604030504040204" pitchFamily="34" charset="0"/>
+            </a:endParaRPr>
+          </a:p>
+          <a:p>
+            <a:pPr marL="285750" indent="-285750">
+              <a:buFont typeface="Arial" panose="020B0604020202020204" pitchFamily="34" charset="0"/>
+              <a:buChar char="•"/>
+            </a:pPr>
+            <a:endParaRPr lang="en-US" sz="1600" b="1" dirty="0">
+              <a:latin typeface="Verdana" panose="020B0604030504040204" pitchFamily="34" charset="0"/>
+              <a:ea typeface="Verdana" panose="020B0604030504040204" pitchFamily="34" charset="0"/>
+              <a:cs typeface="Verdana" panose="020B0604030504040204" pitchFamily="34" charset="0"/>
+            </a:endParaRPr>
+          </a:p>
+          <a:p>
+            <a:pPr marL="285750" indent="-285750">
+              <a:buFont typeface="Arial" panose="020B0604020202020204" pitchFamily="34" charset="0"/>
+              <a:buChar char="•"/>
+            </a:pPr>
+            <a:endParaRPr lang="pt-BR" sz="1600" b="1" dirty="0">
+              <a:latin typeface="Verdana" panose="020B0604030504040204" pitchFamily="34" charset="0"/>
+              <a:ea typeface="Verdana" panose="020B0604030504040204" pitchFamily="34" charset="0"/>
+              <a:cs typeface="Verdana" panose="020B0604030504040204" pitchFamily="34" charset="0"/>
+            </a:endParaRPr>
           </a:p>
         </p:txBody>
       </p:sp>
@@ -3913,10 +3877,94 @@
           </a:prstGeom>
         </p:spPr>
       </p:pic>
+      <p:sp>
+        <p:nvSpPr>
+          <p:cNvPr id="9" name="CaixaDeTexto 8"/>
+          <p:cNvSpPr txBox="1"/>
+          <p:nvPr/>
+        </p:nvSpPr>
+        <p:spPr>
+          <a:xfrm>
+            <a:off x="393549" y="333523"/>
+            <a:ext cx="6192688" cy="646331"/>
+          </a:xfrm>
+          <a:prstGeom prst="rect">
+            <a:avLst/>
+          </a:prstGeom>
+          <a:noFill/>
+        </p:spPr>
+        <p:txBody>
+          <a:bodyPr wrap="square" rtlCol="0">
+            <a:spAutoFit/>
+          </a:bodyPr>
+          <a:lstStyle/>
+          <a:p>
+            <a:r>
+              <a:rPr lang="en-US" sz="3600" b="1" dirty="0" err="1" smtClean="0">
+                <a:latin typeface="Verdana" panose="020B0604030504040204" pitchFamily="34" charset="0"/>
+                <a:ea typeface="Verdana" panose="020B0604030504040204" pitchFamily="34" charset="0"/>
+                <a:cs typeface="Verdana" panose="020B0604030504040204" pitchFamily="34" charset="0"/>
+              </a:rPr>
+              <a:t>Referências</a:t>
+            </a:r>
+            <a:endParaRPr lang="pt-BR" sz="3600" b="1" dirty="0">
+              <a:latin typeface="Verdana" panose="020B0604030504040204" pitchFamily="34" charset="0"/>
+              <a:ea typeface="Verdana" panose="020B0604030504040204" pitchFamily="34" charset="0"/>
+              <a:cs typeface="Verdana" panose="020B0604030504040204" pitchFamily="34" charset="0"/>
+            </a:endParaRPr>
+          </a:p>
+        </p:txBody>
+      </p:sp>
+      <p:sp>
+        <p:nvSpPr>
+          <p:cNvPr id="11" name="Retângulo 10"/>
+          <p:cNvSpPr/>
+          <p:nvPr/>
+        </p:nvSpPr>
+        <p:spPr>
+          <a:xfrm flipV="1">
+            <a:off x="-36512" y="476670"/>
+            <a:ext cx="323528" cy="360039"/>
+          </a:xfrm>
+          <a:prstGeom prst="rect">
+            <a:avLst/>
+          </a:prstGeom>
+          <a:solidFill>
+            <a:srgbClr val="149B55"/>
+          </a:solidFill>
+          <a:ln>
+            <a:noFill/>
+          </a:ln>
+        </p:spPr>
+        <p:style>
+          <a:lnRef idx="2">
+            <a:schemeClr val="accent1">
+              <a:shade val="50000"/>
+            </a:schemeClr>
+          </a:lnRef>
+          <a:fillRef idx="1">
+            <a:schemeClr val="accent1"/>
+          </a:fillRef>
+          <a:effectRef idx="0">
+            <a:schemeClr val="accent1"/>
+          </a:effectRef>
+          <a:fontRef idx="minor">
+            <a:schemeClr val="lt1"/>
+          </a:fontRef>
+        </p:style>
+        <p:txBody>
+          <a:bodyPr rtlCol="0" anchor="ctr"/>
+          <a:lstStyle/>
+          <a:p>
+            <a:pPr algn="ctr"/>
+            <a:endParaRPr lang="pt-BR" dirty="0"/>
+          </a:p>
+        </p:txBody>
+      </p:sp>
     </p:spTree>
     <p:extLst>
       <p:ext uri="{BB962C8B-B14F-4D97-AF65-F5344CB8AC3E}">
-        <p14:creationId xmlns:p14="http://schemas.microsoft.com/office/powerpoint/2010/main" val="3495502305"/>
+        <p14:creationId xmlns:p14="http://schemas.microsoft.com/office/powerpoint/2010/main" val="3076226589"/>
       </p:ext>
     </p:extLst>
   </p:cSld>
@@ -3926,7 +3974,7 @@
 </p:sld>
 </file>
 
-<file path=ppt/slides/slide3.xml><?xml version="1.0" encoding="utf-8"?>
+<file path=ppt/slides/slide11.xml><?xml version="1.0" encoding="utf-8"?>
 <p:sld xmlns:a="http://schemas.openxmlformats.org/drawingml/2006/main" xmlns:r="http://schemas.openxmlformats.org/officeDocument/2006/relationships" xmlns:p="http://schemas.openxmlformats.org/presentationml/2006/main">
   <p:cSld>
     <p:spTree>
@@ -3975,14 +4023,14 @@
       </p:pic>
       <p:sp>
         <p:nvSpPr>
-          <p:cNvPr id="7" name="CaixaDeTexto 6"/>
+          <p:cNvPr id="11" name="CaixaDeTexto 10"/>
           <p:cNvSpPr txBox="1"/>
           <p:nvPr/>
         </p:nvSpPr>
         <p:spPr>
           <a:xfrm>
-            <a:off x="393548" y="333523"/>
-            <a:ext cx="7130779" cy="646331"/>
+            <a:off x="4644008" y="836712"/>
+            <a:ext cx="6192688" cy="707886"/>
           </a:xfrm>
           <a:prstGeom prst="rect">
             <a:avLst/>
@@ -3996,19 +4044,283 @@
           <a:lstStyle/>
           <a:p>
             <a:r>
+              <a:rPr lang="pt-BR" sz="4000" b="1" dirty="0">
+                <a:latin typeface="Verdana" panose="020B0604030504040204" pitchFamily="34" charset="0"/>
+                <a:ea typeface="Verdana" panose="020B0604030504040204" pitchFamily="34" charset="0"/>
+                <a:cs typeface="Verdana" panose="020B0604030504040204" pitchFamily="34" charset="0"/>
+              </a:rPr>
+              <a:t>Obrigado</a:t>
+            </a:r>
+          </a:p>
+        </p:txBody>
+      </p:sp>
+      <p:sp>
+        <p:nvSpPr>
+          <p:cNvPr id="12" name="Retângulo 11"/>
+          <p:cNvSpPr/>
+          <p:nvPr/>
+        </p:nvSpPr>
+        <p:spPr>
+          <a:xfrm>
+            <a:off x="4751513" y="1986453"/>
+            <a:ext cx="3780927" cy="1384995"/>
+          </a:xfrm>
+          <a:prstGeom prst="rect">
+            <a:avLst/>
+          </a:prstGeom>
+        </p:spPr>
+        <p:txBody>
+          <a:bodyPr wrap="square">
+            <a:spAutoFit/>
+          </a:bodyPr>
+          <a:lstStyle/>
+          <a:p>
+            <a:r>
+              <a:rPr lang="pt-BR" sz="1400" b="1" dirty="0">
+                <a:latin typeface="Verdana" panose="020B0604030504040204" pitchFamily="34" charset="0"/>
+                <a:ea typeface="Verdana" panose="020B0604030504040204" pitchFamily="34" charset="0"/>
+                <a:cs typeface="Verdana" panose="020B0604030504040204" pitchFamily="34" charset="0"/>
+              </a:rPr>
+              <a:t>UDESC – Universidade do Estado de Santa Catarina</a:t>
+            </a:r>
+          </a:p>
+          <a:p>
+            <a:endParaRPr lang="pt-BR" sz="1400" dirty="0">
+              <a:latin typeface="Verdana" panose="020B0604030504040204" pitchFamily="34" charset="0"/>
+              <a:ea typeface="Verdana" panose="020B0604030504040204" pitchFamily="34" charset="0"/>
+              <a:cs typeface="Verdana" panose="020B0604030504040204" pitchFamily="34" charset="0"/>
+            </a:endParaRPr>
+          </a:p>
+          <a:p>
+            <a:r>
+              <a:rPr lang="pt-BR" sz="1400" dirty="0">
+                <a:latin typeface="Verdana" panose="020B0604030504040204" pitchFamily="34" charset="0"/>
+                <a:ea typeface="Verdana" panose="020B0604030504040204" pitchFamily="34" charset="0"/>
+                <a:cs typeface="Verdana" panose="020B0604030504040204" pitchFamily="34" charset="0"/>
+              </a:rPr>
+              <a:t>www.udesc.br</a:t>
+            </a:r>
+          </a:p>
+          <a:p>
+            <a:endParaRPr lang="pt-BR" sz="1400" dirty="0">
+              <a:latin typeface="Verdana" panose="020B0604030504040204" pitchFamily="34" charset="0"/>
+              <a:ea typeface="Verdana" panose="020B0604030504040204" pitchFamily="34" charset="0"/>
+              <a:cs typeface="Verdana" panose="020B0604030504040204" pitchFamily="34" charset="0"/>
+            </a:endParaRPr>
+          </a:p>
+          <a:p>
+            <a:r>
+              <a:rPr lang="pt-BR" sz="1400" dirty="0">
+                <a:latin typeface="Verdana" panose="020B0604030504040204" pitchFamily="34" charset="0"/>
+                <a:ea typeface="Verdana" panose="020B0604030504040204" pitchFamily="34" charset="0"/>
+                <a:cs typeface="Verdana" panose="020B0604030504040204" pitchFamily="34" charset="0"/>
+              </a:rPr>
+              <a:t>www.facebook.com/udesc</a:t>
+            </a:r>
+          </a:p>
+        </p:txBody>
+      </p:sp>
+      <p:pic>
+        <p:nvPicPr>
+          <p:cNvPr id="13" name="Imagem 12"/>
+          <p:cNvPicPr>
+            <a:picLocks noChangeAspect="1"/>
+          </p:cNvPicPr>
+          <p:nvPr/>
+        </p:nvPicPr>
+        <p:blipFill rotWithShape="1">
+          <a:blip r:embed="rId3" cstate="print">
+            <a:extLst>
+              <a:ext uri="{28A0092B-C50C-407E-A947-70E740481C1C}">
+                <a14:useLocalDpi xmlns:a14="http://schemas.microsoft.com/office/drawing/2010/main" val="0"/>
+              </a:ext>
+            </a:extLst>
+          </a:blip>
+          <a:srcRect t="23653"/>
+          <a:stretch/>
+        </p:blipFill>
+        <p:spPr>
+          <a:xfrm flipV="1">
+            <a:off x="-396552" y="188640"/>
+            <a:ext cx="4449092" cy="6696744"/>
+          </a:xfrm>
+          <a:prstGeom prst="rect">
+            <a:avLst/>
+          </a:prstGeom>
+        </p:spPr>
+      </p:pic>
+    </p:spTree>
+    <p:extLst>
+      <p:ext uri="{BB962C8B-B14F-4D97-AF65-F5344CB8AC3E}">
+        <p14:creationId xmlns:p14="http://schemas.microsoft.com/office/powerpoint/2010/main" val="3663217977"/>
+      </p:ext>
+    </p:extLst>
+  </p:cSld>
+  <p:clrMapOvr>
+    <a:masterClrMapping/>
+  </p:clrMapOvr>
+</p:sld>
+</file>
+
+<file path=ppt/slides/slide2.xml><?xml version="1.0" encoding="utf-8"?>
+<p:sld xmlns:a="http://schemas.openxmlformats.org/drawingml/2006/main" xmlns:r="http://schemas.openxmlformats.org/officeDocument/2006/relationships" xmlns:p="http://schemas.openxmlformats.org/presentationml/2006/main">
+  <p:cSld>
+    <p:spTree>
+      <p:nvGrpSpPr>
+        <p:cNvPr id="1" name=""/>
+        <p:cNvGrpSpPr/>
+        <p:nvPr/>
+      </p:nvGrpSpPr>
+      <p:grpSpPr>
+        <a:xfrm>
+          <a:off x="0" y="0"/>
+          <a:ext cx="0" cy="0"/>
+          <a:chOff x="0" y="0"/>
+          <a:chExt cx="0" cy="0"/>
+        </a:xfrm>
+      </p:grpSpPr>
+      <p:sp>
+        <p:nvSpPr>
+          <p:cNvPr id="17" name="CaixaDeTexto 16"/>
+          <p:cNvSpPr txBox="1"/>
+          <p:nvPr/>
+        </p:nvSpPr>
+        <p:spPr>
+          <a:xfrm>
+            <a:off x="393549" y="333523"/>
+            <a:ext cx="6192688" cy="646331"/>
+          </a:xfrm>
+          <a:prstGeom prst="rect">
+            <a:avLst/>
+          </a:prstGeom>
+          <a:noFill/>
+        </p:spPr>
+        <p:txBody>
+          <a:bodyPr wrap="square" rtlCol="0">
+            <a:spAutoFit/>
+          </a:bodyPr>
+          <a:lstStyle/>
+          <a:p>
+            <a:r>
               <a:rPr lang="pt-BR" sz="3600" b="1" dirty="0">
                 <a:latin typeface="Verdana" panose="020B0604030504040204" pitchFamily="34" charset="0"/>
                 <a:ea typeface="Verdana" panose="020B0604030504040204" pitchFamily="34" charset="0"/>
                 <a:cs typeface="Verdana" panose="020B0604030504040204" pitchFamily="34" charset="0"/>
               </a:rPr>
-              <a:t>Representação Matemática</a:t>
-            </a:r>
-          </a:p>
-        </p:txBody>
-      </p:sp>
-      <p:sp>
-        <p:nvSpPr>
-          <p:cNvPr id="10" name="Retângulo 9"/>
+              <a:t>Problema</a:t>
+            </a:r>
+          </a:p>
+        </p:txBody>
+      </p:sp>
+      <p:sp>
+        <p:nvSpPr>
+          <p:cNvPr id="19" name="CaixaDeTexto 18"/>
+          <p:cNvSpPr txBox="1"/>
+          <p:nvPr/>
+        </p:nvSpPr>
+        <p:spPr>
+          <a:xfrm>
+            <a:off x="683568" y="979855"/>
+            <a:ext cx="6344292" cy="3108543"/>
+          </a:xfrm>
+          <a:prstGeom prst="rect">
+            <a:avLst/>
+          </a:prstGeom>
+          <a:noFill/>
+        </p:spPr>
+        <p:txBody>
+          <a:bodyPr wrap="square" rtlCol="0">
+            <a:spAutoFit/>
+          </a:bodyPr>
+          <a:lstStyle/>
+          <a:p>
+            <a:pPr algn="just"/>
+            <a:r>
+              <a:rPr lang="pt-BR" dirty="0"/>
+              <a:t>O problema consiste em selecionar M elementos dentre um conjunto de N elementos, sendo o subconjunto selecionado o mais diversificado possível.</a:t>
+            </a:r>
+          </a:p>
+          <a:p>
+            <a:endParaRPr lang="en-US" sz="1700" dirty="0">
+              <a:latin typeface="Verdana" panose="020B0604030504040204" pitchFamily="34" charset="0"/>
+              <a:ea typeface="Verdana" panose="020B0604030504040204" pitchFamily="34" charset="0"/>
+              <a:cs typeface="Verdana" panose="020B0604030504040204" pitchFamily="34" charset="0"/>
+            </a:endParaRPr>
+          </a:p>
+          <a:p>
+            <a:pPr marL="285750" indent="-285750">
+              <a:buFont typeface="Arial" panose="020B0604020202020204" pitchFamily="34" charset="0"/>
+              <a:buChar char="•"/>
+            </a:pPr>
+            <a:r>
+              <a:rPr lang="pt-BR" b="1" dirty="0" smtClean="0">
+                <a:latin typeface="Verdana" panose="020B0604030504040204" pitchFamily="34" charset="0"/>
+                <a:ea typeface="Verdana" panose="020B0604030504040204" pitchFamily="34" charset="0"/>
+                <a:cs typeface="Verdana" panose="020B0604030504040204" pitchFamily="34" charset="0"/>
+              </a:rPr>
+              <a:t>Exemplos:</a:t>
+            </a:r>
+          </a:p>
+          <a:p>
+            <a:endParaRPr lang="pt-BR" b="1" dirty="0">
+              <a:latin typeface="Verdana" panose="020B0604030504040204" pitchFamily="34" charset="0"/>
+              <a:ea typeface="Verdana" panose="020B0604030504040204" pitchFamily="34" charset="0"/>
+              <a:cs typeface="Verdana" panose="020B0604030504040204" pitchFamily="34" charset="0"/>
+            </a:endParaRPr>
+          </a:p>
+          <a:p>
+            <a:r>
+              <a:rPr lang="pt-BR" b="1" dirty="0" smtClean="0">
+                <a:latin typeface="Verdana" panose="020B0604030504040204" pitchFamily="34" charset="0"/>
+                <a:ea typeface="Verdana" panose="020B0604030504040204" pitchFamily="34" charset="0"/>
+                <a:cs typeface="Verdana" panose="020B0604030504040204" pitchFamily="34" charset="0"/>
+              </a:rPr>
+              <a:t>	</a:t>
+            </a:r>
+            <a:r>
+              <a:rPr lang="pt-BR" dirty="0" smtClean="0">
+                <a:latin typeface="+mj-lt"/>
+                <a:ea typeface="Verdana" panose="020B0604030504040204" pitchFamily="34" charset="0"/>
+                <a:cs typeface="Verdana" panose="020B0604030504040204" pitchFamily="34" charset="0"/>
+              </a:rPr>
+              <a:t>Selecionar um grupo de pessoas para participação de um júri em um tribunal.</a:t>
+            </a:r>
+          </a:p>
+          <a:p>
+            <a:r>
+              <a:rPr lang="pt-BR" dirty="0">
+                <a:latin typeface="+mj-lt"/>
+                <a:ea typeface="Verdana" panose="020B0604030504040204" pitchFamily="34" charset="0"/>
+                <a:cs typeface="Verdana" panose="020B0604030504040204" pitchFamily="34" charset="0"/>
+              </a:rPr>
+              <a:t>	</a:t>
+            </a:r>
+            <a:r>
+              <a:rPr lang="pt-BR" dirty="0" smtClean="0">
+                <a:latin typeface="+mj-lt"/>
+                <a:ea typeface="Verdana" panose="020B0604030504040204" pitchFamily="34" charset="0"/>
+                <a:cs typeface="Verdana" panose="020B0604030504040204" pitchFamily="34" charset="0"/>
+              </a:rPr>
+              <a:t>Selecionar sementes com características genéticas diferentes para evitar doenças que acabem com a safra.</a:t>
+            </a:r>
+            <a:endParaRPr lang="pt-BR" dirty="0">
+              <a:latin typeface="+mj-lt"/>
+              <a:ea typeface="Verdana" panose="020B0604030504040204" pitchFamily="34" charset="0"/>
+              <a:cs typeface="Verdana" panose="020B0604030504040204" pitchFamily="34" charset="0"/>
+            </a:endParaRPr>
+          </a:p>
+          <a:p>
+            <a:endParaRPr lang="pt-BR" sz="1700" dirty="0">
+              <a:latin typeface="Verdana" panose="020B0604030504040204" pitchFamily="34" charset="0"/>
+              <a:ea typeface="Verdana" panose="020B0604030504040204" pitchFamily="34" charset="0"/>
+              <a:cs typeface="Verdana" panose="020B0604030504040204" pitchFamily="34" charset="0"/>
+            </a:endParaRPr>
+          </a:p>
+        </p:txBody>
+      </p:sp>
+      <p:sp>
+        <p:nvSpPr>
+          <p:cNvPr id="20" name="Retângulo 19"/>
           <p:cNvSpPr/>
           <p:nvPr/>
         </p:nvSpPr>
@@ -4054,20 +4366,14 @@
       </p:sp>
       <p:pic>
         <p:nvPicPr>
-          <p:cNvPr id="4" name="Imagem 3">
-            <a:extLst>
-              <a:ext uri="{FF2B5EF4-FFF2-40B4-BE49-F238E27FC236}">
-                <a16:creationId xmlns:a16="http://schemas.microsoft.com/office/drawing/2014/main" id="{4773190F-C472-4CDE-A2D0-8F97087CC4FD}"/>
-              </a:ext>
-            </a:extLst>
-          </p:cNvPr>
+          <p:cNvPr id="7" name="Imagem 6"/>
           <p:cNvPicPr>
             <a:picLocks noChangeAspect="1"/>
           </p:cNvPicPr>
           <p:nvPr/>
         </p:nvPicPr>
         <p:blipFill>
-          <a:blip r:embed="rId3">
+          <a:blip r:embed="rId2" cstate="print">
             <a:extLst>
               <a:ext uri="{28A0092B-C50C-407E-A947-70E740481C1C}">
                 <a14:useLocalDpi xmlns:a14="http://schemas.microsoft.com/office/drawing/2010/main" val="0"/>
@@ -4080,30 +4386,54 @@
         </p:blipFill>
         <p:spPr>
           <a:xfrm>
-            <a:off x="393548" y="2406475"/>
-            <a:ext cx="4270166" cy="2045049"/>
+            <a:off x="287015" y="6381328"/>
+            <a:ext cx="1672379" cy="291764"/>
           </a:xfrm>
           <a:prstGeom prst="rect">
             <a:avLst/>
           </a:prstGeom>
         </p:spPr>
       </p:pic>
-      <p:sp>
-        <p:nvSpPr>
-          <p:cNvPr id="9" name="CaixaDeTexto 8">
-            <a:extLst>
-              <a:ext uri="{FF2B5EF4-FFF2-40B4-BE49-F238E27FC236}">
-                <a16:creationId xmlns:a16="http://schemas.microsoft.com/office/drawing/2014/main" id="{44B9EEE7-99EC-42C2-9AB1-6D8FD829670B}"/>
-              </a:ext>
-            </a:extLst>
-          </p:cNvPr>
+    </p:spTree>
+    <p:extLst>
+      <p:ext uri="{BB962C8B-B14F-4D97-AF65-F5344CB8AC3E}">
+        <p14:creationId xmlns:p14="http://schemas.microsoft.com/office/powerpoint/2010/main" val="3495502305"/>
+      </p:ext>
+    </p:extLst>
+  </p:cSld>
+  <p:clrMapOvr>
+    <a:masterClrMapping/>
+  </p:clrMapOvr>
+</p:sld>
+</file>
+
+<file path=ppt/slides/slide3.xml><?xml version="1.0" encoding="utf-8"?>
+<p:sld xmlns:a="http://schemas.openxmlformats.org/drawingml/2006/main" xmlns:r="http://schemas.openxmlformats.org/officeDocument/2006/relationships" xmlns:p="http://schemas.openxmlformats.org/presentationml/2006/main">
+  <p:cSld>
+    <p:spTree>
+      <p:nvGrpSpPr>
+        <p:cNvPr id="1" name=""/>
+        <p:cNvGrpSpPr/>
+        <p:nvPr/>
+      </p:nvGrpSpPr>
+      <p:grpSpPr>
+        <a:xfrm>
+          <a:off x="0" y="0"/>
+          <a:ext cx="0" cy="0"/>
+          <a:chOff x="0" y="0"/>
+          <a:chExt cx="0" cy="0"/>
+        </a:xfrm>
+      </p:grpSpPr>
+      <p:sp>
+        <p:nvSpPr>
+          <p:cNvPr id="8" name="CaixaDeTexto 7"/>
           <p:cNvSpPr txBox="1"/>
           <p:nvPr/>
         </p:nvSpPr>
         <p:spPr>
           <a:xfrm>
-            <a:off x="5004048" y="1988840"/>
-            <a:ext cx="3096344" cy="3108543"/>
+            <a:off x="971600" y="1700808"/>
+            <a:ext cx="5688632" cy="3046988"/>
           </a:xfrm>
           <a:prstGeom prst="rect">
             <a:avLst/>
@@ -4124,9 +4454,175 @@
               <a:rPr lang="en-US" sz="1600" b="1" dirty="0">
                 <a:latin typeface="Verdana" panose="020B0604030504040204" pitchFamily="34" charset="0"/>
                 <a:ea typeface="Verdana" panose="020B0604030504040204" pitchFamily="34" charset="0"/>
-              </a:rPr>
-              <a:t>A</a:t>
-            </a:r>
+                <a:cs typeface="Verdana" panose="020B0604030504040204" pitchFamily="34" charset="0"/>
+              </a:rPr>
+              <a:t>Vetor com n </a:t>
+            </a:r>
+            <a:r>
+              <a:rPr lang="en-US" sz="1600" b="1" dirty="0" err="1">
+                <a:latin typeface="Verdana" panose="020B0604030504040204" pitchFamily="34" charset="0"/>
+                <a:ea typeface="Verdana" panose="020B0604030504040204" pitchFamily="34" charset="0"/>
+                <a:cs typeface="Verdana" panose="020B0604030504040204" pitchFamily="34" charset="0"/>
+              </a:rPr>
+              <a:t>elementos</a:t>
+            </a:r>
+            <a:r>
+              <a:rPr lang="en-US" sz="1600" b="1" dirty="0">
+                <a:latin typeface="Verdana" panose="020B0604030504040204" pitchFamily="34" charset="0"/>
+                <a:ea typeface="Verdana" panose="020B0604030504040204" pitchFamily="34" charset="0"/>
+                <a:cs typeface="Verdana" panose="020B0604030504040204" pitchFamily="34" charset="0"/>
+              </a:rPr>
+              <a:t>: </a:t>
+            </a:r>
+            <a:r>
+              <a:rPr lang="en-US" sz="1600" dirty="0" err="1">
+                <a:latin typeface="Verdana" panose="020B0604030504040204" pitchFamily="34" charset="0"/>
+                <a:ea typeface="Verdana" panose="020B0604030504040204" pitchFamily="34" charset="0"/>
+                <a:cs typeface="Verdana" panose="020B0604030504040204" pitchFamily="34" charset="0"/>
+              </a:rPr>
+              <a:t>onde</a:t>
+            </a:r>
+            <a:r>
+              <a:rPr lang="en-US" sz="1600" dirty="0">
+                <a:latin typeface="Verdana" panose="020B0604030504040204" pitchFamily="34" charset="0"/>
+                <a:ea typeface="Verdana" panose="020B0604030504040204" pitchFamily="34" charset="0"/>
+                <a:cs typeface="Verdana" panose="020B0604030504040204" pitchFamily="34" charset="0"/>
+              </a:rPr>
+              <a:t> m </a:t>
+            </a:r>
+            <a:r>
+              <a:rPr lang="en-US" sz="1600" dirty="0" err="1">
+                <a:latin typeface="Verdana" panose="020B0604030504040204" pitchFamily="34" charset="0"/>
+                <a:ea typeface="Verdana" panose="020B0604030504040204" pitchFamily="34" charset="0"/>
+                <a:cs typeface="Verdana" panose="020B0604030504040204" pitchFamily="34" charset="0"/>
+              </a:rPr>
+              <a:t>elementos</a:t>
+            </a:r>
+            <a:r>
+              <a:rPr lang="en-US" sz="1600" dirty="0">
+                <a:latin typeface="Verdana" panose="020B0604030504040204" pitchFamily="34" charset="0"/>
+                <a:ea typeface="Verdana" panose="020B0604030504040204" pitchFamily="34" charset="0"/>
+                <a:cs typeface="Verdana" panose="020B0604030504040204" pitchFamily="34" charset="0"/>
+              </a:rPr>
+              <a:t> </a:t>
+            </a:r>
+            <a:r>
+              <a:rPr lang="en-US" sz="1600" dirty="0" err="1">
+                <a:latin typeface="Verdana" panose="020B0604030504040204" pitchFamily="34" charset="0"/>
+                <a:ea typeface="Verdana" panose="020B0604030504040204" pitchFamily="34" charset="0"/>
+                <a:cs typeface="Verdana" panose="020B0604030504040204" pitchFamily="34" charset="0"/>
+              </a:rPr>
+              <a:t>são</a:t>
+            </a:r>
+            <a:r>
+              <a:rPr lang="en-US" sz="1600" dirty="0">
+                <a:latin typeface="Verdana" panose="020B0604030504040204" pitchFamily="34" charset="0"/>
+                <a:ea typeface="Verdana" panose="020B0604030504040204" pitchFamily="34" charset="0"/>
+                <a:cs typeface="Verdana" panose="020B0604030504040204" pitchFamily="34" charset="0"/>
+              </a:rPr>
+              <a:t> </a:t>
+            </a:r>
+            <a:r>
+              <a:rPr lang="en-US" sz="1600" dirty="0" err="1">
+                <a:latin typeface="Verdana" panose="020B0604030504040204" pitchFamily="34" charset="0"/>
+                <a:ea typeface="Verdana" panose="020B0604030504040204" pitchFamily="34" charset="0"/>
+                <a:cs typeface="Verdana" panose="020B0604030504040204" pitchFamily="34" charset="0"/>
+              </a:rPr>
+              <a:t>marcados</a:t>
+            </a:r>
+            <a:r>
+              <a:rPr lang="en-US" sz="1600" dirty="0">
+                <a:latin typeface="Verdana" panose="020B0604030504040204" pitchFamily="34" charset="0"/>
+                <a:ea typeface="Verdana" panose="020B0604030504040204" pitchFamily="34" charset="0"/>
+                <a:cs typeface="Verdana" panose="020B0604030504040204" pitchFamily="34" charset="0"/>
+              </a:rPr>
+              <a:t> </a:t>
+            </a:r>
+            <a:r>
+              <a:rPr lang="en-US" sz="1600" dirty="0" err="1">
+                <a:latin typeface="Verdana" panose="020B0604030504040204" pitchFamily="34" charset="0"/>
+                <a:ea typeface="Verdana" panose="020B0604030504040204" pitchFamily="34" charset="0"/>
+                <a:cs typeface="Verdana" panose="020B0604030504040204" pitchFamily="34" charset="0"/>
+              </a:rPr>
+              <a:t>como</a:t>
+            </a:r>
+            <a:r>
+              <a:rPr lang="en-US" sz="1600" dirty="0">
+                <a:latin typeface="Verdana" panose="020B0604030504040204" pitchFamily="34" charset="0"/>
+                <a:ea typeface="Verdana" panose="020B0604030504040204" pitchFamily="34" charset="0"/>
+                <a:cs typeface="Verdana" panose="020B0604030504040204" pitchFamily="34" charset="0"/>
+              </a:rPr>
+              <a:t> </a:t>
+            </a:r>
+            <a:r>
+              <a:rPr lang="en-US" sz="1600" dirty="0" err="1">
+                <a:latin typeface="Verdana" panose="020B0604030504040204" pitchFamily="34" charset="0"/>
+                <a:ea typeface="Verdana" panose="020B0604030504040204" pitchFamily="34" charset="0"/>
+                <a:cs typeface="Verdana" panose="020B0604030504040204" pitchFamily="34" charset="0"/>
+              </a:rPr>
+              <a:t>selecionados</a:t>
+            </a:r>
+            <a:r>
+              <a:rPr lang="en-US" sz="1600" dirty="0">
+                <a:latin typeface="Verdana" panose="020B0604030504040204" pitchFamily="34" charset="0"/>
+                <a:ea typeface="Verdana" panose="020B0604030504040204" pitchFamily="34" charset="0"/>
+                <a:cs typeface="Verdana" panose="020B0604030504040204" pitchFamily="34" charset="0"/>
+              </a:rPr>
+              <a:t> e n-m </a:t>
+            </a:r>
+            <a:r>
+              <a:rPr lang="en-US" sz="1600" dirty="0" err="1">
+                <a:latin typeface="Verdana" panose="020B0604030504040204" pitchFamily="34" charset="0"/>
+                <a:ea typeface="Verdana" panose="020B0604030504040204" pitchFamily="34" charset="0"/>
+                <a:cs typeface="Verdana" panose="020B0604030504040204" pitchFamily="34" charset="0"/>
+              </a:rPr>
+              <a:t>como</a:t>
+            </a:r>
+            <a:r>
+              <a:rPr lang="en-US" sz="1600" dirty="0">
+                <a:latin typeface="Verdana" panose="020B0604030504040204" pitchFamily="34" charset="0"/>
+                <a:ea typeface="Verdana" panose="020B0604030504040204" pitchFamily="34" charset="0"/>
+                <a:cs typeface="Verdana" panose="020B0604030504040204" pitchFamily="34" charset="0"/>
+              </a:rPr>
+              <a:t> </a:t>
+            </a:r>
+            <a:r>
+              <a:rPr lang="en-US" sz="1600" dirty="0" err="1">
+                <a:latin typeface="Verdana" panose="020B0604030504040204" pitchFamily="34" charset="0"/>
+                <a:ea typeface="Verdana" panose="020B0604030504040204" pitchFamily="34" charset="0"/>
+                <a:cs typeface="Verdana" panose="020B0604030504040204" pitchFamily="34" charset="0"/>
+              </a:rPr>
+              <a:t>não</a:t>
+            </a:r>
+            <a:r>
+              <a:rPr lang="en-US" sz="1600" dirty="0">
+                <a:latin typeface="Verdana" panose="020B0604030504040204" pitchFamily="34" charset="0"/>
+                <a:ea typeface="Verdana" panose="020B0604030504040204" pitchFamily="34" charset="0"/>
+                <a:cs typeface="Verdana" panose="020B0604030504040204" pitchFamily="34" charset="0"/>
+              </a:rPr>
+              <a:t> </a:t>
+            </a:r>
+            <a:r>
+              <a:rPr lang="en-US" sz="1600" dirty="0" err="1">
+                <a:latin typeface="Verdana" panose="020B0604030504040204" pitchFamily="34" charset="0"/>
+                <a:ea typeface="Verdana" panose="020B0604030504040204" pitchFamily="34" charset="0"/>
+                <a:cs typeface="Verdana" panose="020B0604030504040204" pitchFamily="34" charset="0"/>
+              </a:rPr>
+              <a:t>selecionados</a:t>
+            </a:r>
+            <a:r>
+              <a:rPr lang="en-US" sz="1600" dirty="0" smtClean="0">
+                <a:latin typeface="Verdana" panose="020B0604030504040204" pitchFamily="34" charset="0"/>
+                <a:ea typeface="Verdana" panose="020B0604030504040204" pitchFamily="34" charset="0"/>
+                <a:cs typeface="Verdana" panose="020B0604030504040204" pitchFamily="34" charset="0"/>
+              </a:rPr>
+              <a:t>.</a:t>
+            </a:r>
+            <a:endParaRPr lang="en-US" sz="1600" b="1" dirty="0">
+              <a:latin typeface="Verdana" panose="020B0604030504040204" pitchFamily="34" charset="0"/>
+              <a:ea typeface="Verdana" panose="020B0604030504040204" pitchFamily="34" charset="0"/>
+              <a:cs typeface="Verdana" panose="020B0604030504040204" pitchFamily="34" charset="0"/>
+            </a:endParaRPr>
           </a:p>
           <a:p>
             <a:pPr marL="285750" indent="-285750">
@@ -4136,6 +4632,7 @@
             <a:endParaRPr lang="en-US" sz="1600" b="1" dirty="0">
               <a:latin typeface="Verdana" panose="020B0604030504040204" pitchFamily="34" charset="0"/>
               <a:ea typeface="Verdana" panose="020B0604030504040204" pitchFamily="34" charset="0"/>
+              <a:cs typeface="Verdana" panose="020B0604030504040204" pitchFamily="34" charset="0"/>
             </a:endParaRPr>
           </a:p>
           <a:p>
@@ -4144,11 +4641,116 @@
               <a:buChar char="•"/>
             </a:pPr>
             <a:r>
+              <a:rPr lang="en-US" sz="1600" b="1" dirty="0" err="1">
+                <a:latin typeface="Verdana" panose="020B0604030504040204" pitchFamily="34" charset="0"/>
+                <a:ea typeface="Verdana" panose="020B0604030504040204" pitchFamily="34" charset="0"/>
+                <a:cs typeface="Verdana" panose="020B0604030504040204" pitchFamily="34" charset="0"/>
+              </a:rPr>
+              <a:t>Matriz</a:t>
+            </a:r>
+            <a:r>
               <a:rPr lang="en-US" sz="1600" b="1" dirty="0">
                 <a:latin typeface="Verdana" panose="020B0604030504040204" pitchFamily="34" charset="0"/>
                 <a:ea typeface="Verdana" panose="020B0604030504040204" pitchFamily="34" charset="0"/>
-              </a:rPr>
-              <a:t>B</a:t>
+                <a:cs typeface="Verdana" panose="020B0604030504040204" pitchFamily="34" charset="0"/>
+              </a:rPr>
+              <a:t> </a:t>
+            </a:r>
+            <a:r>
+              <a:rPr lang="en-US" sz="1600" b="1" dirty="0" err="1">
+                <a:latin typeface="Verdana" panose="020B0604030504040204" pitchFamily="34" charset="0"/>
+                <a:ea typeface="Verdana" panose="020B0604030504040204" pitchFamily="34" charset="0"/>
+                <a:cs typeface="Verdana" panose="020B0604030504040204" pitchFamily="34" charset="0"/>
+              </a:rPr>
+              <a:t>diversidade</a:t>
+            </a:r>
+            <a:r>
+              <a:rPr lang="en-US" sz="1600" b="1" dirty="0">
+                <a:latin typeface="Verdana" panose="020B0604030504040204" pitchFamily="34" charset="0"/>
+                <a:ea typeface="Verdana" panose="020B0604030504040204" pitchFamily="34" charset="0"/>
+                <a:cs typeface="Verdana" panose="020B0604030504040204" pitchFamily="34" charset="0"/>
+              </a:rPr>
+              <a:t>: </a:t>
+            </a:r>
+            <a:r>
+              <a:rPr lang="en-US" sz="1600" dirty="0" err="1">
+                <a:latin typeface="Verdana" panose="020B0604030504040204" pitchFamily="34" charset="0"/>
+                <a:ea typeface="Verdana" panose="020B0604030504040204" pitchFamily="34" charset="0"/>
+                <a:cs typeface="Verdana" panose="020B0604030504040204" pitchFamily="34" charset="0"/>
+              </a:rPr>
+              <a:t>matriz</a:t>
+            </a:r>
+            <a:r>
+              <a:rPr lang="en-US" sz="1600" dirty="0">
+                <a:latin typeface="Verdana" panose="020B0604030504040204" pitchFamily="34" charset="0"/>
+                <a:ea typeface="Verdana" panose="020B0604030504040204" pitchFamily="34" charset="0"/>
+                <a:cs typeface="Verdana" panose="020B0604030504040204" pitchFamily="34" charset="0"/>
+              </a:rPr>
+              <a:t> n x n </a:t>
+            </a:r>
+            <a:r>
+              <a:rPr lang="en-US" sz="1600" dirty="0" err="1">
+                <a:latin typeface="Verdana" panose="020B0604030504040204" pitchFamily="34" charset="0"/>
+                <a:ea typeface="Verdana" panose="020B0604030504040204" pitchFamily="34" charset="0"/>
+                <a:cs typeface="Verdana" panose="020B0604030504040204" pitchFamily="34" charset="0"/>
+              </a:rPr>
+              <a:t>informando</a:t>
+            </a:r>
+            <a:r>
+              <a:rPr lang="en-US" sz="1600" dirty="0">
+                <a:latin typeface="Verdana" panose="020B0604030504040204" pitchFamily="34" charset="0"/>
+                <a:ea typeface="Verdana" panose="020B0604030504040204" pitchFamily="34" charset="0"/>
+                <a:cs typeface="Verdana" panose="020B0604030504040204" pitchFamily="34" charset="0"/>
+              </a:rPr>
+              <a:t> o valor da </a:t>
+            </a:r>
+            <a:r>
+              <a:rPr lang="en-US" sz="1600" dirty="0" err="1">
+                <a:latin typeface="Verdana" panose="020B0604030504040204" pitchFamily="34" charset="0"/>
+                <a:ea typeface="Verdana" panose="020B0604030504040204" pitchFamily="34" charset="0"/>
+                <a:cs typeface="Verdana" panose="020B0604030504040204" pitchFamily="34" charset="0"/>
+              </a:rPr>
+              <a:t>diferença</a:t>
+            </a:r>
+            <a:r>
+              <a:rPr lang="en-US" sz="1600" dirty="0">
+                <a:latin typeface="Verdana" panose="020B0604030504040204" pitchFamily="34" charset="0"/>
+                <a:ea typeface="Verdana" panose="020B0604030504040204" pitchFamily="34" charset="0"/>
+                <a:cs typeface="Verdana" panose="020B0604030504040204" pitchFamily="34" charset="0"/>
+              </a:rPr>
+              <a:t> de </a:t>
+            </a:r>
+            <a:r>
+              <a:rPr lang="en-US" sz="1600" dirty="0" err="1">
+                <a:latin typeface="Verdana" panose="020B0604030504040204" pitchFamily="34" charset="0"/>
+                <a:ea typeface="Verdana" panose="020B0604030504040204" pitchFamily="34" charset="0"/>
+                <a:cs typeface="Verdana" panose="020B0604030504040204" pitchFamily="34" charset="0"/>
+              </a:rPr>
+              <a:t>todos</a:t>
+            </a:r>
+            <a:r>
+              <a:rPr lang="en-US" sz="1600" dirty="0">
+                <a:latin typeface="Verdana" panose="020B0604030504040204" pitchFamily="34" charset="0"/>
+                <a:ea typeface="Verdana" panose="020B0604030504040204" pitchFamily="34" charset="0"/>
+                <a:cs typeface="Verdana" panose="020B0604030504040204" pitchFamily="34" charset="0"/>
+              </a:rPr>
+              <a:t> para </a:t>
+            </a:r>
+            <a:r>
+              <a:rPr lang="en-US" sz="1600" dirty="0" err="1">
+                <a:latin typeface="Verdana" panose="020B0604030504040204" pitchFamily="34" charset="0"/>
+                <a:ea typeface="Verdana" panose="020B0604030504040204" pitchFamily="34" charset="0"/>
+                <a:cs typeface="Verdana" panose="020B0604030504040204" pitchFamily="34" charset="0"/>
+              </a:rPr>
+              <a:t>todos</a:t>
+            </a:r>
+            <a:r>
+              <a:rPr lang="en-US" sz="1600" dirty="0">
+                <a:latin typeface="Verdana" panose="020B0604030504040204" pitchFamily="34" charset="0"/>
+                <a:ea typeface="Verdana" panose="020B0604030504040204" pitchFamily="34" charset="0"/>
+                <a:cs typeface="Verdana" panose="020B0604030504040204" pitchFamily="34" charset="0"/>
+              </a:rPr>
+              <a:t>.</a:t>
             </a:r>
           </a:p>
           <a:p>
@@ -4159,20 +4761,8 @@
             <a:endParaRPr lang="en-US" sz="1600" b="1" dirty="0">
               <a:latin typeface="Verdana" panose="020B0604030504040204" pitchFamily="34" charset="0"/>
               <a:ea typeface="Verdana" panose="020B0604030504040204" pitchFamily="34" charset="0"/>
+              <a:cs typeface="Verdana" panose="020B0604030504040204" pitchFamily="34" charset="0"/>
             </a:endParaRPr>
-          </a:p>
-          <a:p>
-            <a:pPr marL="285750" indent="-285750">
-              <a:buFont typeface="Arial" panose="020B0604020202020204" pitchFamily="34" charset="0"/>
-              <a:buChar char="•"/>
-            </a:pPr>
-            <a:r>
-              <a:rPr lang="en-US" sz="1600" b="1" dirty="0">
-                <a:latin typeface="Verdana" panose="020B0604030504040204" pitchFamily="34" charset="0"/>
-                <a:ea typeface="Verdana" panose="020B0604030504040204" pitchFamily="34" charset="0"/>
-              </a:rPr>
-              <a:t>C</a:t>
-            </a:r>
           </a:p>
           <a:p>
             <a:pPr marL="285750" indent="-285750">
@@ -4182,20 +4772,8 @@
             <a:endParaRPr lang="en-US" sz="1600" b="1" dirty="0">
               <a:latin typeface="Verdana" panose="020B0604030504040204" pitchFamily="34" charset="0"/>
               <a:ea typeface="Verdana" panose="020B0604030504040204" pitchFamily="34" charset="0"/>
+              <a:cs typeface="Verdana" panose="020B0604030504040204" pitchFamily="34" charset="0"/>
             </a:endParaRPr>
-          </a:p>
-          <a:p>
-            <a:pPr marL="285750" indent="-285750">
-              <a:buFont typeface="Arial" panose="020B0604020202020204" pitchFamily="34" charset="0"/>
-              <a:buChar char="•"/>
-            </a:pPr>
-            <a:r>
-              <a:rPr lang="en-US" sz="1600" b="1" dirty="0">
-                <a:latin typeface="Verdana" panose="020B0604030504040204" pitchFamily="34" charset="0"/>
-                <a:ea typeface="Verdana" panose="020B0604030504040204" pitchFamily="34" charset="0"/>
-              </a:rPr>
-              <a:t>D</a:t>
-            </a:r>
           </a:p>
           <a:p>
             <a:pPr marL="285750" indent="-285750">
@@ -4205,20 +4783,8 @@
             <a:endParaRPr lang="en-US" sz="1600" b="1" dirty="0">
               <a:latin typeface="Verdana" panose="020B0604030504040204" pitchFamily="34" charset="0"/>
               <a:ea typeface="Verdana" panose="020B0604030504040204" pitchFamily="34" charset="0"/>
+              <a:cs typeface="Verdana" panose="020B0604030504040204" pitchFamily="34" charset="0"/>
             </a:endParaRPr>
-          </a:p>
-          <a:p>
-            <a:pPr marL="285750" indent="-285750">
-              <a:buFont typeface="Arial" panose="020B0604020202020204" pitchFamily="34" charset="0"/>
-              <a:buChar char="•"/>
-            </a:pPr>
-            <a:r>
-              <a:rPr lang="en-US" sz="1600" b="1" dirty="0">
-                <a:latin typeface="Verdana" panose="020B0604030504040204" pitchFamily="34" charset="0"/>
-                <a:ea typeface="Verdana" panose="020B0604030504040204" pitchFamily="34" charset="0"/>
-              </a:rPr>
-              <a:t>E</a:t>
-            </a:r>
           </a:p>
           <a:p>
             <a:pPr marL="285750" indent="-285750">
@@ -4228,6 +4794,7 @@
             <a:endParaRPr lang="en-US" sz="1600" b="1" dirty="0">
               <a:latin typeface="Verdana" panose="020B0604030504040204" pitchFamily="34" charset="0"/>
               <a:ea typeface="Verdana" panose="020B0604030504040204" pitchFamily="34" charset="0"/>
+              <a:cs typeface="Verdana" panose="020B0604030504040204" pitchFamily="34" charset="0"/>
             </a:endParaRPr>
           </a:p>
           <a:p>
@@ -4235,16 +4802,10 @@
               <a:buFont typeface="Arial" panose="020B0604020202020204" pitchFamily="34" charset="0"/>
               <a:buChar char="•"/>
             </a:pPr>
-            <a:r>
-              <a:rPr lang="en-US" sz="1600" b="1" dirty="0">
-                <a:latin typeface="Verdana" panose="020B0604030504040204" pitchFamily="34" charset="0"/>
-                <a:ea typeface="Verdana" panose="020B0604030504040204" pitchFamily="34" charset="0"/>
-              </a:rPr>
-              <a:t>F</a:t>
-            </a:r>
-            <a:endParaRPr lang="en-US" b="1" dirty="0">
+            <a:endParaRPr lang="en-US" sz="1600" b="1" dirty="0">
               <a:latin typeface="Verdana" panose="020B0604030504040204" pitchFamily="34" charset="0"/>
               <a:ea typeface="Verdana" panose="020B0604030504040204" pitchFamily="34" charset="0"/>
+              <a:cs typeface="Verdana" panose="020B0604030504040204" pitchFamily="34" charset="0"/>
             </a:endParaRPr>
           </a:p>
           <a:p>
@@ -4252,6 +4813,132 @@
               <a:buFont typeface="Arial" panose="020B0604020202020204" pitchFamily="34" charset="0"/>
               <a:buChar char="•"/>
             </a:pPr>
+            <a:endParaRPr lang="pt-BR" sz="1600" b="1" dirty="0">
+              <a:latin typeface="Verdana" panose="020B0604030504040204" pitchFamily="34" charset="0"/>
+              <a:ea typeface="Verdana" panose="020B0604030504040204" pitchFamily="34" charset="0"/>
+              <a:cs typeface="Verdana" panose="020B0604030504040204" pitchFamily="34" charset="0"/>
+            </a:endParaRPr>
+          </a:p>
+        </p:txBody>
+      </p:sp>
+      <p:pic>
+        <p:nvPicPr>
+          <p:cNvPr id="7" name="Imagem 6"/>
+          <p:cNvPicPr>
+            <a:picLocks noChangeAspect="1"/>
+          </p:cNvPicPr>
+          <p:nvPr/>
+        </p:nvPicPr>
+        <p:blipFill>
+          <a:blip r:embed="rId2" cstate="print">
+            <a:extLst>
+              <a:ext uri="{28A0092B-C50C-407E-A947-70E740481C1C}">
+                <a14:useLocalDpi xmlns:a14="http://schemas.microsoft.com/office/drawing/2010/main" val="0"/>
+              </a:ext>
+            </a:extLst>
+          </a:blip>
+          <a:stretch>
+            <a:fillRect/>
+          </a:stretch>
+        </p:blipFill>
+        <p:spPr>
+          <a:xfrm>
+            <a:off x="287015" y="6381328"/>
+            <a:ext cx="1672379" cy="291764"/>
+          </a:xfrm>
+          <a:prstGeom prst="rect">
+            <a:avLst/>
+          </a:prstGeom>
+        </p:spPr>
+      </p:pic>
+      <p:sp>
+        <p:nvSpPr>
+          <p:cNvPr id="9" name="CaixaDeTexto 8"/>
+          <p:cNvSpPr txBox="1"/>
+          <p:nvPr/>
+        </p:nvSpPr>
+        <p:spPr>
+          <a:xfrm>
+            <a:off x="393549" y="333523"/>
+            <a:ext cx="6192688" cy="646331"/>
+          </a:xfrm>
+          <a:prstGeom prst="rect">
+            <a:avLst/>
+          </a:prstGeom>
+          <a:noFill/>
+        </p:spPr>
+        <p:txBody>
+          <a:bodyPr wrap="square" rtlCol="0">
+            <a:spAutoFit/>
+          </a:bodyPr>
+          <a:lstStyle/>
+          <a:p>
+            <a:r>
+              <a:rPr lang="en-US" sz="3600" b="1" dirty="0" err="1">
+                <a:latin typeface="Verdana" panose="020B0604030504040204" pitchFamily="34" charset="0"/>
+                <a:ea typeface="Verdana" panose="020B0604030504040204" pitchFamily="34" charset="0"/>
+                <a:cs typeface="Verdana" panose="020B0604030504040204" pitchFamily="34" charset="0"/>
+              </a:rPr>
+              <a:t>Estrutura</a:t>
+            </a:r>
+            <a:r>
+              <a:rPr lang="en-US" sz="3600" b="1" dirty="0">
+                <a:latin typeface="Verdana" panose="020B0604030504040204" pitchFamily="34" charset="0"/>
+                <a:ea typeface="Verdana" panose="020B0604030504040204" pitchFamily="34" charset="0"/>
+                <a:cs typeface="Verdana" panose="020B0604030504040204" pitchFamily="34" charset="0"/>
+              </a:rPr>
+              <a:t> dos Dados</a:t>
+            </a:r>
+            <a:endParaRPr lang="pt-BR" sz="3600" b="1" dirty="0">
+              <a:latin typeface="Verdana" panose="020B0604030504040204" pitchFamily="34" charset="0"/>
+              <a:ea typeface="Verdana" panose="020B0604030504040204" pitchFamily="34" charset="0"/>
+              <a:cs typeface="Verdana" panose="020B0604030504040204" pitchFamily="34" charset="0"/>
+            </a:endParaRPr>
+          </a:p>
+        </p:txBody>
+      </p:sp>
+      <p:sp>
+        <p:nvSpPr>
+          <p:cNvPr id="11" name="Retângulo 10"/>
+          <p:cNvSpPr/>
+          <p:nvPr/>
+        </p:nvSpPr>
+        <p:spPr>
+          <a:xfrm flipV="1">
+            <a:off x="-36512" y="476670"/>
+            <a:ext cx="323528" cy="360039"/>
+          </a:xfrm>
+          <a:prstGeom prst="rect">
+            <a:avLst/>
+          </a:prstGeom>
+          <a:solidFill>
+            <a:srgbClr val="149B55"/>
+          </a:solidFill>
+          <a:ln>
+            <a:noFill/>
+          </a:ln>
+        </p:spPr>
+        <p:style>
+          <a:lnRef idx="2">
+            <a:schemeClr val="accent1">
+              <a:shade val="50000"/>
+            </a:schemeClr>
+          </a:lnRef>
+          <a:fillRef idx="1">
+            <a:schemeClr val="accent1"/>
+          </a:fillRef>
+          <a:effectRef idx="0">
+            <a:schemeClr val="accent1"/>
+          </a:effectRef>
+          <a:fontRef idx="minor">
+            <a:schemeClr val="lt1"/>
+          </a:fontRef>
+        </p:style>
+        <p:txBody>
+          <a:bodyPr rtlCol="0" anchor="ctr"/>
+          <a:lstStyle/>
+          <a:p>
+            <a:pPr algn="ctr"/>
             <a:endParaRPr lang="pt-BR" dirty="0"/>
           </a:p>
         </p:txBody>
@@ -4259,7 +4946,7 @@
     </p:spTree>
     <p:extLst>
       <p:ext uri="{BB962C8B-B14F-4D97-AF65-F5344CB8AC3E}">
-        <p14:creationId xmlns:p14="http://schemas.microsoft.com/office/powerpoint/2010/main" val="477266963"/>
+        <p14:creationId xmlns:p14="http://schemas.microsoft.com/office/powerpoint/2010/main" val="4006614587"/>
       </p:ext>
     </p:extLst>
   </p:cSld>
@@ -4294,8 +4981,8 @@
         </p:nvSpPr>
         <p:spPr>
           <a:xfrm>
-            <a:off x="971600" y="1700808"/>
-            <a:ext cx="5688632" cy="3293209"/>
+            <a:off x="899592" y="1340768"/>
+            <a:ext cx="5688632" cy="1323439"/>
           </a:xfrm>
           <a:prstGeom prst="rect">
             <a:avLst/>
@@ -4312,22 +4999,44 @@
               <a:buFont typeface="Arial" panose="020B0604020202020204" pitchFamily="34" charset="0"/>
               <a:buChar char="•"/>
             </a:pPr>
-            <a:r>
-              <a:rPr lang="pt-BR" sz="1600" b="1" dirty="0">
-                <a:latin typeface="Verdana" panose="020B0604030504040204" pitchFamily="34" charset="0"/>
-                <a:ea typeface="Verdana" panose="020B0604030504040204" pitchFamily="34" charset="0"/>
-                <a:cs typeface="Verdana" panose="020B0604030504040204" pitchFamily="34" charset="0"/>
-              </a:rPr>
-              <a:t>SOM: </a:t>
-            </a:r>
-            <a:r>
-              <a:rPr lang="pt-BR" sz="1600" dirty="0">
-                <a:latin typeface="Verdana" panose="020B0604030504040204" pitchFamily="34" charset="0"/>
-                <a:ea typeface="Verdana" panose="020B0604030504040204" pitchFamily="34" charset="0"/>
-                <a:cs typeface="Verdana" panose="020B0604030504040204" pitchFamily="34" charset="0"/>
-              </a:rPr>
-              <a:t>Matrizes que contém número randômicos de 0 a 9, gerados por uma distribuição uniforme de inteiros.</a:t>
-            </a:r>
+            <a:endParaRPr lang="en-US" sz="1600" b="1" dirty="0">
+              <a:latin typeface="Verdana" panose="020B0604030504040204" pitchFamily="34" charset="0"/>
+              <a:ea typeface="Verdana" panose="020B0604030504040204" pitchFamily="34" charset="0"/>
+              <a:cs typeface="Verdana" panose="020B0604030504040204" pitchFamily="34" charset="0"/>
+            </a:endParaRPr>
+          </a:p>
+          <a:p>
+            <a:pPr marL="285750" indent="-285750">
+              <a:buFont typeface="Arial" panose="020B0604020202020204" pitchFamily="34" charset="0"/>
+              <a:buChar char="•"/>
+            </a:pPr>
+            <a:endParaRPr lang="en-US" sz="1600" b="1" dirty="0">
+              <a:latin typeface="Verdana" panose="020B0604030504040204" pitchFamily="34" charset="0"/>
+              <a:ea typeface="Verdana" panose="020B0604030504040204" pitchFamily="34" charset="0"/>
+              <a:cs typeface="Verdana" panose="020B0604030504040204" pitchFamily="34" charset="0"/>
+            </a:endParaRPr>
+          </a:p>
+          <a:p>
+            <a:pPr marL="285750" indent="-285750">
+              <a:buFont typeface="Arial" panose="020B0604020202020204" pitchFamily="34" charset="0"/>
+              <a:buChar char="•"/>
+            </a:pPr>
+            <a:endParaRPr lang="en-US" sz="1600" b="1" dirty="0">
+              <a:latin typeface="Verdana" panose="020B0604030504040204" pitchFamily="34" charset="0"/>
+              <a:ea typeface="Verdana" panose="020B0604030504040204" pitchFamily="34" charset="0"/>
+              <a:cs typeface="Verdana" panose="020B0604030504040204" pitchFamily="34" charset="0"/>
+            </a:endParaRPr>
+          </a:p>
+          <a:p>
+            <a:pPr marL="285750" indent="-285750">
+              <a:buFont typeface="Arial" panose="020B0604020202020204" pitchFamily="34" charset="0"/>
+              <a:buChar char="•"/>
+            </a:pPr>
+            <a:endParaRPr lang="en-US" sz="1600" b="1" dirty="0">
+              <a:latin typeface="Verdana" panose="020B0604030504040204" pitchFamily="34" charset="0"/>
+              <a:ea typeface="Verdana" panose="020B0604030504040204" pitchFamily="34" charset="0"/>
+              <a:cs typeface="Verdana" panose="020B0604030504040204" pitchFamily="34" charset="0"/>
+            </a:endParaRPr>
           </a:p>
           <a:p>
             <a:pPr marL="285750" indent="-285750">
@@ -4339,78 +5048,6 @@
               <a:ea typeface="Verdana" panose="020B0604030504040204" pitchFamily="34" charset="0"/>
               <a:cs typeface="Verdana" panose="020B0604030504040204" pitchFamily="34" charset="0"/>
             </a:endParaRPr>
-          </a:p>
-          <a:p>
-            <a:pPr marL="285750" indent="-285750">
-              <a:buFont typeface="Arial" panose="020B0604020202020204" pitchFamily="34" charset="0"/>
-              <a:buChar char="•"/>
-            </a:pPr>
-            <a:endParaRPr lang="pt-BR" sz="1600" dirty="0">
-              <a:latin typeface="Verdana" panose="020B0604030504040204" pitchFamily="34" charset="0"/>
-              <a:ea typeface="Verdana" panose="020B0604030504040204" pitchFamily="34" charset="0"/>
-              <a:cs typeface="Verdana" panose="020B0604030504040204" pitchFamily="34" charset="0"/>
-            </a:endParaRPr>
-          </a:p>
-          <a:p>
-            <a:pPr marL="285750" indent="-285750">
-              <a:buFont typeface="Arial" panose="020B0604020202020204" pitchFamily="34" charset="0"/>
-              <a:buChar char="•"/>
-            </a:pPr>
-            <a:r>
-              <a:rPr lang="pt-BR" sz="1600" b="1" dirty="0">
-                <a:latin typeface="Verdana" panose="020B0604030504040204" pitchFamily="34" charset="0"/>
-                <a:ea typeface="Verdana" panose="020B0604030504040204" pitchFamily="34" charset="0"/>
-                <a:cs typeface="Verdana" panose="020B0604030504040204" pitchFamily="34" charset="0"/>
-              </a:rPr>
-              <a:t>GDK:</a:t>
-            </a:r>
-            <a:r>
-              <a:rPr lang="pt-BR" sz="1600" dirty="0">
-                <a:latin typeface="Verdana" panose="020B0604030504040204" pitchFamily="34" charset="0"/>
-                <a:ea typeface="Verdana" panose="020B0604030504040204" pitchFamily="34" charset="0"/>
-                <a:cs typeface="Verdana" panose="020B0604030504040204" pitchFamily="34" charset="0"/>
-              </a:rPr>
-              <a:t> Matrizes onde os valores são calculados pela distância Euclidiana de pontos gerados randomicamente.</a:t>
-            </a:r>
-          </a:p>
-          <a:p>
-            <a:r>
-              <a:rPr lang="pt-BR" sz="1600" dirty="0">
-                <a:latin typeface="Verdana" panose="020B0604030504040204" pitchFamily="34" charset="0"/>
-                <a:ea typeface="Verdana" panose="020B0604030504040204" pitchFamily="34" charset="0"/>
-                <a:cs typeface="Verdana" panose="020B0604030504040204" pitchFamily="34" charset="0"/>
-              </a:rPr>
-              <a:t> </a:t>
-            </a:r>
-          </a:p>
-          <a:p>
-            <a:endParaRPr lang="pt-BR" sz="1600" dirty="0">
-              <a:latin typeface="Verdana" panose="020B0604030504040204" pitchFamily="34" charset="0"/>
-              <a:ea typeface="Verdana" panose="020B0604030504040204" pitchFamily="34" charset="0"/>
-              <a:cs typeface="Verdana" panose="020B0604030504040204" pitchFamily="34" charset="0"/>
-            </a:endParaRPr>
-          </a:p>
-          <a:p>
-            <a:pPr marL="285750" indent="-285750">
-              <a:buFont typeface="Arial" panose="020B0604020202020204" pitchFamily="34" charset="0"/>
-              <a:buChar char="•"/>
-            </a:pPr>
-            <a:r>
-              <a:rPr lang="pt-BR" sz="1600" b="1" dirty="0">
-                <a:latin typeface="Verdana" panose="020B0604030504040204" pitchFamily="34" charset="0"/>
-                <a:ea typeface="Verdana" panose="020B0604030504040204" pitchFamily="34" charset="0"/>
-                <a:cs typeface="Verdana" panose="020B0604030504040204" pitchFamily="34" charset="0"/>
-              </a:rPr>
-              <a:t>MDG: </a:t>
-            </a:r>
-            <a:r>
-              <a:rPr lang="pt-BR" sz="1600" dirty="0">
-                <a:latin typeface="Verdana" panose="020B0604030504040204" pitchFamily="34" charset="0"/>
-                <a:ea typeface="Verdana" panose="020B0604030504040204" pitchFamily="34" charset="0"/>
-                <a:cs typeface="Verdana" panose="020B0604030504040204" pitchFamily="34" charset="0"/>
-              </a:rPr>
-              <a:t>Matrizes que contém números reais randomicamente selecionados entre 0 e 10, através de uma distribuição uniforme.</a:t>
-            </a:r>
           </a:p>
         </p:txBody>
       </p:sp>
@@ -4452,8 +5089,8 @@
         </p:nvSpPr>
         <p:spPr>
           <a:xfrm>
-            <a:off x="393549" y="333523"/>
-            <a:ext cx="6192688" cy="646331"/>
+            <a:off x="393548" y="333523"/>
+            <a:ext cx="7922867" cy="646331"/>
           </a:xfrm>
           <a:prstGeom prst="rect">
             <a:avLst/>
@@ -4466,21 +5103,30 @@
           </a:bodyPr>
           <a:lstStyle/>
           <a:p>
-            <a:r>
-              <a:rPr lang="en-US" sz="3600" b="1" dirty="0">
-                <a:latin typeface="Verdana" panose="020B0604030504040204" pitchFamily="34" charset="0"/>
-                <a:ea typeface="Verdana" panose="020B0604030504040204" pitchFamily="34" charset="0"/>
-                <a:cs typeface="Verdana" panose="020B0604030504040204" pitchFamily="34" charset="0"/>
-              </a:rPr>
-              <a:t>I</a:t>
-            </a:r>
-            <a:r>
-              <a:rPr lang="pt-BR" sz="3600" b="1" dirty="0" err="1">
-                <a:latin typeface="Verdana" panose="020B0604030504040204" pitchFamily="34" charset="0"/>
-                <a:ea typeface="Verdana" panose="020B0604030504040204" pitchFamily="34" charset="0"/>
-                <a:cs typeface="Verdana" panose="020B0604030504040204" pitchFamily="34" charset="0"/>
-              </a:rPr>
-              <a:t>nstâncias</a:t>
+            <a:pPr algn="ctr"/>
+            <a:r>
+              <a:rPr lang="pt-BR" sz="3600" b="1" dirty="0" smtClean="0">
+                <a:latin typeface="Verdana" panose="020B0604030504040204" pitchFamily="34" charset="0"/>
+                <a:ea typeface="Verdana" panose="020B0604030504040204" pitchFamily="34" charset="0"/>
+                <a:cs typeface="Verdana" panose="020B0604030504040204" pitchFamily="34" charset="0"/>
+              </a:rPr>
+              <a:t>O que é </a:t>
+            </a:r>
+            <a:r>
+              <a:rPr lang="pt-BR" sz="3600" b="1" smtClean="0">
+                <a:latin typeface="Verdana" panose="020B0604030504040204" pitchFamily="34" charset="0"/>
+                <a:ea typeface="Verdana" panose="020B0604030504040204" pitchFamily="34" charset="0"/>
+                <a:cs typeface="Verdana" panose="020B0604030504040204" pitchFamily="34" charset="0"/>
+              </a:rPr>
+              <a:t>essa</a:t>
+            </a:r>
+            <a:r>
+              <a:rPr lang="pt-BR" sz="3600" b="1" smtClean="0">
+                <a:latin typeface="Verdana" panose="020B0604030504040204" pitchFamily="34" charset="0"/>
+                <a:ea typeface="Verdana" panose="020B0604030504040204" pitchFamily="34" charset="0"/>
+                <a:cs typeface="Verdana" panose="020B0604030504040204" pitchFamily="34" charset="0"/>
+              </a:rPr>
+              <a:t> diferença?</a:t>
             </a:r>
             <a:endParaRPr lang="pt-BR" sz="3600" b="1" dirty="0">
               <a:latin typeface="Verdana" panose="020B0604030504040204" pitchFamily="34" charset="0"/>
@@ -4539,7 +5185,7 @@
     </p:spTree>
     <p:extLst>
       <p:ext uri="{BB962C8B-B14F-4D97-AF65-F5344CB8AC3E}">
-        <p14:creationId xmlns:p14="http://schemas.microsoft.com/office/powerpoint/2010/main" val="149408932"/>
+        <p14:creationId xmlns:p14="http://schemas.microsoft.com/office/powerpoint/2010/main" val="2452928483"/>
       </p:ext>
     </p:extLst>
   </p:cSld>
@@ -4550,1489 +5196,6 @@
 </file>
 
 <file path=ppt/slides/slide5.xml><?xml version="1.0" encoding="utf-8"?>
-<p:sld xmlns:a="http://schemas.openxmlformats.org/drawingml/2006/main" xmlns:r="http://schemas.openxmlformats.org/officeDocument/2006/relationships" xmlns:p="http://schemas.openxmlformats.org/presentationml/2006/main">
-  <p:cSld>
-    <p:spTree>
-      <p:nvGrpSpPr>
-        <p:cNvPr id="1" name=""/>
-        <p:cNvGrpSpPr/>
-        <p:nvPr/>
-      </p:nvGrpSpPr>
-      <p:grpSpPr>
-        <a:xfrm>
-          <a:off x="0" y="0"/>
-          <a:ext cx="0" cy="0"/>
-          <a:chOff x="0" y="0"/>
-          <a:chExt cx="0" cy="0"/>
-        </a:xfrm>
-      </p:grpSpPr>
-      <p:sp>
-        <p:nvSpPr>
-          <p:cNvPr id="8" name="CaixaDeTexto 7"/>
-          <p:cNvSpPr txBox="1"/>
-          <p:nvPr/>
-        </p:nvSpPr>
-        <p:spPr>
-          <a:xfrm>
-            <a:off x="971600" y="1700808"/>
-            <a:ext cx="5688632" cy="2308324"/>
-          </a:xfrm>
-          <a:prstGeom prst="rect">
-            <a:avLst/>
-          </a:prstGeom>
-          <a:noFill/>
-        </p:spPr>
-        <p:txBody>
-          <a:bodyPr wrap="square" rtlCol="0">
-            <a:spAutoFit/>
-          </a:bodyPr>
-          <a:lstStyle/>
-          <a:p>
-            <a:pPr marL="285750" indent="-285750">
-              <a:buFont typeface="Arial" panose="020B0604020202020204" pitchFamily="34" charset="0"/>
-              <a:buChar char="•"/>
-            </a:pPr>
-            <a:r>
-              <a:rPr lang="pt-BR" sz="1600" b="1" dirty="0">
-                <a:latin typeface="Verdana" panose="020B0604030504040204" pitchFamily="34" charset="0"/>
-                <a:ea typeface="Verdana" panose="020B0604030504040204" pitchFamily="34" charset="0"/>
-                <a:cs typeface="Verdana" panose="020B0604030504040204" pitchFamily="34" charset="0"/>
-              </a:rPr>
-              <a:t>Construção: </a:t>
-            </a:r>
-            <a:r>
-              <a:rPr lang="pt-BR" sz="1600" dirty="0">
-                <a:latin typeface="Verdana" panose="020B0604030504040204" pitchFamily="34" charset="0"/>
-                <a:ea typeface="Verdana" panose="020B0604030504040204" pitchFamily="34" charset="0"/>
-                <a:cs typeface="Verdana" panose="020B0604030504040204" pitchFamily="34" charset="0"/>
-              </a:rPr>
-              <a:t>Solução ao acaso, selecionando ou removendo elementos iterativamente.</a:t>
-            </a:r>
-          </a:p>
-          <a:p>
-            <a:endParaRPr lang="en-US" sz="1600" b="1" dirty="0">
-              <a:latin typeface="Verdana" panose="020B0604030504040204" pitchFamily="34" charset="0"/>
-              <a:ea typeface="Verdana" panose="020B0604030504040204" pitchFamily="34" charset="0"/>
-              <a:cs typeface="Verdana" panose="020B0604030504040204" pitchFamily="34" charset="0"/>
-            </a:endParaRPr>
-          </a:p>
-          <a:p>
-            <a:endParaRPr lang="pt-BR" sz="1600" b="1" dirty="0">
-              <a:latin typeface="Verdana" panose="020B0604030504040204" pitchFamily="34" charset="0"/>
-              <a:ea typeface="Verdana" panose="020B0604030504040204" pitchFamily="34" charset="0"/>
-              <a:cs typeface="Verdana" panose="020B0604030504040204" pitchFamily="34" charset="0"/>
-            </a:endParaRPr>
-          </a:p>
-          <a:p>
-            <a:pPr marL="285750" indent="-285750">
-              <a:buFont typeface="Arial" panose="020B0604020202020204" pitchFamily="34" charset="0"/>
-              <a:buChar char="•"/>
-            </a:pPr>
-            <a:r>
-              <a:rPr lang="pt-BR" sz="1600" b="1" dirty="0">
-                <a:latin typeface="Verdana" panose="020B0604030504040204" pitchFamily="34" charset="0"/>
-                <a:ea typeface="Verdana" panose="020B0604030504040204" pitchFamily="34" charset="0"/>
-                <a:cs typeface="Verdana" panose="020B0604030504040204" pitchFamily="34" charset="0"/>
-              </a:rPr>
-              <a:t>Melhoria:</a:t>
-            </a:r>
-            <a:r>
-              <a:rPr lang="pt-BR" sz="1600" dirty="0">
-                <a:latin typeface="Verdana" panose="020B0604030504040204" pitchFamily="34" charset="0"/>
-                <a:ea typeface="Verdana" panose="020B0604030504040204" pitchFamily="34" charset="0"/>
-                <a:cs typeface="Verdana" panose="020B0604030504040204" pitchFamily="34" charset="0"/>
-              </a:rPr>
-              <a:t> Iniciam por uma heurística de construção e iterativamente escolhem, usualmente, um elemento que incremente a solução.</a:t>
-            </a:r>
-          </a:p>
-          <a:p>
-            <a:r>
-              <a:rPr lang="pt-BR" sz="1600" dirty="0">
-                <a:latin typeface="Verdana" panose="020B0604030504040204" pitchFamily="34" charset="0"/>
-                <a:ea typeface="Verdana" panose="020B0604030504040204" pitchFamily="34" charset="0"/>
-                <a:cs typeface="Verdana" panose="020B0604030504040204" pitchFamily="34" charset="0"/>
-              </a:rPr>
-              <a:t> </a:t>
-            </a:r>
-          </a:p>
-        </p:txBody>
-      </p:sp>
-      <p:pic>
-        <p:nvPicPr>
-          <p:cNvPr id="7" name="Imagem 6"/>
-          <p:cNvPicPr>
-            <a:picLocks noChangeAspect="1"/>
-          </p:cNvPicPr>
-          <p:nvPr/>
-        </p:nvPicPr>
-        <p:blipFill>
-          <a:blip r:embed="rId2" cstate="print">
-            <a:extLst>
-              <a:ext uri="{28A0092B-C50C-407E-A947-70E740481C1C}">
-                <a14:useLocalDpi xmlns:a14="http://schemas.microsoft.com/office/drawing/2010/main" val="0"/>
-              </a:ext>
-            </a:extLst>
-          </a:blip>
-          <a:stretch>
-            <a:fillRect/>
-          </a:stretch>
-        </p:blipFill>
-        <p:spPr>
-          <a:xfrm>
-            <a:off x="287015" y="6381328"/>
-            <a:ext cx="1672379" cy="291764"/>
-          </a:xfrm>
-          <a:prstGeom prst="rect">
-            <a:avLst/>
-          </a:prstGeom>
-        </p:spPr>
-      </p:pic>
-      <p:sp>
-        <p:nvSpPr>
-          <p:cNvPr id="9" name="CaixaDeTexto 8"/>
-          <p:cNvSpPr txBox="1"/>
-          <p:nvPr/>
-        </p:nvSpPr>
-        <p:spPr>
-          <a:xfrm>
-            <a:off x="393548" y="333523"/>
-            <a:ext cx="8066884" cy="646331"/>
-          </a:xfrm>
-          <a:prstGeom prst="rect">
-            <a:avLst/>
-          </a:prstGeom>
-          <a:noFill/>
-        </p:spPr>
-        <p:txBody>
-          <a:bodyPr wrap="square" rtlCol="0">
-            <a:spAutoFit/>
-          </a:bodyPr>
-          <a:lstStyle/>
-          <a:p>
-            <a:r>
-              <a:rPr lang="en-US" sz="3600" b="1" dirty="0" err="1">
-                <a:latin typeface="Verdana" panose="020B0604030504040204" pitchFamily="34" charset="0"/>
-                <a:ea typeface="Verdana" panose="020B0604030504040204" pitchFamily="34" charset="0"/>
-                <a:cs typeface="Verdana" panose="020B0604030504040204" pitchFamily="34" charset="0"/>
-              </a:rPr>
-              <a:t>Heurísticas</a:t>
-            </a:r>
-            <a:endParaRPr lang="pt-BR" sz="3600" b="1" dirty="0">
-              <a:latin typeface="Verdana" panose="020B0604030504040204" pitchFamily="34" charset="0"/>
-              <a:ea typeface="Verdana" panose="020B0604030504040204" pitchFamily="34" charset="0"/>
-              <a:cs typeface="Verdana" panose="020B0604030504040204" pitchFamily="34" charset="0"/>
-            </a:endParaRPr>
-          </a:p>
-        </p:txBody>
-      </p:sp>
-      <p:sp>
-        <p:nvSpPr>
-          <p:cNvPr id="11" name="Retângulo 10"/>
-          <p:cNvSpPr/>
-          <p:nvPr/>
-        </p:nvSpPr>
-        <p:spPr>
-          <a:xfrm flipV="1">
-            <a:off x="-36512" y="476670"/>
-            <a:ext cx="323528" cy="360039"/>
-          </a:xfrm>
-          <a:prstGeom prst="rect">
-            <a:avLst/>
-          </a:prstGeom>
-          <a:solidFill>
-            <a:srgbClr val="149B55"/>
-          </a:solidFill>
-          <a:ln>
-            <a:noFill/>
-          </a:ln>
-        </p:spPr>
-        <p:style>
-          <a:lnRef idx="2">
-            <a:schemeClr val="accent1">
-              <a:shade val="50000"/>
-            </a:schemeClr>
-          </a:lnRef>
-          <a:fillRef idx="1">
-            <a:schemeClr val="accent1"/>
-          </a:fillRef>
-          <a:effectRef idx="0">
-            <a:schemeClr val="accent1"/>
-          </a:effectRef>
-          <a:fontRef idx="minor">
-            <a:schemeClr val="lt1"/>
-          </a:fontRef>
-        </p:style>
-        <p:txBody>
-          <a:bodyPr rtlCol="0" anchor="ctr"/>
-          <a:lstStyle/>
-          <a:p>
-            <a:pPr algn="ctr"/>
-            <a:endParaRPr lang="pt-BR" dirty="0"/>
-          </a:p>
-        </p:txBody>
-      </p:sp>
-    </p:spTree>
-    <p:extLst>
-      <p:ext uri="{BB962C8B-B14F-4D97-AF65-F5344CB8AC3E}">
-        <p14:creationId xmlns:p14="http://schemas.microsoft.com/office/powerpoint/2010/main" val="3232817111"/>
-      </p:ext>
-    </p:extLst>
-  </p:cSld>
-  <p:clrMapOvr>
-    <a:masterClrMapping/>
-  </p:clrMapOvr>
-</p:sld>
-</file>
-
-<file path=ppt/slides/slide6.xml><?xml version="1.0" encoding="utf-8"?>
-<p:sld xmlns:a="http://schemas.openxmlformats.org/drawingml/2006/main" xmlns:r="http://schemas.openxmlformats.org/officeDocument/2006/relationships" xmlns:p="http://schemas.openxmlformats.org/presentationml/2006/main">
-  <p:cSld>
-    <p:spTree>
-      <p:nvGrpSpPr>
-        <p:cNvPr id="1" name=""/>
-        <p:cNvGrpSpPr/>
-        <p:nvPr/>
-      </p:nvGrpSpPr>
-      <p:grpSpPr>
-        <a:xfrm>
-          <a:off x="0" y="0"/>
-          <a:ext cx="0" cy="0"/>
-          <a:chOff x="0" y="0"/>
-          <a:chExt cx="0" cy="0"/>
-        </a:xfrm>
-      </p:grpSpPr>
-      <p:sp>
-        <p:nvSpPr>
-          <p:cNvPr id="8" name="CaixaDeTexto 7"/>
-          <p:cNvSpPr txBox="1"/>
-          <p:nvPr/>
-        </p:nvSpPr>
-        <p:spPr>
-          <a:xfrm>
-            <a:off x="971600" y="1700808"/>
-            <a:ext cx="5688632" cy="1569660"/>
-          </a:xfrm>
-          <a:prstGeom prst="rect">
-            <a:avLst/>
-          </a:prstGeom>
-          <a:noFill/>
-        </p:spPr>
-        <p:txBody>
-          <a:bodyPr wrap="square" rtlCol="0">
-            <a:spAutoFit/>
-          </a:bodyPr>
-          <a:lstStyle/>
-          <a:p>
-            <a:pPr marL="285750" indent="-285750">
-              <a:buFont typeface="Arial" panose="020B0604020202020204" pitchFamily="34" charset="0"/>
-              <a:buChar char="•"/>
-            </a:pPr>
-            <a:r>
-              <a:rPr lang="pt-BR" sz="1600" b="1" dirty="0">
-                <a:latin typeface="Verdana" panose="020B0604030504040204" pitchFamily="34" charset="0"/>
-                <a:ea typeface="Verdana" panose="020B0604030504040204" pitchFamily="34" charset="0"/>
-                <a:cs typeface="Verdana" panose="020B0604030504040204" pitchFamily="34" charset="0"/>
-              </a:rPr>
-              <a:t>Objetivo: </a:t>
-            </a:r>
-            <a:r>
-              <a:rPr lang="pt-BR" sz="1600" dirty="0">
-                <a:latin typeface="Verdana" panose="020B0604030504040204" pitchFamily="34" charset="0"/>
-                <a:ea typeface="Verdana" panose="020B0604030504040204" pitchFamily="34" charset="0"/>
-                <a:cs typeface="Verdana" panose="020B0604030504040204" pitchFamily="34" charset="0"/>
-              </a:rPr>
-              <a:t>obter resultados melhores que as heurísticas tradicionais.</a:t>
-            </a:r>
-          </a:p>
-          <a:p>
-            <a:pPr marL="285750" indent="-285750">
-              <a:buFont typeface="Arial" panose="020B0604020202020204" pitchFamily="34" charset="0"/>
-              <a:buChar char="•"/>
-            </a:pPr>
-            <a:endParaRPr lang="pt-BR" sz="1600" dirty="0">
-              <a:latin typeface="Verdana" panose="020B0604030504040204" pitchFamily="34" charset="0"/>
-              <a:ea typeface="Verdana" panose="020B0604030504040204" pitchFamily="34" charset="0"/>
-              <a:cs typeface="Verdana" panose="020B0604030504040204" pitchFamily="34" charset="0"/>
-            </a:endParaRPr>
-          </a:p>
-          <a:p>
-            <a:pPr marL="285750" indent="-285750">
-              <a:buFont typeface="Arial" panose="020B0604020202020204" pitchFamily="34" charset="0"/>
-              <a:buChar char="•"/>
-            </a:pPr>
-            <a:endParaRPr lang="pt-BR" sz="1600" dirty="0">
-              <a:latin typeface="Verdana" panose="020B0604030504040204" pitchFamily="34" charset="0"/>
-              <a:ea typeface="Verdana" panose="020B0604030504040204" pitchFamily="34" charset="0"/>
-              <a:cs typeface="Verdana" panose="020B0604030504040204" pitchFamily="34" charset="0"/>
-            </a:endParaRPr>
-          </a:p>
-          <a:p>
-            <a:pPr marL="285750" indent="-285750">
-              <a:buFont typeface="Arial" panose="020B0604020202020204" pitchFamily="34" charset="0"/>
-              <a:buChar char="•"/>
-            </a:pPr>
-            <a:r>
-              <a:rPr lang="pt-BR" sz="1600" b="1" dirty="0">
-                <a:latin typeface="Verdana" panose="020B0604030504040204" pitchFamily="34" charset="0"/>
-                <a:ea typeface="Verdana" panose="020B0604030504040204" pitchFamily="34" charset="0"/>
-                <a:cs typeface="Verdana" panose="020B0604030504040204" pitchFamily="34" charset="0"/>
-              </a:rPr>
-              <a:t>Enfrentando problema de otimização: </a:t>
-            </a:r>
-            <a:r>
-              <a:rPr lang="pt-BR" sz="1600" dirty="0">
-                <a:latin typeface="Verdana" panose="020B0604030504040204" pitchFamily="34" charset="0"/>
-                <a:ea typeface="Verdana" panose="020B0604030504040204" pitchFamily="34" charset="0"/>
-                <a:cs typeface="Verdana" panose="020B0604030504040204" pitchFamily="34" charset="0"/>
-              </a:rPr>
-              <a:t>soluções aproximadas.	 </a:t>
-            </a:r>
-          </a:p>
-        </p:txBody>
-      </p:sp>
-      <p:pic>
-        <p:nvPicPr>
-          <p:cNvPr id="7" name="Imagem 6"/>
-          <p:cNvPicPr>
-            <a:picLocks noChangeAspect="1"/>
-          </p:cNvPicPr>
-          <p:nvPr/>
-        </p:nvPicPr>
-        <p:blipFill>
-          <a:blip r:embed="rId2" cstate="print">
-            <a:extLst>
-              <a:ext uri="{28A0092B-C50C-407E-A947-70E740481C1C}">
-                <a14:useLocalDpi xmlns:a14="http://schemas.microsoft.com/office/drawing/2010/main" val="0"/>
-              </a:ext>
-            </a:extLst>
-          </a:blip>
-          <a:stretch>
-            <a:fillRect/>
-          </a:stretch>
-        </p:blipFill>
-        <p:spPr>
-          <a:xfrm>
-            <a:off x="287015" y="6381328"/>
-            <a:ext cx="1672379" cy="291764"/>
-          </a:xfrm>
-          <a:prstGeom prst="rect">
-            <a:avLst/>
-          </a:prstGeom>
-        </p:spPr>
-      </p:pic>
-      <p:sp>
-        <p:nvSpPr>
-          <p:cNvPr id="9" name="CaixaDeTexto 8"/>
-          <p:cNvSpPr txBox="1"/>
-          <p:nvPr/>
-        </p:nvSpPr>
-        <p:spPr>
-          <a:xfrm>
-            <a:off x="393548" y="333523"/>
-            <a:ext cx="8066884" cy="646331"/>
-          </a:xfrm>
-          <a:prstGeom prst="rect">
-            <a:avLst/>
-          </a:prstGeom>
-          <a:noFill/>
-        </p:spPr>
-        <p:txBody>
-          <a:bodyPr wrap="square" rtlCol="0">
-            <a:spAutoFit/>
-          </a:bodyPr>
-          <a:lstStyle/>
-          <a:p>
-            <a:r>
-              <a:rPr lang="en-US" sz="3600" b="1" dirty="0" err="1">
-                <a:latin typeface="Verdana" panose="020B0604030504040204" pitchFamily="34" charset="0"/>
-                <a:ea typeface="Verdana" panose="020B0604030504040204" pitchFamily="34" charset="0"/>
-                <a:cs typeface="Verdana" panose="020B0604030504040204" pitchFamily="34" charset="0"/>
-              </a:rPr>
-              <a:t>Metaheurísticas</a:t>
-            </a:r>
-            <a:endParaRPr lang="pt-BR" sz="3600" b="1" dirty="0">
-              <a:latin typeface="Verdana" panose="020B0604030504040204" pitchFamily="34" charset="0"/>
-              <a:ea typeface="Verdana" panose="020B0604030504040204" pitchFamily="34" charset="0"/>
-              <a:cs typeface="Verdana" panose="020B0604030504040204" pitchFamily="34" charset="0"/>
-            </a:endParaRPr>
-          </a:p>
-        </p:txBody>
-      </p:sp>
-      <p:sp>
-        <p:nvSpPr>
-          <p:cNvPr id="11" name="Retângulo 10"/>
-          <p:cNvSpPr/>
-          <p:nvPr/>
-        </p:nvSpPr>
-        <p:spPr>
-          <a:xfrm flipV="1">
-            <a:off x="-36512" y="476670"/>
-            <a:ext cx="323528" cy="360039"/>
-          </a:xfrm>
-          <a:prstGeom prst="rect">
-            <a:avLst/>
-          </a:prstGeom>
-          <a:solidFill>
-            <a:srgbClr val="149B55"/>
-          </a:solidFill>
-          <a:ln>
-            <a:noFill/>
-          </a:ln>
-        </p:spPr>
-        <p:style>
-          <a:lnRef idx="2">
-            <a:schemeClr val="accent1">
-              <a:shade val="50000"/>
-            </a:schemeClr>
-          </a:lnRef>
-          <a:fillRef idx="1">
-            <a:schemeClr val="accent1"/>
-          </a:fillRef>
-          <a:effectRef idx="0">
-            <a:schemeClr val="accent1"/>
-          </a:effectRef>
-          <a:fontRef idx="minor">
-            <a:schemeClr val="lt1"/>
-          </a:fontRef>
-        </p:style>
-        <p:txBody>
-          <a:bodyPr rtlCol="0" anchor="ctr"/>
-          <a:lstStyle/>
-          <a:p>
-            <a:pPr algn="ctr"/>
-            <a:endParaRPr lang="pt-BR" dirty="0"/>
-          </a:p>
-        </p:txBody>
-      </p:sp>
-    </p:spTree>
-    <p:extLst>
-      <p:ext uri="{BB962C8B-B14F-4D97-AF65-F5344CB8AC3E}">
-        <p14:creationId xmlns:p14="http://schemas.microsoft.com/office/powerpoint/2010/main" val="842391489"/>
-      </p:ext>
-    </p:extLst>
-  </p:cSld>
-  <p:clrMapOvr>
-    <a:masterClrMapping/>
-  </p:clrMapOvr>
-</p:sld>
-</file>
-
-<file path=ppt/slides/slide7.xml><?xml version="1.0" encoding="utf-8"?>
-<p:sld xmlns:a="http://schemas.openxmlformats.org/drawingml/2006/main" xmlns:r="http://schemas.openxmlformats.org/officeDocument/2006/relationships" xmlns:p="http://schemas.openxmlformats.org/presentationml/2006/main">
-  <p:cSld>
-    <p:spTree>
-      <p:nvGrpSpPr>
-        <p:cNvPr id="1" name=""/>
-        <p:cNvGrpSpPr/>
-        <p:nvPr/>
-      </p:nvGrpSpPr>
-      <p:grpSpPr>
-        <a:xfrm>
-          <a:off x="0" y="0"/>
-          <a:ext cx="0" cy="0"/>
-          <a:chOff x="0" y="0"/>
-          <a:chExt cx="0" cy="0"/>
-        </a:xfrm>
-      </p:grpSpPr>
-      <p:sp>
-        <p:nvSpPr>
-          <p:cNvPr id="8" name="CaixaDeTexto 7"/>
-          <p:cNvSpPr txBox="1"/>
-          <p:nvPr/>
-        </p:nvSpPr>
-        <p:spPr>
-          <a:xfrm>
-            <a:off x="971600" y="1700808"/>
-            <a:ext cx="5688632" cy="4031873"/>
-          </a:xfrm>
-          <a:prstGeom prst="rect">
-            <a:avLst/>
-          </a:prstGeom>
-          <a:noFill/>
-        </p:spPr>
-        <p:txBody>
-          <a:bodyPr wrap="square" rtlCol="0">
-            <a:spAutoFit/>
-          </a:bodyPr>
-          <a:lstStyle/>
-          <a:p>
-            <a:pPr marL="285750" indent="-285750">
-              <a:buFont typeface="Arial" panose="020B0604020202020204" pitchFamily="34" charset="0"/>
-              <a:buChar char="•"/>
-            </a:pPr>
-            <a:r>
-              <a:rPr lang="en-US" sz="1600" b="1" dirty="0" err="1">
-                <a:latin typeface="Verdana" panose="020B0604030504040204" pitchFamily="34" charset="0"/>
-                <a:ea typeface="Verdana" panose="020B0604030504040204" pitchFamily="34" charset="0"/>
-                <a:cs typeface="Verdana" panose="020B0604030504040204" pitchFamily="34" charset="0"/>
-              </a:rPr>
-              <a:t>Vetor</a:t>
-            </a:r>
-            <a:r>
-              <a:rPr lang="en-US" sz="1600" b="1" dirty="0">
-                <a:latin typeface="Verdana" panose="020B0604030504040204" pitchFamily="34" charset="0"/>
-                <a:ea typeface="Verdana" panose="020B0604030504040204" pitchFamily="34" charset="0"/>
-                <a:cs typeface="Verdana" panose="020B0604030504040204" pitchFamily="34" charset="0"/>
-              </a:rPr>
-              <a:t> com n </a:t>
-            </a:r>
-            <a:r>
-              <a:rPr lang="en-US" sz="1600" b="1" dirty="0" err="1">
-                <a:latin typeface="Verdana" panose="020B0604030504040204" pitchFamily="34" charset="0"/>
-                <a:ea typeface="Verdana" panose="020B0604030504040204" pitchFamily="34" charset="0"/>
-                <a:cs typeface="Verdana" panose="020B0604030504040204" pitchFamily="34" charset="0"/>
-              </a:rPr>
-              <a:t>elementos</a:t>
-            </a:r>
-            <a:r>
-              <a:rPr lang="en-US" sz="1600" b="1" dirty="0">
-                <a:latin typeface="Verdana" panose="020B0604030504040204" pitchFamily="34" charset="0"/>
-                <a:ea typeface="Verdana" panose="020B0604030504040204" pitchFamily="34" charset="0"/>
-                <a:cs typeface="Verdana" panose="020B0604030504040204" pitchFamily="34" charset="0"/>
-              </a:rPr>
-              <a:t>: </a:t>
-            </a:r>
-            <a:r>
-              <a:rPr lang="en-US" sz="1600" dirty="0" err="1">
-                <a:latin typeface="Verdana" panose="020B0604030504040204" pitchFamily="34" charset="0"/>
-                <a:ea typeface="Verdana" panose="020B0604030504040204" pitchFamily="34" charset="0"/>
-                <a:cs typeface="Verdana" panose="020B0604030504040204" pitchFamily="34" charset="0"/>
-              </a:rPr>
-              <a:t>onde</a:t>
-            </a:r>
-            <a:r>
-              <a:rPr lang="en-US" sz="1600" dirty="0">
-                <a:latin typeface="Verdana" panose="020B0604030504040204" pitchFamily="34" charset="0"/>
-                <a:ea typeface="Verdana" panose="020B0604030504040204" pitchFamily="34" charset="0"/>
-                <a:cs typeface="Verdana" panose="020B0604030504040204" pitchFamily="34" charset="0"/>
-              </a:rPr>
-              <a:t> m </a:t>
-            </a:r>
-            <a:r>
-              <a:rPr lang="en-US" sz="1600" dirty="0" err="1">
-                <a:latin typeface="Verdana" panose="020B0604030504040204" pitchFamily="34" charset="0"/>
-                <a:ea typeface="Verdana" panose="020B0604030504040204" pitchFamily="34" charset="0"/>
-                <a:cs typeface="Verdana" panose="020B0604030504040204" pitchFamily="34" charset="0"/>
-              </a:rPr>
-              <a:t>elementos</a:t>
-            </a:r>
-            <a:r>
-              <a:rPr lang="en-US" sz="1600" dirty="0">
-                <a:latin typeface="Verdana" panose="020B0604030504040204" pitchFamily="34" charset="0"/>
-                <a:ea typeface="Verdana" panose="020B0604030504040204" pitchFamily="34" charset="0"/>
-                <a:cs typeface="Verdana" panose="020B0604030504040204" pitchFamily="34" charset="0"/>
-              </a:rPr>
-              <a:t> </a:t>
-            </a:r>
-            <a:r>
-              <a:rPr lang="en-US" sz="1600" dirty="0" err="1">
-                <a:latin typeface="Verdana" panose="020B0604030504040204" pitchFamily="34" charset="0"/>
-                <a:ea typeface="Verdana" panose="020B0604030504040204" pitchFamily="34" charset="0"/>
-                <a:cs typeface="Verdana" panose="020B0604030504040204" pitchFamily="34" charset="0"/>
-              </a:rPr>
-              <a:t>são</a:t>
-            </a:r>
-            <a:r>
-              <a:rPr lang="en-US" sz="1600" dirty="0">
-                <a:latin typeface="Verdana" panose="020B0604030504040204" pitchFamily="34" charset="0"/>
-                <a:ea typeface="Verdana" panose="020B0604030504040204" pitchFamily="34" charset="0"/>
-                <a:cs typeface="Verdana" panose="020B0604030504040204" pitchFamily="34" charset="0"/>
-              </a:rPr>
-              <a:t> </a:t>
-            </a:r>
-            <a:r>
-              <a:rPr lang="en-US" sz="1600" dirty="0" err="1">
-                <a:latin typeface="Verdana" panose="020B0604030504040204" pitchFamily="34" charset="0"/>
-                <a:ea typeface="Verdana" panose="020B0604030504040204" pitchFamily="34" charset="0"/>
-                <a:cs typeface="Verdana" panose="020B0604030504040204" pitchFamily="34" charset="0"/>
-              </a:rPr>
-              <a:t>marcados</a:t>
-            </a:r>
-            <a:r>
-              <a:rPr lang="en-US" sz="1600" dirty="0">
-                <a:latin typeface="Verdana" panose="020B0604030504040204" pitchFamily="34" charset="0"/>
-                <a:ea typeface="Verdana" panose="020B0604030504040204" pitchFamily="34" charset="0"/>
-                <a:cs typeface="Verdana" panose="020B0604030504040204" pitchFamily="34" charset="0"/>
-              </a:rPr>
-              <a:t> </a:t>
-            </a:r>
-            <a:r>
-              <a:rPr lang="en-US" sz="1600" dirty="0" err="1">
-                <a:latin typeface="Verdana" panose="020B0604030504040204" pitchFamily="34" charset="0"/>
-                <a:ea typeface="Verdana" panose="020B0604030504040204" pitchFamily="34" charset="0"/>
-                <a:cs typeface="Verdana" panose="020B0604030504040204" pitchFamily="34" charset="0"/>
-              </a:rPr>
-              <a:t>como</a:t>
-            </a:r>
-            <a:r>
-              <a:rPr lang="en-US" sz="1600" dirty="0">
-                <a:latin typeface="Verdana" panose="020B0604030504040204" pitchFamily="34" charset="0"/>
-                <a:ea typeface="Verdana" panose="020B0604030504040204" pitchFamily="34" charset="0"/>
-                <a:cs typeface="Verdana" panose="020B0604030504040204" pitchFamily="34" charset="0"/>
-              </a:rPr>
-              <a:t> </a:t>
-            </a:r>
-            <a:r>
-              <a:rPr lang="en-US" sz="1600" dirty="0" err="1">
-                <a:latin typeface="Verdana" panose="020B0604030504040204" pitchFamily="34" charset="0"/>
-                <a:ea typeface="Verdana" panose="020B0604030504040204" pitchFamily="34" charset="0"/>
-                <a:cs typeface="Verdana" panose="020B0604030504040204" pitchFamily="34" charset="0"/>
-              </a:rPr>
-              <a:t>selecionados</a:t>
-            </a:r>
-            <a:r>
-              <a:rPr lang="en-US" sz="1600" dirty="0">
-                <a:latin typeface="Verdana" panose="020B0604030504040204" pitchFamily="34" charset="0"/>
-                <a:ea typeface="Verdana" panose="020B0604030504040204" pitchFamily="34" charset="0"/>
-                <a:cs typeface="Verdana" panose="020B0604030504040204" pitchFamily="34" charset="0"/>
-              </a:rPr>
-              <a:t> e n-m </a:t>
-            </a:r>
-            <a:r>
-              <a:rPr lang="en-US" sz="1600" dirty="0" err="1">
-                <a:latin typeface="Verdana" panose="020B0604030504040204" pitchFamily="34" charset="0"/>
-                <a:ea typeface="Verdana" panose="020B0604030504040204" pitchFamily="34" charset="0"/>
-                <a:cs typeface="Verdana" panose="020B0604030504040204" pitchFamily="34" charset="0"/>
-              </a:rPr>
-              <a:t>como</a:t>
-            </a:r>
-            <a:r>
-              <a:rPr lang="en-US" sz="1600" dirty="0">
-                <a:latin typeface="Verdana" panose="020B0604030504040204" pitchFamily="34" charset="0"/>
-                <a:ea typeface="Verdana" panose="020B0604030504040204" pitchFamily="34" charset="0"/>
-                <a:cs typeface="Verdana" panose="020B0604030504040204" pitchFamily="34" charset="0"/>
-              </a:rPr>
-              <a:t> </a:t>
-            </a:r>
-            <a:r>
-              <a:rPr lang="en-US" sz="1600" dirty="0" err="1">
-                <a:latin typeface="Verdana" panose="020B0604030504040204" pitchFamily="34" charset="0"/>
-                <a:ea typeface="Verdana" panose="020B0604030504040204" pitchFamily="34" charset="0"/>
-                <a:cs typeface="Verdana" panose="020B0604030504040204" pitchFamily="34" charset="0"/>
-              </a:rPr>
-              <a:t>não</a:t>
-            </a:r>
-            <a:r>
-              <a:rPr lang="en-US" sz="1600" dirty="0">
-                <a:latin typeface="Verdana" panose="020B0604030504040204" pitchFamily="34" charset="0"/>
-                <a:ea typeface="Verdana" panose="020B0604030504040204" pitchFamily="34" charset="0"/>
-                <a:cs typeface="Verdana" panose="020B0604030504040204" pitchFamily="34" charset="0"/>
-              </a:rPr>
-              <a:t> </a:t>
-            </a:r>
-            <a:r>
-              <a:rPr lang="en-US" sz="1600" dirty="0" err="1">
-                <a:latin typeface="Verdana" panose="020B0604030504040204" pitchFamily="34" charset="0"/>
-                <a:ea typeface="Verdana" panose="020B0604030504040204" pitchFamily="34" charset="0"/>
-                <a:cs typeface="Verdana" panose="020B0604030504040204" pitchFamily="34" charset="0"/>
-              </a:rPr>
-              <a:t>selecionados</a:t>
-            </a:r>
-            <a:r>
-              <a:rPr lang="en-US" sz="1600" dirty="0">
-                <a:latin typeface="Verdana" panose="020B0604030504040204" pitchFamily="34" charset="0"/>
-                <a:ea typeface="Verdana" panose="020B0604030504040204" pitchFamily="34" charset="0"/>
-                <a:cs typeface="Verdana" panose="020B0604030504040204" pitchFamily="34" charset="0"/>
-              </a:rPr>
-              <a:t>.</a:t>
-            </a:r>
-          </a:p>
-          <a:p>
-            <a:pPr marL="285750" indent="-285750">
-              <a:buFont typeface="Arial" panose="020B0604020202020204" pitchFamily="34" charset="0"/>
-              <a:buChar char="•"/>
-            </a:pPr>
-            <a:endParaRPr lang="en-US" sz="1600" b="1" dirty="0">
-              <a:latin typeface="Verdana" panose="020B0604030504040204" pitchFamily="34" charset="0"/>
-              <a:ea typeface="Verdana" panose="020B0604030504040204" pitchFamily="34" charset="0"/>
-              <a:cs typeface="Verdana" panose="020B0604030504040204" pitchFamily="34" charset="0"/>
-            </a:endParaRPr>
-          </a:p>
-          <a:p>
-            <a:pPr marL="285750" indent="-285750">
-              <a:buFont typeface="Arial" panose="020B0604020202020204" pitchFamily="34" charset="0"/>
-              <a:buChar char="•"/>
-            </a:pPr>
-            <a:endParaRPr lang="en-US" sz="1600" b="1" dirty="0">
-              <a:latin typeface="Verdana" panose="020B0604030504040204" pitchFamily="34" charset="0"/>
-              <a:ea typeface="Verdana" panose="020B0604030504040204" pitchFamily="34" charset="0"/>
-              <a:cs typeface="Verdana" panose="020B0604030504040204" pitchFamily="34" charset="0"/>
-            </a:endParaRPr>
-          </a:p>
-          <a:p>
-            <a:pPr marL="285750" indent="-285750">
-              <a:buFont typeface="Arial" panose="020B0604020202020204" pitchFamily="34" charset="0"/>
-              <a:buChar char="•"/>
-            </a:pPr>
-            <a:r>
-              <a:rPr lang="en-US" sz="1600" b="1" dirty="0" err="1">
-                <a:latin typeface="Verdana" panose="020B0604030504040204" pitchFamily="34" charset="0"/>
-                <a:ea typeface="Verdana" panose="020B0604030504040204" pitchFamily="34" charset="0"/>
-                <a:cs typeface="Verdana" panose="020B0604030504040204" pitchFamily="34" charset="0"/>
-              </a:rPr>
-              <a:t>Instâncias</a:t>
-            </a:r>
-            <a:r>
-              <a:rPr lang="en-US" sz="1600" b="1" dirty="0">
-                <a:latin typeface="Verdana" panose="020B0604030504040204" pitchFamily="34" charset="0"/>
-                <a:ea typeface="Verdana" panose="020B0604030504040204" pitchFamily="34" charset="0"/>
-                <a:cs typeface="Verdana" panose="020B0604030504040204" pitchFamily="34" charset="0"/>
-              </a:rPr>
-              <a:t>: </a:t>
-            </a:r>
-            <a:r>
-              <a:rPr lang="en-US" sz="1600" dirty="0" err="1">
-                <a:latin typeface="Verdana" panose="020B0604030504040204" pitchFamily="34" charset="0"/>
-                <a:ea typeface="Verdana" panose="020B0604030504040204" pitchFamily="34" charset="0"/>
-                <a:cs typeface="Verdana" panose="020B0604030504040204" pitchFamily="34" charset="0"/>
-              </a:rPr>
-              <a:t>matrizes</a:t>
-            </a:r>
-            <a:r>
-              <a:rPr lang="en-US" sz="1600" dirty="0">
-                <a:latin typeface="Verdana" panose="020B0604030504040204" pitchFamily="34" charset="0"/>
-                <a:ea typeface="Verdana" panose="020B0604030504040204" pitchFamily="34" charset="0"/>
-                <a:cs typeface="Verdana" panose="020B0604030504040204" pitchFamily="34" charset="0"/>
-              </a:rPr>
-              <a:t> com </a:t>
-            </a:r>
-            <a:r>
-              <a:rPr lang="en-US" sz="1600" dirty="0" err="1">
-                <a:latin typeface="Verdana" panose="020B0604030504040204" pitchFamily="34" charset="0"/>
-                <a:ea typeface="Verdana" panose="020B0604030504040204" pitchFamily="34" charset="0"/>
-                <a:cs typeface="Verdana" panose="020B0604030504040204" pitchFamily="34" charset="0"/>
-              </a:rPr>
-              <a:t>elementos</a:t>
-            </a:r>
-            <a:r>
-              <a:rPr lang="en-US" sz="1600" dirty="0">
-                <a:latin typeface="Verdana" panose="020B0604030504040204" pitchFamily="34" charset="0"/>
-                <a:ea typeface="Verdana" panose="020B0604030504040204" pitchFamily="34" charset="0"/>
-                <a:cs typeface="Verdana" panose="020B0604030504040204" pitchFamily="34" charset="0"/>
-              </a:rPr>
-              <a:t> </a:t>
-            </a:r>
-            <a:r>
-              <a:rPr lang="en-US" sz="1600" dirty="0" err="1">
-                <a:latin typeface="Verdana" panose="020B0604030504040204" pitchFamily="34" charset="0"/>
-                <a:ea typeface="Verdana" panose="020B0604030504040204" pitchFamily="34" charset="0"/>
-                <a:cs typeface="Verdana" panose="020B0604030504040204" pitchFamily="34" charset="0"/>
-              </a:rPr>
-              <a:t>gerados</a:t>
-            </a:r>
-            <a:r>
-              <a:rPr lang="en-US" sz="1600" dirty="0">
-                <a:latin typeface="Verdana" panose="020B0604030504040204" pitchFamily="34" charset="0"/>
-                <a:ea typeface="Verdana" panose="020B0604030504040204" pitchFamily="34" charset="0"/>
-                <a:cs typeface="Verdana" panose="020B0604030504040204" pitchFamily="34" charset="0"/>
-              </a:rPr>
-              <a:t>.</a:t>
-            </a:r>
-          </a:p>
-          <a:p>
-            <a:pPr marL="285750" indent="-285750">
-              <a:buFont typeface="Arial" panose="020B0604020202020204" pitchFamily="34" charset="0"/>
-              <a:buChar char="•"/>
-            </a:pPr>
-            <a:endParaRPr lang="en-US" sz="1600" b="1" dirty="0">
-              <a:latin typeface="Verdana" panose="020B0604030504040204" pitchFamily="34" charset="0"/>
-              <a:ea typeface="Verdana" panose="020B0604030504040204" pitchFamily="34" charset="0"/>
-              <a:cs typeface="Verdana" panose="020B0604030504040204" pitchFamily="34" charset="0"/>
-            </a:endParaRPr>
-          </a:p>
-          <a:p>
-            <a:pPr marL="285750" indent="-285750">
-              <a:buFont typeface="Arial" panose="020B0604020202020204" pitchFamily="34" charset="0"/>
-              <a:buChar char="•"/>
-            </a:pPr>
-            <a:endParaRPr lang="en-US" sz="1600" b="1" dirty="0">
-              <a:latin typeface="Verdana" panose="020B0604030504040204" pitchFamily="34" charset="0"/>
-              <a:ea typeface="Verdana" panose="020B0604030504040204" pitchFamily="34" charset="0"/>
-              <a:cs typeface="Verdana" panose="020B0604030504040204" pitchFamily="34" charset="0"/>
-            </a:endParaRPr>
-          </a:p>
-          <a:p>
-            <a:pPr marL="285750" indent="-285750">
-              <a:buFont typeface="Arial" panose="020B0604020202020204" pitchFamily="34" charset="0"/>
-              <a:buChar char="•"/>
-            </a:pPr>
-            <a:r>
-              <a:rPr lang="en-US" sz="1600" b="1" dirty="0" err="1">
-                <a:latin typeface="Verdana" panose="020B0604030504040204" pitchFamily="34" charset="0"/>
-                <a:ea typeface="Verdana" panose="020B0604030504040204" pitchFamily="34" charset="0"/>
-                <a:cs typeface="Verdana" panose="020B0604030504040204" pitchFamily="34" charset="0"/>
-              </a:rPr>
-              <a:t>Matriz</a:t>
-            </a:r>
-            <a:r>
-              <a:rPr lang="en-US" sz="1600" b="1" dirty="0">
-                <a:latin typeface="Verdana" panose="020B0604030504040204" pitchFamily="34" charset="0"/>
-                <a:ea typeface="Verdana" panose="020B0604030504040204" pitchFamily="34" charset="0"/>
-                <a:cs typeface="Verdana" panose="020B0604030504040204" pitchFamily="34" charset="0"/>
-              </a:rPr>
-              <a:t> </a:t>
-            </a:r>
-            <a:r>
-              <a:rPr lang="en-US" sz="1600" b="1" dirty="0" err="1">
-                <a:latin typeface="Verdana" panose="020B0604030504040204" pitchFamily="34" charset="0"/>
-                <a:ea typeface="Verdana" panose="020B0604030504040204" pitchFamily="34" charset="0"/>
-                <a:cs typeface="Verdana" panose="020B0604030504040204" pitchFamily="34" charset="0"/>
-              </a:rPr>
-              <a:t>diversidade</a:t>
-            </a:r>
-            <a:r>
-              <a:rPr lang="en-US" sz="1600" b="1" dirty="0">
-                <a:latin typeface="Verdana" panose="020B0604030504040204" pitchFamily="34" charset="0"/>
-                <a:ea typeface="Verdana" panose="020B0604030504040204" pitchFamily="34" charset="0"/>
-                <a:cs typeface="Verdana" panose="020B0604030504040204" pitchFamily="34" charset="0"/>
-              </a:rPr>
-              <a:t>: </a:t>
-            </a:r>
-            <a:r>
-              <a:rPr lang="en-US" sz="1600" dirty="0" err="1">
-                <a:latin typeface="Verdana" panose="020B0604030504040204" pitchFamily="34" charset="0"/>
-                <a:ea typeface="Verdana" panose="020B0604030504040204" pitchFamily="34" charset="0"/>
-                <a:cs typeface="Verdana" panose="020B0604030504040204" pitchFamily="34" charset="0"/>
-              </a:rPr>
-              <a:t>matriz</a:t>
-            </a:r>
-            <a:r>
-              <a:rPr lang="en-US" sz="1600" dirty="0">
-                <a:latin typeface="Verdana" panose="020B0604030504040204" pitchFamily="34" charset="0"/>
-                <a:ea typeface="Verdana" panose="020B0604030504040204" pitchFamily="34" charset="0"/>
-                <a:cs typeface="Verdana" panose="020B0604030504040204" pitchFamily="34" charset="0"/>
-              </a:rPr>
-              <a:t> n x n </a:t>
-            </a:r>
-            <a:r>
-              <a:rPr lang="en-US" sz="1600" dirty="0" err="1">
-                <a:latin typeface="Verdana" panose="020B0604030504040204" pitchFamily="34" charset="0"/>
-                <a:ea typeface="Verdana" panose="020B0604030504040204" pitchFamily="34" charset="0"/>
-                <a:cs typeface="Verdana" panose="020B0604030504040204" pitchFamily="34" charset="0"/>
-              </a:rPr>
-              <a:t>informando</a:t>
-            </a:r>
-            <a:r>
-              <a:rPr lang="en-US" sz="1600" dirty="0">
-                <a:latin typeface="Verdana" panose="020B0604030504040204" pitchFamily="34" charset="0"/>
-                <a:ea typeface="Verdana" panose="020B0604030504040204" pitchFamily="34" charset="0"/>
-                <a:cs typeface="Verdana" panose="020B0604030504040204" pitchFamily="34" charset="0"/>
-              </a:rPr>
-              <a:t> o valor da </a:t>
-            </a:r>
-            <a:r>
-              <a:rPr lang="en-US" sz="1600" dirty="0" err="1">
-                <a:latin typeface="Verdana" panose="020B0604030504040204" pitchFamily="34" charset="0"/>
-                <a:ea typeface="Verdana" panose="020B0604030504040204" pitchFamily="34" charset="0"/>
-                <a:cs typeface="Verdana" panose="020B0604030504040204" pitchFamily="34" charset="0"/>
-              </a:rPr>
-              <a:t>diferença</a:t>
-            </a:r>
-            <a:r>
-              <a:rPr lang="en-US" sz="1600" dirty="0">
-                <a:latin typeface="Verdana" panose="020B0604030504040204" pitchFamily="34" charset="0"/>
-                <a:ea typeface="Verdana" panose="020B0604030504040204" pitchFamily="34" charset="0"/>
-                <a:cs typeface="Verdana" panose="020B0604030504040204" pitchFamily="34" charset="0"/>
-              </a:rPr>
-              <a:t> de </a:t>
-            </a:r>
-            <a:r>
-              <a:rPr lang="en-US" sz="1600" dirty="0" err="1">
-                <a:latin typeface="Verdana" panose="020B0604030504040204" pitchFamily="34" charset="0"/>
-                <a:ea typeface="Verdana" panose="020B0604030504040204" pitchFamily="34" charset="0"/>
-                <a:cs typeface="Verdana" panose="020B0604030504040204" pitchFamily="34" charset="0"/>
-              </a:rPr>
-              <a:t>todos</a:t>
-            </a:r>
-            <a:r>
-              <a:rPr lang="en-US" sz="1600" dirty="0">
-                <a:latin typeface="Verdana" panose="020B0604030504040204" pitchFamily="34" charset="0"/>
-                <a:ea typeface="Verdana" panose="020B0604030504040204" pitchFamily="34" charset="0"/>
-                <a:cs typeface="Verdana" panose="020B0604030504040204" pitchFamily="34" charset="0"/>
-              </a:rPr>
-              <a:t> para </a:t>
-            </a:r>
-            <a:r>
-              <a:rPr lang="en-US" sz="1600" dirty="0" err="1">
-                <a:latin typeface="Verdana" panose="020B0604030504040204" pitchFamily="34" charset="0"/>
-                <a:ea typeface="Verdana" panose="020B0604030504040204" pitchFamily="34" charset="0"/>
-                <a:cs typeface="Verdana" panose="020B0604030504040204" pitchFamily="34" charset="0"/>
-              </a:rPr>
-              <a:t>todos</a:t>
-            </a:r>
-            <a:r>
-              <a:rPr lang="en-US" sz="1600" dirty="0">
-                <a:latin typeface="Verdana" panose="020B0604030504040204" pitchFamily="34" charset="0"/>
-                <a:ea typeface="Verdana" panose="020B0604030504040204" pitchFamily="34" charset="0"/>
-                <a:cs typeface="Verdana" panose="020B0604030504040204" pitchFamily="34" charset="0"/>
-              </a:rPr>
-              <a:t>.</a:t>
-            </a:r>
-          </a:p>
-          <a:p>
-            <a:pPr marL="285750" indent="-285750">
-              <a:buFont typeface="Arial" panose="020B0604020202020204" pitchFamily="34" charset="0"/>
-              <a:buChar char="•"/>
-            </a:pPr>
-            <a:endParaRPr lang="en-US" sz="1600" b="1" dirty="0">
-              <a:latin typeface="Verdana" panose="020B0604030504040204" pitchFamily="34" charset="0"/>
-              <a:ea typeface="Verdana" panose="020B0604030504040204" pitchFamily="34" charset="0"/>
-              <a:cs typeface="Verdana" panose="020B0604030504040204" pitchFamily="34" charset="0"/>
-            </a:endParaRPr>
-          </a:p>
-          <a:p>
-            <a:pPr marL="285750" indent="-285750">
-              <a:buFont typeface="Arial" panose="020B0604020202020204" pitchFamily="34" charset="0"/>
-              <a:buChar char="•"/>
-            </a:pPr>
-            <a:endParaRPr lang="en-US" sz="1600" b="1" dirty="0">
-              <a:latin typeface="Verdana" panose="020B0604030504040204" pitchFamily="34" charset="0"/>
-              <a:ea typeface="Verdana" panose="020B0604030504040204" pitchFamily="34" charset="0"/>
-              <a:cs typeface="Verdana" panose="020B0604030504040204" pitchFamily="34" charset="0"/>
-            </a:endParaRPr>
-          </a:p>
-          <a:p>
-            <a:pPr marL="285750" indent="-285750">
-              <a:buFont typeface="Arial" panose="020B0604020202020204" pitchFamily="34" charset="0"/>
-              <a:buChar char="•"/>
-            </a:pPr>
-            <a:endParaRPr lang="en-US" sz="1600" b="1" dirty="0">
-              <a:latin typeface="Verdana" panose="020B0604030504040204" pitchFamily="34" charset="0"/>
-              <a:ea typeface="Verdana" panose="020B0604030504040204" pitchFamily="34" charset="0"/>
-              <a:cs typeface="Verdana" panose="020B0604030504040204" pitchFamily="34" charset="0"/>
-            </a:endParaRPr>
-          </a:p>
-          <a:p>
-            <a:pPr marL="285750" indent="-285750">
-              <a:buFont typeface="Arial" panose="020B0604020202020204" pitchFamily="34" charset="0"/>
-              <a:buChar char="•"/>
-            </a:pPr>
-            <a:endParaRPr lang="en-US" sz="1600" b="1" dirty="0">
-              <a:latin typeface="Verdana" panose="020B0604030504040204" pitchFamily="34" charset="0"/>
-              <a:ea typeface="Verdana" panose="020B0604030504040204" pitchFamily="34" charset="0"/>
-              <a:cs typeface="Verdana" panose="020B0604030504040204" pitchFamily="34" charset="0"/>
-            </a:endParaRPr>
-          </a:p>
-          <a:p>
-            <a:pPr marL="285750" indent="-285750">
-              <a:buFont typeface="Arial" panose="020B0604020202020204" pitchFamily="34" charset="0"/>
-              <a:buChar char="•"/>
-            </a:pPr>
-            <a:endParaRPr lang="en-US" sz="1600" b="1" dirty="0">
-              <a:latin typeface="Verdana" panose="020B0604030504040204" pitchFamily="34" charset="0"/>
-              <a:ea typeface="Verdana" panose="020B0604030504040204" pitchFamily="34" charset="0"/>
-              <a:cs typeface="Verdana" panose="020B0604030504040204" pitchFamily="34" charset="0"/>
-            </a:endParaRPr>
-          </a:p>
-          <a:p>
-            <a:pPr marL="285750" indent="-285750">
-              <a:buFont typeface="Arial" panose="020B0604020202020204" pitchFamily="34" charset="0"/>
-              <a:buChar char="•"/>
-            </a:pPr>
-            <a:endParaRPr lang="pt-BR" sz="1600" b="1" dirty="0">
-              <a:latin typeface="Verdana" panose="020B0604030504040204" pitchFamily="34" charset="0"/>
-              <a:ea typeface="Verdana" panose="020B0604030504040204" pitchFamily="34" charset="0"/>
-              <a:cs typeface="Verdana" panose="020B0604030504040204" pitchFamily="34" charset="0"/>
-            </a:endParaRPr>
-          </a:p>
-        </p:txBody>
-      </p:sp>
-      <p:pic>
-        <p:nvPicPr>
-          <p:cNvPr id="7" name="Imagem 6"/>
-          <p:cNvPicPr>
-            <a:picLocks noChangeAspect="1"/>
-          </p:cNvPicPr>
-          <p:nvPr/>
-        </p:nvPicPr>
-        <p:blipFill>
-          <a:blip r:embed="rId2" cstate="print">
-            <a:extLst>
-              <a:ext uri="{28A0092B-C50C-407E-A947-70E740481C1C}">
-                <a14:useLocalDpi xmlns:a14="http://schemas.microsoft.com/office/drawing/2010/main" val="0"/>
-              </a:ext>
-            </a:extLst>
-          </a:blip>
-          <a:stretch>
-            <a:fillRect/>
-          </a:stretch>
-        </p:blipFill>
-        <p:spPr>
-          <a:xfrm>
-            <a:off x="287015" y="6381328"/>
-            <a:ext cx="1672379" cy="291764"/>
-          </a:xfrm>
-          <a:prstGeom prst="rect">
-            <a:avLst/>
-          </a:prstGeom>
-        </p:spPr>
-      </p:pic>
-      <p:sp>
-        <p:nvSpPr>
-          <p:cNvPr id="9" name="CaixaDeTexto 8"/>
-          <p:cNvSpPr txBox="1"/>
-          <p:nvPr/>
-        </p:nvSpPr>
-        <p:spPr>
-          <a:xfrm>
-            <a:off x="393549" y="333523"/>
-            <a:ext cx="6192688" cy="646331"/>
-          </a:xfrm>
-          <a:prstGeom prst="rect">
-            <a:avLst/>
-          </a:prstGeom>
-          <a:noFill/>
-        </p:spPr>
-        <p:txBody>
-          <a:bodyPr wrap="square" rtlCol="0">
-            <a:spAutoFit/>
-          </a:bodyPr>
-          <a:lstStyle/>
-          <a:p>
-            <a:r>
-              <a:rPr lang="en-US" sz="3600" b="1" dirty="0" err="1">
-                <a:latin typeface="Verdana" panose="020B0604030504040204" pitchFamily="34" charset="0"/>
-                <a:ea typeface="Verdana" panose="020B0604030504040204" pitchFamily="34" charset="0"/>
-                <a:cs typeface="Verdana" panose="020B0604030504040204" pitchFamily="34" charset="0"/>
-              </a:rPr>
-              <a:t>Estrutura</a:t>
-            </a:r>
-            <a:r>
-              <a:rPr lang="en-US" sz="3600" b="1" dirty="0">
-                <a:latin typeface="Verdana" panose="020B0604030504040204" pitchFamily="34" charset="0"/>
-                <a:ea typeface="Verdana" panose="020B0604030504040204" pitchFamily="34" charset="0"/>
-                <a:cs typeface="Verdana" panose="020B0604030504040204" pitchFamily="34" charset="0"/>
-              </a:rPr>
-              <a:t> dos Dados</a:t>
-            </a:r>
-            <a:endParaRPr lang="pt-BR" sz="3600" b="1" dirty="0">
-              <a:latin typeface="Verdana" panose="020B0604030504040204" pitchFamily="34" charset="0"/>
-              <a:ea typeface="Verdana" panose="020B0604030504040204" pitchFamily="34" charset="0"/>
-              <a:cs typeface="Verdana" panose="020B0604030504040204" pitchFamily="34" charset="0"/>
-            </a:endParaRPr>
-          </a:p>
-        </p:txBody>
-      </p:sp>
-      <p:sp>
-        <p:nvSpPr>
-          <p:cNvPr id="11" name="Retângulo 10"/>
-          <p:cNvSpPr/>
-          <p:nvPr/>
-        </p:nvSpPr>
-        <p:spPr>
-          <a:xfrm flipV="1">
-            <a:off x="-36512" y="476670"/>
-            <a:ext cx="323528" cy="360039"/>
-          </a:xfrm>
-          <a:prstGeom prst="rect">
-            <a:avLst/>
-          </a:prstGeom>
-          <a:solidFill>
-            <a:srgbClr val="149B55"/>
-          </a:solidFill>
-          <a:ln>
-            <a:noFill/>
-          </a:ln>
-        </p:spPr>
-        <p:style>
-          <a:lnRef idx="2">
-            <a:schemeClr val="accent1">
-              <a:shade val="50000"/>
-            </a:schemeClr>
-          </a:lnRef>
-          <a:fillRef idx="1">
-            <a:schemeClr val="accent1"/>
-          </a:fillRef>
-          <a:effectRef idx="0">
-            <a:schemeClr val="accent1"/>
-          </a:effectRef>
-          <a:fontRef idx="minor">
-            <a:schemeClr val="lt1"/>
-          </a:fontRef>
-        </p:style>
-        <p:txBody>
-          <a:bodyPr rtlCol="0" anchor="ctr"/>
-          <a:lstStyle/>
-          <a:p>
-            <a:pPr algn="ctr"/>
-            <a:endParaRPr lang="pt-BR" dirty="0"/>
-          </a:p>
-        </p:txBody>
-      </p:sp>
-    </p:spTree>
-    <p:extLst>
-      <p:ext uri="{BB962C8B-B14F-4D97-AF65-F5344CB8AC3E}">
-        <p14:creationId xmlns:p14="http://schemas.microsoft.com/office/powerpoint/2010/main" val="4006614587"/>
-      </p:ext>
-    </p:extLst>
-  </p:cSld>
-  <p:clrMapOvr>
-    <a:masterClrMapping/>
-  </p:clrMapOvr>
-</p:sld>
-</file>
-
-<file path=ppt/slides/slide8.xml><?xml version="1.0" encoding="utf-8"?>
-<p:sld xmlns:a="http://schemas.openxmlformats.org/drawingml/2006/main" xmlns:r="http://schemas.openxmlformats.org/officeDocument/2006/relationships" xmlns:p="http://schemas.openxmlformats.org/presentationml/2006/main">
-  <p:cSld>
-    <p:spTree>
-      <p:nvGrpSpPr>
-        <p:cNvPr id="1" name=""/>
-        <p:cNvGrpSpPr/>
-        <p:nvPr/>
-      </p:nvGrpSpPr>
-      <p:grpSpPr>
-        <a:xfrm>
-          <a:off x="0" y="0"/>
-          <a:ext cx="0" cy="0"/>
-          <a:chOff x="0" y="0"/>
-          <a:chExt cx="0" cy="0"/>
-        </a:xfrm>
-      </p:grpSpPr>
-      <p:sp>
-        <p:nvSpPr>
-          <p:cNvPr id="8" name="CaixaDeTexto 7"/>
-          <p:cNvSpPr txBox="1"/>
-          <p:nvPr/>
-        </p:nvSpPr>
-        <p:spPr>
-          <a:xfrm>
-            <a:off x="971600" y="1700808"/>
-            <a:ext cx="5688632" cy="3785652"/>
-          </a:xfrm>
-          <a:prstGeom prst="rect">
-            <a:avLst/>
-          </a:prstGeom>
-          <a:noFill/>
-        </p:spPr>
-        <p:txBody>
-          <a:bodyPr wrap="square" rtlCol="0">
-            <a:spAutoFit/>
-          </a:bodyPr>
-          <a:lstStyle/>
-          <a:p>
-            <a:pPr marL="285750" indent="-285750">
-              <a:buFont typeface="Arial" panose="020B0604020202020204" pitchFamily="34" charset="0"/>
-              <a:buChar char="•"/>
-            </a:pPr>
-            <a:r>
-              <a:rPr lang="en-US" sz="1600" b="1" dirty="0">
-                <a:latin typeface="Verdana" panose="020B0604030504040204" pitchFamily="34" charset="0"/>
-                <a:ea typeface="Verdana" panose="020B0604030504040204" pitchFamily="34" charset="0"/>
-                <a:cs typeface="Verdana" panose="020B0604030504040204" pitchFamily="34" charset="0"/>
-              </a:rPr>
-              <a:t>A</a:t>
-            </a:r>
-          </a:p>
-          <a:p>
-            <a:pPr marL="285750" indent="-285750">
-              <a:buFont typeface="Arial" panose="020B0604020202020204" pitchFamily="34" charset="0"/>
-              <a:buChar char="•"/>
-            </a:pPr>
-            <a:endParaRPr lang="en-US" sz="1600" b="1" dirty="0">
-              <a:latin typeface="Verdana" panose="020B0604030504040204" pitchFamily="34" charset="0"/>
-              <a:ea typeface="Verdana" panose="020B0604030504040204" pitchFamily="34" charset="0"/>
-              <a:cs typeface="Verdana" panose="020B0604030504040204" pitchFamily="34" charset="0"/>
-            </a:endParaRPr>
-          </a:p>
-          <a:p>
-            <a:pPr marL="285750" indent="-285750">
-              <a:buFont typeface="Arial" panose="020B0604020202020204" pitchFamily="34" charset="0"/>
-              <a:buChar char="•"/>
-            </a:pPr>
-            <a:r>
-              <a:rPr lang="en-US" sz="1600" b="1" dirty="0">
-                <a:latin typeface="Verdana" panose="020B0604030504040204" pitchFamily="34" charset="0"/>
-                <a:ea typeface="Verdana" panose="020B0604030504040204" pitchFamily="34" charset="0"/>
-                <a:cs typeface="Verdana" panose="020B0604030504040204" pitchFamily="34" charset="0"/>
-              </a:rPr>
-              <a:t>B</a:t>
-            </a:r>
-          </a:p>
-          <a:p>
-            <a:pPr marL="285750" indent="-285750">
-              <a:buFont typeface="Arial" panose="020B0604020202020204" pitchFamily="34" charset="0"/>
-              <a:buChar char="•"/>
-            </a:pPr>
-            <a:endParaRPr lang="en-US" sz="1600" b="1" dirty="0">
-              <a:latin typeface="Verdana" panose="020B0604030504040204" pitchFamily="34" charset="0"/>
-              <a:ea typeface="Verdana" panose="020B0604030504040204" pitchFamily="34" charset="0"/>
-              <a:cs typeface="Verdana" panose="020B0604030504040204" pitchFamily="34" charset="0"/>
-            </a:endParaRPr>
-          </a:p>
-          <a:p>
-            <a:pPr marL="285750" indent="-285750">
-              <a:buFont typeface="Arial" panose="020B0604020202020204" pitchFamily="34" charset="0"/>
-              <a:buChar char="•"/>
-            </a:pPr>
-            <a:r>
-              <a:rPr lang="en-US" sz="1600" b="1" dirty="0">
-                <a:latin typeface="Verdana" panose="020B0604030504040204" pitchFamily="34" charset="0"/>
-                <a:ea typeface="Verdana" panose="020B0604030504040204" pitchFamily="34" charset="0"/>
-                <a:cs typeface="Verdana" panose="020B0604030504040204" pitchFamily="34" charset="0"/>
-              </a:rPr>
-              <a:t>C</a:t>
-            </a:r>
-          </a:p>
-          <a:p>
-            <a:pPr marL="285750" indent="-285750">
-              <a:buFont typeface="Arial" panose="020B0604020202020204" pitchFamily="34" charset="0"/>
-              <a:buChar char="•"/>
-            </a:pPr>
-            <a:endParaRPr lang="en-US" sz="1600" b="1" dirty="0">
-              <a:latin typeface="Verdana" panose="020B0604030504040204" pitchFamily="34" charset="0"/>
-              <a:ea typeface="Verdana" panose="020B0604030504040204" pitchFamily="34" charset="0"/>
-              <a:cs typeface="Verdana" panose="020B0604030504040204" pitchFamily="34" charset="0"/>
-            </a:endParaRPr>
-          </a:p>
-          <a:p>
-            <a:pPr marL="285750" indent="-285750">
-              <a:buFont typeface="Arial" panose="020B0604020202020204" pitchFamily="34" charset="0"/>
-              <a:buChar char="•"/>
-            </a:pPr>
-            <a:r>
-              <a:rPr lang="en-US" sz="1600" b="1" dirty="0">
-                <a:latin typeface="Verdana" panose="020B0604030504040204" pitchFamily="34" charset="0"/>
-                <a:ea typeface="Verdana" panose="020B0604030504040204" pitchFamily="34" charset="0"/>
-                <a:cs typeface="Verdana" panose="020B0604030504040204" pitchFamily="34" charset="0"/>
-              </a:rPr>
-              <a:t>D</a:t>
-            </a:r>
-          </a:p>
-          <a:p>
-            <a:pPr marL="285750" indent="-285750">
-              <a:buFont typeface="Arial" panose="020B0604020202020204" pitchFamily="34" charset="0"/>
-              <a:buChar char="•"/>
-            </a:pPr>
-            <a:endParaRPr lang="en-US" sz="1600" b="1" dirty="0">
-              <a:latin typeface="Verdana" panose="020B0604030504040204" pitchFamily="34" charset="0"/>
-              <a:ea typeface="Verdana" panose="020B0604030504040204" pitchFamily="34" charset="0"/>
-              <a:cs typeface="Verdana" panose="020B0604030504040204" pitchFamily="34" charset="0"/>
-            </a:endParaRPr>
-          </a:p>
-          <a:p>
-            <a:pPr marL="285750" indent="-285750">
-              <a:buFont typeface="Arial" panose="020B0604020202020204" pitchFamily="34" charset="0"/>
-              <a:buChar char="•"/>
-            </a:pPr>
-            <a:r>
-              <a:rPr lang="en-US" sz="1600" b="1">
-                <a:latin typeface="Verdana" panose="020B0604030504040204" pitchFamily="34" charset="0"/>
-                <a:ea typeface="Verdana" panose="020B0604030504040204" pitchFamily="34" charset="0"/>
-                <a:cs typeface="Verdana" panose="020B0604030504040204" pitchFamily="34" charset="0"/>
-              </a:rPr>
-              <a:t>E</a:t>
-            </a:r>
-            <a:endParaRPr lang="en-US" sz="1600" dirty="0">
-              <a:latin typeface="Verdana" panose="020B0604030504040204" pitchFamily="34" charset="0"/>
-              <a:ea typeface="Verdana" panose="020B0604030504040204" pitchFamily="34" charset="0"/>
-              <a:cs typeface="Verdana" panose="020B0604030504040204" pitchFamily="34" charset="0"/>
-            </a:endParaRPr>
-          </a:p>
-          <a:p>
-            <a:pPr marL="285750" indent="-285750">
-              <a:buFont typeface="Arial" panose="020B0604020202020204" pitchFamily="34" charset="0"/>
-              <a:buChar char="•"/>
-            </a:pPr>
-            <a:endParaRPr lang="en-US" sz="1600" b="1" dirty="0">
-              <a:latin typeface="Verdana" panose="020B0604030504040204" pitchFamily="34" charset="0"/>
-              <a:ea typeface="Verdana" panose="020B0604030504040204" pitchFamily="34" charset="0"/>
-              <a:cs typeface="Verdana" panose="020B0604030504040204" pitchFamily="34" charset="0"/>
-            </a:endParaRPr>
-          </a:p>
-          <a:p>
-            <a:pPr marL="285750" indent="-285750">
-              <a:buFont typeface="Arial" panose="020B0604020202020204" pitchFamily="34" charset="0"/>
-              <a:buChar char="•"/>
-            </a:pPr>
-            <a:endParaRPr lang="en-US" sz="1600" b="1" dirty="0">
-              <a:latin typeface="Verdana" panose="020B0604030504040204" pitchFamily="34" charset="0"/>
-              <a:ea typeface="Verdana" panose="020B0604030504040204" pitchFamily="34" charset="0"/>
-              <a:cs typeface="Verdana" panose="020B0604030504040204" pitchFamily="34" charset="0"/>
-            </a:endParaRPr>
-          </a:p>
-          <a:p>
-            <a:pPr marL="285750" indent="-285750">
-              <a:buFont typeface="Arial" panose="020B0604020202020204" pitchFamily="34" charset="0"/>
-              <a:buChar char="•"/>
-            </a:pPr>
-            <a:endParaRPr lang="en-US" sz="1600" b="1" dirty="0">
-              <a:latin typeface="Verdana" panose="020B0604030504040204" pitchFamily="34" charset="0"/>
-              <a:ea typeface="Verdana" panose="020B0604030504040204" pitchFamily="34" charset="0"/>
-              <a:cs typeface="Verdana" panose="020B0604030504040204" pitchFamily="34" charset="0"/>
-            </a:endParaRPr>
-          </a:p>
-          <a:p>
-            <a:pPr marL="285750" indent="-285750">
-              <a:buFont typeface="Arial" panose="020B0604020202020204" pitchFamily="34" charset="0"/>
-              <a:buChar char="•"/>
-            </a:pPr>
-            <a:endParaRPr lang="en-US" sz="1600" b="1" dirty="0">
-              <a:latin typeface="Verdana" panose="020B0604030504040204" pitchFamily="34" charset="0"/>
-              <a:ea typeface="Verdana" panose="020B0604030504040204" pitchFamily="34" charset="0"/>
-              <a:cs typeface="Verdana" panose="020B0604030504040204" pitchFamily="34" charset="0"/>
-            </a:endParaRPr>
-          </a:p>
-          <a:p>
-            <a:pPr marL="285750" indent="-285750">
-              <a:buFont typeface="Arial" panose="020B0604020202020204" pitchFamily="34" charset="0"/>
-              <a:buChar char="•"/>
-            </a:pPr>
-            <a:endParaRPr lang="en-US" sz="1600" b="1" dirty="0">
-              <a:latin typeface="Verdana" panose="020B0604030504040204" pitchFamily="34" charset="0"/>
-              <a:ea typeface="Verdana" panose="020B0604030504040204" pitchFamily="34" charset="0"/>
-              <a:cs typeface="Verdana" panose="020B0604030504040204" pitchFamily="34" charset="0"/>
-            </a:endParaRPr>
-          </a:p>
-          <a:p>
-            <a:pPr marL="285750" indent="-285750">
-              <a:buFont typeface="Arial" panose="020B0604020202020204" pitchFamily="34" charset="0"/>
-              <a:buChar char="•"/>
-            </a:pPr>
-            <a:endParaRPr lang="pt-BR" sz="1600" b="1" dirty="0">
-              <a:latin typeface="Verdana" panose="020B0604030504040204" pitchFamily="34" charset="0"/>
-              <a:ea typeface="Verdana" panose="020B0604030504040204" pitchFamily="34" charset="0"/>
-              <a:cs typeface="Verdana" panose="020B0604030504040204" pitchFamily="34" charset="0"/>
-            </a:endParaRPr>
-          </a:p>
-        </p:txBody>
-      </p:sp>
-      <p:pic>
-        <p:nvPicPr>
-          <p:cNvPr id="7" name="Imagem 6"/>
-          <p:cNvPicPr>
-            <a:picLocks noChangeAspect="1"/>
-          </p:cNvPicPr>
-          <p:nvPr/>
-        </p:nvPicPr>
-        <p:blipFill>
-          <a:blip r:embed="rId2" cstate="print">
-            <a:extLst>
-              <a:ext uri="{28A0092B-C50C-407E-A947-70E740481C1C}">
-                <a14:useLocalDpi xmlns:a14="http://schemas.microsoft.com/office/drawing/2010/main" val="0"/>
-              </a:ext>
-            </a:extLst>
-          </a:blip>
-          <a:stretch>
-            <a:fillRect/>
-          </a:stretch>
-        </p:blipFill>
-        <p:spPr>
-          <a:xfrm>
-            <a:off x="287015" y="6381328"/>
-            <a:ext cx="1672379" cy="291764"/>
-          </a:xfrm>
-          <a:prstGeom prst="rect">
-            <a:avLst/>
-          </a:prstGeom>
-        </p:spPr>
-      </p:pic>
-      <p:sp>
-        <p:nvSpPr>
-          <p:cNvPr id="9" name="CaixaDeTexto 8"/>
-          <p:cNvSpPr txBox="1"/>
-          <p:nvPr/>
-        </p:nvSpPr>
-        <p:spPr>
-          <a:xfrm>
-            <a:off x="393549" y="333523"/>
-            <a:ext cx="6192688" cy="646331"/>
-          </a:xfrm>
-          <a:prstGeom prst="rect">
-            <a:avLst/>
-          </a:prstGeom>
-          <a:noFill/>
-        </p:spPr>
-        <p:txBody>
-          <a:bodyPr wrap="square" rtlCol="0">
-            <a:spAutoFit/>
-          </a:bodyPr>
-          <a:lstStyle/>
-          <a:p>
-            <a:r>
-              <a:rPr lang="en-US" sz="3600" b="1" dirty="0">
-                <a:latin typeface="Verdana" panose="020B0604030504040204" pitchFamily="34" charset="0"/>
-                <a:ea typeface="Verdana" panose="020B0604030504040204" pitchFamily="34" charset="0"/>
-                <a:cs typeface="Verdana" panose="020B0604030504040204" pitchFamily="34" charset="0"/>
-              </a:rPr>
-              <a:t>Estado da </a:t>
-            </a:r>
-            <a:r>
-              <a:rPr lang="en-US" sz="3600" b="1" dirty="0" err="1">
-                <a:latin typeface="Verdana" panose="020B0604030504040204" pitchFamily="34" charset="0"/>
-                <a:ea typeface="Verdana" panose="020B0604030504040204" pitchFamily="34" charset="0"/>
-                <a:cs typeface="Verdana" panose="020B0604030504040204" pitchFamily="34" charset="0"/>
-              </a:rPr>
-              <a:t>arte</a:t>
-            </a:r>
-            <a:endParaRPr lang="pt-BR" sz="3600" b="1" dirty="0">
-              <a:latin typeface="Verdana" panose="020B0604030504040204" pitchFamily="34" charset="0"/>
-              <a:ea typeface="Verdana" panose="020B0604030504040204" pitchFamily="34" charset="0"/>
-              <a:cs typeface="Verdana" panose="020B0604030504040204" pitchFamily="34" charset="0"/>
-            </a:endParaRPr>
-          </a:p>
-        </p:txBody>
-      </p:sp>
-      <p:sp>
-        <p:nvSpPr>
-          <p:cNvPr id="11" name="Retângulo 10"/>
-          <p:cNvSpPr/>
-          <p:nvPr/>
-        </p:nvSpPr>
-        <p:spPr>
-          <a:xfrm flipV="1">
-            <a:off x="-36512" y="476670"/>
-            <a:ext cx="323528" cy="360039"/>
-          </a:xfrm>
-          <a:prstGeom prst="rect">
-            <a:avLst/>
-          </a:prstGeom>
-          <a:solidFill>
-            <a:srgbClr val="149B55"/>
-          </a:solidFill>
-          <a:ln>
-            <a:noFill/>
-          </a:ln>
-        </p:spPr>
-        <p:style>
-          <a:lnRef idx="2">
-            <a:schemeClr val="accent1">
-              <a:shade val="50000"/>
-            </a:schemeClr>
-          </a:lnRef>
-          <a:fillRef idx="1">
-            <a:schemeClr val="accent1"/>
-          </a:fillRef>
-          <a:effectRef idx="0">
-            <a:schemeClr val="accent1"/>
-          </a:effectRef>
-          <a:fontRef idx="minor">
-            <a:schemeClr val="lt1"/>
-          </a:fontRef>
-        </p:style>
-        <p:txBody>
-          <a:bodyPr rtlCol="0" anchor="ctr"/>
-          <a:lstStyle/>
-          <a:p>
-            <a:pPr algn="ctr"/>
-            <a:endParaRPr lang="pt-BR" dirty="0"/>
-          </a:p>
-        </p:txBody>
-      </p:sp>
-    </p:spTree>
-    <p:extLst>
-      <p:ext uri="{BB962C8B-B14F-4D97-AF65-F5344CB8AC3E}">
-        <p14:creationId xmlns:p14="http://schemas.microsoft.com/office/powerpoint/2010/main" val="772612620"/>
-      </p:ext>
-    </p:extLst>
-  </p:cSld>
-  <p:clrMapOvr>
-    <a:masterClrMapping/>
-  </p:clrMapOvr>
-</p:sld>
-</file>
-
-<file path=ppt/slides/slide9.xml><?xml version="1.0" encoding="utf-8"?>
 <p:sld xmlns:a="http://schemas.openxmlformats.org/drawingml/2006/main" xmlns:r="http://schemas.openxmlformats.org/officeDocument/2006/relationships" xmlns:p="http://schemas.openxmlformats.org/presentationml/2006/main">
   <p:cSld>
     <p:spTree>
@@ -6081,14 +5244,14 @@
       </p:pic>
       <p:sp>
         <p:nvSpPr>
-          <p:cNvPr id="11" name="CaixaDeTexto 10"/>
+          <p:cNvPr id="7" name="CaixaDeTexto 6"/>
           <p:cNvSpPr txBox="1"/>
           <p:nvPr/>
         </p:nvSpPr>
         <p:spPr>
           <a:xfrm>
-            <a:off x="4644008" y="836712"/>
-            <a:ext cx="6192688" cy="707886"/>
+            <a:off x="393548" y="333523"/>
+            <a:ext cx="7130779" cy="646331"/>
           </a:xfrm>
           <a:prstGeom prst="rect">
             <a:avLst/>
@@ -6102,115 +5265,1378 @@
           <a:lstStyle/>
           <a:p>
             <a:r>
-              <a:rPr lang="pt-BR" sz="4000" b="1" dirty="0">
-                <a:latin typeface="Verdana" panose="020B0604030504040204" pitchFamily="34" charset="0"/>
-                <a:ea typeface="Verdana" panose="020B0604030504040204" pitchFamily="34" charset="0"/>
-                <a:cs typeface="Verdana" panose="020B0604030504040204" pitchFamily="34" charset="0"/>
-              </a:rPr>
-              <a:t>Obrigado</a:t>
-            </a:r>
-          </a:p>
-        </p:txBody>
-      </p:sp>
-      <p:sp>
-        <p:nvSpPr>
-          <p:cNvPr id="12" name="Retângulo 11"/>
+              <a:rPr lang="pt-BR" sz="3600" b="1" dirty="0">
+                <a:latin typeface="Verdana" panose="020B0604030504040204" pitchFamily="34" charset="0"/>
+                <a:ea typeface="Verdana" panose="020B0604030504040204" pitchFamily="34" charset="0"/>
+                <a:cs typeface="Verdana" panose="020B0604030504040204" pitchFamily="34" charset="0"/>
+              </a:rPr>
+              <a:t>Representação Matemática</a:t>
+            </a:r>
+          </a:p>
+        </p:txBody>
+      </p:sp>
+      <p:sp>
+        <p:nvSpPr>
+          <p:cNvPr id="10" name="Retângulo 9"/>
           <p:cNvSpPr/>
           <p:nvPr/>
         </p:nvSpPr>
         <p:spPr>
-          <a:xfrm>
-            <a:off x="4751513" y="1986453"/>
-            <a:ext cx="3780927" cy="1384995"/>
+          <a:xfrm flipV="1">
+            <a:off x="-36512" y="476670"/>
+            <a:ext cx="323528" cy="360039"/>
           </a:xfrm>
           <a:prstGeom prst="rect">
             <a:avLst/>
           </a:prstGeom>
-        </p:spPr>
-        <p:txBody>
-          <a:bodyPr wrap="square">
-            <a:spAutoFit/>
-          </a:bodyPr>
-          <a:lstStyle/>
-          <a:p>
-            <a:r>
-              <a:rPr lang="pt-BR" sz="1400" b="1" dirty="0">
-                <a:latin typeface="Verdana" panose="020B0604030504040204" pitchFamily="34" charset="0"/>
-                <a:ea typeface="Verdana" panose="020B0604030504040204" pitchFamily="34" charset="0"/>
-                <a:cs typeface="Verdana" panose="020B0604030504040204" pitchFamily="34" charset="0"/>
-              </a:rPr>
-              <a:t>UDESC – Universidade do Estado de Santa Catarina</a:t>
-            </a:r>
-          </a:p>
-          <a:p>
-            <a:endParaRPr lang="pt-BR" sz="1400" dirty="0">
-              <a:latin typeface="Verdana" panose="020B0604030504040204" pitchFamily="34" charset="0"/>
-              <a:ea typeface="Verdana" panose="020B0604030504040204" pitchFamily="34" charset="0"/>
-              <a:cs typeface="Verdana" panose="020B0604030504040204" pitchFamily="34" charset="0"/>
-            </a:endParaRPr>
-          </a:p>
-          <a:p>
-            <a:r>
-              <a:rPr lang="pt-BR" sz="1400" dirty="0">
-                <a:latin typeface="Verdana" panose="020B0604030504040204" pitchFamily="34" charset="0"/>
-                <a:ea typeface="Verdana" panose="020B0604030504040204" pitchFamily="34" charset="0"/>
-                <a:cs typeface="Verdana" panose="020B0604030504040204" pitchFamily="34" charset="0"/>
-              </a:rPr>
-              <a:t>www.udesc.br</a:t>
-            </a:r>
-          </a:p>
-          <a:p>
-            <a:endParaRPr lang="pt-BR" sz="1400" dirty="0">
-              <a:latin typeface="Verdana" panose="020B0604030504040204" pitchFamily="34" charset="0"/>
-              <a:ea typeface="Verdana" panose="020B0604030504040204" pitchFamily="34" charset="0"/>
-              <a:cs typeface="Verdana" panose="020B0604030504040204" pitchFamily="34" charset="0"/>
-            </a:endParaRPr>
-          </a:p>
-          <a:p>
-            <a:r>
-              <a:rPr lang="pt-BR" sz="1400" dirty="0">
-                <a:latin typeface="Verdana" panose="020B0604030504040204" pitchFamily="34" charset="0"/>
-                <a:ea typeface="Verdana" panose="020B0604030504040204" pitchFamily="34" charset="0"/>
-                <a:cs typeface="Verdana" panose="020B0604030504040204" pitchFamily="34" charset="0"/>
-              </a:rPr>
-              <a:t>www.facebook.com/udesc</a:t>
-            </a:r>
+          <a:solidFill>
+            <a:srgbClr val="149B55"/>
+          </a:solidFill>
+          <a:ln>
+            <a:noFill/>
+          </a:ln>
+        </p:spPr>
+        <p:style>
+          <a:lnRef idx="2">
+            <a:schemeClr val="accent1">
+              <a:shade val="50000"/>
+            </a:schemeClr>
+          </a:lnRef>
+          <a:fillRef idx="1">
+            <a:schemeClr val="accent1"/>
+          </a:fillRef>
+          <a:effectRef idx="0">
+            <a:schemeClr val="accent1"/>
+          </a:effectRef>
+          <a:fontRef idx="minor">
+            <a:schemeClr val="lt1"/>
+          </a:fontRef>
+        </p:style>
+        <p:txBody>
+          <a:bodyPr rtlCol="0" anchor="ctr"/>
+          <a:lstStyle/>
+          <a:p>
+            <a:pPr algn="ctr"/>
+            <a:endParaRPr lang="pt-BR" dirty="0"/>
           </a:p>
         </p:txBody>
       </p:sp>
       <p:pic>
         <p:nvPicPr>
-          <p:cNvPr id="13" name="Imagem 12"/>
+          <p:cNvPr id="4" name="Imagem 3">
+            <a:extLst>
+              <a:ext uri="{FF2B5EF4-FFF2-40B4-BE49-F238E27FC236}">
+                <a16:creationId xmlns:a16="http://schemas.microsoft.com/office/drawing/2014/main" id="{4773190F-C472-4CDE-A2D0-8F97087CC4FD}"/>
+              </a:ext>
+            </a:extLst>
+          </p:cNvPr>
           <p:cNvPicPr>
             <a:picLocks noChangeAspect="1"/>
           </p:cNvPicPr>
           <p:nvPr/>
         </p:nvPicPr>
-        <p:blipFill rotWithShape="1">
-          <a:blip r:embed="rId3" cstate="print">
+        <p:blipFill>
+          <a:blip r:embed="rId3">
             <a:extLst>
               <a:ext uri="{28A0092B-C50C-407E-A947-70E740481C1C}">
                 <a14:useLocalDpi xmlns:a14="http://schemas.microsoft.com/office/drawing/2010/main" val="0"/>
               </a:ext>
             </a:extLst>
           </a:blip>
-          <a:srcRect t="23653"/>
-          <a:stretch/>
+          <a:stretch>
+            <a:fillRect/>
+          </a:stretch>
         </p:blipFill>
         <p:spPr>
-          <a:xfrm flipV="1">
-            <a:off x="-396552" y="188640"/>
-            <a:ext cx="4449092" cy="6696744"/>
+          <a:xfrm>
+            <a:off x="393548" y="2406475"/>
+            <a:ext cx="4270166" cy="2045049"/>
           </a:xfrm>
           <a:prstGeom prst="rect">
             <a:avLst/>
           </a:prstGeom>
         </p:spPr>
       </p:pic>
+      <p:sp>
+        <p:nvSpPr>
+          <p:cNvPr id="9" name="CaixaDeTexto 8">
+            <a:extLst>
+              <a:ext uri="{FF2B5EF4-FFF2-40B4-BE49-F238E27FC236}">
+                <a16:creationId xmlns:a16="http://schemas.microsoft.com/office/drawing/2014/main" id="{44B9EEE7-99EC-42C2-9AB1-6D8FD829670B}"/>
+              </a:ext>
+            </a:extLst>
+          </p:cNvPr>
+          <p:cNvSpPr txBox="1"/>
+          <p:nvPr/>
+        </p:nvSpPr>
+        <p:spPr>
+          <a:xfrm>
+            <a:off x="5004048" y="1988840"/>
+            <a:ext cx="3096344" cy="3108543"/>
+          </a:xfrm>
+          <a:prstGeom prst="rect">
+            <a:avLst/>
+          </a:prstGeom>
+          <a:noFill/>
+        </p:spPr>
+        <p:txBody>
+          <a:bodyPr wrap="square" rtlCol="0">
+            <a:spAutoFit/>
+          </a:bodyPr>
+          <a:lstStyle/>
+          <a:p>
+            <a:pPr marL="285750" indent="-285750">
+              <a:buFont typeface="Arial" panose="020B0604020202020204" pitchFamily="34" charset="0"/>
+              <a:buChar char="•"/>
+            </a:pPr>
+            <a:r>
+              <a:rPr lang="en-US" sz="1600" b="1" dirty="0">
+                <a:latin typeface="Verdana" panose="020B0604030504040204" pitchFamily="34" charset="0"/>
+                <a:ea typeface="Verdana" panose="020B0604030504040204" pitchFamily="34" charset="0"/>
+              </a:rPr>
+              <a:t>A</a:t>
+            </a:r>
+          </a:p>
+          <a:p>
+            <a:pPr marL="285750" indent="-285750">
+              <a:buFont typeface="Arial" panose="020B0604020202020204" pitchFamily="34" charset="0"/>
+              <a:buChar char="•"/>
+            </a:pPr>
+            <a:endParaRPr lang="en-US" sz="1600" b="1" dirty="0">
+              <a:latin typeface="Verdana" panose="020B0604030504040204" pitchFamily="34" charset="0"/>
+              <a:ea typeface="Verdana" panose="020B0604030504040204" pitchFamily="34" charset="0"/>
+            </a:endParaRPr>
+          </a:p>
+          <a:p>
+            <a:pPr marL="285750" indent="-285750">
+              <a:buFont typeface="Arial" panose="020B0604020202020204" pitchFamily="34" charset="0"/>
+              <a:buChar char="•"/>
+            </a:pPr>
+            <a:r>
+              <a:rPr lang="en-US" sz="1600" b="1" dirty="0">
+                <a:latin typeface="Verdana" panose="020B0604030504040204" pitchFamily="34" charset="0"/>
+                <a:ea typeface="Verdana" panose="020B0604030504040204" pitchFamily="34" charset="0"/>
+              </a:rPr>
+              <a:t>B</a:t>
+            </a:r>
+          </a:p>
+          <a:p>
+            <a:pPr marL="285750" indent="-285750">
+              <a:buFont typeface="Arial" panose="020B0604020202020204" pitchFamily="34" charset="0"/>
+              <a:buChar char="•"/>
+            </a:pPr>
+            <a:endParaRPr lang="en-US" sz="1600" b="1" dirty="0">
+              <a:latin typeface="Verdana" panose="020B0604030504040204" pitchFamily="34" charset="0"/>
+              <a:ea typeface="Verdana" panose="020B0604030504040204" pitchFamily="34" charset="0"/>
+            </a:endParaRPr>
+          </a:p>
+          <a:p>
+            <a:pPr marL="285750" indent="-285750">
+              <a:buFont typeface="Arial" panose="020B0604020202020204" pitchFamily="34" charset="0"/>
+              <a:buChar char="•"/>
+            </a:pPr>
+            <a:r>
+              <a:rPr lang="en-US" sz="1600" b="1" dirty="0">
+                <a:latin typeface="Verdana" panose="020B0604030504040204" pitchFamily="34" charset="0"/>
+                <a:ea typeface="Verdana" panose="020B0604030504040204" pitchFamily="34" charset="0"/>
+              </a:rPr>
+              <a:t>C</a:t>
+            </a:r>
+          </a:p>
+          <a:p>
+            <a:pPr marL="285750" indent="-285750">
+              <a:buFont typeface="Arial" panose="020B0604020202020204" pitchFamily="34" charset="0"/>
+              <a:buChar char="•"/>
+            </a:pPr>
+            <a:endParaRPr lang="en-US" sz="1600" b="1" dirty="0">
+              <a:latin typeface="Verdana" panose="020B0604030504040204" pitchFamily="34" charset="0"/>
+              <a:ea typeface="Verdana" panose="020B0604030504040204" pitchFamily="34" charset="0"/>
+            </a:endParaRPr>
+          </a:p>
+          <a:p>
+            <a:pPr marL="285750" indent="-285750">
+              <a:buFont typeface="Arial" panose="020B0604020202020204" pitchFamily="34" charset="0"/>
+              <a:buChar char="•"/>
+            </a:pPr>
+            <a:r>
+              <a:rPr lang="en-US" sz="1600" b="1" dirty="0">
+                <a:latin typeface="Verdana" panose="020B0604030504040204" pitchFamily="34" charset="0"/>
+                <a:ea typeface="Verdana" panose="020B0604030504040204" pitchFamily="34" charset="0"/>
+              </a:rPr>
+              <a:t>D</a:t>
+            </a:r>
+          </a:p>
+          <a:p>
+            <a:pPr marL="285750" indent="-285750">
+              <a:buFont typeface="Arial" panose="020B0604020202020204" pitchFamily="34" charset="0"/>
+              <a:buChar char="•"/>
+            </a:pPr>
+            <a:endParaRPr lang="en-US" sz="1600" b="1" dirty="0">
+              <a:latin typeface="Verdana" panose="020B0604030504040204" pitchFamily="34" charset="0"/>
+              <a:ea typeface="Verdana" panose="020B0604030504040204" pitchFamily="34" charset="0"/>
+            </a:endParaRPr>
+          </a:p>
+          <a:p>
+            <a:pPr marL="285750" indent="-285750">
+              <a:buFont typeface="Arial" panose="020B0604020202020204" pitchFamily="34" charset="0"/>
+              <a:buChar char="•"/>
+            </a:pPr>
+            <a:r>
+              <a:rPr lang="en-US" sz="1600" b="1" dirty="0">
+                <a:latin typeface="Verdana" panose="020B0604030504040204" pitchFamily="34" charset="0"/>
+                <a:ea typeface="Verdana" panose="020B0604030504040204" pitchFamily="34" charset="0"/>
+              </a:rPr>
+              <a:t>E</a:t>
+            </a:r>
+          </a:p>
+          <a:p>
+            <a:pPr marL="285750" indent="-285750">
+              <a:buFont typeface="Arial" panose="020B0604020202020204" pitchFamily="34" charset="0"/>
+              <a:buChar char="•"/>
+            </a:pPr>
+            <a:endParaRPr lang="en-US" sz="1600" b="1" dirty="0">
+              <a:latin typeface="Verdana" panose="020B0604030504040204" pitchFamily="34" charset="0"/>
+              <a:ea typeface="Verdana" panose="020B0604030504040204" pitchFamily="34" charset="0"/>
+            </a:endParaRPr>
+          </a:p>
+          <a:p>
+            <a:pPr marL="285750" indent="-285750">
+              <a:buFont typeface="Arial" panose="020B0604020202020204" pitchFamily="34" charset="0"/>
+              <a:buChar char="•"/>
+            </a:pPr>
+            <a:r>
+              <a:rPr lang="en-US" sz="1600" b="1" dirty="0">
+                <a:latin typeface="Verdana" panose="020B0604030504040204" pitchFamily="34" charset="0"/>
+                <a:ea typeface="Verdana" panose="020B0604030504040204" pitchFamily="34" charset="0"/>
+              </a:rPr>
+              <a:t>F</a:t>
+            </a:r>
+            <a:endParaRPr lang="en-US" b="1" dirty="0">
+              <a:latin typeface="Verdana" panose="020B0604030504040204" pitchFamily="34" charset="0"/>
+              <a:ea typeface="Verdana" panose="020B0604030504040204" pitchFamily="34" charset="0"/>
+            </a:endParaRPr>
+          </a:p>
+          <a:p>
+            <a:pPr marL="285750" indent="-285750">
+              <a:buFont typeface="Arial" panose="020B0604020202020204" pitchFamily="34" charset="0"/>
+              <a:buChar char="•"/>
+            </a:pPr>
+            <a:endParaRPr lang="pt-BR" dirty="0"/>
+          </a:p>
+        </p:txBody>
+      </p:sp>
     </p:spTree>
     <p:extLst>
       <p:ext uri="{BB962C8B-B14F-4D97-AF65-F5344CB8AC3E}">
-        <p14:creationId xmlns:p14="http://schemas.microsoft.com/office/powerpoint/2010/main" val="3663217977"/>
+        <p14:creationId xmlns:p14="http://schemas.microsoft.com/office/powerpoint/2010/main" val="477266963"/>
+      </p:ext>
+    </p:extLst>
+  </p:cSld>
+  <p:clrMapOvr>
+    <a:masterClrMapping/>
+  </p:clrMapOvr>
+</p:sld>
+</file>
+
+<file path=ppt/slides/slide6.xml><?xml version="1.0" encoding="utf-8"?>
+<p:sld xmlns:a="http://schemas.openxmlformats.org/drawingml/2006/main" xmlns:r="http://schemas.openxmlformats.org/officeDocument/2006/relationships" xmlns:p="http://schemas.openxmlformats.org/presentationml/2006/main">
+  <p:cSld>
+    <p:spTree>
+      <p:nvGrpSpPr>
+        <p:cNvPr id="1" name=""/>
+        <p:cNvGrpSpPr/>
+        <p:nvPr/>
+      </p:nvGrpSpPr>
+      <p:grpSpPr>
+        <a:xfrm>
+          <a:off x="0" y="0"/>
+          <a:ext cx="0" cy="0"/>
+          <a:chOff x="0" y="0"/>
+          <a:chExt cx="0" cy="0"/>
+        </a:xfrm>
+      </p:grpSpPr>
+      <p:sp>
+        <p:nvSpPr>
+          <p:cNvPr id="8" name="CaixaDeTexto 7"/>
+          <p:cNvSpPr txBox="1"/>
+          <p:nvPr/>
+        </p:nvSpPr>
+        <p:spPr>
+          <a:xfrm>
+            <a:off x="971600" y="1700808"/>
+            <a:ext cx="5688632" cy="3293209"/>
+          </a:xfrm>
+          <a:prstGeom prst="rect">
+            <a:avLst/>
+          </a:prstGeom>
+          <a:noFill/>
+        </p:spPr>
+        <p:txBody>
+          <a:bodyPr wrap="square" rtlCol="0">
+            <a:spAutoFit/>
+          </a:bodyPr>
+          <a:lstStyle/>
+          <a:p>
+            <a:pPr marL="285750" indent="-285750">
+              <a:buFont typeface="Arial" panose="020B0604020202020204" pitchFamily="34" charset="0"/>
+              <a:buChar char="•"/>
+            </a:pPr>
+            <a:r>
+              <a:rPr lang="pt-BR" sz="1600" b="1" dirty="0">
+                <a:latin typeface="Verdana" panose="020B0604030504040204" pitchFamily="34" charset="0"/>
+                <a:ea typeface="Verdana" panose="020B0604030504040204" pitchFamily="34" charset="0"/>
+                <a:cs typeface="Verdana" panose="020B0604030504040204" pitchFamily="34" charset="0"/>
+              </a:rPr>
+              <a:t>SOM: </a:t>
+            </a:r>
+            <a:r>
+              <a:rPr lang="pt-BR" sz="1600" dirty="0">
+                <a:latin typeface="Verdana" panose="020B0604030504040204" pitchFamily="34" charset="0"/>
+                <a:ea typeface="Verdana" panose="020B0604030504040204" pitchFamily="34" charset="0"/>
+                <a:cs typeface="Verdana" panose="020B0604030504040204" pitchFamily="34" charset="0"/>
+              </a:rPr>
+              <a:t>Matrizes que contém número randômicos de 0 a 9, gerados por uma distribuição uniforme de inteiros.</a:t>
+            </a:r>
+          </a:p>
+          <a:p>
+            <a:pPr marL="285750" indent="-285750">
+              <a:buFont typeface="Arial" panose="020B0604020202020204" pitchFamily="34" charset="0"/>
+              <a:buChar char="•"/>
+            </a:pPr>
+            <a:endParaRPr lang="pt-BR" sz="1600" b="1" dirty="0">
+              <a:latin typeface="Verdana" panose="020B0604030504040204" pitchFamily="34" charset="0"/>
+              <a:ea typeface="Verdana" panose="020B0604030504040204" pitchFamily="34" charset="0"/>
+              <a:cs typeface="Verdana" panose="020B0604030504040204" pitchFamily="34" charset="0"/>
+            </a:endParaRPr>
+          </a:p>
+          <a:p>
+            <a:pPr marL="285750" indent="-285750">
+              <a:buFont typeface="Arial" panose="020B0604020202020204" pitchFamily="34" charset="0"/>
+              <a:buChar char="•"/>
+            </a:pPr>
+            <a:endParaRPr lang="pt-BR" sz="1600" dirty="0">
+              <a:latin typeface="Verdana" panose="020B0604030504040204" pitchFamily="34" charset="0"/>
+              <a:ea typeface="Verdana" panose="020B0604030504040204" pitchFamily="34" charset="0"/>
+              <a:cs typeface="Verdana" panose="020B0604030504040204" pitchFamily="34" charset="0"/>
+            </a:endParaRPr>
+          </a:p>
+          <a:p>
+            <a:pPr marL="285750" indent="-285750">
+              <a:buFont typeface="Arial" panose="020B0604020202020204" pitchFamily="34" charset="0"/>
+              <a:buChar char="•"/>
+            </a:pPr>
+            <a:r>
+              <a:rPr lang="pt-BR" sz="1600" b="1" dirty="0">
+                <a:latin typeface="Verdana" panose="020B0604030504040204" pitchFamily="34" charset="0"/>
+                <a:ea typeface="Verdana" panose="020B0604030504040204" pitchFamily="34" charset="0"/>
+                <a:cs typeface="Verdana" panose="020B0604030504040204" pitchFamily="34" charset="0"/>
+              </a:rPr>
+              <a:t>GDK:</a:t>
+            </a:r>
+            <a:r>
+              <a:rPr lang="pt-BR" sz="1600" dirty="0">
+                <a:latin typeface="Verdana" panose="020B0604030504040204" pitchFamily="34" charset="0"/>
+                <a:ea typeface="Verdana" panose="020B0604030504040204" pitchFamily="34" charset="0"/>
+                <a:cs typeface="Verdana" panose="020B0604030504040204" pitchFamily="34" charset="0"/>
+              </a:rPr>
+              <a:t> Matrizes onde os valores são calculados pela distância Euclidiana de pontos gerados randomicamente.</a:t>
+            </a:r>
+          </a:p>
+          <a:p>
+            <a:r>
+              <a:rPr lang="pt-BR" sz="1600" dirty="0">
+                <a:latin typeface="Verdana" panose="020B0604030504040204" pitchFamily="34" charset="0"/>
+                <a:ea typeface="Verdana" panose="020B0604030504040204" pitchFamily="34" charset="0"/>
+                <a:cs typeface="Verdana" panose="020B0604030504040204" pitchFamily="34" charset="0"/>
+              </a:rPr>
+              <a:t> </a:t>
+            </a:r>
+          </a:p>
+          <a:p>
+            <a:endParaRPr lang="pt-BR" sz="1600" dirty="0">
+              <a:latin typeface="Verdana" panose="020B0604030504040204" pitchFamily="34" charset="0"/>
+              <a:ea typeface="Verdana" panose="020B0604030504040204" pitchFamily="34" charset="0"/>
+              <a:cs typeface="Verdana" panose="020B0604030504040204" pitchFamily="34" charset="0"/>
+            </a:endParaRPr>
+          </a:p>
+          <a:p>
+            <a:pPr marL="285750" indent="-285750">
+              <a:buFont typeface="Arial" panose="020B0604020202020204" pitchFamily="34" charset="0"/>
+              <a:buChar char="•"/>
+            </a:pPr>
+            <a:r>
+              <a:rPr lang="pt-BR" sz="1600" b="1" dirty="0">
+                <a:latin typeface="Verdana" panose="020B0604030504040204" pitchFamily="34" charset="0"/>
+                <a:ea typeface="Verdana" panose="020B0604030504040204" pitchFamily="34" charset="0"/>
+                <a:cs typeface="Verdana" panose="020B0604030504040204" pitchFamily="34" charset="0"/>
+              </a:rPr>
+              <a:t>MDG: </a:t>
+            </a:r>
+            <a:r>
+              <a:rPr lang="pt-BR" sz="1600" dirty="0">
+                <a:latin typeface="Verdana" panose="020B0604030504040204" pitchFamily="34" charset="0"/>
+                <a:ea typeface="Verdana" panose="020B0604030504040204" pitchFamily="34" charset="0"/>
+                <a:cs typeface="Verdana" panose="020B0604030504040204" pitchFamily="34" charset="0"/>
+              </a:rPr>
+              <a:t>Matrizes que contém números reais randomicamente selecionados entre 0 e 10, através de uma distribuição uniforme.</a:t>
+            </a:r>
+          </a:p>
+        </p:txBody>
+      </p:sp>
+      <p:pic>
+        <p:nvPicPr>
+          <p:cNvPr id="7" name="Imagem 6"/>
+          <p:cNvPicPr>
+            <a:picLocks noChangeAspect="1"/>
+          </p:cNvPicPr>
+          <p:nvPr/>
+        </p:nvPicPr>
+        <p:blipFill>
+          <a:blip r:embed="rId2" cstate="print">
+            <a:extLst>
+              <a:ext uri="{28A0092B-C50C-407E-A947-70E740481C1C}">
+                <a14:useLocalDpi xmlns:a14="http://schemas.microsoft.com/office/drawing/2010/main" val="0"/>
+              </a:ext>
+            </a:extLst>
+          </a:blip>
+          <a:stretch>
+            <a:fillRect/>
+          </a:stretch>
+        </p:blipFill>
+        <p:spPr>
+          <a:xfrm>
+            <a:off x="287015" y="6381328"/>
+            <a:ext cx="1672379" cy="291764"/>
+          </a:xfrm>
+          <a:prstGeom prst="rect">
+            <a:avLst/>
+          </a:prstGeom>
+        </p:spPr>
+      </p:pic>
+      <p:sp>
+        <p:nvSpPr>
+          <p:cNvPr id="9" name="CaixaDeTexto 8"/>
+          <p:cNvSpPr txBox="1"/>
+          <p:nvPr/>
+        </p:nvSpPr>
+        <p:spPr>
+          <a:xfrm>
+            <a:off x="393549" y="333523"/>
+            <a:ext cx="6192688" cy="646331"/>
+          </a:xfrm>
+          <a:prstGeom prst="rect">
+            <a:avLst/>
+          </a:prstGeom>
+          <a:noFill/>
+        </p:spPr>
+        <p:txBody>
+          <a:bodyPr wrap="square" rtlCol="0">
+            <a:spAutoFit/>
+          </a:bodyPr>
+          <a:lstStyle/>
+          <a:p>
+            <a:r>
+              <a:rPr lang="en-US" sz="3600" b="1" dirty="0">
+                <a:latin typeface="Verdana" panose="020B0604030504040204" pitchFamily="34" charset="0"/>
+                <a:ea typeface="Verdana" panose="020B0604030504040204" pitchFamily="34" charset="0"/>
+                <a:cs typeface="Verdana" panose="020B0604030504040204" pitchFamily="34" charset="0"/>
+              </a:rPr>
+              <a:t>I</a:t>
+            </a:r>
+            <a:r>
+              <a:rPr lang="pt-BR" sz="3600" b="1" dirty="0" err="1">
+                <a:latin typeface="Verdana" panose="020B0604030504040204" pitchFamily="34" charset="0"/>
+                <a:ea typeface="Verdana" panose="020B0604030504040204" pitchFamily="34" charset="0"/>
+                <a:cs typeface="Verdana" panose="020B0604030504040204" pitchFamily="34" charset="0"/>
+              </a:rPr>
+              <a:t>nstâncias</a:t>
+            </a:r>
+            <a:endParaRPr lang="pt-BR" sz="3600" b="1" dirty="0">
+              <a:latin typeface="Verdana" panose="020B0604030504040204" pitchFamily="34" charset="0"/>
+              <a:ea typeface="Verdana" panose="020B0604030504040204" pitchFamily="34" charset="0"/>
+              <a:cs typeface="Verdana" panose="020B0604030504040204" pitchFamily="34" charset="0"/>
+            </a:endParaRPr>
+          </a:p>
+        </p:txBody>
+      </p:sp>
+      <p:sp>
+        <p:nvSpPr>
+          <p:cNvPr id="11" name="Retângulo 10"/>
+          <p:cNvSpPr/>
+          <p:nvPr/>
+        </p:nvSpPr>
+        <p:spPr>
+          <a:xfrm flipV="1">
+            <a:off x="-36512" y="476670"/>
+            <a:ext cx="323528" cy="360039"/>
+          </a:xfrm>
+          <a:prstGeom prst="rect">
+            <a:avLst/>
+          </a:prstGeom>
+          <a:solidFill>
+            <a:srgbClr val="149B55"/>
+          </a:solidFill>
+          <a:ln>
+            <a:noFill/>
+          </a:ln>
+        </p:spPr>
+        <p:style>
+          <a:lnRef idx="2">
+            <a:schemeClr val="accent1">
+              <a:shade val="50000"/>
+            </a:schemeClr>
+          </a:lnRef>
+          <a:fillRef idx="1">
+            <a:schemeClr val="accent1"/>
+          </a:fillRef>
+          <a:effectRef idx="0">
+            <a:schemeClr val="accent1"/>
+          </a:effectRef>
+          <a:fontRef idx="minor">
+            <a:schemeClr val="lt1"/>
+          </a:fontRef>
+        </p:style>
+        <p:txBody>
+          <a:bodyPr rtlCol="0" anchor="ctr"/>
+          <a:lstStyle/>
+          <a:p>
+            <a:pPr algn="ctr"/>
+            <a:endParaRPr lang="pt-BR" dirty="0"/>
+          </a:p>
+        </p:txBody>
+      </p:sp>
+    </p:spTree>
+    <p:extLst>
+      <p:ext uri="{BB962C8B-B14F-4D97-AF65-F5344CB8AC3E}">
+        <p14:creationId xmlns:p14="http://schemas.microsoft.com/office/powerpoint/2010/main" val="149408932"/>
+      </p:ext>
+    </p:extLst>
+  </p:cSld>
+  <p:clrMapOvr>
+    <a:masterClrMapping/>
+  </p:clrMapOvr>
+</p:sld>
+</file>
+
+<file path=ppt/slides/slide7.xml><?xml version="1.0" encoding="utf-8"?>
+<p:sld xmlns:a="http://schemas.openxmlformats.org/drawingml/2006/main" xmlns:r="http://schemas.openxmlformats.org/officeDocument/2006/relationships" xmlns:p="http://schemas.openxmlformats.org/presentationml/2006/main">
+  <p:cSld>
+    <p:spTree>
+      <p:nvGrpSpPr>
+        <p:cNvPr id="1" name=""/>
+        <p:cNvGrpSpPr/>
+        <p:nvPr/>
+      </p:nvGrpSpPr>
+      <p:grpSpPr>
+        <a:xfrm>
+          <a:off x="0" y="0"/>
+          <a:ext cx="0" cy="0"/>
+          <a:chOff x="0" y="0"/>
+          <a:chExt cx="0" cy="0"/>
+        </a:xfrm>
+      </p:grpSpPr>
+      <p:sp>
+        <p:nvSpPr>
+          <p:cNvPr id="8" name="CaixaDeTexto 7"/>
+          <p:cNvSpPr txBox="1"/>
+          <p:nvPr/>
+        </p:nvSpPr>
+        <p:spPr>
+          <a:xfrm>
+            <a:off x="971600" y="1700808"/>
+            <a:ext cx="5688632" cy="2308324"/>
+          </a:xfrm>
+          <a:prstGeom prst="rect">
+            <a:avLst/>
+          </a:prstGeom>
+          <a:noFill/>
+        </p:spPr>
+        <p:txBody>
+          <a:bodyPr wrap="square" rtlCol="0">
+            <a:spAutoFit/>
+          </a:bodyPr>
+          <a:lstStyle/>
+          <a:p>
+            <a:pPr marL="285750" indent="-285750">
+              <a:buFont typeface="Arial" panose="020B0604020202020204" pitchFamily="34" charset="0"/>
+              <a:buChar char="•"/>
+            </a:pPr>
+            <a:r>
+              <a:rPr lang="pt-BR" sz="1600" b="1" dirty="0">
+                <a:latin typeface="Verdana" panose="020B0604030504040204" pitchFamily="34" charset="0"/>
+                <a:ea typeface="Verdana" panose="020B0604030504040204" pitchFamily="34" charset="0"/>
+                <a:cs typeface="Verdana" panose="020B0604030504040204" pitchFamily="34" charset="0"/>
+              </a:rPr>
+              <a:t>Construção: </a:t>
+            </a:r>
+            <a:r>
+              <a:rPr lang="pt-BR" sz="1600" dirty="0">
+                <a:latin typeface="Verdana" panose="020B0604030504040204" pitchFamily="34" charset="0"/>
+                <a:ea typeface="Verdana" panose="020B0604030504040204" pitchFamily="34" charset="0"/>
+                <a:cs typeface="Verdana" panose="020B0604030504040204" pitchFamily="34" charset="0"/>
+              </a:rPr>
+              <a:t>Solução ao acaso, selecionando ou removendo elementos iterativamente.</a:t>
+            </a:r>
+          </a:p>
+          <a:p>
+            <a:endParaRPr lang="en-US" sz="1600" b="1" dirty="0">
+              <a:latin typeface="Verdana" panose="020B0604030504040204" pitchFamily="34" charset="0"/>
+              <a:ea typeface="Verdana" panose="020B0604030504040204" pitchFamily="34" charset="0"/>
+              <a:cs typeface="Verdana" panose="020B0604030504040204" pitchFamily="34" charset="0"/>
+            </a:endParaRPr>
+          </a:p>
+          <a:p>
+            <a:endParaRPr lang="pt-BR" sz="1600" b="1" dirty="0">
+              <a:latin typeface="Verdana" panose="020B0604030504040204" pitchFamily="34" charset="0"/>
+              <a:ea typeface="Verdana" panose="020B0604030504040204" pitchFamily="34" charset="0"/>
+              <a:cs typeface="Verdana" panose="020B0604030504040204" pitchFamily="34" charset="0"/>
+            </a:endParaRPr>
+          </a:p>
+          <a:p>
+            <a:pPr marL="285750" indent="-285750">
+              <a:buFont typeface="Arial" panose="020B0604020202020204" pitchFamily="34" charset="0"/>
+              <a:buChar char="•"/>
+            </a:pPr>
+            <a:r>
+              <a:rPr lang="pt-BR" sz="1600" b="1" dirty="0">
+                <a:latin typeface="Verdana" panose="020B0604030504040204" pitchFamily="34" charset="0"/>
+                <a:ea typeface="Verdana" panose="020B0604030504040204" pitchFamily="34" charset="0"/>
+                <a:cs typeface="Verdana" panose="020B0604030504040204" pitchFamily="34" charset="0"/>
+              </a:rPr>
+              <a:t>Melhoria:</a:t>
+            </a:r>
+            <a:r>
+              <a:rPr lang="pt-BR" sz="1600" dirty="0">
+                <a:latin typeface="Verdana" panose="020B0604030504040204" pitchFamily="34" charset="0"/>
+                <a:ea typeface="Verdana" panose="020B0604030504040204" pitchFamily="34" charset="0"/>
+                <a:cs typeface="Verdana" panose="020B0604030504040204" pitchFamily="34" charset="0"/>
+              </a:rPr>
+              <a:t> Iniciam por uma heurística de construção e iterativamente escolhem, usualmente, um elemento que incremente a solução.</a:t>
+            </a:r>
+          </a:p>
+          <a:p>
+            <a:r>
+              <a:rPr lang="pt-BR" sz="1600" dirty="0">
+                <a:latin typeface="Verdana" panose="020B0604030504040204" pitchFamily="34" charset="0"/>
+                <a:ea typeface="Verdana" panose="020B0604030504040204" pitchFamily="34" charset="0"/>
+                <a:cs typeface="Verdana" panose="020B0604030504040204" pitchFamily="34" charset="0"/>
+              </a:rPr>
+              <a:t> </a:t>
+            </a:r>
+          </a:p>
+        </p:txBody>
+      </p:sp>
+      <p:pic>
+        <p:nvPicPr>
+          <p:cNvPr id="7" name="Imagem 6"/>
+          <p:cNvPicPr>
+            <a:picLocks noChangeAspect="1"/>
+          </p:cNvPicPr>
+          <p:nvPr/>
+        </p:nvPicPr>
+        <p:blipFill>
+          <a:blip r:embed="rId2" cstate="print">
+            <a:extLst>
+              <a:ext uri="{28A0092B-C50C-407E-A947-70E740481C1C}">
+                <a14:useLocalDpi xmlns:a14="http://schemas.microsoft.com/office/drawing/2010/main" val="0"/>
+              </a:ext>
+            </a:extLst>
+          </a:blip>
+          <a:stretch>
+            <a:fillRect/>
+          </a:stretch>
+        </p:blipFill>
+        <p:spPr>
+          <a:xfrm>
+            <a:off x="287015" y="6381328"/>
+            <a:ext cx="1672379" cy="291764"/>
+          </a:xfrm>
+          <a:prstGeom prst="rect">
+            <a:avLst/>
+          </a:prstGeom>
+        </p:spPr>
+      </p:pic>
+      <p:sp>
+        <p:nvSpPr>
+          <p:cNvPr id="9" name="CaixaDeTexto 8"/>
+          <p:cNvSpPr txBox="1"/>
+          <p:nvPr/>
+        </p:nvSpPr>
+        <p:spPr>
+          <a:xfrm>
+            <a:off x="393548" y="333523"/>
+            <a:ext cx="8066884" cy="646331"/>
+          </a:xfrm>
+          <a:prstGeom prst="rect">
+            <a:avLst/>
+          </a:prstGeom>
+          <a:noFill/>
+        </p:spPr>
+        <p:txBody>
+          <a:bodyPr wrap="square" rtlCol="0">
+            <a:spAutoFit/>
+          </a:bodyPr>
+          <a:lstStyle/>
+          <a:p>
+            <a:r>
+              <a:rPr lang="en-US" sz="3600" b="1" dirty="0" err="1">
+                <a:latin typeface="Verdana" panose="020B0604030504040204" pitchFamily="34" charset="0"/>
+                <a:ea typeface="Verdana" panose="020B0604030504040204" pitchFamily="34" charset="0"/>
+                <a:cs typeface="Verdana" panose="020B0604030504040204" pitchFamily="34" charset="0"/>
+              </a:rPr>
+              <a:t>Heurísticas</a:t>
+            </a:r>
+            <a:endParaRPr lang="pt-BR" sz="3600" b="1" dirty="0">
+              <a:latin typeface="Verdana" panose="020B0604030504040204" pitchFamily="34" charset="0"/>
+              <a:ea typeface="Verdana" panose="020B0604030504040204" pitchFamily="34" charset="0"/>
+              <a:cs typeface="Verdana" panose="020B0604030504040204" pitchFamily="34" charset="0"/>
+            </a:endParaRPr>
+          </a:p>
+        </p:txBody>
+      </p:sp>
+      <p:sp>
+        <p:nvSpPr>
+          <p:cNvPr id="11" name="Retângulo 10"/>
+          <p:cNvSpPr/>
+          <p:nvPr/>
+        </p:nvSpPr>
+        <p:spPr>
+          <a:xfrm flipV="1">
+            <a:off x="-36512" y="476670"/>
+            <a:ext cx="323528" cy="360039"/>
+          </a:xfrm>
+          <a:prstGeom prst="rect">
+            <a:avLst/>
+          </a:prstGeom>
+          <a:solidFill>
+            <a:srgbClr val="149B55"/>
+          </a:solidFill>
+          <a:ln>
+            <a:noFill/>
+          </a:ln>
+        </p:spPr>
+        <p:style>
+          <a:lnRef idx="2">
+            <a:schemeClr val="accent1">
+              <a:shade val="50000"/>
+            </a:schemeClr>
+          </a:lnRef>
+          <a:fillRef idx="1">
+            <a:schemeClr val="accent1"/>
+          </a:fillRef>
+          <a:effectRef idx="0">
+            <a:schemeClr val="accent1"/>
+          </a:effectRef>
+          <a:fontRef idx="minor">
+            <a:schemeClr val="lt1"/>
+          </a:fontRef>
+        </p:style>
+        <p:txBody>
+          <a:bodyPr rtlCol="0" anchor="ctr"/>
+          <a:lstStyle/>
+          <a:p>
+            <a:pPr algn="ctr"/>
+            <a:endParaRPr lang="pt-BR" dirty="0"/>
+          </a:p>
+        </p:txBody>
+      </p:sp>
+    </p:spTree>
+    <p:extLst>
+      <p:ext uri="{BB962C8B-B14F-4D97-AF65-F5344CB8AC3E}">
+        <p14:creationId xmlns:p14="http://schemas.microsoft.com/office/powerpoint/2010/main" val="3232817111"/>
+      </p:ext>
+    </p:extLst>
+  </p:cSld>
+  <p:clrMapOvr>
+    <a:masterClrMapping/>
+  </p:clrMapOvr>
+</p:sld>
+</file>
+
+<file path=ppt/slides/slide8.xml><?xml version="1.0" encoding="utf-8"?>
+<p:sld xmlns:a="http://schemas.openxmlformats.org/drawingml/2006/main" xmlns:r="http://schemas.openxmlformats.org/officeDocument/2006/relationships" xmlns:p="http://schemas.openxmlformats.org/presentationml/2006/main">
+  <p:cSld>
+    <p:spTree>
+      <p:nvGrpSpPr>
+        <p:cNvPr id="1" name=""/>
+        <p:cNvGrpSpPr/>
+        <p:nvPr/>
+      </p:nvGrpSpPr>
+      <p:grpSpPr>
+        <a:xfrm>
+          <a:off x="0" y="0"/>
+          <a:ext cx="0" cy="0"/>
+          <a:chOff x="0" y="0"/>
+          <a:chExt cx="0" cy="0"/>
+        </a:xfrm>
+      </p:grpSpPr>
+      <p:sp>
+        <p:nvSpPr>
+          <p:cNvPr id="8" name="CaixaDeTexto 7"/>
+          <p:cNvSpPr txBox="1"/>
+          <p:nvPr/>
+        </p:nvSpPr>
+        <p:spPr>
+          <a:xfrm>
+            <a:off x="971600" y="1700808"/>
+            <a:ext cx="5688632" cy="1569660"/>
+          </a:xfrm>
+          <a:prstGeom prst="rect">
+            <a:avLst/>
+          </a:prstGeom>
+          <a:noFill/>
+        </p:spPr>
+        <p:txBody>
+          <a:bodyPr wrap="square" rtlCol="0">
+            <a:spAutoFit/>
+          </a:bodyPr>
+          <a:lstStyle/>
+          <a:p>
+            <a:pPr marL="285750" indent="-285750">
+              <a:buFont typeface="Arial" panose="020B0604020202020204" pitchFamily="34" charset="0"/>
+              <a:buChar char="•"/>
+            </a:pPr>
+            <a:r>
+              <a:rPr lang="pt-BR" sz="1600" b="1" dirty="0">
+                <a:latin typeface="Verdana" panose="020B0604030504040204" pitchFamily="34" charset="0"/>
+                <a:ea typeface="Verdana" panose="020B0604030504040204" pitchFamily="34" charset="0"/>
+                <a:cs typeface="Verdana" panose="020B0604030504040204" pitchFamily="34" charset="0"/>
+              </a:rPr>
+              <a:t>Objetivo: </a:t>
+            </a:r>
+            <a:r>
+              <a:rPr lang="pt-BR" sz="1600" dirty="0">
+                <a:latin typeface="Verdana" panose="020B0604030504040204" pitchFamily="34" charset="0"/>
+                <a:ea typeface="Verdana" panose="020B0604030504040204" pitchFamily="34" charset="0"/>
+                <a:cs typeface="Verdana" panose="020B0604030504040204" pitchFamily="34" charset="0"/>
+              </a:rPr>
+              <a:t>obter resultados melhores que as heurísticas tradicionais.</a:t>
+            </a:r>
+          </a:p>
+          <a:p>
+            <a:pPr marL="285750" indent="-285750">
+              <a:buFont typeface="Arial" panose="020B0604020202020204" pitchFamily="34" charset="0"/>
+              <a:buChar char="•"/>
+            </a:pPr>
+            <a:endParaRPr lang="pt-BR" sz="1600" dirty="0">
+              <a:latin typeface="Verdana" panose="020B0604030504040204" pitchFamily="34" charset="0"/>
+              <a:ea typeface="Verdana" panose="020B0604030504040204" pitchFamily="34" charset="0"/>
+              <a:cs typeface="Verdana" panose="020B0604030504040204" pitchFamily="34" charset="0"/>
+            </a:endParaRPr>
+          </a:p>
+          <a:p>
+            <a:pPr marL="285750" indent="-285750">
+              <a:buFont typeface="Arial" panose="020B0604020202020204" pitchFamily="34" charset="0"/>
+              <a:buChar char="•"/>
+            </a:pPr>
+            <a:endParaRPr lang="pt-BR" sz="1600" dirty="0">
+              <a:latin typeface="Verdana" panose="020B0604030504040204" pitchFamily="34" charset="0"/>
+              <a:ea typeface="Verdana" panose="020B0604030504040204" pitchFamily="34" charset="0"/>
+              <a:cs typeface="Verdana" panose="020B0604030504040204" pitchFamily="34" charset="0"/>
+            </a:endParaRPr>
+          </a:p>
+          <a:p>
+            <a:pPr marL="285750" indent="-285750">
+              <a:buFont typeface="Arial" panose="020B0604020202020204" pitchFamily="34" charset="0"/>
+              <a:buChar char="•"/>
+            </a:pPr>
+            <a:r>
+              <a:rPr lang="pt-BR" sz="1600" b="1" dirty="0">
+                <a:latin typeface="Verdana" panose="020B0604030504040204" pitchFamily="34" charset="0"/>
+                <a:ea typeface="Verdana" panose="020B0604030504040204" pitchFamily="34" charset="0"/>
+                <a:cs typeface="Verdana" panose="020B0604030504040204" pitchFamily="34" charset="0"/>
+              </a:rPr>
+              <a:t>Enfrentando problema de otimização: </a:t>
+            </a:r>
+            <a:r>
+              <a:rPr lang="pt-BR" sz="1600" dirty="0">
+                <a:latin typeface="Verdana" panose="020B0604030504040204" pitchFamily="34" charset="0"/>
+                <a:ea typeface="Verdana" panose="020B0604030504040204" pitchFamily="34" charset="0"/>
+                <a:cs typeface="Verdana" panose="020B0604030504040204" pitchFamily="34" charset="0"/>
+              </a:rPr>
+              <a:t>soluções aproximadas.	 </a:t>
+            </a:r>
+          </a:p>
+        </p:txBody>
+      </p:sp>
+      <p:pic>
+        <p:nvPicPr>
+          <p:cNvPr id="7" name="Imagem 6"/>
+          <p:cNvPicPr>
+            <a:picLocks noChangeAspect="1"/>
+          </p:cNvPicPr>
+          <p:nvPr/>
+        </p:nvPicPr>
+        <p:blipFill>
+          <a:blip r:embed="rId2" cstate="print">
+            <a:extLst>
+              <a:ext uri="{28A0092B-C50C-407E-A947-70E740481C1C}">
+                <a14:useLocalDpi xmlns:a14="http://schemas.microsoft.com/office/drawing/2010/main" val="0"/>
+              </a:ext>
+            </a:extLst>
+          </a:blip>
+          <a:stretch>
+            <a:fillRect/>
+          </a:stretch>
+        </p:blipFill>
+        <p:spPr>
+          <a:xfrm>
+            <a:off x="287015" y="6381328"/>
+            <a:ext cx="1672379" cy="291764"/>
+          </a:xfrm>
+          <a:prstGeom prst="rect">
+            <a:avLst/>
+          </a:prstGeom>
+        </p:spPr>
+      </p:pic>
+      <p:sp>
+        <p:nvSpPr>
+          <p:cNvPr id="9" name="CaixaDeTexto 8"/>
+          <p:cNvSpPr txBox="1"/>
+          <p:nvPr/>
+        </p:nvSpPr>
+        <p:spPr>
+          <a:xfrm>
+            <a:off x="393548" y="333523"/>
+            <a:ext cx="8066884" cy="646331"/>
+          </a:xfrm>
+          <a:prstGeom prst="rect">
+            <a:avLst/>
+          </a:prstGeom>
+          <a:noFill/>
+        </p:spPr>
+        <p:txBody>
+          <a:bodyPr wrap="square" rtlCol="0">
+            <a:spAutoFit/>
+          </a:bodyPr>
+          <a:lstStyle/>
+          <a:p>
+            <a:r>
+              <a:rPr lang="en-US" sz="3600" b="1" dirty="0" err="1">
+                <a:latin typeface="Verdana" panose="020B0604030504040204" pitchFamily="34" charset="0"/>
+                <a:ea typeface="Verdana" panose="020B0604030504040204" pitchFamily="34" charset="0"/>
+                <a:cs typeface="Verdana" panose="020B0604030504040204" pitchFamily="34" charset="0"/>
+              </a:rPr>
+              <a:t>Metaheurísticas</a:t>
+            </a:r>
+            <a:endParaRPr lang="pt-BR" sz="3600" b="1" dirty="0">
+              <a:latin typeface="Verdana" panose="020B0604030504040204" pitchFamily="34" charset="0"/>
+              <a:ea typeface="Verdana" panose="020B0604030504040204" pitchFamily="34" charset="0"/>
+              <a:cs typeface="Verdana" panose="020B0604030504040204" pitchFamily="34" charset="0"/>
+            </a:endParaRPr>
+          </a:p>
+        </p:txBody>
+      </p:sp>
+      <p:sp>
+        <p:nvSpPr>
+          <p:cNvPr id="11" name="Retângulo 10"/>
+          <p:cNvSpPr/>
+          <p:nvPr/>
+        </p:nvSpPr>
+        <p:spPr>
+          <a:xfrm flipV="1">
+            <a:off x="-36512" y="476670"/>
+            <a:ext cx="323528" cy="360039"/>
+          </a:xfrm>
+          <a:prstGeom prst="rect">
+            <a:avLst/>
+          </a:prstGeom>
+          <a:solidFill>
+            <a:srgbClr val="149B55"/>
+          </a:solidFill>
+          <a:ln>
+            <a:noFill/>
+          </a:ln>
+        </p:spPr>
+        <p:style>
+          <a:lnRef idx="2">
+            <a:schemeClr val="accent1">
+              <a:shade val="50000"/>
+            </a:schemeClr>
+          </a:lnRef>
+          <a:fillRef idx="1">
+            <a:schemeClr val="accent1"/>
+          </a:fillRef>
+          <a:effectRef idx="0">
+            <a:schemeClr val="accent1"/>
+          </a:effectRef>
+          <a:fontRef idx="minor">
+            <a:schemeClr val="lt1"/>
+          </a:fontRef>
+        </p:style>
+        <p:txBody>
+          <a:bodyPr rtlCol="0" anchor="ctr"/>
+          <a:lstStyle/>
+          <a:p>
+            <a:pPr algn="ctr"/>
+            <a:endParaRPr lang="pt-BR" dirty="0"/>
+          </a:p>
+        </p:txBody>
+      </p:sp>
+    </p:spTree>
+    <p:extLst>
+      <p:ext uri="{BB962C8B-B14F-4D97-AF65-F5344CB8AC3E}">
+        <p14:creationId xmlns:p14="http://schemas.microsoft.com/office/powerpoint/2010/main" val="842391489"/>
+      </p:ext>
+    </p:extLst>
+  </p:cSld>
+  <p:clrMapOvr>
+    <a:masterClrMapping/>
+  </p:clrMapOvr>
+</p:sld>
+</file>
+
+<file path=ppt/slides/slide9.xml><?xml version="1.0" encoding="utf-8"?>
+<p:sld xmlns:a="http://schemas.openxmlformats.org/drawingml/2006/main" xmlns:r="http://schemas.openxmlformats.org/officeDocument/2006/relationships" xmlns:p="http://schemas.openxmlformats.org/presentationml/2006/main">
+  <p:cSld>
+    <p:spTree>
+      <p:nvGrpSpPr>
+        <p:cNvPr id="1" name=""/>
+        <p:cNvGrpSpPr/>
+        <p:nvPr/>
+      </p:nvGrpSpPr>
+      <p:grpSpPr>
+        <a:xfrm>
+          <a:off x="0" y="0"/>
+          <a:ext cx="0" cy="0"/>
+          <a:chOff x="0" y="0"/>
+          <a:chExt cx="0" cy="0"/>
+        </a:xfrm>
+      </p:grpSpPr>
+      <p:sp>
+        <p:nvSpPr>
+          <p:cNvPr id="8" name="CaixaDeTexto 7"/>
+          <p:cNvSpPr txBox="1"/>
+          <p:nvPr/>
+        </p:nvSpPr>
+        <p:spPr>
+          <a:xfrm>
+            <a:off x="971600" y="1700808"/>
+            <a:ext cx="5688632" cy="3785652"/>
+          </a:xfrm>
+          <a:prstGeom prst="rect">
+            <a:avLst/>
+          </a:prstGeom>
+          <a:noFill/>
+        </p:spPr>
+        <p:txBody>
+          <a:bodyPr wrap="square" rtlCol="0">
+            <a:spAutoFit/>
+          </a:bodyPr>
+          <a:lstStyle/>
+          <a:p>
+            <a:pPr marL="285750" indent="-285750">
+              <a:buFont typeface="Arial" panose="020B0604020202020204" pitchFamily="34" charset="0"/>
+              <a:buChar char="•"/>
+            </a:pPr>
+            <a:r>
+              <a:rPr lang="en-US" sz="1600" b="1" dirty="0">
+                <a:latin typeface="Verdana" panose="020B0604030504040204" pitchFamily="34" charset="0"/>
+                <a:ea typeface="Verdana" panose="020B0604030504040204" pitchFamily="34" charset="0"/>
+                <a:cs typeface="Verdana" panose="020B0604030504040204" pitchFamily="34" charset="0"/>
+              </a:rPr>
+              <a:t>A</a:t>
+            </a:r>
+          </a:p>
+          <a:p>
+            <a:pPr marL="285750" indent="-285750">
+              <a:buFont typeface="Arial" panose="020B0604020202020204" pitchFamily="34" charset="0"/>
+              <a:buChar char="•"/>
+            </a:pPr>
+            <a:endParaRPr lang="en-US" sz="1600" b="1" dirty="0">
+              <a:latin typeface="Verdana" panose="020B0604030504040204" pitchFamily="34" charset="0"/>
+              <a:ea typeface="Verdana" panose="020B0604030504040204" pitchFamily="34" charset="0"/>
+              <a:cs typeface="Verdana" panose="020B0604030504040204" pitchFamily="34" charset="0"/>
+            </a:endParaRPr>
+          </a:p>
+          <a:p>
+            <a:pPr marL="285750" indent="-285750">
+              <a:buFont typeface="Arial" panose="020B0604020202020204" pitchFamily="34" charset="0"/>
+              <a:buChar char="•"/>
+            </a:pPr>
+            <a:r>
+              <a:rPr lang="en-US" sz="1600" b="1" dirty="0">
+                <a:latin typeface="Verdana" panose="020B0604030504040204" pitchFamily="34" charset="0"/>
+                <a:ea typeface="Verdana" panose="020B0604030504040204" pitchFamily="34" charset="0"/>
+                <a:cs typeface="Verdana" panose="020B0604030504040204" pitchFamily="34" charset="0"/>
+              </a:rPr>
+              <a:t>B</a:t>
+            </a:r>
+          </a:p>
+          <a:p>
+            <a:pPr marL="285750" indent="-285750">
+              <a:buFont typeface="Arial" panose="020B0604020202020204" pitchFamily="34" charset="0"/>
+              <a:buChar char="•"/>
+            </a:pPr>
+            <a:endParaRPr lang="en-US" sz="1600" b="1" dirty="0">
+              <a:latin typeface="Verdana" panose="020B0604030504040204" pitchFamily="34" charset="0"/>
+              <a:ea typeface="Verdana" panose="020B0604030504040204" pitchFamily="34" charset="0"/>
+              <a:cs typeface="Verdana" panose="020B0604030504040204" pitchFamily="34" charset="0"/>
+            </a:endParaRPr>
+          </a:p>
+          <a:p>
+            <a:pPr marL="285750" indent="-285750">
+              <a:buFont typeface="Arial" panose="020B0604020202020204" pitchFamily="34" charset="0"/>
+              <a:buChar char="•"/>
+            </a:pPr>
+            <a:r>
+              <a:rPr lang="en-US" sz="1600" b="1" dirty="0">
+                <a:latin typeface="Verdana" panose="020B0604030504040204" pitchFamily="34" charset="0"/>
+                <a:ea typeface="Verdana" panose="020B0604030504040204" pitchFamily="34" charset="0"/>
+                <a:cs typeface="Verdana" panose="020B0604030504040204" pitchFamily="34" charset="0"/>
+              </a:rPr>
+              <a:t>C</a:t>
+            </a:r>
+          </a:p>
+          <a:p>
+            <a:pPr marL="285750" indent="-285750">
+              <a:buFont typeface="Arial" panose="020B0604020202020204" pitchFamily="34" charset="0"/>
+              <a:buChar char="•"/>
+            </a:pPr>
+            <a:endParaRPr lang="en-US" sz="1600" b="1" dirty="0">
+              <a:latin typeface="Verdana" panose="020B0604030504040204" pitchFamily="34" charset="0"/>
+              <a:ea typeface="Verdana" panose="020B0604030504040204" pitchFamily="34" charset="0"/>
+              <a:cs typeface="Verdana" panose="020B0604030504040204" pitchFamily="34" charset="0"/>
+            </a:endParaRPr>
+          </a:p>
+          <a:p>
+            <a:pPr marL="285750" indent="-285750">
+              <a:buFont typeface="Arial" panose="020B0604020202020204" pitchFamily="34" charset="0"/>
+              <a:buChar char="•"/>
+            </a:pPr>
+            <a:r>
+              <a:rPr lang="en-US" sz="1600" b="1" dirty="0">
+                <a:latin typeface="Verdana" panose="020B0604030504040204" pitchFamily="34" charset="0"/>
+                <a:ea typeface="Verdana" panose="020B0604030504040204" pitchFamily="34" charset="0"/>
+                <a:cs typeface="Verdana" panose="020B0604030504040204" pitchFamily="34" charset="0"/>
+              </a:rPr>
+              <a:t>D</a:t>
+            </a:r>
+          </a:p>
+          <a:p>
+            <a:pPr marL="285750" indent="-285750">
+              <a:buFont typeface="Arial" panose="020B0604020202020204" pitchFamily="34" charset="0"/>
+              <a:buChar char="•"/>
+            </a:pPr>
+            <a:endParaRPr lang="en-US" sz="1600" b="1" dirty="0">
+              <a:latin typeface="Verdana" panose="020B0604030504040204" pitchFamily="34" charset="0"/>
+              <a:ea typeface="Verdana" panose="020B0604030504040204" pitchFamily="34" charset="0"/>
+              <a:cs typeface="Verdana" panose="020B0604030504040204" pitchFamily="34" charset="0"/>
+            </a:endParaRPr>
+          </a:p>
+          <a:p>
+            <a:pPr marL="285750" indent="-285750">
+              <a:buFont typeface="Arial" panose="020B0604020202020204" pitchFamily="34" charset="0"/>
+              <a:buChar char="•"/>
+            </a:pPr>
+            <a:r>
+              <a:rPr lang="en-US" sz="1600" b="1">
+                <a:latin typeface="Verdana" panose="020B0604030504040204" pitchFamily="34" charset="0"/>
+                <a:ea typeface="Verdana" panose="020B0604030504040204" pitchFamily="34" charset="0"/>
+                <a:cs typeface="Verdana" panose="020B0604030504040204" pitchFamily="34" charset="0"/>
+              </a:rPr>
+              <a:t>E</a:t>
+            </a:r>
+            <a:endParaRPr lang="en-US" sz="1600" dirty="0">
+              <a:latin typeface="Verdana" panose="020B0604030504040204" pitchFamily="34" charset="0"/>
+              <a:ea typeface="Verdana" panose="020B0604030504040204" pitchFamily="34" charset="0"/>
+              <a:cs typeface="Verdana" panose="020B0604030504040204" pitchFamily="34" charset="0"/>
+            </a:endParaRPr>
+          </a:p>
+          <a:p>
+            <a:pPr marL="285750" indent="-285750">
+              <a:buFont typeface="Arial" panose="020B0604020202020204" pitchFamily="34" charset="0"/>
+              <a:buChar char="•"/>
+            </a:pPr>
+            <a:endParaRPr lang="en-US" sz="1600" b="1" dirty="0">
+              <a:latin typeface="Verdana" panose="020B0604030504040204" pitchFamily="34" charset="0"/>
+              <a:ea typeface="Verdana" panose="020B0604030504040204" pitchFamily="34" charset="0"/>
+              <a:cs typeface="Verdana" panose="020B0604030504040204" pitchFamily="34" charset="0"/>
+            </a:endParaRPr>
+          </a:p>
+          <a:p>
+            <a:pPr marL="285750" indent="-285750">
+              <a:buFont typeface="Arial" panose="020B0604020202020204" pitchFamily="34" charset="0"/>
+              <a:buChar char="•"/>
+            </a:pPr>
+            <a:endParaRPr lang="en-US" sz="1600" b="1" dirty="0">
+              <a:latin typeface="Verdana" panose="020B0604030504040204" pitchFamily="34" charset="0"/>
+              <a:ea typeface="Verdana" panose="020B0604030504040204" pitchFamily="34" charset="0"/>
+              <a:cs typeface="Verdana" panose="020B0604030504040204" pitchFamily="34" charset="0"/>
+            </a:endParaRPr>
+          </a:p>
+          <a:p>
+            <a:pPr marL="285750" indent="-285750">
+              <a:buFont typeface="Arial" panose="020B0604020202020204" pitchFamily="34" charset="0"/>
+              <a:buChar char="•"/>
+            </a:pPr>
+            <a:endParaRPr lang="en-US" sz="1600" b="1" dirty="0">
+              <a:latin typeface="Verdana" panose="020B0604030504040204" pitchFamily="34" charset="0"/>
+              <a:ea typeface="Verdana" panose="020B0604030504040204" pitchFamily="34" charset="0"/>
+              <a:cs typeface="Verdana" panose="020B0604030504040204" pitchFamily="34" charset="0"/>
+            </a:endParaRPr>
+          </a:p>
+          <a:p>
+            <a:pPr marL="285750" indent="-285750">
+              <a:buFont typeface="Arial" panose="020B0604020202020204" pitchFamily="34" charset="0"/>
+              <a:buChar char="•"/>
+            </a:pPr>
+            <a:endParaRPr lang="en-US" sz="1600" b="1" dirty="0">
+              <a:latin typeface="Verdana" panose="020B0604030504040204" pitchFamily="34" charset="0"/>
+              <a:ea typeface="Verdana" panose="020B0604030504040204" pitchFamily="34" charset="0"/>
+              <a:cs typeface="Verdana" panose="020B0604030504040204" pitchFamily="34" charset="0"/>
+            </a:endParaRPr>
+          </a:p>
+          <a:p>
+            <a:pPr marL="285750" indent="-285750">
+              <a:buFont typeface="Arial" panose="020B0604020202020204" pitchFamily="34" charset="0"/>
+              <a:buChar char="•"/>
+            </a:pPr>
+            <a:endParaRPr lang="en-US" sz="1600" b="1" dirty="0">
+              <a:latin typeface="Verdana" panose="020B0604030504040204" pitchFamily="34" charset="0"/>
+              <a:ea typeface="Verdana" panose="020B0604030504040204" pitchFamily="34" charset="0"/>
+              <a:cs typeface="Verdana" panose="020B0604030504040204" pitchFamily="34" charset="0"/>
+            </a:endParaRPr>
+          </a:p>
+          <a:p>
+            <a:pPr marL="285750" indent="-285750">
+              <a:buFont typeface="Arial" panose="020B0604020202020204" pitchFamily="34" charset="0"/>
+              <a:buChar char="•"/>
+            </a:pPr>
+            <a:endParaRPr lang="pt-BR" sz="1600" b="1" dirty="0">
+              <a:latin typeface="Verdana" panose="020B0604030504040204" pitchFamily="34" charset="0"/>
+              <a:ea typeface="Verdana" panose="020B0604030504040204" pitchFamily="34" charset="0"/>
+              <a:cs typeface="Verdana" panose="020B0604030504040204" pitchFamily="34" charset="0"/>
+            </a:endParaRPr>
+          </a:p>
+        </p:txBody>
+      </p:sp>
+      <p:pic>
+        <p:nvPicPr>
+          <p:cNvPr id="7" name="Imagem 6"/>
+          <p:cNvPicPr>
+            <a:picLocks noChangeAspect="1"/>
+          </p:cNvPicPr>
+          <p:nvPr/>
+        </p:nvPicPr>
+        <p:blipFill>
+          <a:blip r:embed="rId2" cstate="print">
+            <a:extLst>
+              <a:ext uri="{28A0092B-C50C-407E-A947-70E740481C1C}">
+                <a14:useLocalDpi xmlns:a14="http://schemas.microsoft.com/office/drawing/2010/main" val="0"/>
+              </a:ext>
+            </a:extLst>
+          </a:blip>
+          <a:stretch>
+            <a:fillRect/>
+          </a:stretch>
+        </p:blipFill>
+        <p:spPr>
+          <a:xfrm>
+            <a:off x="287015" y="6381328"/>
+            <a:ext cx="1672379" cy="291764"/>
+          </a:xfrm>
+          <a:prstGeom prst="rect">
+            <a:avLst/>
+          </a:prstGeom>
+        </p:spPr>
+      </p:pic>
+      <p:sp>
+        <p:nvSpPr>
+          <p:cNvPr id="9" name="CaixaDeTexto 8"/>
+          <p:cNvSpPr txBox="1"/>
+          <p:nvPr/>
+        </p:nvSpPr>
+        <p:spPr>
+          <a:xfrm>
+            <a:off x="393549" y="333523"/>
+            <a:ext cx="6192688" cy="646331"/>
+          </a:xfrm>
+          <a:prstGeom prst="rect">
+            <a:avLst/>
+          </a:prstGeom>
+          <a:noFill/>
+        </p:spPr>
+        <p:txBody>
+          <a:bodyPr wrap="square" rtlCol="0">
+            <a:spAutoFit/>
+          </a:bodyPr>
+          <a:lstStyle/>
+          <a:p>
+            <a:r>
+              <a:rPr lang="en-US" sz="3600" b="1" dirty="0">
+                <a:latin typeface="Verdana" panose="020B0604030504040204" pitchFamily="34" charset="0"/>
+                <a:ea typeface="Verdana" panose="020B0604030504040204" pitchFamily="34" charset="0"/>
+                <a:cs typeface="Verdana" panose="020B0604030504040204" pitchFamily="34" charset="0"/>
+              </a:rPr>
+              <a:t>Estado da </a:t>
+            </a:r>
+            <a:r>
+              <a:rPr lang="en-US" sz="3600" b="1" dirty="0" err="1">
+                <a:latin typeface="Verdana" panose="020B0604030504040204" pitchFamily="34" charset="0"/>
+                <a:ea typeface="Verdana" panose="020B0604030504040204" pitchFamily="34" charset="0"/>
+                <a:cs typeface="Verdana" panose="020B0604030504040204" pitchFamily="34" charset="0"/>
+              </a:rPr>
+              <a:t>arte</a:t>
+            </a:r>
+            <a:endParaRPr lang="pt-BR" sz="3600" b="1" dirty="0">
+              <a:latin typeface="Verdana" panose="020B0604030504040204" pitchFamily="34" charset="0"/>
+              <a:ea typeface="Verdana" panose="020B0604030504040204" pitchFamily="34" charset="0"/>
+              <a:cs typeface="Verdana" panose="020B0604030504040204" pitchFamily="34" charset="0"/>
+            </a:endParaRPr>
+          </a:p>
+        </p:txBody>
+      </p:sp>
+      <p:sp>
+        <p:nvSpPr>
+          <p:cNvPr id="11" name="Retângulo 10"/>
+          <p:cNvSpPr/>
+          <p:nvPr/>
+        </p:nvSpPr>
+        <p:spPr>
+          <a:xfrm flipV="1">
+            <a:off x="-36512" y="476670"/>
+            <a:ext cx="323528" cy="360039"/>
+          </a:xfrm>
+          <a:prstGeom prst="rect">
+            <a:avLst/>
+          </a:prstGeom>
+          <a:solidFill>
+            <a:srgbClr val="149B55"/>
+          </a:solidFill>
+          <a:ln>
+            <a:noFill/>
+          </a:ln>
+        </p:spPr>
+        <p:style>
+          <a:lnRef idx="2">
+            <a:schemeClr val="accent1">
+              <a:shade val="50000"/>
+            </a:schemeClr>
+          </a:lnRef>
+          <a:fillRef idx="1">
+            <a:schemeClr val="accent1"/>
+          </a:fillRef>
+          <a:effectRef idx="0">
+            <a:schemeClr val="accent1"/>
+          </a:effectRef>
+          <a:fontRef idx="minor">
+            <a:schemeClr val="lt1"/>
+          </a:fontRef>
+        </p:style>
+        <p:txBody>
+          <a:bodyPr rtlCol="0" anchor="ctr"/>
+          <a:lstStyle/>
+          <a:p>
+            <a:pPr algn="ctr"/>
+            <a:endParaRPr lang="pt-BR" dirty="0"/>
+          </a:p>
+        </p:txBody>
+      </p:sp>
+    </p:spTree>
+    <p:extLst>
+      <p:ext uri="{BB962C8B-B14F-4D97-AF65-F5344CB8AC3E}">
+        <p14:creationId xmlns:p14="http://schemas.microsoft.com/office/powerpoint/2010/main" val="772612620"/>
       </p:ext>
     </p:extLst>
   </p:cSld>

</xml_diff>

<commit_message>
Documentation of Randomic Alg
</commit_message>
<xml_diff>
--- a/Guia e Tarefas/Apresentação Primeira Entrega.pptx
+++ b/Guia e Tarefas/Apresentação Primeira Entrega.pptx
@@ -5,7 +5,7 @@
     <p:sldMasterId id="2147483648" r:id="rId1"/>
   </p:sldMasterIdLst>
   <p:notesMasterIdLst>
-    <p:notesMasterId r:id="rId13"/>
+    <p:notesMasterId r:id="rId16"/>
   </p:notesMasterIdLst>
   <p:sldIdLst>
     <p:sldId id="282" r:id="rId2"/>
@@ -14,11 +14,14 @@
     <p:sldId id="293" r:id="rId5"/>
     <p:sldId id="289" r:id="rId6"/>
     <p:sldId id="257" r:id="rId7"/>
-    <p:sldId id="287" r:id="rId8"/>
-    <p:sldId id="290" r:id="rId9"/>
-    <p:sldId id="291" r:id="rId10"/>
-    <p:sldId id="292" r:id="rId11"/>
-    <p:sldId id="275" r:id="rId12"/>
+    <p:sldId id="296" r:id="rId8"/>
+    <p:sldId id="287" r:id="rId9"/>
+    <p:sldId id="290" r:id="rId10"/>
+    <p:sldId id="291" r:id="rId11"/>
+    <p:sldId id="294" r:id="rId12"/>
+    <p:sldId id="295" r:id="rId13"/>
+    <p:sldId id="292" r:id="rId14"/>
+    <p:sldId id="275" r:id="rId15"/>
   </p:sldIdLst>
   <p:sldSz cx="9144000" cy="6858000" type="screen4x3"/>
   <p:notesSz cx="6858000" cy="9144000"/>
@@ -3751,8 +3754,8 @@
         </p:nvSpPr>
         <p:spPr>
           <a:xfrm>
-            <a:off x="755576" y="1124744"/>
-            <a:ext cx="5904656" cy="2062103"/>
+            <a:off x="971600" y="1700808"/>
+            <a:ext cx="5688632" cy="3785652"/>
           </a:xfrm>
           <a:prstGeom prst="rect">
             <a:avLst/>
@@ -3765,13 +3768,117 @@
           </a:bodyPr>
           <a:lstStyle/>
           <a:p>
-            <a:r>
-              <a:rPr lang="pt-BR" sz="1600" dirty="0" err="1"/>
-              <a:t>Takane</a:t>
-            </a:r>
-            <a:r>
-              <a:rPr lang="pt-BR" sz="1600" dirty="0"/>
-              <a:t>, Bruno. "Um algoritmo exato para o problema da diversidade máxima." (2011).</a:t>
+            <a:pPr marL="285750" indent="-285750">
+              <a:buFont typeface="Arial" panose="020B0604020202020204" pitchFamily="34" charset="0"/>
+              <a:buChar char="•"/>
+            </a:pPr>
+            <a:r>
+              <a:rPr lang="en-US" sz="1600" b="1" dirty="0">
+                <a:latin typeface="Verdana" panose="020B0604030504040204" pitchFamily="34" charset="0"/>
+                <a:ea typeface="Verdana" panose="020B0604030504040204" pitchFamily="34" charset="0"/>
+                <a:cs typeface="Verdana" panose="020B0604030504040204" pitchFamily="34" charset="0"/>
+              </a:rPr>
+              <a:t>A</a:t>
+            </a:r>
+          </a:p>
+          <a:p>
+            <a:pPr marL="285750" indent="-285750">
+              <a:buFont typeface="Arial" panose="020B0604020202020204" pitchFamily="34" charset="0"/>
+              <a:buChar char="•"/>
+            </a:pPr>
+            <a:endParaRPr lang="en-US" sz="1600" b="1" dirty="0">
+              <a:latin typeface="Verdana" panose="020B0604030504040204" pitchFamily="34" charset="0"/>
+              <a:ea typeface="Verdana" panose="020B0604030504040204" pitchFamily="34" charset="0"/>
+              <a:cs typeface="Verdana" panose="020B0604030504040204" pitchFamily="34" charset="0"/>
+            </a:endParaRPr>
+          </a:p>
+          <a:p>
+            <a:pPr marL="285750" indent="-285750">
+              <a:buFont typeface="Arial" panose="020B0604020202020204" pitchFamily="34" charset="0"/>
+              <a:buChar char="•"/>
+            </a:pPr>
+            <a:r>
+              <a:rPr lang="en-US" sz="1600" b="1" dirty="0">
+                <a:latin typeface="Verdana" panose="020B0604030504040204" pitchFamily="34" charset="0"/>
+                <a:ea typeface="Verdana" panose="020B0604030504040204" pitchFamily="34" charset="0"/>
+                <a:cs typeface="Verdana" panose="020B0604030504040204" pitchFamily="34" charset="0"/>
+              </a:rPr>
+              <a:t>B</a:t>
+            </a:r>
+          </a:p>
+          <a:p>
+            <a:pPr marL="285750" indent="-285750">
+              <a:buFont typeface="Arial" panose="020B0604020202020204" pitchFamily="34" charset="0"/>
+              <a:buChar char="•"/>
+            </a:pPr>
+            <a:endParaRPr lang="en-US" sz="1600" b="1" dirty="0">
+              <a:latin typeface="Verdana" panose="020B0604030504040204" pitchFamily="34" charset="0"/>
+              <a:ea typeface="Verdana" panose="020B0604030504040204" pitchFamily="34" charset="0"/>
+              <a:cs typeface="Verdana" panose="020B0604030504040204" pitchFamily="34" charset="0"/>
+            </a:endParaRPr>
+          </a:p>
+          <a:p>
+            <a:pPr marL="285750" indent="-285750">
+              <a:buFont typeface="Arial" panose="020B0604020202020204" pitchFamily="34" charset="0"/>
+              <a:buChar char="•"/>
+            </a:pPr>
+            <a:r>
+              <a:rPr lang="en-US" sz="1600" b="1" dirty="0">
+                <a:latin typeface="Verdana" panose="020B0604030504040204" pitchFamily="34" charset="0"/>
+                <a:ea typeface="Verdana" panose="020B0604030504040204" pitchFamily="34" charset="0"/>
+                <a:cs typeface="Verdana" panose="020B0604030504040204" pitchFamily="34" charset="0"/>
+              </a:rPr>
+              <a:t>C</a:t>
+            </a:r>
+          </a:p>
+          <a:p>
+            <a:pPr marL="285750" indent="-285750">
+              <a:buFont typeface="Arial" panose="020B0604020202020204" pitchFamily="34" charset="0"/>
+              <a:buChar char="•"/>
+            </a:pPr>
+            <a:endParaRPr lang="en-US" sz="1600" b="1" dirty="0">
+              <a:latin typeface="Verdana" panose="020B0604030504040204" pitchFamily="34" charset="0"/>
+              <a:ea typeface="Verdana" panose="020B0604030504040204" pitchFamily="34" charset="0"/>
+              <a:cs typeface="Verdana" panose="020B0604030504040204" pitchFamily="34" charset="0"/>
+            </a:endParaRPr>
+          </a:p>
+          <a:p>
+            <a:pPr marL="285750" indent="-285750">
+              <a:buFont typeface="Arial" panose="020B0604020202020204" pitchFamily="34" charset="0"/>
+              <a:buChar char="•"/>
+            </a:pPr>
+            <a:r>
+              <a:rPr lang="en-US" sz="1600" b="1" dirty="0">
+                <a:latin typeface="Verdana" panose="020B0604030504040204" pitchFamily="34" charset="0"/>
+                <a:ea typeface="Verdana" panose="020B0604030504040204" pitchFamily="34" charset="0"/>
+                <a:cs typeface="Verdana" panose="020B0604030504040204" pitchFamily="34" charset="0"/>
+              </a:rPr>
+              <a:t>D</a:t>
+            </a:r>
+          </a:p>
+          <a:p>
+            <a:pPr marL="285750" indent="-285750">
+              <a:buFont typeface="Arial" panose="020B0604020202020204" pitchFamily="34" charset="0"/>
+              <a:buChar char="•"/>
+            </a:pPr>
+            <a:endParaRPr lang="en-US" sz="1600" b="1" dirty="0">
+              <a:latin typeface="Verdana" panose="020B0604030504040204" pitchFamily="34" charset="0"/>
+              <a:ea typeface="Verdana" panose="020B0604030504040204" pitchFamily="34" charset="0"/>
+              <a:cs typeface="Verdana" panose="020B0604030504040204" pitchFamily="34" charset="0"/>
+            </a:endParaRPr>
+          </a:p>
+          <a:p>
+            <a:pPr marL="285750" indent="-285750">
+              <a:buFont typeface="Arial" panose="020B0604020202020204" pitchFamily="34" charset="0"/>
+              <a:buChar char="•"/>
+            </a:pPr>
+            <a:r>
+              <a:rPr lang="en-US" sz="1600" b="1">
+                <a:latin typeface="Verdana" panose="020B0604030504040204" pitchFamily="34" charset="0"/>
+                <a:ea typeface="Verdana" panose="020B0604030504040204" pitchFamily="34" charset="0"/>
+                <a:cs typeface="Verdana" panose="020B0604030504040204" pitchFamily="34" charset="0"/>
+              </a:rPr>
+              <a:t>E</a:t>
             </a:r>
             <a:endParaRPr lang="en-US" sz="1600" dirty="0">
               <a:latin typeface="Verdana" panose="020B0604030504040204" pitchFamily="34" charset="0"/>
@@ -3900,12 +4007,20 @@
           <a:lstStyle/>
           <a:p>
             <a:r>
-              <a:rPr lang="en-US" sz="3600" b="1" dirty="0" err="1" smtClean="0">
-                <a:latin typeface="Verdana" panose="020B0604030504040204" pitchFamily="34" charset="0"/>
-                <a:ea typeface="Verdana" panose="020B0604030504040204" pitchFamily="34" charset="0"/>
-                <a:cs typeface="Verdana" panose="020B0604030504040204" pitchFamily="34" charset="0"/>
-              </a:rPr>
-              <a:t>Referências</a:t>
+              <a:rPr lang="en-US" sz="3600" b="1" dirty="0">
+                <a:latin typeface="Verdana" panose="020B0604030504040204" pitchFamily="34" charset="0"/>
+                <a:ea typeface="Verdana" panose="020B0604030504040204" pitchFamily="34" charset="0"/>
+                <a:cs typeface="Verdana" panose="020B0604030504040204" pitchFamily="34" charset="0"/>
+              </a:rPr>
+              <a:t>Estado da </a:t>
+            </a:r>
+            <a:r>
+              <a:rPr lang="en-US" sz="3600" b="1" dirty="0" err="1">
+                <a:latin typeface="Verdana" panose="020B0604030504040204" pitchFamily="34" charset="0"/>
+                <a:ea typeface="Verdana" panose="020B0604030504040204" pitchFamily="34" charset="0"/>
+                <a:cs typeface="Verdana" panose="020B0604030504040204" pitchFamily="34" charset="0"/>
+              </a:rPr>
+              <a:t>arte</a:t>
             </a:r>
             <a:endParaRPr lang="pt-BR" sz="3600" b="1" dirty="0">
               <a:latin typeface="Verdana" panose="020B0604030504040204" pitchFamily="34" charset="0"/>
@@ -3964,6 +4079,2216 @@
     </p:spTree>
     <p:extLst>
       <p:ext uri="{BB962C8B-B14F-4D97-AF65-F5344CB8AC3E}">
+        <p14:creationId xmlns:p14="http://schemas.microsoft.com/office/powerpoint/2010/main" val="772612620"/>
+      </p:ext>
+    </p:extLst>
+  </p:cSld>
+  <p:clrMapOvr>
+    <a:masterClrMapping/>
+  </p:clrMapOvr>
+</p:sld>
+</file>
+
+<file path=ppt/slides/slide11.xml><?xml version="1.0" encoding="utf-8"?>
+<p:sld xmlns:a="http://schemas.openxmlformats.org/drawingml/2006/main" xmlns:r="http://schemas.openxmlformats.org/officeDocument/2006/relationships" xmlns:p="http://schemas.openxmlformats.org/presentationml/2006/main">
+  <p:cSld>
+    <p:spTree>
+      <p:nvGrpSpPr>
+        <p:cNvPr id="1" name=""/>
+        <p:cNvGrpSpPr/>
+        <p:nvPr/>
+      </p:nvGrpSpPr>
+      <p:grpSpPr>
+        <a:xfrm>
+          <a:off x="0" y="0"/>
+          <a:ext cx="0" cy="0"/>
+          <a:chOff x="0" y="0"/>
+          <a:chExt cx="0" cy="0"/>
+        </a:xfrm>
+      </p:grpSpPr>
+      <p:sp>
+        <p:nvSpPr>
+          <p:cNvPr id="8" name="CaixaDeTexto 7"/>
+          <p:cNvSpPr txBox="1"/>
+          <p:nvPr/>
+        </p:nvSpPr>
+        <p:spPr>
+          <a:xfrm>
+            <a:off x="971600" y="1700808"/>
+            <a:ext cx="5688632" cy="4278094"/>
+          </a:xfrm>
+          <a:prstGeom prst="rect">
+            <a:avLst/>
+          </a:prstGeom>
+          <a:noFill/>
+        </p:spPr>
+        <p:txBody>
+          <a:bodyPr wrap="square" rtlCol="0">
+            <a:spAutoFit/>
+          </a:bodyPr>
+          <a:lstStyle/>
+          <a:p>
+            <a:pPr marL="285750" indent="-285750">
+              <a:buFont typeface="Arial" panose="020B0604020202020204" pitchFamily="34" charset="0"/>
+              <a:buChar char="•"/>
+            </a:pPr>
+            <a:r>
+              <a:rPr lang="en-US" sz="1600" b="1" dirty="0" err="1">
+                <a:latin typeface="Verdana" panose="020B0604030504040204" pitchFamily="34" charset="0"/>
+                <a:ea typeface="Verdana" panose="020B0604030504040204" pitchFamily="34" charset="0"/>
+                <a:cs typeface="Verdana" panose="020B0604030504040204" pitchFamily="34" charset="0"/>
+              </a:rPr>
+              <a:t>Leitor</a:t>
+            </a:r>
+            <a:r>
+              <a:rPr lang="en-US" sz="1600" b="1" dirty="0">
+                <a:latin typeface="Verdana" panose="020B0604030504040204" pitchFamily="34" charset="0"/>
+                <a:ea typeface="Verdana" panose="020B0604030504040204" pitchFamily="34" charset="0"/>
+                <a:cs typeface="Verdana" panose="020B0604030504040204" pitchFamily="34" charset="0"/>
+              </a:rPr>
+              <a:t> de </a:t>
+            </a:r>
+            <a:r>
+              <a:rPr lang="en-US" sz="1600" b="1" dirty="0" err="1">
+                <a:latin typeface="Verdana" panose="020B0604030504040204" pitchFamily="34" charset="0"/>
+                <a:ea typeface="Verdana" panose="020B0604030504040204" pitchFamily="34" charset="0"/>
+                <a:cs typeface="Verdana" panose="020B0604030504040204" pitchFamily="34" charset="0"/>
+              </a:rPr>
+              <a:t>instâncias</a:t>
+            </a:r>
+            <a:r>
+              <a:rPr lang="en-US" sz="1600" b="1" dirty="0">
+                <a:latin typeface="Verdana" panose="020B0604030504040204" pitchFamily="34" charset="0"/>
+                <a:ea typeface="Verdana" panose="020B0604030504040204" pitchFamily="34" charset="0"/>
+                <a:cs typeface="Verdana" panose="020B0604030504040204" pitchFamily="34" charset="0"/>
+              </a:rPr>
+              <a:t>: </a:t>
+            </a:r>
+            <a:r>
+              <a:rPr lang="en-US" sz="1600" dirty="0" err="1">
+                <a:latin typeface="Verdana" panose="020B0604030504040204" pitchFamily="34" charset="0"/>
+                <a:ea typeface="Verdana" panose="020B0604030504040204" pitchFamily="34" charset="0"/>
+                <a:cs typeface="Verdana" panose="020B0604030504040204" pitchFamily="34" charset="0"/>
+              </a:rPr>
+              <a:t>componente</a:t>
+            </a:r>
+            <a:r>
+              <a:rPr lang="en-US" sz="1600" dirty="0">
+                <a:latin typeface="Verdana" panose="020B0604030504040204" pitchFamily="34" charset="0"/>
+                <a:ea typeface="Verdana" panose="020B0604030504040204" pitchFamily="34" charset="0"/>
+                <a:cs typeface="Verdana" panose="020B0604030504040204" pitchFamily="34" charset="0"/>
+              </a:rPr>
+              <a:t> </a:t>
+            </a:r>
+            <a:r>
+              <a:rPr lang="en-US" sz="1600" dirty="0" err="1">
+                <a:latin typeface="Verdana" panose="020B0604030504040204" pitchFamily="34" charset="0"/>
+                <a:ea typeface="Verdana" panose="020B0604030504040204" pitchFamily="34" charset="0"/>
+                <a:cs typeface="Verdana" panose="020B0604030504040204" pitchFamily="34" charset="0"/>
+              </a:rPr>
+              <a:t>responsável</a:t>
+            </a:r>
+            <a:r>
+              <a:rPr lang="en-US" sz="1600" dirty="0">
+                <a:latin typeface="Verdana" panose="020B0604030504040204" pitchFamily="34" charset="0"/>
+                <a:ea typeface="Verdana" panose="020B0604030504040204" pitchFamily="34" charset="0"/>
+                <a:cs typeface="Verdana" panose="020B0604030504040204" pitchFamily="34" charset="0"/>
+              </a:rPr>
+              <a:t> por </a:t>
+            </a:r>
+            <a:r>
+              <a:rPr lang="en-US" sz="1600" dirty="0" err="1">
+                <a:latin typeface="Verdana" panose="020B0604030504040204" pitchFamily="34" charset="0"/>
+                <a:ea typeface="Verdana" panose="020B0604030504040204" pitchFamily="34" charset="0"/>
+                <a:cs typeface="Verdana" panose="020B0604030504040204" pitchFamily="34" charset="0"/>
+              </a:rPr>
+              <a:t>ler</a:t>
+            </a:r>
+            <a:r>
+              <a:rPr lang="en-US" sz="1600" dirty="0">
+                <a:latin typeface="Verdana" panose="020B0604030504040204" pitchFamily="34" charset="0"/>
+                <a:ea typeface="Verdana" panose="020B0604030504040204" pitchFamily="34" charset="0"/>
+                <a:cs typeface="Verdana" panose="020B0604030504040204" pitchFamily="34" charset="0"/>
+              </a:rPr>
+              <a:t> </a:t>
+            </a:r>
+            <a:r>
+              <a:rPr lang="en-US" sz="1600" dirty="0" err="1">
+                <a:latin typeface="Verdana" panose="020B0604030504040204" pitchFamily="34" charset="0"/>
+                <a:ea typeface="Verdana" panose="020B0604030504040204" pitchFamily="34" charset="0"/>
+                <a:cs typeface="Verdana" panose="020B0604030504040204" pitchFamily="34" charset="0"/>
+              </a:rPr>
+              <a:t>uma</a:t>
+            </a:r>
+            <a:r>
+              <a:rPr lang="en-US" sz="1600" dirty="0">
+                <a:latin typeface="Verdana" panose="020B0604030504040204" pitchFamily="34" charset="0"/>
+                <a:ea typeface="Verdana" panose="020B0604030504040204" pitchFamily="34" charset="0"/>
+                <a:cs typeface="Verdana" panose="020B0604030504040204" pitchFamily="34" charset="0"/>
+              </a:rPr>
+              <a:t> </a:t>
+            </a:r>
+            <a:r>
+              <a:rPr lang="en-US" sz="1600" dirty="0" err="1">
+                <a:latin typeface="Verdana" panose="020B0604030504040204" pitchFamily="34" charset="0"/>
+                <a:ea typeface="Verdana" panose="020B0604030504040204" pitchFamily="34" charset="0"/>
+                <a:cs typeface="Verdana" panose="020B0604030504040204" pitchFamily="34" charset="0"/>
+              </a:rPr>
+              <a:t>instância</a:t>
+            </a:r>
+            <a:r>
+              <a:rPr lang="en-US" sz="1600" dirty="0">
+                <a:latin typeface="Verdana" panose="020B0604030504040204" pitchFamily="34" charset="0"/>
+                <a:ea typeface="Verdana" panose="020B0604030504040204" pitchFamily="34" charset="0"/>
+                <a:cs typeface="Verdana" panose="020B0604030504040204" pitchFamily="34" charset="0"/>
+              </a:rPr>
+              <a:t> de um </a:t>
+            </a:r>
+            <a:r>
+              <a:rPr lang="en-US" sz="1600" dirty="0" err="1">
+                <a:latin typeface="Verdana" panose="020B0604030504040204" pitchFamily="34" charset="0"/>
+                <a:ea typeface="Verdana" panose="020B0604030504040204" pitchFamily="34" charset="0"/>
+                <a:cs typeface="Verdana" panose="020B0604030504040204" pitchFamily="34" charset="0"/>
+              </a:rPr>
+              <a:t>arquivo</a:t>
+            </a:r>
+            <a:r>
+              <a:rPr lang="en-US" sz="1600" dirty="0">
+                <a:latin typeface="Verdana" panose="020B0604030504040204" pitchFamily="34" charset="0"/>
+                <a:ea typeface="Verdana" panose="020B0604030504040204" pitchFamily="34" charset="0"/>
+                <a:cs typeface="Verdana" panose="020B0604030504040204" pitchFamily="34" charset="0"/>
+              </a:rPr>
+              <a:t> </a:t>
+            </a:r>
+            <a:r>
+              <a:rPr lang="en-US" sz="1600" dirty="0" err="1">
+                <a:latin typeface="Verdana" panose="020B0604030504040204" pitchFamily="34" charset="0"/>
+                <a:ea typeface="Verdana" panose="020B0604030504040204" pitchFamily="34" charset="0"/>
+                <a:cs typeface="Verdana" panose="020B0604030504040204" pitchFamily="34" charset="0"/>
+              </a:rPr>
+              <a:t>texto</a:t>
+            </a:r>
+            <a:r>
+              <a:rPr lang="en-US" sz="1600" dirty="0">
+                <a:latin typeface="Verdana" panose="020B0604030504040204" pitchFamily="34" charset="0"/>
+                <a:ea typeface="Verdana" panose="020B0604030504040204" pitchFamily="34" charset="0"/>
+                <a:cs typeface="Verdana" panose="020B0604030504040204" pitchFamily="34" charset="0"/>
+              </a:rPr>
+              <a:t>.</a:t>
+            </a:r>
+            <a:endParaRPr lang="en-US" sz="1600" b="1" dirty="0">
+              <a:latin typeface="Verdana" panose="020B0604030504040204" pitchFamily="34" charset="0"/>
+              <a:ea typeface="Verdana" panose="020B0604030504040204" pitchFamily="34" charset="0"/>
+              <a:cs typeface="Verdana" panose="020B0604030504040204" pitchFamily="34" charset="0"/>
+            </a:endParaRPr>
+          </a:p>
+          <a:p>
+            <a:pPr marL="285750" indent="-285750">
+              <a:buFont typeface="Arial" panose="020B0604020202020204" pitchFamily="34" charset="0"/>
+              <a:buChar char="•"/>
+            </a:pPr>
+            <a:endParaRPr lang="en-US" sz="1600" b="1" dirty="0">
+              <a:latin typeface="Verdana" panose="020B0604030504040204" pitchFamily="34" charset="0"/>
+              <a:ea typeface="Verdana" panose="020B0604030504040204" pitchFamily="34" charset="0"/>
+              <a:cs typeface="Verdana" panose="020B0604030504040204" pitchFamily="34" charset="0"/>
+            </a:endParaRPr>
+          </a:p>
+          <a:p>
+            <a:pPr marL="285750" indent="-285750">
+              <a:buFont typeface="Arial" panose="020B0604020202020204" pitchFamily="34" charset="0"/>
+              <a:buChar char="•"/>
+            </a:pPr>
+            <a:r>
+              <a:rPr lang="en-US" sz="1600" b="1" dirty="0" err="1">
+                <a:latin typeface="Verdana" panose="020B0604030504040204" pitchFamily="34" charset="0"/>
+                <a:ea typeface="Verdana" panose="020B0604030504040204" pitchFamily="34" charset="0"/>
+                <a:cs typeface="Verdana" panose="020B0604030504040204" pitchFamily="34" charset="0"/>
+              </a:rPr>
+              <a:t>Solução</a:t>
+            </a:r>
+            <a:r>
+              <a:rPr lang="en-US" sz="1600" b="1" dirty="0">
+                <a:latin typeface="Verdana" panose="020B0604030504040204" pitchFamily="34" charset="0"/>
+                <a:ea typeface="Verdana" panose="020B0604030504040204" pitchFamily="34" charset="0"/>
+                <a:cs typeface="Verdana" panose="020B0604030504040204" pitchFamily="34" charset="0"/>
+              </a:rPr>
+              <a:t>: </a:t>
+            </a:r>
+            <a:r>
+              <a:rPr lang="en-US" sz="1600" dirty="0" err="1">
+                <a:latin typeface="Verdana" panose="020B0604030504040204" pitchFamily="34" charset="0"/>
+                <a:ea typeface="Verdana" panose="020B0604030504040204" pitchFamily="34" charset="0"/>
+                <a:cs typeface="Verdana" panose="020B0604030504040204" pitchFamily="34" charset="0"/>
+              </a:rPr>
+              <a:t>componente</a:t>
+            </a:r>
+            <a:r>
+              <a:rPr lang="en-US" sz="1600" dirty="0">
+                <a:latin typeface="Verdana" panose="020B0604030504040204" pitchFamily="34" charset="0"/>
+                <a:ea typeface="Verdana" panose="020B0604030504040204" pitchFamily="34" charset="0"/>
+                <a:cs typeface="Verdana" panose="020B0604030504040204" pitchFamily="34" charset="0"/>
+              </a:rPr>
+              <a:t> </a:t>
+            </a:r>
+            <a:r>
+              <a:rPr lang="en-US" sz="1600" dirty="0" err="1">
+                <a:latin typeface="Verdana" panose="020B0604030504040204" pitchFamily="34" charset="0"/>
+                <a:ea typeface="Verdana" panose="020B0604030504040204" pitchFamily="34" charset="0"/>
+                <a:cs typeface="Verdana" panose="020B0604030504040204" pitchFamily="34" charset="0"/>
+              </a:rPr>
+              <a:t>responsável</a:t>
+            </a:r>
+            <a:r>
+              <a:rPr lang="en-US" sz="1600" dirty="0">
+                <a:latin typeface="Verdana" panose="020B0604030504040204" pitchFamily="34" charset="0"/>
+                <a:ea typeface="Verdana" panose="020B0604030504040204" pitchFamily="34" charset="0"/>
+                <a:cs typeface="Verdana" panose="020B0604030504040204" pitchFamily="34" charset="0"/>
+              </a:rPr>
+              <a:t> por </a:t>
+            </a:r>
+            <a:r>
+              <a:rPr lang="en-US" sz="1600" dirty="0" err="1">
+                <a:latin typeface="Verdana" panose="020B0604030504040204" pitchFamily="34" charset="0"/>
+                <a:ea typeface="Verdana" panose="020B0604030504040204" pitchFamily="34" charset="0"/>
+                <a:cs typeface="Verdana" panose="020B0604030504040204" pitchFamily="34" charset="0"/>
+              </a:rPr>
+              <a:t>obter</a:t>
+            </a:r>
+            <a:r>
+              <a:rPr lang="en-US" sz="1600" dirty="0">
+                <a:latin typeface="Verdana" panose="020B0604030504040204" pitchFamily="34" charset="0"/>
+                <a:ea typeface="Verdana" panose="020B0604030504040204" pitchFamily="34" charset="0"/>
+                <a:cs typeface="Verdana" panose="020B0604030504040204" pitchFamily="34" charset="0"/>
+              </a:rPr>
+              <a:t> o </a:t>
+            </a:r>
+            <a:r>
+              <a:rPr lang="en-US" sz="1600" dirty="0" err="1">
+                <a:latin typeface="Verdana" panose="020B0604030504040204" pitchFamily="34" charset="0"/>
+                <a:ea typeface="Verdana" panose="020B0604030504040204" pitchFamily="34" charset="0"/>
+                <a:cs typeface="Verdana" panose="020B0604030504040204" pitchFamily="34" charset="0"/>
+              </a:rPr>
+              <a:t>vetor</a:t>
+            </a:r>
+            <a:r>
+              <a:rPr lang="en-US" sz="1600" dirty="0">
+                <a:latin typeface="Verdana" panose="020B0604030504040204" pitchFamily="34" charset="0"/>
+                <a:ea typeface="Verdana" panose="020B0604030504040204" pitchFamily="34" charset="0"/>
+                <a:cs typeface="Verdana" panose="020B0604030504040204" pitchFamily="34" charset="0"/>
+              </a:rPr>
+              <a:t> com a </a:t>
+            </a:r>
+            <a:r>
+              <a:rPr lang="en-US" sz="1600" dirty="0" err="1">
+                <a:latin typeface="Verdana" panose="020B0604030504040204" pitchFamily="34" charset="0"/>
+                <a:ea typeface="Verdana" panose="020B0604030504040204" pitchFamily="34" charset="0"/>
+                <a:cs typeface="Verdana" panose="020B0604030504040204" pitchFamily="34" charset="0"/>
+              </a:rPr>
+              <a:t>solução</a:t>
+            </a:r>
+            <a:r>
+              <a:rPr lang="en-US" sz="1600" dirty="0">
+                <a:latin typeface="Verdana" panose="020B0604030504040204" pitchFamily="34" charset="0"/>
+                <a:ea typeface="Verdana" panose="020B0604030504040204" pitchFamily="34" charset="0"/>
+                <a:cs typeface="Verdana" panose="020B0604030504040204" pitchFamily="34" charset="0"/>
+              </a:rPr>
+              <a:t> e </a:t>
+            </a:r>
+            <a:r>
+              <a:rPr lang="en-US" sz="1600" dirty="0" err="1">
+                <a:latin typeface="Verdana" panose="020B0604030504040204" pitchFamily="34" charset="0"/>
+                <a:ea typeface="Verdana" panose="020B0604030504040204" pitchFamily="34" charset="0"/>
+                <a:cs typeface="Verdana" panose="020B0604030504040204" pitchFamily="34" charset="0"/>
+              </a:rPr>
+              <a:t>seu</a:t>
+            </a:r>
+            <a:r>
+              <a:rPr lang="en-US" sz="1600" dirty="0">
+                <a:latin typeface="Verdana" panose="020B0604030504040204" pitchFamily="34" charset="0"/>
+                <a:ea typeface="Verdana" panose="020B0604030504040204" pitchFamily="34" charset="0"/>
+                <a:cs typeface="Verdana" panose="020B0604030504040204" pitchFamily="34" charset="0"/>
+              </a:rPr>
+              <a:t> </a:t>
+            </a:r>
+            <a:r>
+              <a:rPr lang="en-US" sz="1600" dirty="0" err="1">
+                <a:latin typeface="Verdana" panose="020B0604030504040204" pitchFamily="34" charset="0"/>
+                <a:ea typeface="Verdana" panose="020B0604030504040204" pitchFamily="34" charset="0"/>
+                <a:cs typeface="Verdana" panose="020B0604030504040204" pitchFamily="34" charset="0"/>
+              </a:rPr>
+              <a:t>resultado</a:t>
+            </a:r>
+            <a:r>
+              <a:rPr lang="en-US" sz="1600" dirty="0">
+                <a:latin typeface="Verdana" panose="020B0604030504040204" pitchFamily="34" charset="0"/>
+                <a:ea typeface="Verdana" panose="020B0604030504040204" pitchFamily="34" charset="0"/>
+                <a:cs typeface="Verdana" panose="020B0604030504040204" pitchFamily="34" charset="0"/>
+              </a:rPr>
+              <a:t>.</a:t>
+            </a:r>
+            <a:endParaRPr lang="en-US" sz="1600" b="1" dirty="0">
+              <a:latin typeface="Verdana" panose="020B0604030504040204" pitchFamily="34" charset="0"/>
+              <a:ea typeface="Verdana" panose="020B0604030504040204" pitchFamily="34" charset="0"/>
+              <a:cs typeface="Verdana" panose="020B0604030504040204" pitchFamily="34" charset="0"/>
+            </a:endParaRPr>
+          </a:p>
+          <a:p>
+            <a:pPr marL="285750" indent="-285750">
+              <a:buFont typeface="Arial" panose="020B0604020202020204" pitchFamily="34" charset="0"/>
+              <a:buChar char="•"/>
+            </a:pPr>
+            <a:endParaRPr lang="en-US" sz="1600" b="1" dirty="0">
+              <a:latin typeface="Verdana" panose="020B0604030504040204" pitchFamily="34" charset="0"/>
+              <a:ea typeface="Verdana" panose="020B0604030504040204" pitchFamily="34" charset="0"/>
+              <a:cs typeface="Verdana" panose="020B0604030504040204" pitchFamily="34" charset="0"/>
+            </a:endParaRPr>
+          </a:p>
+          <a:p>
+            <a:pPr marL="285750" indent="-285750">
+              <a:buFont typeface="Arial" panose="020B0604020202020204" pitchFamily="34" charset="0"/>
+              <a:buChar char="•"/>
+            </a:pPr>
+            <a:r>
+              <a:rPr lang="en-US" sz="1600" b="1" dirty="0" err="1">
+                <a:latin typeface="Verdana" panose="020B0604030504040204" pitchFamily="34" charset="0"/>
+                <a:ea typeface="Verdana" panose="020B0604030504040204" pitchFamily="34" charset="0"/>
+                <a:cs typeface="Verdana" panose="020B0604030504040204" pitchFamily="34" charset="0"/>
+              </a:rPr>
+              <a:t>Algoritmo</a:t>
+            </a:r>
+            <a:r>
+              <a:rPr lang="en-US" sz="1600" b="1" dirty="0">
+                <a:latin typeface="Verdana" panose="020B0604030504040204" pitchFamily="34" charset="0"/>
+                <a:ea typeface="Verdana" panose="020B0604030504040204" pitchFamily="34" charset="0"/>
+                <a:cs typeface="Verdana" panose="020B0604030504040204" pitchFamily="34" charset="0"/>
+              </a:rPr>
+              <a:t>: </a:t>
+            </a:r>
+            <a:r>
+              <a:rPr lang="en-US" sz="1600" dirty="0" err="1">
+                <a:latin typeface="Verdana" panose="020B0604030504040204" pitchFamily="34" charset="0"/>
+                <a:ea typeface="Verdana" panose="020B0604030504040204" pitchFamily="34" charset="0"/>
+                <a:cs typeface="Verdana" panose="020B0604030504040204" pitchFamily="34" charset="0"/>
+              </a:rPr>
+              <a:t>componente</a:t>
+            </a:r>
+            <a:r>
+              <a:rPr lang="en-US" sz="1600" dirty="0">
+                <a:latin typeface="Verdana" panose="020B0604030504040204" pitchFamily="34" charset="0"/>
+                <a:ea typeface="Verdana" panose="020B0604030504040204" pitchFamily="34" charset="0"/>
+                <a:cs typeface="Verdana" panose="020B0604030504040204" pitchFamily="34" charset="0"/>
+              </a:rPr>
+              <a:t> </a:t>
+            </a:r>
+            <a:r>
+              <a:rPr lang="en-US" sz="1600" dirty="0" err="1">
+                <a:latin typeface="Verdana" panose="020B0604030504040204" pitchFamily="34" charset="0"/>
+                <a:ea typeface="Verdana" panose="020B0604030504040204" pitchFamily="34" charset="0"/>
+                <a:cs typeface="Verdana" panose="020B0604030504040204" pitchFamily="34" charset="0"/>
+              </a:rPr>
+              <a:t>responsável</a:t>
+            </a:r>
+            <a:r>
+              <a:rPr lang="en-US" sz="1600" dirty="0">
+                <a:latin typeface="Verdana" panose="020B0604030504040204" pitchFamily="34" charset="0"/>
+                <a:ea typeface="Verdana" panose="020B0604030504040204" pitchFamily="34" charset="0"/>
+                <a:cs typeface="Verdana" panose="020B0604030504040204" pitchFamily="34" charset="0"/>
+              </a:rPr>
+              <a:t> por </a:t>
+            </a:r>
+            <a:r>
+              <a:rPr lang="en-US" sz="1600" dirty="0" err="1">
+                <a:latin typeface="Verdana" panose="020B0604030504040204" pitchFamily="34" charset="0"/>
+                <a:ea typeface="Verdana" panose="020B0604030504040204" pitchFamily="34" charset="0"/>
+                <a:cs typeface="Verdana" panose="020B0604030504040204" pitchFamily="34" charset="0"/>
+              </a:rPr>
+              <a:t>criar</a:t>
+            </a:r>
+            <a:r>
+              <a:rPr lang="en-US" sz="1600" dirty="0">
+                <a:latin typeface="Verdana" panose="020B0604030504040204" pitchFamily="34" charset="0"/>
+                <a:ea typeface="Verdana" panose="020B0604030504040204" pitchFamily="34" charset="0"/>
+                <a:cs typeface="Verdana" panose="020B0604030504040204" pitchFamily="34" charset="0"/>
+              </a:rPr>
+              <a:t> </a:t>
+            </a:r>
+            <a:r>
+              <a:rPr lang="en-US" sz="1600" dirty="0" err="1">
+                <a:latin typeface="Verdana" panose="020B0604030504040204" pitchFamily="34" charset="0"/>
+                <a:ea typeface="Verdana" panose="020B0604030504040204" pitchFamily="34" charset="0"/>
+                <a:cs typeface="Verdana" panose="020B0604030504040204" pitchFamily="34" charset="0"/>
+              </a:rPr>
+              <a:t>uma</a:t>
+            </a:r>
+            <a:r>
+              <a:rPr lang="en-US" sz="1600" dirty="0">
+                <a:latin typeface="Verdana" panose="020B0604030504040204" pitchFamily="34" charset="0"/>
+                <a:ea typeface="Verdana" panose="020B0604030504040204" pitchFamily="34" charset="0"/>
+                <a:cs typeface="Verdana" panose="020B0604030504040204" pitchFamily="34" charset="0"/>
+              </a:rPr>
+              <a:t> </a:t>
+            </a:r>
+            <a:r>
+              <a:rPr lang="en-US" sz="1600" dirty="0" err="1">
+                <a:latin typeface="Verdana" panose="020B0604030504040204" pitchFamily="34" charset="0"/>
+                <a:ea typeface="Verdana" panose="020B0604030504040204" pitchFamily="34" charset="0"/>
+                <a:cs typeface="Verdana" panose="020B0604030504040204" pitchFamily="34" charset="0"/>
+              </a:rPr>
+              <a:t>solução</a:t>
+            </a:r>
+            <a:r>
+              <a:rPr lang="en-US" sz="1600" dirty="0">
+                <a:latin typeface="Verdana" panose="020B0604030504040204" pitchFamily="34" charset="0"/>
+                <a:ea typeface="Verdana" panose="020B0604030504040204" pitchFamily="34" charset="0"/>
+                <a:cs typeface="Verdana" panose="020B0604030504040204" pitchFamily="34" charset="0"/>
+              </a:rPr>
+              <a:t>.</a:t>
+            </a:r>
+            <a:endParaRPr lang="en-US" sz="1600" b="1" dirty="0">
+              <a:latin typeface="Verdana" panose="020B0604030504040204" pitchFamily="34" charset="0"/>
+              <a:ea typeface="Verdana" panose="020B0604030504040204" pitchFamily="34" charset="0"/>
+              <a:cs typeface="Verdana" panose="020B0604030504040204" pitchFamily="34" charset="0"/>
+            </a:endParaRPr>
+          </a:p>
+          <a:p>
+            <a:pPr marL="285750" indent="-285750">
+              <a:buFont typeface="Arial" panose="020B0604020202020204" pitchFamily="34" charset="0"/>
+              <a:buChar char="•"/>
+            </a:pPr>
+            <a:endParaRPr lang="en-US" sz="1600" b="1" dirty="0">
+              <a:latin typeface="Verdana" panose="020B0604030504040204" pitchFamily="34" charset="0"/>
+              <a:ea typeface="Verdana" panose="020B0604030504040204" pitchFamily="34" charset="0"/>
+              <a:cs typeface="Verdana" panose="020B0604030504040204" pitchFamily="34" charset="0"/>
+            </a:endParaRPr>
+          </a:p>
+          <a:p>
+            <a:pPr marL="285750" indent="-285750">
+              <a:buFont typeface="Arial" panose="020B0604020202020204" pitchFamily="34" charset="0"/>
+              <a:buChar char="•"/>
+            </a:pPr>
+            <a:r>
+              <a:rPr lang="en-US" sz="1600" b="1" dirty="0">
+                <a:latin typeface="Verdana" panose="020B0604030504040204" pitchFamily="34" charset="0"/>
+                <a:ea typeface="Verdana" panose="020B0604030504040204" pitchFamily="34" charset="0"/>
+                <a:cs typeface="Verdana" panose="020B0604030504040204" pitchFamily="34" charset="0"/>
+              </a:rPr>
+              <a:t>Classes </a:t>
+            </a:r>
+            <a:r>
+              <a:rPr lang="en-US" sz="1600" b="1" dirty="0" err="1">
+                <a:latin typeface="Verdana" panose="020B0604030504040204" pitchFamily="34" charset="0"/>
+                <a:ea typeface="Verdana" panose="020B0604030504040204" pitchFamily="34" charset="0"/>
+                <a:cs typeface="Verdana" panose="020B0604030504040204" pitchFamily="34" charset="0"/>
+              </a:rPr>
+              <a:t>implementadas</a:t>
+            </a:r>
+            <a:r>
+              <a:rPr lang="en-US" sz="1600" b="1" dirty="0">
+                <a:latin typeface="Verdana" panose="020B0604030504040204" pitchFamily="34" charset="0"/>
+                <a:ea typeface="Verdana" panose="020B0604030504040204" pitchFamily="34" charset="0"/>
+                <a:cs typeface="Verdana" panose="020B0604030504040204" pitchFamily="34" charset="0"/>
+              </a:rPr>
+              <a:t>: </a:t>
+            </a:r>
+            <a:r>
+              <a:rPr lang="en-US" sz="1600" dirty="0" err="1">
+                <a:latin typeface="Verdana" panose="020B0604030504040204" pitchFamily="34" charset="0"/>
+                <a:ea typeface="Verdana" panose="020B0604030504040204" pitchFamily="34" charset="0"/>
+                <a:cs typeface="Verdana" panose="020B0604030504040204" pitchFamily="34" charset="0"/>
+              </a:rPr>
+              <a:t>InstanceReader</a:t>
+            </a:r>
+            <a:r>
+              <a:rPr lang="en-US" sz="1600" dirty="0">
+                <a:latin typeface="Verdana" panose="020B0604030504040204" pitchFamily="34" charset="0"/>
+                <a:ea typeface="Verdana" panose="020B0604030504040204" pitchFamily="34" charset="0"/>
+                <a:cs typeface="Verdana" panose="020B0604030504040204" pitchFamily="34" charset="0"/>
+              </a:rPr>
+              <a:t>, Instance, Solution, </a:t>
+            </a:r>
+            <a:r>
+              <a:rPr lang="en-US" sz="1600" dirty="0" err="1">
+                <a:latin typeface="Verdana" panose="020B0604030504040204" pitchFamily="34" charset="0"/>
+                <a:ea typeface="Verdana" panose="020B0604030504040204" pitchFamily="34" charset="0"/>
+                <a:cs typeface="Verdana" panose="020B0604030504040204" pitchFamily="34" charset="0"/>
+              </a:rPr>
+              <a:t>RandomicAlg</a:t>
+            </a:r>
+            <a:r>
+              <a:rPr lang="en-US" sz="1600" dirty="0">
+                <a:latin typeface="Verdana" panose="020B0604030504040204" pitchFamily="34" charset="0"/>
+                <a:ea typeface="Verdana" panose="020B0604030504040204" pitchFamily="34" charset="0"/>
+                <a:cs typeface="Verdana" panose="020B0604030504040204" pitchFamily="34" charset="0"/>
+              </a:rPr>
+              <a:t>.</a:t>
+            </a:r>
+          </a:p>
+          <a:p>
+            <a:pPr marL="285750" indent="-285750">
+              <a:buFont typeface="Arial" panose="020B0604020202020204" pitchFamily="34" charset="0"/>
+              <a:buChar char="•"/>
+            </a:pPr>
+            <a:endParaRPr lang="en-US" sz="1600" b="1" dirty="0">
+              <a:latin typeface="Verdana" panose="020B0604030504040204" pitchFamily="34" charset="0"/>
+              <a:ea typeface="Verdana" panose="020B0604030504040204" pitchFamily="34" charset="0"/>
+              <a:cs typeface="Verdana" panose="020B0604030504040204" pitchFamily="34" charset="0"/>
+            </a:endParaRPr>
+          </a:p>
+          <a:p>
+            <a:pPr marL="285750" indent="-285750">
+              <a:buFont typeface="Arial" panose="020B0604020202020204" pitchFamily="34" charset="0"/>
+              <a:buChar char="•"/>
+            </a:pPr>
+            <a:endParaRPr lang="en-US" sz="1600" b="1" dirty="0">
+              <a:latin typeface="Verdana" panose="020B0604030504040204" pitchFamily="34" charset="0"/>
+              <a:ea typeface="Verdana" panose="020B0604030504040204" pitchFamily="34" charset="0"/>
+              <a:cs typeface="Verdana" panose="020B0604030504040204" pitchFamily="34" charset="0"/>
+            </a:endParaRPr>
+          </a:p>
+          <a:p>
+            <a:pPr marL="285750" indent="-285750">
+              <a:buFont typeface="Arial" panose="020B0604020202020204" pitchFamily="34" charset="0"/>
+              <a:buChar char="•"/>
+            </a:pPr>
+            <a:endParaRPr lang="en-US" sz="1600" b="1" dirty="0">
+              <a:latin typeface="Verdana" panose="020B0604030504040204" pitchFamily="34" charset="0"/>
+              <a:ea typeface="Verdana" panose="020B0604030504040204" pitchFamily="34" charset="0"/>
+              <a:cs typeface="Verdana" panose="020B0604030504040204" pitchFamily="34" charset="0"/>
+            </a:endParaRPr>
+          </a:p>
+          <a:p>
+            <a:pPr marL="285750" indent="-285750">
+              <a:buFont typeface="Arial" panose="020B0604020202020204" pitchFamily="34" charset="0"/>
+              <a:buChar char="•"/>
+            </a:pPr>
+            <a:endParaRPr lang="en-US" sz="1600" b="1" dirty="0">
+              <a:latin typeface="Verdana" panose="020B0604030504040204" pitchFamily="34" charset="0"/>
+              <a:ea typeface="Verdana" panose="020B0604030504040204" pitchFamily="34" charset="0"/>
+              <a:cs typeface="Verdana" panose="020B0604030504040204" pitchFamily="34" charset="0"/>
+            </a:endParaRPr>
+          </a:p>
+          <a:p>
+            <a:pPr marL="285750" indent="-285750">
+              <a:buFont typeface="Arial" panose="020B0604020202020204" pitchFamily="34" charset="0"/>
+              <a:buChar char="•"/>
+            </a:pPr>
+            <a:endParaRPr lang="en-US" sz="1600" b="1" dirty="0">
+              <a:latin typeface="Verdana" panose="020B0604030504040204" pitchFamily="34" charset="0"/>
+              <a:ea typeface="Verdana" panose="020B0604030504040204" pitchFamily="34" charset="0"/>
+              <a:cs typeface="Verdana" panose="020B0604030504040204" pitchFamily="34" charset="0"/>
+            </a:endParaRPr>
+          </a:p>
+          <a:p>
+            <a:pPr marL="285750" indent="-285750">
+              <a:buFont typeface="Arial" panose="020B0604020202020204" pitchFamily="34" charset="0"/>
+              <a:buChar char="•"/>
+            </a:pPr>
+            <a:endParaRPr lang="pt-BR" sz="1600" b="1" dirty="0">
+              <a:latin typeface="Verdana" panose="020B0604030504040204" pitchFamily="34" charset="0"/>
+              <a:ea typeface="Verdana" panose="020B0604030504040204" pitchFamily="34" charset="0"/>
+              <a:cs typeface="Verdana" panose="020B0604030504040204" pitchFamily="34" charset="0"/>
+            </a:endParaRPr>
+          </a:p>
+        </p:txBody>
+      </p:sp>
+      <p:pic>
+        <p:nvPicPr>
+          <p:cNvPr id="7" name="Imagem 6"/>
+          <p:cNvPicPr>
+            <a:picLocks noChangeAspect="1"/>
+          </p:cNvPicPr>
+          <p:nvPr/>
+        </p:nvPicPr>
+        <p:blipFill>
+          <a:blip r:embed="rId2" cstate="print">
+            <a:extLst>
+              <a:ext uri="{28A0092B-C50C-407E-A947-70E740481C1C}">
+                <a14:useLocalDpi xmlns:a14="http://schemas.microsoft.com/office/drawing/2010/main" val="0"/>
+              </a:ext>
+            </a:extLst>
+          </a:blip>
+          <a:stretch>
+            <a:fillRect/>
+          </a:stretch>
+        </p:blipFill>
+        <p:spPr>
+          <a:xfrm>
+            <a:off x="287015" y="6381328"/>
+            <a:ext cx="1672379" cy="291764"/>
+          </a:xfrm>
+          <a:prstGeom prst="rect">
+            <a:avLst/>
+          </a:prstGeom>
+        </p:spPr>
+      </p:pic>
+      <p:sp>
+        <p:nvSpPr>
+          <p:cNvPr id="9" name="CaixaDeTexto 8"/>
+          <p:cNvSpPr txBox="1"/>
+          <p:nvPr/>
+        </p:nvSpPr>
+        <p:spPr>
+          <a:xfrm>
+            <a:off x="393549" y="333523"/>
+            <a:ext cx="6192688" cy="646331"/>
+          </a:xfrm>
+          <a:prstGeom prst="rect">
+            <a:avLst/>
+          </a:prstGeom>
+          <a:noFill/>
+        </p:spPr>
+        <p:txBody>
+          <a:bodyPr wrap="square" rtlCol="0">
+            <a:spAutoFit/>
+          </a:bodyPr>
+          <a:lstStyle/>
+          <a:p>
+            <a:r>
+              <a:rPr lang="en-US" sz="3600" b="1" dirty="0" err="1">
+                <a:latin typeface="Verdana" panose="020B0604030504040204" pitchFamily="34" charset="0"/>
+                <a:ea typeface="Verdana" panose="020B0604030504040204" pitchFamily="34" charset="0"/>
+                <a:cs typeface="Verdana" panose="020B0604030504040204" pitchFamily="34" charset="0"/>
+              </a:rPr>
+              <a:t>Implementação</a:t>
+            </a:r>
+            <a:r>
+              <a:rPr lang="en-US" sz="3600" b="1" dirty="0">
+                <a:latin typeface="Verdana" panose="020B0604030504040204" pitchFamily="34" charset="0"/>
+                <a:ea typeface="Verdana" panose="020B0604030504040204" pitchFamily="34" charset="0"/>
+                <a:cs typeface="Verdana" panose="020B0604030504040204" pitchFamily="34" charset="0"/>
+              </a:rPr>
+              <a:t> </a:t>
+            </a:r>
+            <a:r>
+              <a:rPr lang="en-US" sz="3600" b="1" dirty="0" err="1">
+                <a:latin typeface="Verdana" panose="020B0604030504040204" pitchFamily="34" charset="0"/>
+                <a:ea typeface="Verdana" panose="020B0604030504040204" pitchFamily="34" charset="0"/>
+                <a:cs typeface="Verdana" panose="020B0604030504040204" pitchFamily="34" charset="0"/>
+              </a:rPr>
+              <a:t>Inicial</a:t>
+            </a:r>
+            <a:endParaRPr lang="pt-BR" sz="3600" b="1" dirty="0">
+              <a:latin typeface="Verdana" panose="020B0604030504040204" pitchFamily="34" charset="0"/>
+              <a:ea typeface="Verdana" panose="020B0604030504040204" pitchFamily="34" charset="0"/>
+              <a:cs typeface="Verdana" panose="020B0604030504040204" pitchFamily="34" charset="0"/>
+            </a:endParaRPr>
+          </a:p>
+        </p:txBody>
+      </p:sp>
+      <p:sp>
+        <p:nvSpPr>
+          <p:cNvPr id="11" name="Retângulo 10"/>
+          <p:cNvSpPr/>
+          <p:nvPr/>
+        </p:nvSpPr>
+        <p:spPr>
+          <a:xfrm flipV="1">
+            <a:off x="-36512" y="476670"/>
+            <a:ext cx="323528" cy="360039"/>
+          </a:xfrm>
+          <a:prstGeom prst="rect">
+            <a:avLst/>
+          </a:prstGeom>
+          <a:solidFill>
+            <a:srgbClr val="149B55"/>
+          </a:solidFill>
+          <a:ln>
+            <a:noFill/>
+          </a:ln>
+        </p:spPr>
+        <p:style>
+          <a:lnRef idx="2">
+            <a:schemeClr val="accent1">
+              <a:shade val="50000"/>
+            </a:schemeClr>
+          </a:lnRef>
+          <a:fillRef idx="1">
+            <a:schemeClr val="accent1"/>
+          </a:fillRef>
+          <a:effectRef idx="0">
+            <a:schemeClr val="accent1"/>
+          </a:effectRef>
+          <a:fontRef idx="minor">
+            <a:schemeClr val="lt1"/>
+          </a:fontRef>
+        </p:style>
+        <p:txBody>
+          <a:bodyPr rtlCol="0" anchor="ctr"/>
+          <a:lstStyle/>
+          <a:p>
+            <a:pPr algn="ctr"/>
+            <a:endParaRPr lang="pt-BR" dirty="0"/>
+          </a:p>
+        </p:txBody>
+      </p:sp>
+    </p:spTree>
+    <p:extLst>
+      <p:ext uri="{BB962C8B-B14F-4D97-AF65-F5344CB8AC3E}">
+        <p14:creationId xmlns:p14="http://schemas.microsoft.com/office/powerpoint/2010/main" val="1981665283"/>
+      </p:ext>
+    </p:extLst>
+  </p:cSld>
+  <p:clrMapOvr>
+    <a:masterClrMapping/>
+  </p:clrMapOvr>
+</p:sld>
+</file>
+
+<file path=ppt/slides/slide12.xml><?xml version="1.0" encoding="utf-8"?>
+<p:sld xmlns:a="http://schemas.openxmlformats.org/drawingml/2006/main" xmlns:r="http://schemas.openxmlformats.org/officeDocument/2006/relationships" xmlns:p="http://schemas.openxmlformats.org/presentationml/2006/main">
+  <p:cSld>
+    <p:spTree>
+      <p:nvGrpSpPr>
+        <p:cNvPr id="1" name=""/>
+        <p:cNvGrpSpPr/>
+        <p:nvPr/>
+      </p:nvGrpSpPr>
+      <p:grpSpPr>
+        <a:xfrm>
+          <a:off x="0" y="0"/>
+          <a:ext cx="0" cy="0"/>
+          <a:chOff x="0" y="0"/>
+          <a:chExt cx="0" cy="0"/>
+        </a:xfrm>
+      </p:grpSpPr>
+      <p:sp>
+        <p:nvSpPr>
+          <p:cNvPr id="8" name="CaixaDeTexto 7"/>
+          <p:cNvSpPr txBox="1"/>
+          <p:nvPr/>
+        </p:nvSpPr>
+        <p:spPr>
+          <a:xfrm>
+            <a:off x="971600" y="1700808"/>
+            <a:ext cx="5688632" cy="2554545"/>
+          </a:xfrm>
+          <a:prstGeom prst="rect">
+            <a:avLst/>
+          </a:prstGeom>
+          <a:noFill/>
+        </p:spPr>
+        <p:txBody>
+          <a:bodyPr wrap="square" rtlCol="0">
+            <a:spAutoFit/>
+          </a:bodyPr>
+          <a:lstStyle/>
+          <a:p>
+            <a:pPr marL="285750" indent="-285750">
+              <a:buFont typeface="Arial" panose="020B0604020202020204" pitchFamily="34" charset="0"/>
+              <a:buChar char="•"/>
+            </a:pPr>
+            <a:r>
+              <a:rPr lang="en-US" sz="1600" b="1" dirty="0" err="1">
+                <a:latin typeface="Verdana" panose="020B0604030504040204" pitchFamily="34" charset="0"/>
+                <a:ea typeface="Verdana" panose="020B0604030504040204" pitchFamily="34" charset="0"/>
+                <a:cs typeface="Verdana" panose="020B0604030504040204" pitchFamily="34" charset="0"/>
+              </a:rPr>
+              <a:t>Critério</a:t>
+            </a:r>
+            <a:r>
+              <a:rPr lang="en-US" sz="1600" b="1" dirty="0">
+                <a:latin typeface="Verdana" panose="020B0604030504040204" pitchFamily="34" charset="0"/>
+                <a:ea typeface="Verdana" panose="020B0604030504040204" pitchFamily="34" charset="0"/>
+                <a:cs typeface="Verdana" panose="020B0604030504040204" pitchFamily="34" charset="0"/>
+              </a:rPr>
+              <a:t> de </a:t>
+            </a:r>
+            <a:r>
+              <a:rPr lang="en-US" sz="1600" b="1" dirty="0" err="1">
+                <a:latin typeface="Verdana" panose="020B0604030504040204" pitchFamily="34" charset="0"/>
+                <a:ea typeface="Verdana" panose="020B0604030504040204" pitchFamily="34" charset="0"/>
+                <a:cs typeface="Verdana" panose="020B0604030504040204" pitchFamily="34" charset="0"/>
+              </a:rPr>
+              <a:t>parada</a:t>
+            </a:r>
+            <a:r>
+              <a:rPr lang="en-US" sz="1600" b="1" dirty="0">
+                <a:latin typeface="Verdana" panose="020B0604030504040204" pitchFamily="34" charset="0"/>
+                <a:ea typeface="Verdana" panose="020B0604030504040204" pitchFamily="34" charset="0"/>
+                <a:cs typeface="Verdana" panose="020B0604030504040204" pitchFamily="34" charset="0"/>
+              </a:rPr>
+              <a:t>: </a:t>
+            </a:r>
+            <a:r>
+              <a:rPr lang="en-US" sz="1600" dirty="0">
+                <a:latin typeface="Verdana" panose="020B0604030504040204" pitchFamily="34" charset="0"/>
+                <a:ea typeface="Verdana" panose="020B0604030504040204" pitchFamily="34" charset="0"/>
+                <a:cs typeface="Verdana" panose="020B0604030504040204" pitchFamily="34" charset="0"/>
+              </a:rPr>
+              <a:t>tempo </a:t>
+            </a:r>
+            <a:r>
+              <a:rPr lang="en-US" sz="1600" dirty="0" err="1">
+                <a:latin typeface="Verdana" panose="020B0604030504040204" pitchFamily="34" charset="0"/>
+                <a:ea typeface="Verdana" panose="020B0604030504040204" pitchFamily="34" charset="0"/>
+                <a:cs typeface="Verdana" panose="020B0604030504040204" pitchFamily="34" charset="0"/>
+              </a:rPr>
+              <a:t>predefinido</a:t>
+            </a:r>
+            <a:r>
+              <a:rPr lang="en-US" sz="1600" dirty="0">
+                <a:latin typeface="Verdana" panose="020B0604030504040204" pitchFamily="34" charset="0"/>
+                <a:ea typeface="Verdana" panose="020B0604030504040204" pitchFamily="34" charset="0"/>
+                <a:cs typeface="Verdana" panose="020B0604030504040204" pitchFamily="34" charset="0"/>
+              </a:rPr>
+              <a:t>.</a:t>
+            </a:r>
+          </a:p>
+          <a:p>
+            <a:pPr marL="285750" indent="-285750">
+              <a:buFont typeface="Arial" panose="020B0604020202020204" pitchFamily="34" charset="0"/>
+              <a:buChar char="•"/>
+            </a:pPr>
+            <a:endParaRPr lang="en-US" sz="1600" b="1" dirty="0">
+              <a:latin typeface="Verdana" panose="020B0604030504040204" pitchFamily="34" charset="0"/>
+              <a:ea typeface="Verdana" panose="020B0604030504040204" pitchFamily="34" charset="0"/>
+              <a:cs typeface="Verdana" panose="020B0604030504040204" pitchFamily="34" charset="0"/>
+            </a:endParaRPr>
+          </a:p>
+          <a:p>
+            <a:pPr marL="285750" indent="-285750">
+              <a:buFont typeface="Arial" panose="020B0604020202020204" pitchFamily="34" charset="0"/>
+              <a:buChar char="•"/>
+            </a:pPr>
+            <a:r>
+              <a:rPr lang="en-US" sz="1600" b="1" dirty="0" err="1">
+                <a:latin typeface="Verdana" panose="020B0604030504040204" pitchFamily="34" charset="0"/>
+                <a:ea typeface="Verdana" panose="020B0604030504040204" pitchFamily="34" charset="0"/>
+                <a:cs typeface="Verdana" panose="020B0604030504040204" pitchFamily="34" charset="0"/>
+              </a:rPr>
+              <a:t>Funcionamento</a:t>
+            </a:r>
+            <a:r>
+              <a:rPr lang="en-US" sz="1600" b="1" dirty="0">
+                <a:latin typeface="Verdana" panose="020B0604030504040204" pitchFamily="34" charset="0"/>
+                <a:ea typeface="Verdana" panose="020B0604030504040204" pitchFamily="34" charset="0"/>
+                <a:cs typeface="Verdana" panose="020B0604030504040204" pitchFamily="34" charset="0"/>
+              </a:rPr>
+              <a:t>: </a:t>
+            </a:r>
+            <a:r>
+              <a:rPr lang="en-US" sz="1600" dirty="0" err="1">
+                <a:latin typeface="Verdana" panose="020B0604030504040204" pitchFamily="34" charset="0"/>
+                <a:ea typeface="Verdana" panose="020B0604030504040204" pitchFamily="34" charset="0"/>
+                <a:cs typeface="Verdana" panose="020B0604030504040204" pitchFamily="34" charset="0"/>
+              </a:rPr>
+              <a:t>criação</a:t>
+            </a:r>
+            <a:r>
+              <a:rPr lang="en-US" sz="1600" dirty="0">
+                <a:latin typeface="Verdana" panose="020B0604030504040204" pitchFamily="34" charset="0"/>
+                <a:ea typeface="Verdana" panose="020B0604030504040204" pitchFamily="34" charset="0"/>
+                <a:cs typeface="Verdana" panose="020B0604030504040204" pitchFamily="34" charset="0"/>
+              </a:rPr>
+              <a:t> da </a:t>
+            </a:r>
+            <a:r>
+              <a:rPr lang="en-US" sz="1600" dirty="0" err="1">
+                <a:latin typeface="Verdana" panose="020B0604030504040204" pitchFamily="34" charset="0"/>
+                <a:ea typeface="Verdana" panose="020B0604030504040204" pitchFamily="34" charset="0"/>
+                <a:cs typeface="Verdana" panose="020B0604030504040204" pitchFamily="34" charset="0"/>
+              </a:rPr>
+              <a:t>solução</a:t>
+            </a:r>
+            <a:r>
+              <a:rPr lang="en-US" sz="1600" dirty="0">
+                <a:latin typeface="Verdana" panose="020B0604030504040204" pitchFamily="34" charset="0"/>
+                <a:ea typeface="Verdana" panose="020B0604030504040204" pitchFamily="34" charset="0"/>
+                <a:cs typeface="Verdana" panose="020B0604030504040204" pitchFamily="34" charset="0"/>
+              </a:rPr>
+              <a:t> </a:t>
+            </a:r>
+            <a:r>
+              <a:rPr lang="en-US" sz="1600" dirty="0" err="1">
+                <a:latin typeface="Verdana" panose="020B0604030504040204" pitchFamily="34" charset="0"/>
+                <a:ea typeface="Verdana" panose="020B0604030504040204" pitchFamily="34" charset="0"/>
+                <a:cs typeface="Verdana" panose="020B0604030504040204" pitchFamily="34" charset="0"/>
+              </a:rPr>
+              <a:t>baseada</a:t>
+            </a:r>
+            <a:r>
+              <a:rPr lang="en-US" sz="1600" dirty="0">
+                <a:latin typeface="Verdana" panose="020B0604030504040204" pitchFamily="34" charset="0"/>
+                <a:ea typeface="Verdana" panose="020B0604030504040204" pitchFamily="34" charset="0"/>
+                <a:cs typeface="Verdana" panose="020B0604030504040204" pitchFamily="34" charset="0"/>
+              </a:rPr>
+              <a:t> </a:t>
+            </a:r>
+            <a:r>
+              <a:rPr lang="en-US" sz="1600" dirty="0" err="1">
+                <a:latin typeface="Verdana" panose="020B0604030504040204" pitchFamily="34" charset="0"/>
+                <a:ea typeface="Verdana" panose="020B0604030504040204" pitchFamily="34" charset="0"/>
+                <a:cs typeface="Verdana" panose="020B0604030504040204" pitchFamily="34" charset="0"/>
+              </a:rPr>
+              <a:t>em</a:t>
+            </a:r>
+            <a:r>
+              <a:rPr lang="en-US" sz="1600" dirty="0">
+                <a:latin typeface="Verdana" panose="020B0604030504040204" pitchFamily="34" charset="0"/>
+                <a:ea typeface="Verdana" panose="020B0604030504040204" pitchFamily="34" charset="0"/>
+                <a:cs typeface="Verdana" panose="020B0604030504040204" pitchFamily="34" charset="0"/>
+              </a:rPr>
+              <a:t> m </a:t>
+            </a:r>
+            <a:r>
+              <a:rPr lang="en-US" sz="1600" dirty="0" err="1">
+                <a:latin typeface="Verdana" panose="020B0604030504040204" pitchFamily="34" charset="0"/>
+                <a:ea typeface="Verdana" panose="020B0604030504040204" pitchFamily="34" charset="0"/>
+                <a:cs typeface="Verdana" panose="020B0604030504040204" pitchFamily="34" charset="0"/>
+              </a:rPr>
+              <a:t>posições</a:t>
+            </a:r>
+            <a:r>
+              <a:rPr lang="en-US" sz="1600" dirty="0">
+                <a:latin typeface="Verdana" panose="020B0604030504040204" pitchFamily="34" charset="0"/>
+                <a:ea typeface="Verdana" panose="020B0604030504040204" pitchFamily="34" charset="0"/>
+                <a:cs typeface="Verdana" panose="020B0604030504040204" pitchFamily="34" charset="0"/>
+              </a:rPr>
+              <a:t> </a:t>
+            </a:r>
+            <a:r>
+              <a:rPr lang="en-US" sz="1600" dirty="0" err="1">
+                <a:latin typeface="Verdana" panose="020B0604030504040204" pitchFamily="34" charset="0"/>
+                <a:ea typeface="Verdana" panose="020B0604030504040204" pitchFamily="34" charset="0"/>
+                <a:cs typeface="Verdana" panose="020B0604030504040204" pitchFamily="34" charset="0"/>
+              </a:rPr>
+              <a:t>randomicamente</a:t>
+            </a:r>
+            <a:r>
+              <a:rPr lang="en-US" sz="1600" dirty="0">
+                <a:latin typeface="Verdana" panose="020B0604030504040204" pitchFamily="34" charset="0"/>
+                <a:ea typeface="Verdana" panose="020B0604030504040204" pitchFamily="34" charset="0"/>
+                <a:cs typeface="Verdana" panose="020B0604030504040204" pitchFamily="34" charset="0"/>
+              </a:rPr>
+              <a:t> </a:t>
+            </a:r>
+            <a:r>
+              <a:rPr lang="en-US" sz="1600" dirty="0" err="1">
+                <a:latin typeface="Verdana" panose="020B0604030504040204" pitchFamily="34" charset="0"/>
+                <a:ea typeface="Verdana" panose="020B0604030504040204" pitchFamily="34" charset="0"/>
+                <a:cs typeface="Verdana" panose="020B0604030504040204" pitchFamily="34" charset="0"/>
+              </a:rPr>
+              <a:t>selecionadas</a:t>
+            </a:r>
+            <a:r>
+              <a:rPr lang="en-US" sz="1600" dirty="0">
+                <a:latin typeface="Verdana" panose="020B0604030504040204" pitchFamily="34" charset="0"/>
+                <a:ea typeface="Verdana" panose="020B0604030504040204" pitchFamily="34" charset="0"/>
+                <a:cs typeface="Verdana" panose="020B0604030504040204" pitchFamily="34" charset="0"/>
+              </a:rPr>
+              <a:t>.</a:t>
+            </a:r>
+            <a:endParaRPr lang="en-US" sz="1600" b="1" dirty="0">
+              <a:latin typeface="Verdana" panose="020B0604030504040204" pitchFamily="34" charset="0"/>
+              <a:ea typeface="Verdana" panose="020B0604030504040204" pitchFamily="34" charset="0"/>
+              <a:cs typeface="Verdana" panose="020B0604030504040204" pitchFamily="34" charset="0"/>
+            </a:endParaRPr>
+          </a:p>
+          <a:p>
+            <a:pPr marL="285750" indent="-285750">
+              <a:buFont typeface="Arial" panose="020B0604020202020204" pitchFamily="34" charset="0"/>
+              <a:buChar char="•"/>
+            </a:pPr>
+            <a:endParaRPr lang="en-US" sz="1600" b="1" dirty="0">
+              <a:latin typeface="Verdana" panose="020B0604030504040204" pitchFamily="34" charset="0"/>
+              <a:ea typeface="Verdana" panose="020B0604030504040204" pitchFamily="34" charset="0"/>
+              <a:cs typeface="Verdana" panose="020B0604030504040204" pitchFamily="34" charset="0"/>
+            </a:endParaRPr>
+          </a:p>
+          <a:p>
+            <a:pPr marL="285750" indent="-285750">
+              <a:buFont typeface="Arial" panose="020B0604020202020204" pitchFamily="34" charset="0"/>
+              <a:buChar char="•"/>
+            </a:pPr>
+            <a:endParaRPr lang="en-US" sz="1600" b="1" dirty="0">
+              <a:latin typeface="Verdana" panose="020B0604030504040204" pitchFamily="34" charset="0"/>
+              <a:ea typeface="Verdana" panose="020B0604030504040204" pitchFamily="34" charset="0"/>
+              <a:cs typeface="Verdana" panose="020B0604030504040204" pitchFamily="34" charset="0"/>
+            </a:endParaRPr>
+          </a:p>
+          <a:p>
+            <a:pPr marL="285750" indent="-285750">
+              <a:buFont typeface="Arial" panose="020B0604020202020204" pitchFamily="34" charset="0"/>
+              <a:buChar char="•"/>
+            </a:pPr>
+            <a:endParaRPr lang="en-US" sz="1600" b="1" dirty="0">
+              <a:latin typeface="Verdana" panose="020B0604030504040204" pitchFamily="34" charset="0"/>
+              <a:ea typeface="Verdana" panose="020B0604030504040204" pitchFamily="34" charset="0"/>
+              <a:cs typeface="Verdana" panose="020B0604030504040204" pitchFamily="34" charset="0"/>
+            </a:endParaRPr>
+          </a:p>
+          <a:p>
+            <a:pPr marL="285750" indent="-285750">
+              <a:buFont typeface="Arial" panose="020B0604020202020204" pitchFamily="34" charset="0"/>
+              <a:buChar char="•"/>
+            </a:pPr>
+            <a:endParaRPr lang="en-US" sz="1600" b="1" dirty="0">
+              <a:latin typeface="Verdana" panose="020B0604030504040204" pitchFamily="34" charset="0"/>
+              <a:ea typeface="Verdana" panose="020B0604030504040204" pitchFamily="34" charset="0"/>
+              <a:cs typeface="Verdana" panose="020B0604030504040204" pitchFamily="34" charset="0"/>
+            </a:endParaRPr>
+          </a:p>
+          <a:p>
+            <a:pPr marL="285750" indent="-285750">
+              <a:buFont typeface="Arial" panose="020B0604020202020204" pitchFamily="34" charset="0"/>
+              <a:buChar char="•"/>
+            </a:pPr>
+            <a:endParaRPr lang="en-US" sz="1600" b="1" dirty="0">
+              <a:latin typeface="Verdana" panose="020B0604030504040204" pitchFamily="34" charset="0"/>
+              <a:ea typeface="Verdana" panose="020B0604030504040204" pitchFamily="34" charset="0"/>
+              <a:cs typeface="Verdana" panose="020B0604030504040204" pitchFamily="34" charset="0"/>
+            </a:endParaRPr>
+          </a:p>
+          <a:p>
+            <a:pPr marL="285750" indent="-285750">
+              <a:buFont typeface="Arial" panose="020B0604020202020204" pitchFamily="34" charset="0"/>
+              <a:buChar char="•"/>
+            </a:pPr>
+            <a:endParaRPr lang="pt-BR" sz="1600" b="1" dirty="0">
+              <a:latin typeface="Verdana" panose="020B0604030504040204" pitchFamily="34" charset="0"/>
+              <a:ea typeface="Verdana" panose="020B0604030504040204" pitchFamily="34" charset="0"/>
+              <a:cs typeface="Verdana" panose="020B0604030504040204" pitchFamily="34" charset="0"/>
+            </a:endParaRPr>
+          </a:p>
+        </p:txBody>
+      </p:sp>
+      <p:pic>
+        <p:nvPicPr>
+          <p:cNvPr id="7" name="Imagem 6"/>
+          <p:cNvPicPr>
+            <a:picLocks noChangeAspect="1"/>
+          </p:cNvPicPr>
+          <p:nvPr/>
+        </p:nvPicPr>
+        <p:blipFill>
+          <a:blip r:embed="rId2" cstate="print">
+            <a:extLst>
+              <a:ext uri="{28A0092B-C50C-407E-A947-70E740481C1C}">
+                <a14:useLocalDpi xmlns:a14="http://schemas.microsoft.com/office/drawing/2010/main" val="0"/>
+              </a:ext>
+            </a:extLst>
+          </a:blip>
+          <a:stretch>
+            <a:fillRect/>
+          </a:stretch>
+        </p:blipFill>
+        <p:spPr>
+          <a:xfrm>
+            <a:off x="287015" y="6381328"/>
+            <a:ext cx="1672379" cy="291764"/>
+          </a:xfrm>
+          <a:prstGeom prst="rect">
+            <a:avLst/>
+          </a:prstGeom>
+        </p:spPr>
+      </p:pic>
+      <p:sp>
+        <p:nvSpPr>
+          <p:cNvPr id="9" name="CaixaDeTexto 8"/>
+          <p:cNvSpPr txBox="1"/>
+          <p:nvPr/>
+        </p:nvSpPr>
+        <p:spPr>
+          <a:xfrm>
+            <a:off x="393549" y="333523"/>
+            <a:ext cx="6192688" cy="646331"/>
+          </a:xfrm>
+          <a:prstGeom prst="rect">
+            <a:avLst/>
+          </a:prstGeom>
+          <a:noFill/>
+        </p:spPr>
+        <p:txBody>
+          <a:bodyPr wrap="square" rtlCol="0">
+            <a:spAutoFit/>
+          </a:bodyPr>
+          <a:lstStyle/>
+          <a:p>
+            <a:r>
+              <a:rPr lang="en-US" sz="3600" b="1" dirty="0" err="1">
+                <a:latin typeface="Verdana" panose="020B0604030504040204" pitchFamily="34" charset="0"/>
+                <a:ea typeface="Verdana" panose="020B0604030504040204" pitchFamily="34" charset="0"/>
+                <a:cs typeface="Verdana" panose="020B0604030504040204" pitchFamily="34" charset="0"/>
+              </a:rPr>
+              <a:t>Algoritmo</a:t>
+            </a:r>
+            <a:r>
+              <a:rPr lang="en-US" sz="3600" b="1" dirty="0">
+                <a:latin typeface="Verdana" panose="020B0604030504040204" pitchFamily="34" charset="0"/>
+                <a:ea typeface="Verdana" panose="020B0604030504040204" pitchFamily="34" charset="0"/>
+                <a:cs typeface="Verdana" panose="020B0604030504040204" pitchFamily="34" charset="0"/>
+              </a:rPr>
+              <a:t> </a:t>
+            </a:r>
+            <a:r>
+              <a:rPr lang="en-US" sz="3600" b="1" dirty="0" err="1">
+                <a:latin typeface="Verdana" panose="020B0604030504040204" pitchFamily="34" charset="0"/>
+                <a:ea typeface="Verdana" panose="020B0604030504040204" pitchFamily="34" charset="0"/>
+                <a:cs typeface="Verdana" panose="020B0604030504040204" pitchFamily="34" charset="0"/>
+              </a:rPr>
+              <a:t>Randômico</a:t>
+            </a:r>
+            <a:endParaRPr lang="pt-BR" sz="3600" b="1" dirty="0">
+              <a:latin typeface="Verdana" panose="020B0604030504040204" pitchFamily="34" charset="0"/>
+              <a:ea typeface="Verdana" panose="020B0604030504040204" pitchFamily="34" charset="0"/>
+              <a:cs typeface="Verdana" panose="020B0604030504040204" pitchFamily="34" charset="0"/>
+            </a:endParaRPr>
+          </a:p>
+        </p:txBody>
+      </p:sp>
+      <p:sp>
+        <p:nvSpPr>
+          <p:cNvPr id="11" name="Retângulo 10"/>
+          <p:cNvSpPr/>
+          <p:nvPr/>
+        </p:nvSpPr>
+        <p:spPr>
+          <a:xfrm flipV="1">
+            <a:off x="-36512" y="476670"/>
+            <a:ext cx="323528" cy="360039"/>
+          </a:xfrm>
+          <a:prstGeom prst="rect">
+            <a:avLst/>
+          </a:prstGeom>
+          <a:solidFill>
+            <a:srgbClr val="149B55"/>
+          </a:solidFill>
+          <a:ln>
+            <a:noFill/>
+          </a:ln>
+        </p:spPr>
+        <p:style>
+          <a:lnRef idx="2">
+            <a:schemeClr val="accent1">
+              <a:shade val="50000"/>
+            </a:schemeClr>
+          </a:lnRef>
+          <a:fillRef idx="1">
+            <a:schemeClr val="accent1"/>
+          </a:fillRef>
+          <a:effectRef idx="0">
+            <a:schemeClr val="accent1"/>
+          </a:effectRef>
+          <a:fontRef idx="minor">
+            <a:schemeClr val="lt1"/>
+          </a:fontRef>
+        </p:style>
+        <p:txBody>
+          <a:bodyPr rtlCol="0" anchor="ctr"/>
+          <a:lstStyle/>
+          <a:p>
+            <a:pPr algn="ctr"/>
+            <a:endParaRPr lang="pt-BR" dirty="0"/>
+          </a:p>
+        </p:txBody>
+      </p:sp>
+      <p:graphicFrame>
+        <p:nvGraphicFramePr>
+          <p:cNvPr id="2" name="Tabela 1">
+            <a:extLst>
+              <a:ext uri="{FF2B5EF4-FFF2-40B4-BE49-F238E27FC236}">
+                <a16:creationId xmlns:a16="http://schemas.microsoft.com/office/drawing/2014/main" id="{20A72204-6040-4D57-A5B3-1E0C3328F817}"/>
+              </a:ext>
+            </a:extLst>
+          </p:cNvPr>
+          <p:cNvGraphicFramePr>
+            <a:graphicFrameLocks noGrp="1"/>
+          </p:cNvGraphicFramePr>
+          <p:nvPr>
+            <p:extLst>
+              <p:ext uri="{D42A27DB-BD31-4B8C-83A1-F6EECF244321}">
+                <p14:modId xmlns:p14="http://schemas.microsoft.com/office/powerpoint/2010/main" val="3512892077"/>
+              </p:ext>
+            </p:extLst>
+          </p:nvPr>
+        </p:nvGraphicFramePr>
+        <p:xfrm>
+          <a:off x="971600" y="2978080"/>
+          <a:ext cx="7200800" cy="2598778"/>
+        </p:xfrm>
+        <a:graphic>
+          <a:graphicData uri="http://schemas.openxmlformats.org/drawingml/2006/table">
+            <a:tbl>
+              <a:tblPr firstRow="1" bandRow="1">
+                <a:tableStyleId>{5C22544A-7EE6-4342-B048-85BDC9FD1C3A}</a:tableStyleId>
+              </a:tblPr>
+              <a:tblGrid>
+                <a:gridCol w="1800200">
+                  <a:extLst>
+                    <a:ext uri="{9D8B030D-6E8A-4147-A177-3AD203B41FA5}">
+                      <a16:colId xmlns:a16="http://schemas.microsoft.com/office/drawing/2014/main" val="219651036"/>
+                    </a:ext>
+                  </a:extLst>
+                </a:gridCol>
+                <a:gridCol w="1800200">
+                  <a:extLst>
+                    <a:ext uri="{9D8B030D-6E8A-4147-A177-3AD203B41FA5}">
+                      <a16:colId xmlns:a16="http://schemas.microsoft.com/office/drawing/2014/main" val="1362504551"/>
+                    </a:ext>
+                  </a:extLst>
+                </a:gridCol>
+                <a:gridCol w="1800200">
+                  <a:extLst>
+                    <a:ext uri="{9D8B030D-6E8A-4147-A177-3AD203B41FA5}">
+                      <a16:colId xmlns:a16="http://schemas.microsoft.com/office/drawing/2014/main" val="1077630181"/>
+                    </a:ext>
+                  </a:extLst>
+                </a:gridCol>
+                <a:gridCol w="1800200">
+                  <a:extLst>
+                    <a:ext uri="{9D8B030D-6E8A-4147-A177-3AD203B41FA5}">
+                      <a16:colId xmlns:a16="http://schemas.microsoft.com/office/drawing/2014/main" val="2777859465"/>
+                    </a:ext>
+                  </a:extLst>
+                </a:gridCol>
+              </a:tblGrid>
+              <a:tr h="595850">
+                <a:tc>
+                  <a:txBody>
+                    <a:bodyPr/>
+                    <a:lstStyle/>
+                    <a:p>
+                      <a:r>
+                        <a:rPr lang="en-US" dirty="0" err="1"/>
+                        <a:t>Instância</a:t>
+                      </a:r>
+                      <a:endParaRPr lang="pt-BR" dirty="0"/>
+                    </a:p>
+                  </a:txBody>
+                  <a:tcPr/>
+                </a:tc>
+                <a:tc>
+                  <a:txBody>
+                    <a:bodyPr/>
+                    <a:lstStyle/>
+                    <a:p>
+                      <a:r>
+                        <a:rPr lang="en-US" dirty="0" err="1"/>
+                        <a:t>Resultado</a:t>
+                      </a:r>
+                      <a:r>
+                        <a:rPr lang="en-US" dirty="0"/>
+                        <a:t> </a:t>
+                      </a:r>
+                      <a:r>
+                        <a:rPr lang="en-US" dirty="0" err="1"/>
+                        <a:t>Randômico</a:t>
+                      </a:r>
+                      <a:endParaRPr lang="pt-BR" dirty="0"/>
+                    </a:p>
+                  </a:txBody>
+                  <a:tcPr/>
+                </a:tc>
+                <a:tc>
+                  <a:txBody>
+                    <a:bodyPr/>
+                    <a:lstStyle/>
+                    <a:p>
+                      <a:r>
+                        <a:rPr lang="en-US" dirty="0" err="1"/>
+                        <a:t>Resultado</a:t>
+                      </a:r>
+                      <a:r>
+                        <a:rPr lang="en-US" dirty="0"/>
+                        <a:t> Estado da </a:t>
+                      </a:r>
+                      <a:r>
+                        <a:rPr lang="en-US" dirty="0" err="1"/>
+                        <a:t>Arte</a:t>
+                      </a:r>
+                      <a:endParaRPr lang="pt-BR" dirty="0"/>
+                    </a:p>
+                  </a:txBody>
+                  <a:tcPr/>
+                </a:tc>
+                <a:tc>
+                  <a:txBody>
+                    <a:bodyPr/>
+                    <a:lstStyle/>
+                    <a:p>
+                      <a:r>
+                        <a:rPr lang="en-US" dirty="0"/>
+                        <a:t>Estado da </a:t>
+                      </a:r>
+                      <a:r>
+                        <a:rPr lang="en-US" dirty="0" err="1"/>
+                        <a:t>Arte</a:t>
+                      </a:r>
+                      <a:endParaRPr lang="pt-BR" dirty="0"/>
+                    </a:p>
+                  </a:txBody>
+                  <a:tcPr/>
+                </a:tc>
+                <a:extLst>
+                  <a:ext uri="{0D108BD9-81ED-4DB2-BD59-A6C34878D82A}">
+                    <a16:rowId xmlns:a16="http://schemas.microsoft.com/office/drawing/2014/main" val="701403831"/>
+                  </a:ext>
+                </a:extLst>
+              </a:tr>
+              <a:tr h="279814">
+                <a:tc>
+                  <a:txBody>
+                    <a:bodyPr/>
+                    <a:lstStyle/>
+                    <a:p>
+                      <a:pPr algn="ctr" fontAlgn="b"/>
+                      <a:r>
+                        <a:rPr lang="pt-BR" sz="1100" b="0" i="0" u="none" strike="noStrike" dirty="0">
+                          <a:solidFill>
+                            <a:srgbClr val="000000"/>
+                          </a:solidFill>
+                          <a:effectLst/>
+                          <a:latin typeface="Calibri" panose="020F0502020204030204" pitchFamily="34" charset="0"/>
+                        </a:rPr>
+                        <a:t>SOM-b_1_n100_m10</a:t>
+                      </a:r>
+                    </a:p>
+                  </a:txBody>
+                  <a:tcPr marL="9525" marR="9525" marT="9525" marB="0" anchor="ctr"/>
+                </a:tc>
+                <a:tc>
+                  <a:txBody>
+                    <a:bodyPr/>
+                    <a:lstStyle/>
+                    <a:p>
+                      <a:pPr algn="ctr" fontAlgn="b"/>
+                      <a:r>
+                        <a:rPr lang="pt-BR" sz="1100" b="0" i="0" u="none" strike="noStrike" dirty="0">
+                          <a:solidFill>
+                            <a:srgbClr val="000000"/>
+                          </a:solidFill>
+                          <a:effectLst/>
+                          <a:latin typeface="Calibri" panose="020F0502020204030204" pitchFamily="34" charset="0"/>
+                        </a:rPr>
+                        <a:t>285</a:t>
+                      </a:r>
+                    </a:p>
+                  </a:txBody>
+                  <a:tcPr marL="9525" marR="9525" marT="9525" marB="0" anchor="ctr"/>
+                </a:tc>
+                <a:tc>
+                  <a:txBody>
+                    <a:bodyPr/>
+                    <a:lstStyle/>
+                    <a:p>
+                      <a:pPr algn="ctr" fontAlgn="b"/>
+                      <a:r>
+                        <a:rPr lang="pt-BR" sz="1100" b="0" i="0" u="none" strike="noStrike">
+                          <a:solidFill>
+                            <a:srgbClr val="000000"/>
+                          </a:solidFill>
+                          <a:effectLst/>
+                          <a:latin typeface="Calibri" panose="020F0502020204030204" pitchFamily="34" charset="0"/>
+                        </a:rPr>
+                        <a:t>333</a:t>
+                      </a:r>
+                    </a:p>
+                  </a:txBody>
+                  <a:tcPr marL="9525" marR="9525" marT="9525" marB="0" anchor="ctr"/>
+                </a:tc>
+                <a:tc>
+                  <a:txBody>
+                    <a:bodyPr/>
+                    <a:lstStyle/>
+                    <a:p>
+                      <a:pPr algn="ctr" fontAlgn="b"/>
+                      <a:r>
+                        <a:rPr lang="pt-BR" sz="1000" b="0" i="0" u="none" strike="noStrike">
+                          <a:solidFill>
+                            <a:srgbClr val="000000"/>
+                          </a:solidFill>
+                          <a:effectLst/>
+                          <a:latin typeface="Arial" panose="020B0604020202020204" pitchFamily="34" charset="0"/>
+                        </a:rPr>
+                        <a:t>G_SS</a:t>
+                      </a:r>
+                    </a:p>
+                  </a:txBody>
+                  <a:tcPr marL="9525" marR="9525" marT="9525" marB="0" anchor="ctr"/>
+                </a:tc>
+                <a:extLst>
+                  <a:ext uri="{0D108BD9-81ED-4DB2-BD59-A6C34878D82A}">
+                    <a16:rowId xmlns:a16="http://schemas.microsoft.com/office/drawing/2014/main" val="1554991850"/>
+                  </a:ext>
+                </a:extLst>
+              </a:tr>
+              <a:tr h="279814">
+                <a:tc>
+                  <a:txBody>
+                    <a:bodyPr/>
+                    <a:lstStyle/>
+                    <a:p>
+                      <a:pPr algn="ctr" fontAlgn="b"/>
+                      <a:r>
+                        <a:rPr lang="pt-BR" sz="1000" b="0" i="0" u="none" strike="noStrike">
+                          <a:solidFill>
+                            <a:srgbClr val="000000"/>
+                          </a:solidFill>
+                          <a:effectLst/>
+                          <a:latin typeface="Arial" panose="020B0604020202020204" pitchFamily="34" charset="0"/>
+                        </a:rPr>
+                        <a:t>SOM-b_5_n200_m20</a:t>
+                      </a:r>
+                    </a:p>
+                  </a:txBody>
+                  <a:tcPr marL="9525" marR="9525" marT="9525" marB="0" anchor="ctr"/>
+                </a:tc>
+                <a:tc>
+                  <a:txBody>
+                    <a:bodyPr/>
+                    <a:lstStyle/>
+                    <a:p>
+                      <a:pPr algn="ctr" fontAlgn="b"/>
+                      <a:r>
+                        <a:rPr lang="pt-BR" sz="1100" b="0" i="0" u="none" strike="noStrike">
+                          <a:solidFill>
+                            <a:srgbClr val="000000"/>
+                          </a:solidFill>
+                          <a:effectLst/>
+                          <a:latin typeface="Calibri" panose="020F0502020204030204" pitchFamily="34" charset="0"/>
+                        </a:rPr>
+                        <a:t>1028</a:t>
+                      </a:r>
+                    </a:p>
+                  </a:txBody>
+                  <a:tcPr marL="9525" marR="9525" marT="9525" marB="0" anchor="ctr"/>
+                </a:tc>
+                <a:tc>
+                  <a:txBody>
+                    <a:bodyPr/>
+                    <a:lstStyle/>
+                    <a:p>
+                      <a:pPr algn="ctr" fontAlgn="b"/>
+                      <a:r>
+                        <a:rPr lang="pt-BR" sz="1100" b="0" i="0" u="none" strike="noStrike">
+                          <a:solidFill>
+                            <a:srgbClr val="000000"/>
+                          </a:solidFill>
+                          <a:effectLst/>
+                          <a:latin typeface="Calibri" panose="020F0502020204030204" pitchFamily="34" charset="0"/>
+                        </a:rPr>
+                        <a:t>1247</a:t>
+                      </a:r>
+                    </a:p>
+                  </a:txBody>
+                  <a:tcPr marL="9525" marR="9525" marT="9525" marB="0" anchor="ctr"/>
+                </a:tc>
+                <a:tc>
+                  <a:txBody>
+                    <a:bodyPr/>
+                    <a:lstStyle/>
+                    <a:p>
+                      <a:pPr algn="ctr" fontAlgn="b"/>
+                      <a:r>
+                        <a:rPr lang="pt-BR" sz="1000" b="0" i="0" u="none" strike="noStrike">
+                          <a:solidFill>
+                            <a:srgbClr val="000000"/>
+                          </a:solidFill>
+                          <a:effectLst/>
+                          <a:latin typeface="Arial" panose="020B0604020202020204" pitchFamily="34" charset="0"/>
+                        </a:rPr>
+                        <a:t>G_SS</a:t>
+                      </a:r>
+                    </a:p>
+                  </a:txBody>
+                  <a:tcPr marL="9525" marR="9525" marT="9525" marB="0" anchor="ctr"/>
+                </a:tc>
+                <a:extLst>
+                  <a:ext uri="{0D108BD9-81ED-4DB2-BD59-A6C34878D82A}">
+                    <a16:rowId xmlns:a16="http://schemas.microsoft.com/office/drawing/2014/main" val="2687186080"/>
+                  </a:ext>
+                </a:extLst>
+              </a:tr>
+              <a:tr h="279814">
+                <a:tc>
+                  <a:txBody>
+                    <a:bodyPr/>
+                    <a:lstStyle/>
+                    <a:p>
+                      <a:pPr algn="ctr" fontAlgn="b"/>
+                      <a:r>
+                        <a:rPr lang="pt-BR" sz="1000" b="0" i="0" u="none" strike="noStrike">
+                          <a:solidFill>
+                            <a:srgbClr val="000000"/>
+                          </a:solidFill>
+                          <a:effectLst/>
+                          <a:latin typeface="Arial" panose="020B0604020202020204" pitchFamily="34" charset="0"/>
+                        </a:rPr>
+                        <a:t>SOM-b_10_n300_m60</a:t>
+                      </a:r>
+                    </a:p>
+                  </a:txBody>
+                  <a:tcPr marL="9525" marR="9525" marT="9525" marB="0" anchor="ctr"/>
+                </a:tc>
+                <a:tc>
+                  <a:txBody>
+                    <a:bodyPr/>
+                    <a:lstStyle/>
+                    <a:p>
+                      <a:pPr algn="ctr" fontAlgn="b"/>
+                      <a:r>
+                        <a:rPr lang="pt-BR" sz="1100" b="0" i="0" u="none" strike="noStrike">
+                          <a:solidFill>
+                            <a:srgbClr val="000000"/>
+                          </a:solidFill>
+                          <a:effectLst/>
+                          <a:latin typeface="Calibri" panose="020F0502020204030204" pitchFamily="34" charset="0"/>
+                        </a:rPr>
+                        <a:t>8521</a:t>
+                      </a:r>
+                    </a:p>
+                  </a:txBody>
+                  <a:tcPr marL="9525" marR="9525" marT="9525" marB="0" anchor="ctr"/>
+                </a:tc>
+                <a:tc>
+                  <a:txBody>
+                    <a:bodyPr/>
+                    <a:lstStyle/>
+                    <a:p>
+                      <a:pPr algn="ctr" fontAlgn="b"/>
+                      <a:r>
+                        <a:rPr lang="pt-BR" sz="1000" b="0" i="0" u="none" strike="noStrike">
+                          <a:solidFill>
+                            <a:srgbClr val="000000"/>
+                          </a:solidFill>
+                          <a:effectLst/>
+                          <a:latin typeface="Arial" panose="020B0604020202020204" pitchFamily="34" charset="0"/>
+                        </a:rPr>
+                        <a:t>9689</a:t>
+                      </a:r>
+                    </a:p>
+                  </a:txBody>
+                  <a:tcPr marL="9525" marR="9525" marT="9525" marB="0" anchor="ctr"/>
+                </a:tc>
+                <a:tc>
+                  <a:txBody>
+                    <a:bodyPr/>
+                    <a:lstStyle/>
+                    <a:p>
+                      <a:pPr algn="ctr" fontAlgn="b"/>
+                      <a:r>
+                        <a:rPr lang="pt-BR" sz="1000" b="0" i="0" u="none" strike="noStrike">
+                          <a:solidFill>
+                            <a:srgbClr val="000000"/>
+                          </a:solidFill>
+                          <a:effectLst/>
+                          <a:latin typeface="Arial" panose="020B0604020202020204" pitchFamily="34" charset="0"/>
+                        </a:rPr>
+                        <a:t>G_SS</a:t>
+                      </a:r>
+                    </a:p>
+                  </a:txBody>
+                  <a:tcPr marL="9525" marR="9525" marT="9525" marB="0" anchor="ctr"/>
+                </a:tc>
+                <a:extLst>
+                  <a:ext uri="{0D108BD9-81ED-4DB2-BD59-A6C34878D82A}">
+                    <a16:rowId xmlns:a16="http://schemas.microsoft.com/office/drawing/2014/main" val="3666907379"/>
+                  </a:ext>
+                </a:extLst>
+              </a:tr>
+              <a:tr h="279814">
+                <a:tc>
+                  <a:txBody>
+                    <a:bodyPr/>
+                    <a:lstStyle/>
+                    <a:p>
+                      <a:pPr algn="ctr" fontAlgn="b"/>
+                      <a:r>
+                        <a:rPr lang="pt-BR" sz="1000" b="0" i="0" u="none" strike="noStrike">
+                          <a:solidFill>
+                            <a:srgbClr val="000000"/>
+                          </a:solidFill>
+                          <a:effectLst/>
+                          <a:latin typeface="Arial" panose="020B0604020202020204" pitchFamily="34" charset="0"/>
+                        </a:rPr>
+                        <a:t>MDG-a_1_n500_m50</a:t>
+                      </a:r>
+                    </a:p>
+                  </a:txBody>
+                  <a:tcPr marL="9525" marR="9525" marT="9525" marB="0" anchor="ctr"/>
+                </a:tc>
+                <a:tc>
+                  <a:txBody>
+                    <a:bodyPr/>
+                    <a:lstStyle/>
+                    <a:p>
+                      <a:pPr algn="ctr" fontAlgn="b"/>
+                      <a:r>
+                        <a:rPr lang="pt-BR" sz="1100" b="0" i="0" u="none" strike="noStrike">
+                          <a:solidFill>
+                            <a:srgbClr val="000000"/>
+                          </a:solidFill>
+                          <a:effectLst/>
+                          <a:latin typeface="Calibri" panose="020F0502020204030204" pitchFamily="34" charset="0"/>
+                        </a:rPr>
+                        <a:t>6553</a:t>
+                      </a:r>
+                    </a:p>
+                  </a:txBody>
+                  <a:tcPr marL="9525" marR="9525" marT="9525" marB="0" anchor="ctr"/>
+                </a:tc>
+                <a:tc>
+                  <a:txBody>
+                    <a:bodyPr/>
+                    <a:lstStyle/>
+                    <a:p>
+                      <a:pPr algn="ctr" fontAlgn="b"/>
+                      <a:r>
+                        <a:rPr lang="pt-BR" sz="1000" b="0" i="0" u="none" strike="noStrike">
+                          <a:solidFill>
+                            <a:srgbClr val="000000"/>
+                          </a:solidFill>
+                          <a:effectLst/>
+                          <a:latin typeface="Arial" panose="020B0604020202020204" pitchFamily="34" charset="0"/>
+                        </a:rPr>
+                        <a:t>7833,83252</a:t>
+                      </a:r>
+                    </a:p>
+                  </a:txBody>
+                  <a:tcPr marL="9525" marR="9525" marT="9525" marB="0" anchor="ctr"/>
+                </a:tc>
+                <a:tc>
+                  <a:txBody>
+                    <a:bodyPr/>
+                    <a:lstStyle/>
+                    <a:p>
+                      <a:pPr algn="ctr" fontAlgn="b"/>
+                      <a:r>
+                        <a:rPr lang="pt-BR" sz="1000" b="0" i="0" u="none" strike="noStrike">
+                          <a:solidFill>
+                            <a:srgbClr val="000000"/>
+                          </a:solidFill>
+                          <a:effectLst/>
+                          <a:latin typeface="Arial" panose="020B0604020202020204" pitchFamily="34" charset="0"/>
+                        </a:rPr>
+                        <a:t>G_SS</a:t>
+                      </a:r>
+                    </a:p>
+                  </a:txBody>
+                  <a:tcPr marL="9525" marR="9525" marT="9525" marB="0" anchor="ctr"/>
+                </a:tc>
+                <a:extLst>
+                  <a:ext uri="{0D108BD9-81ED-4DB2-BD59-A6C34878D82A}">
+                    <a16:rowId xmlns:a16="http://schemas.microsoft.com/office/drawing/2014/main" val="3225856696"/>
+                  </a:ext>
+                </a:extLst>
+              </a:tr>
+              <a:tr h="279814">
+                <a:tc>
+                  <a:txBody>
+                    <a:bodyPr/>
+                    <a:lstStyle/>
+                    <a:p>
+                      <a:pPr algn="ctr" fontAlgn="b"/>
+                      <a:r>
+                        <a:rPr lang="pt-BR" sz="1000" b="0" i="0" u="none" strike="noStrike">
+                          <a:solidFill>
+                            <a:srgbClr val="000000"/>
+                          </a:solidFill>
+                          <a:effectLst/>
+                          <a:latin typeface="Arial" panose="020B0604020202020204" pitchFamily="34" charset="0"/>
+                        </a:rPr>
+                        <a:t>MDG-a_21_n2000_m200</a:t>
+                      </a:r>
+                    </a:p>
+                  </a:txBody>
+                  <a:tcPr marL="9525" marR="9525" marT="9525" marB="0" anchor="ctr"/>
+                </a:tc>
+                <a:tc>
+                  <a:txBody>
+                    <a:bodyPr/>
+                    <a:lstStyle/>
+                    <a:p>
+                      <a:pPr algn="ctr" fontAlgn="b"/>
+                      <a:r>
+                        <a:rPr lang="pt-BR" sz="1100" b="0" i="0" u="none" strike="noStrike">
+                          <a:solidFill>
+                            <a:srgbClr val="000000"/>
+                          </a:solidFill>
+                          <a:effectLst/>
+                          <a:latin typeface="Calibri" panose="020F0502020204030204" pitchFamily="34" charset="0"/>
+                        </a:rPr>
+                        <a:t>101341</a:t>
+                      </a:r>
+                    </a:p>
+                  </a:txBody>
+                  <a:tcPr marL="9525" marR="9525" marT="9525" marB="0" anchor="ctr"/>
+                </a:tc>
+                <a:tc>
+                  <a:txBody>
+                    <a:bodyPr/>
+                    <a:lstStyle/>
+                    <a:p>
+                      <a:pPr algn="ctr" fontAlgn="b"/>
+                      <a:r>
+                        <a:rPr lang="pt-BR" sz="1000" b="0" i="0" u="none" strike="noStrike">
+                          <a:solidFill>
+                            <a:srgbClr val="000000"/>
+                          </a:solidFill>
+                          <a:effectLst/>
+                          <a:latin typeface="Arial" panose="020B0604020202020204" pitchFamily="34" charset="0"/>
+                        </a:rPr>
+                        <a:t>114259</a:t>
+                      </a:r>
+                    </a:p>
+                  </a:txBody>
+                  <a:tcPr marL="9525" marR="9525" marT="9525" marB="0" anchor="ctr"/>
+                </a:tc>
+                <a:tc>
+                  <a:txBody>
+                    <a:bodyPr/>
+                    <a:lstStyle/>
+                    <a:p>
+                      <a:pPr algn="ctr" fontAlgn="b"/>
+                      <a:r>
+                        <a:rPr lang="pt-BR" sz="1000" b="0" i="0" u="none" strike="noStrike">
+                          <a:solidFill>
+                            <a:srgbClr val="000000"/>
+                          </a:solidFill>
+                          <a:effectLst/>
+                          <a:latin typeface="Arial" panose="020B0604020202020204" pitchFamily="34" charset="0"/>
+                        </a:rPr>
+                        <a:t>G_SS</a:t>
+                      </a:r>
+                    </a:p>
+                  </a:txBody>
+                  <a:tcPr marL="9525" marR="9525" marT="9525" marB="0" anchor="ctr"/>
+                </a:tc>
+                <a:extLst>
+                  <a:ext uri="{0D108BD9-81ED-4DB2-BD59-A6C34878D82A}">
+                    <a16:rowId xmlns:a16="http://schemas.microsoft.com/office/drawing/2014/main" val="1184646055"/>
+                  </a:ext>
+                </a:extLst>
+              </a:tr>
+              <a:tr h="279814">
+                <a:tc>
+                  <a:txBody>
+                    <a:bodyPr/>
+                    <a:lstStyle/>
+                    <a:p>
+                      <a:pPr algn="ctr" fontAlgn="b"/>
+                      <a:r>
+                        <a:rPr lang="pt-BR" sz="1000" b="0" i="0" u="none" strike="noStrike">
+                          <a:solidFill>
+                            <a:srgbClr val="000000"/>
+                          </a:solidFill>
+                          <a:effectLst/>
+                          <a:latin typeface="Arial" panose="020B0604020202020204" pitchFamily="34" charset="0"/>
+                        </a:rPr>
+                        <a:t>MDG-a_40_n2000_m200</a:t>
+                      </a:r>
+                    </a:p>
+                  </a:txBody>
+                  <a:tcPr marL="9525" marR="9525" marT="9525" marB="0" anchor="ctr"/>
+                </a:tc>
+                <a:tc>
+                  <a:txBody>
+                    <a:bodyPr/>
+                    <a:lstStyle/>
+                    <a:p>
+                      <a:pPr algn="ctr" fontAlgn="b"/>
+                      <a:r>
+                        <a:rPr lang="pt-BR" sz="1100" b="0" i="0" u="none" strike="noStrike">
+                          <a:solidFill>
+                            <a:srgbClr val="000000"/>
+                          </a:solidFill>
+                          <a:effectLst/>
+                          <a:latin typeface="Calibri" panose="020F0502020204030204" pitchFamily="34" charset="0"/>
+                        </a:rPr>
+                        <a:t>101333</a:t>
+                      </a:r>
+                    </a:p>
+                  </a:txBody>
+                  <a:tcPr marL="9525" marR="9525" marT="9525" marB="0" anchor="ctr"/>
+                </a:tc>
+                <a:tc>
+                  <a:txBody>
+                    <a:bodyPr/>
+                    <a:lstStyle/>
+                    <a:p>
+                      <a:pPr algn="ctr" fontAlgn="b"/>
+                      <a:r>
+                        <a:rPr lang="pt-BR" sz="1000" b="0" i="0" u="none" strike="noStrike">
+                          <a:solidFill>
+                            <a:srgbClr val="000000"/>
+                          </a:solidFill>
+                          <a:effectLst/>
+                          <a:latin typeface="Arial" panose="020B0604020202020204" pitchFamily="34" charset="0"/>
+                        </a:rPr>
+                        <a:t>114191</a:t>
+                      </a:r>
+                    </a:p>
+                  </a:txBody>
+                  <a:tcPr marL="9525" marR="9525" marT="9525" marB="0" anchor="ctr"/>
+                </a:tc>
+                <a:tc>
+                  <a:txBody>
+                    <a:bodyPr/>
+                    <a:lstStyle/>
+                    <a:p>
+                      <a:pPr algn="ctr" fontAlgn="b"/>
+                      <a:r>
+                        <a:rPr lang="pt-BR" sz="1000" b="0" i="0" u="none" strike="noStrike">
+                          <a:solidFill>
+                            <a:srgbClr val="000000"/>
+                          </a:solidFill>
+                          <a:effectLst/>
+                          <a:latin typeface="Arial" panose="020B0604020202020204" pitchFamily="34" charset="0"/>
+                        </a:rPr>
+                        <a:t>G_SS</a:t>
+                      </a:r>
+                    </a:p>
+                  </a:txBody>
+                  <a:tcPr marL="9525" marR="9525" marT="9525" marB="0" anchor="ctr"/>
+                </a:tc>
+                <a:extLst>
+                  <a:ext uri="{0D108BD9-81ED-4DB2-BD59-A6C34878D82A}">
+                    <a16:rowId xmlns:a16="http://schemas.microsoft.com/office/drawing/2014/main" val="3494002297"/>
+                  </a:ext>
+                </a:extLst>
+              </a:tr>
+              <a:tr h="279814">
+                <a:tc>
+                  <a:txBody>
+                    <a:bodyPr/>
+                    <a:lstStyle/>
+                    <a:p>
+                      <a:pPr algn="ctr" fontAlgn="b"/>
+                      <a:r>
+                        <a:rPr lang="pt-BR" sz="1000" b="0" i="0" u="none" strike="noStrike" dirty="0">
+                          <a:solidFill>
+                            <a:srgbClr val="000000"/>
+                          </a:solidFill>
+                          <a:effectLst/>
+                          <a:latin typeface="Arial" panose="020B0604020202020204" pitchFamily="34" charset="0"/>
+                        </a:rPr>
+                        <a:t>GKD-c_1_n500_m50</a:t>
+                      </a:r>
+                    </a:p>
+                  </a:txBody>
+                  <a:tcPr marL="9525" marR="9525" marT="9525" marB="0" anchor="ctr"/>
+                </a:tc>
+                <a:tc>
+                  <a:txBody>
+                    <a:bodyPr/>
+                    <a:lstStyle/>
+                    <a:p>
+                      <a:pPr algn="ctr" fontAlgn="b"/>
+                      <a:r>
+                        <a:rPr lang="pt-BR" sz="1100" b="0" i="0" u="none" strike="noStrike">
+                          <a:solidFill>
+                            <a:srgbClr val="000000"/>
+                          </a:solidFill>
+                          <a:effectLst/>
+                          <a:latin typeface="Calibri" panose="020F0502020204030204" pitchFamily="34" charset="0"/>
+                        </a:rPr>
+                        <a:t>17199</a:t>
+                      </a:r>
+                    </a:p>
+                  </a:txBody>
+                  <a:tcPr marL="9525" marR="9525" marT="9525" marB="0" anchor="ctr"/>
+                </a:tc>
+                <a:tc>
+                  <a:txBody>
+                    <a:bodyPr/>
+                    <a:lstStyle/>
+                    <a:p>
+                      <a:pPr algn="ctr" fontAlgn="b"/>
+                      <a:r>
+                        <a:rPr lang="pt-BR" sz="1000" b="0" i="0" u="none" strike="noStrike">
+                          <a:solidFill>
+                            <a:srgbClr val="000000"/>
+                          </a:solidFill>
+                          <a:effectLst/>
+                          <a:latin typeface="Arial" panose="020B0604020202020204" pitchFamily="34" charset="0"/>
+                        </a:rPr>
+                        <a:t>19485,1875</a:t>
+                      </a:r>
+                    </a:p>
+                  </a:txBody>
+                  <a:tcPr marL="9525" marR="9525" marT="9525" marB="0" anchor="ctr"/>
+                </a:tc>
+                <a:tc>
+                  <a:txBody>
+                    <a:bodyPr/>
+                    <a:lstStyle/>
+                    <a:p>
+                      <a:pPr algn="ctr" fontAlgn="b"/>
+                      <a:r>
+                        <a:rPr lang="pt-BR" sz="1000" b="0" i="0" u="none" strike="noStrike" dirty="0">
+                          <a:solidFill>
+                            <a:srgbClr val="000000"/>
+                          </a:solidFill>
+                          <a:effectLst/>
+                          <a:latin typeface="Arial" panose="020B0604020202020204" pitchFamily="34" charset="0"/>
+                        </a:rPr>
+                        <a:t>G_SS</a:t>
+                      </a:r>
+                    </a:p>
+                  </a:txBody>
+                  <a:tcPr marL="9525" marR="9525" marT="9525" marB="0" anchor="ctr"/>
+                </a:tc>
+                <a:extLst>
+                  <a:ext uri="{0D108BD9-81ED-4DB2-BD59-A6C34878D82A}">
+                    <a16:rowId xmlns:a16="http://schemas.microsoft.com/office/drawing/2014/main" val="1968305940"/>
+                  </a:ext>
+                </a:extLst>
+              </a:tr>
+            </a:tbl>
+          </a:graphicData>
+        </a:graphic>
+      </p:graphicFrame>
+    </p:spTree>
+    <p:extLst>
+      <p:ext uri="{BB962C8B-B14F-4D97-AF65-F5344CB8AC3E}">
+        <p14:creationId xmlns:p14="http://schemas.microsoft.com/office/powerpoint/2010/main" val="2109816979"/>
+      </p:ext>
+    </p:extLst>
+  </p:cSld>
+  <p:clrMapOvr>
+    <a:masterClrMapping/>
+  </p:clrMapOvr>
+</p:sld>
+</file>
+
+<file path=ppt/slides/slide13.xml><?xml version="1.0" encoding="utf-8"?>
+<p:sld xmlns:a="http://schemas.openxmlformats.org/drawingml/2006/main" xmlns:r="http://schemas.openxmlformats.org/officeDocument/2006/relationships" xmlns:p="http://schemas.openxmlformats.org/presentationml/2006/main">
+  <p:cSld>
+    <p:spTree>
+      <p:nvGrpSpPr>
+        <p:cNvPr id="1" name=""/>
+        <p:cNvGrpSpPr/>
+        <p:nvPr/>
+      </p:nvGrpSpPr>
+      <p:grpSpPr>
+        <a:xfrm>
+          <a:off x="0" y="0"/>
+          <a:ext cx="0" cy="0"/>
+          <a:chOff x="0" y="0"/>
+          <a:chExt cx="0" cy="0"/>
+        </a:xfrm>
+      </p:grpSpPr>
+      <p:sp>
+        <p:nvSpPr>
+          <p:cNvPr id="8" name="CaixaDeTexto 7"/>
+          <p:cNvSpPr txBox="1"/>
+          <p:nvPr/>
+        </p:nvSpPr>
+        <p:spPr>
+          <a:xfrm>
+            <a:off x="755576" y="1124744"/>
+            <a:ext cx="5904656" cy="2062103"/>
+          </a:xfrm>
+          <a:prstGeom prst="rect">
+            <a:avLst/>
+          </a:prstGeom>
+          <a:noFill/>
+        </p:spPr>
+        <p:txBody>
+          <a:bodyPr wrap="square" rtlCol="0">
+            <a:spAutoFit/>
+          </a:bodyPr>
+          <a:lstStyle/>
+          <a:p>
+            <a:r>
+              <a:rPr lang="pt-BR" sz="1600" dirty="0" err="1"/>
+              <a:t>Takane</a:t>
+            </a:r>
+            <a:r>
+              <a:rPr lang="pt-BR" sz="1600" dirty="0"/>
+              <a:t>, Bruno. "Um algoritmo exato para o problema da diversidade máxima." (2011).</a:t>
+            </a:r>
+            <a:endParaRPr lang="en-US" sz="1600" dirty="0">
+              <a:latin typeface="Verdana" panose="020B0604030504040204" pitchFamily="34" charset="0"/>
+              <a:ea typeface="Verdana" panose="020B0604030504040204" pitchFamily="34" charset="0"/>
+              <a:cs typeface="Verdana" panose="020B0604030504040204" pitchFamily="34" charset="0"/>
+            </a:endParaRPr>
+          </a:p>
+          <a:p>
+            <a:pPr marL="285750" indent="-285750">
+              <a:buFont typeface="Arial" panose="020B0604020202020204" pitchFamily="34" charset="0"/>
+              <a:buChar char="•"/>
+            </a:pPr>
+            <a:endParaRPr lang="en-US" sz="1600" b="1" dirty="0">
+              <a:latin typeface="Verdana" panose="020B0604030504040204" pitchFamily="34" charset="0"/>
+              <a:ea typeface="Verdana" panose="020B0604030504040204" pitchFamily="34" charset="0"/>
+              <a:cs typeface="Verdana" panose="020B0604030504040204" pitchFamily="34" charset="0"/>
+            </a:endParaRPr>
+          </a:p>
+          <a:p>
+            <a:pPr marL="285750" indent="-285750">
+              <a:buFont typeface="Arial" panose="020B0604020202020204" pitchFamily="34" charset="0"/>
+              <a:buChar char="•"/>
+            </a:pPr>
+            <a:endParaRPr lang="en-US" sz="1600" b="1" dirty="0">
+              <a:latin typeface="Verdana" panose="020B0604030504040204" pitchFamily="34" charset="0"/>
+              <a:ea typeface="Verdana" panose="020B0604030504040204" pitchFamily="34" charset="0"/>
+              <a:cs typeface="Verdana" panose="020B0604030504040204" pitchFamily="34" charset="0"/>
+            </a:endParaRPr>
+          </a:p>
+          <a:p>
+            <a:pPr marL="285750" indent="-285750">
+              <a:buFont typeface="Arial" panose="020B0604020202020204" pitchFamily="34" charset="0"/>
+              <a:buChar char="•"/>
+            </a:pPr>
+            <a:endParaRPr lang="en-US" sz="1600" b="1" dirty="0">
+              <a:latin typeface="Verdana" panose="020B0604030504040204" pitchFamily="34" charset="0"/>
+              <a:ea typeface="Verdana" panose="020B0604030504040204" pitchFamily="34" charset="0"/>
+              <a:cs typeface="Verdana" panose="020B0604030504040204" pitchFamily="34" charset="0"/>
+            </a:endParaRPr>
+          </a:p>
+          <a:p>
+            <a:pPr marL="285750" indent="-285750">
+              <a:buFont typeface="Arial" panose="020B0604020202020204" pitchFamily="34" charset="0"/>
+              <a:buChar char="•"/>
+            </a:pPr>
+            <a:endParaRPr lang="en-US" sz="1600" b="1" dirty="0">
+              <a:latin typeface="Verdana" panose="020B0604030504040204" pitchFamily="34" charset="0"/>
+              <a:ea typeface="Verdana" panose="020B0604030504040204" pitchFamily="34" charset="0"/>
+              <a:cs typeface="Verdana" panose="020B0604030504040204" pitchFamily="34" charset="0"/>
+            </a:endParaRPr>
+          </a:p>
+          <a:p>
+            <a:pPr marL="285750" indent="-285750">
+              <a:buFont typeface="Arial" panose="020B0604020202020204" pitchFamily="34" charset="0"/>
+              <a:buChar char="•"/>
+            </a:pPr>
+            <a:endParaRPr lang="en-US" sz="1600" b="1" dirty="0">
+              <a:latin typeface="Verdana" panose="020B0604030504040204" pitchFamily="34" charset="0"/>
+              <a:ea typeface="Verdana" panose="020B0604030504040204" pitchFamily="34" charset="0"/>
+              <a:cs typeface="Verdana" panose="020B0604030504040204" pitchFamily="34" charset="0"/>
+            </a:endParaRPr>
+          </a:p>
+          <a:p>
+            <a:pPr marL="285750" indent="-285750">
+              <a:buFont typeface="Arial" panose="020B0604020202020204" pitchFamily="34" charset="0"/>
+              <a:buChar char="•"/>
+            </a:pPr>
+            <a:endParaRPr lang="pt-BR" sz="1600" b="1" dirty="0">
+              <a:latin typeface="Verdana" panose="020B0604030504040204" pitchFamily="34" charset="0"/>
+              <a:ea typeface="Verdana" panose="020B0604030504040204" pitchFamily="34" charset="0"/>
+              <a:cs typeface="Verdana" panose="020B0604030504040204" pitchFamily="34" charset="0"/>
+            </a:endParaRPr>
+          </a:p>
+        </p:txBody>
+      </p:sp>
+      <p:pic>
+        <p:nvPicPr>
+          <p:cNvPr id="7" name="Imagem 6"/>
+          <p:cNvPicPr>
+            <a:picLocks noChangeAspect="1"/>
+          </p:cNvPicPr>
+          <p:nvPr/>
+        </p:nvPicPr>
+        <p:blipFill>
+          <a:blip r:embed="rId2" cstate="print">
+            <a:extLst>
+              <a:ext uri="{28A0092B-C50C-407E-A947-70E740481C1C}">
+                <a14:useLocalDpi xmlns:a14="http://schemas.microsoft.com/office/drawing/2010/main" val="0"/>
+              </a:ext>
+            </a:extLst>
+          </a:blip>
+          <a:stretch>
+            <a:fillRect/>
+          </a:stretch>
+        </p:blipFill>
+        <p:spPr>
+          <a:xfrm>
+            <a:off x="287015" y="6381328"/>
+            <a:ext cx="1672379" cy="291764"/>
+          </a:xfrm>
+          <a:prstGeom prst="rect">
+            <a:avLst/>
+          </a:prstGeom>
+        </p:spPr>
+      </p:pic>
+      <p:sp>
+        <p:nvSpPr>
+          <p:cNvPr id="9" name="CaixaDeTexto 8"/>
+          <p:cNvSpPr txBox="1"/>
+          <p:nvPr/>
+        </p:nvSpPr>
+        <p:spPr>
+          <a:xfrm>
+            <a:off x="393549" y="333523"/>
+            <a:ext cx="6192688" cy="646331"/>
+          </a:xfrm>
+          <a:prstGeom prst="rect">
+            <a:avLst/>
+          </a:prstGeom>
+          <a:noFill/>
+        </p:spPr>
+        <p:txBody>
+          <a:bodyPr wrap="square" rtlCol="0">
+            <a:spAutoFit/>
+          </a:bodyPr>
+          <a:lstStyle/>
+          <a:p>
+            <a:r>
+              <a:rPr lang="en-US" sz="3600" b="1" dirty="0" err="1">
+                <a:latin typeface="Verdana" panose="020B0604030504040204" pitchFamily="34" charset="0"/>
+                <a:ea typeface="Verdana" panose="020B0604030504040204" pitchFamily="34" charset="0"/>
+                <a:cs typeface="Verdana" panose="020B0604030504040204" pitchFamily="34" charset="0"/>
+              </a:rPr>
+              <a:t>Referências</a:t>
+            </a:r>
+            <a:endParaRPr lang="pt-BR" sz="3600" b="1" dirty="0">
+              <a:latin typeface="Verdana" panose="020B0604030504040204" pitchFamily="34" charset="0"/>
+              <a:ea typeface="Verdana" panose="020B0604030504040204" pitchFamily="34" charset="0"/>
+              <a:cs typeface="Verdana" panose="020B0604030504040204" pitchFamily="34" charset="0"/>
+            </a:endParaRPr>
+          </a:p>
+        </p:txBody>
+      </p:sp>
+      <p:sp>
+        <p:nvSpPr>
+          <p:cNvPr id="11" name="Retângulo 10"/>
+          <p:cNvSpPr/>
+          <p:nvPr/>
+        </p:nvSpPr>
+        <p:spPr>
+          <a:xfrm flipV="1">
+            <a:off x="-36512" y="476670"/>
+            <a:ext cx="323528" cy="360039"/>
+          </a:xfrm>
+          <a:prstGeom prst="rect">
+            <a:avLst/>
+          </a:prstGeom>
+          <a:solidFill>
+            <a:srgbClr val="149B55"/>
+          </a:solidFill>
+          <a:ln>
+            <a:noFill/>
+          </a:ln>
+        </p:spPr>
+        <p:style>
+          <a:lnRef idx="2">
+            <a:schemeClr val="accent1">
+              <a:shade val="50000"/>
+            </a:schemeClr>
+          </a:lnRef>
+          <a:fillRef idx="1">
+            <a:schemeClr val="accent1"/>
+          </a:fillRef>
+          <a:effectRef idx="0">
+            <a:schemeClr val="accent1"/>
+          </a:effectRef>
+          <a:fontRef idx="minor">
+            <a:schemeClr val="lt1"/>
+          </a:fontRef>
+        </p:style>
+        <p:txBody>
+          <a:bodyPr rtlCol="0" anchor="ctr"/>
+          <a:lstStyle/>
+          <a:p>
+            <a:pPr algn="ctr"/>
+            <a:endParaRPr lang="pt-BR" dirty="0"/>
+          </a:p>
+        </p:txBody>
+      </p:sp>
+    </p:spTree>
+    <p:extLst>
+      <p:ext uri="{BB962C8B-B14F-4D97-AF65-F5344CB8AC3E}">
         <p14:creationId xmlns:p14="http://schemas.microsoft.com/office/powerpoint/2010/main" val="3076226589"/>
       </p:ext>
     </p:extLst>
@@ -3974,7 +6299,7 @@
 </p:sld>
 </file>
 
-<file path=ppt/slides/slide11.xml><?xml version="1.0" encoding="utf-8"?>
+<file path=ppt/slides/slide14.xml><?xml version="1.0" encoding="utf-8"?>
 <p:sld xmlns:a="http://schemas.openxmlformats.org/drawingml/2006/main" xmlns:r="http://schemas.openxmlformats.org/officeDocument/2006/relationships" xmlns:p="http://schemas.openxmlformats.org/presentationml/2006/main">
   <p:cSld>
     <p:spTree>
@@ -4253,7 +6578,7 @@
               <a:buChar char="•"/>
             </a:pPr>
             <a:r>
-              <a:rPr lang="pt-BR" b="1" dirty="0" smtClean="0">
+              <a:rPr lang="pt-BR" b="1" dirty="0">
                 <a:latin typeface="Verdana" panose="020B0604030504040204" pitchFamily="34" charset="0"/>
                 <a:ea typeface="Verdana" panose="020B0604030504040204" pitchFamily="34" charset="0"/>
                 <a:cs typeface="Verdana" panose="020B0604030504040204" pitchFamily="34" charset="0"/>
@@ -4270,44 +6595,31 @@
           </a:p>
           <a:p>
             <a:r>
-              <a:rPr lang="pt-BR" b="1" dirty="0" smtClean="0">
+              <a:rPr lang="pt-BR" b="1" dirty="0">
                 <a:latin typeface="Verdana" panose="020B0604030504040204" pitchFamily="34" charset="0"/>
                 <a:ea typeface="Verdana" panose="020B0604030504040204" pitchFamily="34" charset="0"/>
                 <a:cs typeface="Verdana" panose="020B0604030504040204" pitchFamily="34" charset="0"/>
               </a:rPr>
               <a:t>	</a:t>
             </a:r>
-            <a:r>
-              <a:rPr lang="pt-BR" dirty="0" smtClean="0">
-                <a:latin typeface="+mj-lt"/>
-                <a:ea typeface="Verdana" panose="020B0604030504040204" pitchFamily="34" charset="0"/>
-                <a:cs typeface="Verdana" panose="020B0604030504040204" pitchFamily="34" charset="0"/>
-              </a:rPr>
-              <a:t>Selecionar um grupo de pessoas para participação de um júri em um tribunal.</a:t>
-            </a:r>
-          </a:p>
-          <a:p>
             <a:r>
               <a:rPr lang="pt-BR" dirty="0">
                 <a:latin typeface="+mj-lt"/>
                 <a:ea typeface="Verdana" panose="020B0604030504040204" pitchFamily="34" charset="0"/>
                 <a:cs typeface="Verdana" panose="020B0604030504040204" pitchFamily="34" charset="0"/>
               </a:rPr>
-              <a:t>	</a:t>
-            </a:r>
-            <a:r>
-              <a:rPr lang="pt-BR" dirty="0" smtClean="0">
+              <a:t>Selecionar um grupo de pessoas para participação de um júri em um tribunal.</a:t>
+            </a:r>
+          </a:p>
+          <a:p>
+            <a:r>
+              <a:rPr lang="pt-BR" dirty="0">
                 <a:latin typeface="+mj-lt"/>
                 <a:ea typeface="Verdana" panose="020B0604030504040204" pitchFamily="34" charset="0"/>
                 <a:cs typeface="Verdana" panose="020B0604030504040204" pitchFamily="34" charset="0"/>
               </a:rPr>
-              <a:t>Selecionar sementes com características genéticas diferentes para evitar doenças que acabem com a safra.</a:t>
-            </a:r>
-            <a:endParaRPr lang="pt-BR" dirty="0">
-              <a:latin typeface="+mj-lt"/>
-              <a:ea typeface="Verdana" panose="020B0604030504040204" pitchFamily="34" charset="0"/>
-              <a:cs typeface="Verdana" panose="020B0604030504040204" pitchFamily="34" charset="0"/>
-            </a:endParaRPr>
+              <a:t>	Selecionar sementes com características genéticas diferentes para evitar doenças que acabem com a safra.</a:t>
+            </a:r>
           </a:p>
           <a:p>
             <a:endParaRPr lang="pt-BR" sz="1700" dirty="0">
@@ -4611,7 +6923,7 @@
               <a:t>selecionados</a:t>
             </a:r>
             <a:r>
-              <a:rPr lang="en-US" sz="1600" dirty="0" smtClean="0">
+              <a:rPr lang="en-US" sz="1600" dirty="0">
                 <a:latin typeface="Verdana" panose="020B0604030504040204" pitchFamily="34" charset="0"/>
                 <a:ea typeface="Verdana" panose="020B0604030504040204" pitchFamily="34" charset="0"/>
                 <a:cs typeface="Verdana" panose="020B0604030504040204" pitchFamily="34" charset="0"/>
@@ -5105,7 +7417,7 @@
           <a:p>
             <a:pPr algn="ctr"/>
             <a:r>
-              <a:rPr lang="pt-BR" sz="3600" b="1" dirty="0" smtClean="0">
+              <a:rPr lang="pt-BR" sz="3600" b="1" dirty="0">
                 <a:latin typeface="Verdana" panose="020B0604030504040204" pitchFamily="34" charset="0"/>
                 <a:ea typeface="Verdana" panose="020B0604030504040204" pitchFamily="34" charset="0"/>
                 <a:cs typeface="Verdana" panose="020B0604030504040204" pitchFamily="34" charset="0"/>
@@ -5113,20 +7425,12 @@
               <a:t>O que é </a:t>
             </a:r>
             <a:r>
-              <a:rPr lang="pt-BR" sz="3600" b="1" smtClean="0">
-                <a:latin typeface="Verdana" panose="020B0604030504040204" pitchFamily="34" charset="0"/>
-                <a:ea typeface="Verdana" panose="020B0604030504040204" pitchFamily="34" charset="0"/>
-                <a:cs typeface="Verdana" panose="020B0604030504040204" pitchFamily="34" charset="0"/>
-              </a:rPr>
-              <a:t>essa</a:t>
-            </a:r>
-            <a:r>
-              <a:rPr lang="pt-BR" sz="3600" b="1" smtClean="0">
-                <a:latin typeface="Verdana" panose="020B0604030504040204" pitchFamily="34" charset="0"/>
-                <a:ea typeface="Verdana" panose="020B0604030504040204" pitchFamily="34" charset="0"/>
-                <a:cs typeface="Verdana" panose="020B0604030504040204" pitchFamily="34" charset="0"/>
-              </a:rPr>
-              <a:t> diferença?</a:t>
+              <a:rPr lang="pt-BR" sz="3600" b="1">
+                <a:latin typeface="Verdana" panose="020B0604030504040204" pitchFamily="34" charset="0"/>
+                <a:ea typeface="Verdana" panose="020B0604030504040204" pitchFamily="34" charset="0"/>
+                <a:cs typeface="Verdana" panose="020B0604030504040204" pitchFamily="34" charset="0"/>
+              </a:rPr>
+              <a:t>essa diferença?</a:t>
             </a:r>
             <a:endParaRPr lang="pt-BR" sz="3600" b="1" dirty="0">
               <a:latin typeface="Verdana" panose="020B0604030504040204" pitchFamily="34" charset="0"/>
@@ -5835,100 +8139,9 @@
           <a:chExt cx="0" cy="0"/>
         </a:xfrm>
       </p:grpSpPr>
-      <p:sp>
-        <p:nvSpPr>
-          <p:cNvPr id="8" name="CaixaDeTexto 7"/>
-          <p:cNvSpPr txBox="1"/>
-          <p:nvPr/>
-        </p:nvSpPr>
-        <p:spPr>
-          <a:xfrm>
-            <a:off x="971600" y="1700808"/>
-            <a:ext cx="5688632" cy="2308324"/>
-          </a:xfrm>
-          <a:prstGeom prst="rect">
-            <a:avLst/>
-          </a:prstGeom>
-          <a:noFill/>
-        </p:spPr>
-        <p:txBody>
-          <a:bodyPr wrap="square" rtlCol="0">
-            <a:spAutoFit/>
-          </a:bodyPr>
-          <a:lstStyle/>
-          <a:p>
-            <a:pPr marL="285750" indent="-285750">
-              <a:buFont typeface="Arial" panose="020B0604020202020204" pitchFamily="34" charset="0"/>
-              <a:buChar char="•"/>
-            </a:pPr>
-            <a:r>
-              <a:rPr lang="pt-BR" sz="1600" b="1" dirty="0">
-                <a:latin typeface="Verdana" panose="020B0604030504040204" pitchFamily="34" charset="0"/>
-                <a:ea typeface="Verdana" panose="020B0604030504040204" pitchFamily="34" charset="0"/>
-                <a:cs typeface="Verdana" panose="020B0604030504040204" pitchFamily="34" charset="0"/>
-              </a:rPr>
-              <a:t>Construção: </a:t>
-            </a:r>
-            <a:r>
-              <a:rPr lang="pt-BR" sz="1600" dirty="0">
-                <a:latin typeface="Verdana" panose="020B0604030504040204" pitchFamily="34" charset="0"/>
-                <a:ea typeface="Verdana" panose="020B0604030504040204" pitchFamily="34" charset="0"/>
-                <a:cs typeface="Verdana" panose="020B0604030504040204" pitchFamily="34" charset="0"/>
-              </a:rPr>
-              <a:t>Solução ao acaso, selecionando ou removendo elementos iterativamente.</a:t>
-            </a:r>
-          </a:p>
-          <a:p>
-            <a:endParaRPr lang="en-US" sz="1600" b="1" dirty="0">
-              <a:latin typeface="Verdana" panose="020B0604030504040204" pitchFamily="34" charset="0"/>
-              <a:ea typeface="Verdana" panose="020B0604030504040204" pitchFamily="34" charset="0"/>
-              <a:cs typeface="Verdana" panose="020B0604030504040204" pitchFamily="34" charset="0"/>
-            </a:endParaRPr>
-          </a:p>
-          <a:p>
-            <a:endParaRPr lang="pt-BR" sz="1600" b="1" dirty="0">
-              <a:latin typeface="Verdana" panose="020B0604030504040204" pitchFamily="34" charset="0"/>
-              <a:ea typeface="Verdana" panose="020B0604030504040204" pitchFamily="34" charset="0"/>
-              <a:cs typeface="Verdana" panose="020B0604030504040204" pitchFamily="34" charset="0"/>
-            </a:endParaRPr>
-          </a:p>
-          <a:p>
-            <a:pPr marL="285750" indent="-285750">
-              <a:buFont typeface="Arial" panose="020B0604020202020204" pitchFamily="34" charset="0"/>
-              <a:buChar char="•"/>
-            </a:pPr>
-            <a:r>
-              <a:rPr lang="pt-BR" sz="1600" b="1" dirty="0">
-                <a:latin typeface="Verdana" panose="020B0604030504040204" pitchFamily="34" charset="0"/>
-                <a:ea typeface="Verdana" panose="020B0604030504040204" pitchFamily="34" charset="0"/>
-                <a:cs typeface="Verdana" panose="020B0604030504040204" pitchFamily="34" charset="0"/>
-              </a:rPr>
-              <a:t>Melhoria:</a:t>
-            </a:r>
-            <a:r>
-              <a:rPr lang="pt-BR" sz="1600" dirty="0">
-                <a:latin typeface="Verdana" panose="020B0604030504040204" pitchFamily="34" charset="0"/>
-                <a:ea typeface="Verdana" panose="020B0604030504040204" pitchFamily="34" charset="0"/>
-                <a:cs typeface="Verdana" panose="020B0604030504040204" pitchFamily="34" charset="0"/>
-              </a:rPr>
-              <a:t> Iniciam por uma heurística de construção e iterativamente escolhem, usualmente, um elemento que incremente a solução.</a:t>
-            </a:r>
-          </a:p>
-          <a:p>
-            <a:r>
-              <a:rPr lang="pt-BR" sz="1600" dirty="0">
-                <a:latin typeface="Verdana" panose="020B0604030504040204" pitchFamily="34" charset="0"/>
-                <a:ea typeface="Verdana" panose="020B0604030504040204" pitchFamily="34" charset="0"/>
-                <a:cs typeface="Verdana" panose="020B0604030504040204" pitchFamily="34" charset="0"/>
-              </a:rPr>
-              <a:t> </a:t>
-            </a:r>
-          </a:p>
-        </p:txBody>
-      </p:sp>
       <p:pic>
         <p:nvPicPr>
-          <p:cNvPr id="7" name="Imagem 6"/>
+          <p:cNvPr id="8" name="Imagem 7"/>
           <p:cNvPicPr>
             <a:picLocks noChangeAspect="1"/>
           </p:cNvPicPr>
@@ -5958,14 +8171,14 @@
       </p:pic>
       <p:sp>
         <p:nvSpPr>
-          <p:cNvPr id="9" name="CaixaDeTexto 8"/>
+          <p:cNvPr id="7" name="CaixaDeTexto 6"/>
           <p:cNvSpPr txBox="1"/>
           <p:nvPr/>
         </p:nvSpPr>
         <p:spPr>
           <a:xfrm>
             <a:off x="393548" y="333523"/>
-            <a:ext cx="8066884" cy="646331"/>
+            <a:ext cx="7130779" cy="646331"/>
           </a:xfrm>
           <a:prstGeom prst="rect">
             <a:avLst/>
@@ -5979,24 +8192,19 @@
           <a:lstStyle/>
           <a:p>
             <a:r>
-              <a:rPr lang="en-US" sz="3600" b="1" dirty="0" err="1">
-                <a:latin typeface="Verdana" panose="020B0604030504040204" pitchFamily="34" charset="0"/>
-                <a:ea typeface="Verdana" panose="020B0604030504040204" pitchFamily="34" charset="0"/>
-                <a:cs typeface="Verdana" panose="020B0604030504040204" pitchFamily="34" charset="0"/>
-              </a:rPr>
-              <a:t>Heurísticas</a:t>
-            </a:r>
-            <a:endParaRPr lang="pt-BR" sz="3600" b="1" dirty="0">
-              <a:latin typeface="Verdana" panose="020B0604030504040204" pitchFamily="34" charset="0"/>
-              <a:ea typeface="Verdana" panose="020B0604030504040204" pitchFamily="34" charset="0"/>
-              <a:cs typeface="Verdana" panose="020B0604030504040204" pitchFamily="34" charset="0"/>
-            </a:endParaRPr>
-          </a:p>
-        </p:txBody>
-      </p:sp>
-      <p:sp>
-        <p:nvSpPr>
-          <p:cNvPr id="11" name="Retângulo 10"/>
+              <a:rPr lang="pt-BR" sz="3600" b="1" dirty="0">
+                <a:latin typeface="Verdana" panose="020B0604030504040204" pitchFamily="34" charset="0"/>
+                <a:ea typeface="Verdana" panose="020B0604030504040204" pitchFamily="34" charset="0"/>
+                <a:cs typeface="Verdana" panose="020B0604030504040204" pitchFamily="34" charset="0"/>
+              </a:rPr>
+              <a:t>Exemplo de Instância</a:t>
+            </a:r>
+          </a:p>
+        </p:txBody>
+      </p:sp>
+      <p:sp>
+        <p:nvSpPr>
+          <p:cNvPr id="10" name="Retângulo 9"/>
           <p:cNvSpPr/>
           <p:nvPr/>
         </p:nvSpPr>
@@ -6040,10 +8248,548 @@
           </a:p>
         </p:txBody>
       </p:sp>
+      <p:sp>
+        <p:nvSpPr>
+          <p:cNvPr id="12" name="CaixaDeTexto 11">
+            <a:extLst>
+              <a:ext uri="{FF2B5EF4-FFF2-40B4-BE49-F238E27FC236}">
+                <a16:creationId xmlns:a16="http://schemas.microsoft.com/office/drawing/2014/main" id="{B682B5CC-45F5-4A5D-A811-0BC35CA6628A}"/>
+              </a:ext>
+            </a:extLst>
+          </p:cNvPr>
+          <p:cNvSpPr txBox="1"/>
+          <p:nvPr/>
+        </p:nvSpPr>
+        <p:spPr>
+          <a:xfrm>
+            <a:off x="500080" y="940535"/>
+            <a:ext cx="7130779" cy="369332"/>
+          </a:xfrm>
+          <a:prstGeom prst="rect">
+            <a:avLst/>
+          </a:prstGeom>
+          <a:noFill/>
+        </p:spPr>
+        <p:txBody>
+          <a:bodyPr wrap="square" rtlCol="0">
+            <a:spAutoFit/>
+          </a:bodyPr>
+          <a:lstStyle/>
+          <a:p>
+            <a:r>
+              <a:rPr lang="en-US" dirty="0">
+                <a:latin typeface="Verdana" panose="020B0604030504040204" pitchFamily="34" charset="0"/>
+                <a:ea typeface="Verdana" panose="020B0604030504040204" pitchFamily="34" charset="0"/>
+                <a:cs typeface="Verdana" panose="020B0604030504040204" pitchFamily="34" charset="0"/>
+              </a:rPr>
+              <a:t>SOM-a_1_n25_m2</a:t>
+            </a:r>
+          </a:p>
+        </p:txBody>
+      </p:sp>
+      <p:sp>
+        <p:nvSpPr>
+          <p:cNvPr id="13" name="CaixaDeTexto 12">
+            <a:extLst>
+              <a:ext uri="{FF2B5EF4-FFF2-40B4-BE49-F238E27FC236}">
+                <a16:creationId xmlns:a16="http://schemas.microsoft.com/office/drawing/2014/main" id="{91F15B8E-5E10-4F8E-B147-9E03260413A7}"/>
+              </a:ext>
+            </a:extLst>
+          </p:cNvPr>
+          <p:cNvSpPr txBox="1"/>
+          <p:nvPr/>
+        </p:nvSpPr>
+        <p:spPr>
+          <a:xfrm>
+            <a:off x="1043608" y="1700809"/>
+            <a:ext cx="7200800" cy="4031873"/>
+          </a:xfrm>
+          <a:prstGeom prst="rect">
+            <a:avLst/>
+          </a:prstGeom>
+          <a:noFill/>
+        </p:spPr>
+        <p:txBody>
+          <a:bodyPr wrap="square" numCol="3" rtlCol="0">
+            <a:spAutoFit/>
+          </a:bodyPr>
+          <a:lstStyle/>
+          <a:p>
+            <a:r>
+              <a:rPr lang="pt-BR" sz="1600" dirty="0">
+                <a:latin typeface="Verdana" panose="020B0604030504040204" pitchFamily="34" charset="0"/>
+                <a:ea typeface="Verdana" panose="020B0604030504040204" pitchFamily="34" charset="0"/>
+                <a:cs typeface="Verdana" panose="020B0604030504040204" pitchFamily="34" charset="0"/>
+              </a:rPr>
+              <a:t>0 1 1.0</a:t>
+            </a:r>
+          </a:p>
+          <a:p>
+            <a:r>
+              <a:rPr lang="pt-BR" sz="1600" dirty="0">
+                <a:latin typeface="Verdana" panose="020B0604030504040204" pitchFamily="34" charset="0"/>
+                <a:ea typeface="Verdana" panose="020B0604030504040204" pitchFamily="34" charset="0"/>
+                <a:cs typeface="Verdana" panose="020B0604030504040204" pitchFamily="34" charset="0"/>
+              </a:rPr>
+              <a:t>0 2 1.0</a:t>
+            </a:r>
+          </a:p>
+          <a:p>
+            <a:r>
+              <a:rPr lang="pt-BR" sz="1600" dirty="0">
+                <a:latin typeface="Verdana" panose="020B0604030504040204" pitchFamily="34" charset="0"/>
+                <a:ea typeface="Verdana" panose="020B0604030504040204" pitchFamily="34" charset="0"/>
+                <a:cs typeface="Verdana" panose="020B0604030504040204" pitchFamily="34" charset="0"/>
+              </a:rPr>
+              <a:t>0 3 4.0</a:t>
+            </a:r>
+          </a:p>
+          <a:p>
+            <a:r>
+              <a:rPr lang="pt-BR" sz="1600" dirty="0">
+                <a:latin typeface="Verdana" panose="020B0604030504040204" pitchFamily="34" charset="0"/>
+                <a:ea typeface="Verdana" panose="020B0604030504040204" pitchFamily="34" charset="0"/>
+                <a:cs typeface="Verdana" panose="020B0604030504040204" pitchFamily="34" charset="0"/>
+              </a:rPr>
+              <a:t>0 4 0.0</a:t>
+            </a:r>
+          </a:p>
+          <a:p>
+            <a:r>
+              <a:rPr lang="pt-BR" sz="1600" dirty="0">
+                <a:latin typeface="Verdana" panose="020B0604030504040204" pitchFamily="34" charset="0"/>
+                <a:ea typeface="Verdana" panose="020B0604030504040204" pitchFamily="34" charset="0"/>
+                <a:cs typeface="Verdana" panose="020B0604030504040204" pitchFamily="34" charset="0"/>
+              </a:rPr>
+              <a:t>0 5 6.0</a:t>
+            </a:r>
+          </a:p>
+          <a:p>
+            <a:r>
+              <a:rPr lang="pt-BR" sz="1600" dirty="0">
+                <a:latin typeface="Verdana" panose="020B0604030504040204" pitchFamily="34" charset="0"/>
+                <a:ea typeface="Verdana" panose="020B0604030504040204" pitchFamily="34" charset="0"/>
+                <a:cs typeface="Verdana" panose="020B0604030504040204" pitchFamily="34" charset="0"/>
+              </a:rPr>
+              <a:t>0 6 1.0</a:t>
+            </a:r>
+          </a:p>
+          <a:p>
+            <a:r>
+              <a:rPr lang="pt-BR" sz="1600" dirty="0">
+                <a:latin typeface="Verdana" panose="020B0604030504040204" pitchFamily="34" charset="0"/>
+                <a:ea typeface="Verdana" panose="020B0604030504040204" pitchFamily="34" charset="0"/>
+                <a:cs typeface="Verdana" panose="020B0604030504040204" pitchFamily="34" charset="0"/>
+              </a:rPr>
+              <a:t>0 7 9.0</a:t>
+            </a:r>
+          </a:p>
+          <a:p>
+            <a:r>
+              <a:rPr lang="pt-BR" sz="1600" dirty="0">
+                <a:latin typeface="Verdana" panose="020B0604030504040204" pitchFamily="34" charset="0"/>
+                <a:ea typeface="Verdana" panose="020B0604030504040204" pitchFamily="34" charset="0"/>
+                <a:cs typeface="Verdana" panose="020B0604030504040204" pitchFamily="34" charset="0"/>
+              </a:rPr>
+              <a:t>0 8 7.0</a:t>
+            </a:r>
+          </a:p>
+          <a:p>
+            <a:r>
+              <a:rPr lang="pt-BR" sz="1600" dirty="0">
+                <a:latin typeface="Verdana" panose="020B0604030504040204" pitchFamily="34" charset="0"/>
+                <a:ea typeface="Verdana" panose="020B0604030504040204" pitchFamily="34" charset="0"/>
+                <a:cs typeface="Verdana" panose="020B0604030504040204" pitchFamily="34" charset="0"/>
+              </a:rPr>
+              <a:t>0 9 0.0</a:t>
+            </a:r>
+          </a:p>
+          <a:p>
+            <a:r>
+              <a:rPr lang="pt-BR" sz="1600" dirty="0">
+                <a:latin typeface="Verdana" panose="020B0604030504040204" pitchFamily="34" charset="0"/>
+                <a:ea typeface="Verdana" panose="020B0604030504040204" pitchFamily="34" charset="0"/>
+                <a:cs typeface="Verdana" panose="020B0604030504040204" pitchFamily="34" charset="0"/>
+              </a:rPr>
+              <a:t>0 10 8.0</a:t>
+            </a:r>
+          </a:p>
+          <a:p>
+            <a:r>
+              <a:rPr lang="pt-BR" sz="1600" dirty="0">
+                <a:latin typeface="Verdana" panose="020B0604030504040204" pitchFamily="34" charset="0"/>
+                <a:ea typeface="Verdana" panose="020B0604030504040204" pitchFamily="34" charset="0"/>
+                <a:cs typeface="Verdana" panose="020B0604030504040204" pitchFamily="34" charset="0"/>
+              </a:rPr>
+              <a:t>0 11 6.0</a:t>
+            </a:r>
+          </a:p>
+          <a:p>
+            <a:r>
+              <a:rPr lang="pt-BR" sz="1600" dirty="0">
+                <a:latin typeface="Verdana" panose="020B0604030504040204" pitchFamily="34" charset="0"/>
+                <a:ea typeface="Verdana" panose="020B0604030504040204" pitchFamily="34" charset="0"/>
+                <a:cs typeface="Verdana" panose="020B0604030504040204" pitchFamily="34" charset="0"/>
+              </a:rPr>
+              <a:t>0 12 5.0</a:t>
+            </a:r>
+          </a:p>
+          <a:p>
+            <a:r>
+              <a:rPr lang="pt-BR" sz="1600" dirty="0">
+                <a:latin typeface="Verdana" panose="020B0604030504040204" pitchFamily="34" charset="0"/>
+                <a:ea typeface="Verdana" panose="020B0604030504040204" pitchFamily="34" charset="0"/>
+                <a:cs typeface="Verdana" panose="020B0604030504040204" pitchFamily="34" charset="0"/>
+              </a:rPr>
+              <a:t>0 13 9.0</a:t>
+            </a:r>
+          </a:p>
+          <a:p>
+            <a:r>
+              <a:rPr lang="pt-BR" sz="1600" dirty="0">
+                <a:latin typeface="Verdana" panose="020B0604030504040204" pitchFamily="34" charset="0"/>
+                <a:ea typeface="Verdana" panose="020B0604030504040204" pitchFamily="34" charset="0"/>
+                <a:cs typeface="Verdana" panose="020B0604030504040204" pitchFamily="34" charset="0"/>
+              </a:rPr>
+              <a:t>0 14 8.0</a:t>
+            </a:r>
+          </a:p>
+          <a:p>
+            <a:r>
+              <a:rPr lang="pt-BR" sz="1600" dirty="0">
+                <a:latin typeface="Verdana" panose="020B0604030504040204" pitchFamily="34" charset="0"/>
+                <a:ea typeface="Verdana" panose="020B0604030504040204" pitchFamily="34" charset="0"/>
+                <a:cs typeface="Verdana" panose="020B0604030504040204" pitchFamily="34" charset="0"/>
+              </a:rPr>
+              <a:t>0 15 6.0</a:t>
+            </a:r>
+          </a:p>
+          <a:p>
+            <a:r>
+              <a:rPr lang="pt-BR" sz="1600" dirty="0">
+                <a:latin typeface="Verdana" panose="020B0604030504040204" pitchFamily="34" charset="0"/>
+                <a:ea typeface="Verdana" panose="020B0604030504040204" pitchFamily="34" charset="0"/>
+                <a:cs typeface="Verdana" panose="020B0604030504040204" pitchFamily="34" charset="0"/>
+              </a:rPr>
+              <a:t>0 16 0.0</a:t>
+            </a:r>
+          </a:p>
+          <a:p>
+            <a:r>
+              <a:rPr lang="pt-BR" sz="1600" dirty="0">
+                <a:latin typeface="Verdana" panose="020B0604030504040204" pitchFamily="34" charset="0"/>
+                <a:ea typeface="Verdana" panose="020B0604030504040204" pitchFamily="34" charset="0"/>
+                <a:cs typeface="Verdana" panose="020B0604030504040204" pitchFamily="34" charset="0"/>
+              </a:rPr>
+              <a:t>0 17 8.0</a:t>
+            </a:r>
+          </a:p>
+          <a:p>
+            <a:r>
+              <a:rPr lang="pt-BR" sz="1600" dirty="0">
+                <a:latin typeface="Verdana" panose="020B0604030504040204" pitchFamily="34" charset="0"/>
+                <a:ea typeface="Verdana" panose="020B0604030504040204" pitchFamily="34" charset="0"/>
+                <a:cs typeface="Verdana" panose="020B0604030504040204" pitchFamily="34" charset="0"/>
+              </a:rPr>
+              <a:t>0 18 3.0</a:t>
+            </a:r>
+          </a:p>
+          <a:p>
+            <a:r>
+              <a:rPr lang="pt-BR" sz="1600" dirty="0">
+                <a:latin typeface="Verdana" panose="020B0604030504040204" pitchFamily="34" charset="0"/>
+                <a:ea typeface="Verdana" panose="020B0604030504040204" pitchFamily="34" charset="0"/>
+                <a:cs typeface="Verdana" panose="020B0604030504040204" pitchFamily="34" charset="0"/>
+              </a:rPr>
+              <a:t>0 19 2.0</a:t>
+            </a:r>
+          </a:p>
+          <a:p>
+            <a:r>
+              <a:rPr lang="pt-BR" sz="1600" dirty="0">
+                <a:latin typeface="Verdana" panose="020B0604030504040204" pitchFamily="34" charset="0"/>
+                <a:ea typeface="Verdana" panose="020B0604030504040204" pitchFamily="34" charset="0"/>
+                <a:cs typeface="Verdana" panose="020B0604030504040204" pitchFamily="34" charset="0"/>
+              </a:rPr>
+              <a:t>0 20 9.0</a:t>
+            </a:r>
+          </a:p>
+          <a:p>
+            <a:r>
+              <a:rPr lang="pt-BR" sz="1600" dirty="0">
+                <a:latin typeface="Verdana" panose="020B0604030504040204" pitchFamily="34" charset="0"/>
+                <a:ea typeface="Verdana" panose="020B0604030504040204" pitchFamily="34" charset="0"/>
+                <a:cs typeface="Verdana" panose="020B0604030504040204" pitchFamily="34" charset="0"/>
+              </a:rPr>
+              <a:t>0 21 3.0</a:t>
+            </a:r>
+          </a:p>
+          <a:p>
+            <a:r>
+              <a:rPr lang="pt-BR" sz="1600" dirty="0">
+                <a:latin typeface="Verdana" panose="020B0604030504040204" pitchFamily="34" charset="0"/>
+                <a:ea typeface="Verdana" panose="020B0604030504040204" pitchFamily="34" charset="0"/>
+                <a:cs typeface="Verdana" panose="020B0604030504040204" pitchFamily="34" charset="0"/>
+              </a:rPr>
+              <a:t>0 22 6.0</a:t>
+            </a:r>
+          </a:p>
+          <a:p>
+            <a:r>
+              <a:rPr lang="pt-BR" sz="1600" dirty="0">
+                <a:latin typeface="Verdana" panose="020B0604030504040204" pitchFamily="34" charset="0"/>
+                <a:ea typeface="Verdana" panose="020B0604030504040204" pitchFamily="34" charset="0"/>
+                <a:cs typeface="Verdana" panose="020B0604030504040204" pitchFamily="34" charset="0"/>
+              </a:rPr>
+              <a:t>0 23 8.0</a:t>
+            </a:r>
+          </a:p>
+          <a:p>
+            <a:r>
+              <a:rPr lang="pt-BR" sz="1600" dirty="0">
+                <a:latin typeface="Verdana" panose="020B0604030504040204" pitchFamily="34" charset="0"/>
+                <a:ea typeface="Verdana" panose="020B0604030504040204" pitchFamily="34" charset="0"/>
+                <a:cs typeface="Verdana" panose="020B0604030504040204" pitchFamily="34" charset="0"/>
+              </a:rPr>
+              <a:t>0 24 7.0</a:t>
+            </a:r>
+          </a:p>
+          <a:p>
+            <a:r>
+              <a:rPr lang="pt-BR" sz="1600" dirty="0">
+                <a:latin typeface="Verdana" panose="020B0604030504040204" pitchFamily="34" charset="0"/>
+                <a:ea typeface="Verdana" panose="020B0604030504040204" pitchFamily="34" charset="0"/>
+                <a:cs typeface="Verdana" panose="020B0604030504040204" pitchFamily="34" charset="0"/>
+              </a:rPr>
+              <a:t>1 2 0.0</a:t>
+            </a:r>
+          </a:p>
+          <a:p>
+            <a:r>
+              <a:rPr lang="pt-BR" sz="1600" dirty="0">
+                <a:latin typeface="Verdana" panose="020B0604030504040204" pitchFamily="34" charset="0"/>
+                <a:ea typeface="Verdana" panose="020B0604030504040204" pitchFamily="34" charset="0"/>
+                <a:cs typeface="Verdana" panose="020B0604030504040204" pitchFamily="34" charset="0"/>
+              </a:rPr>
+              <a:t>1 3 5.0</a:t>
+            </a:r>
+          </a:p>
+          <a:p>
+            <a:r>
+              <a:rPr lang="pt-BR" sz="1600" dirty="0">
+                <a:latin typeface="Verdana" panose="020B0604030504040204" pitchFamily="34" charset="0"/>
+                <a:ea typeface="Verdana" panose="020B0604030504040204" pitchFamily="34" charset="0"/>
+                <a:cs typeface="Verdana" panose="020B0604030504040204" pitchFamily="34" charset="0"/>
+              </a:rPr>
+              <a:t>1 4 2.0</a:t>
+            </a:r>
+          </a:p>
+          <a:p>
+            <a:r>
+              <a:rPr lang="pt-BR" sz="1600" dirty="0">
+                <a:latin typeface="Verdana" panose="020B0604030504040204" pitchFamily="34" charset="0"/>
+                <a:ea typeface="Verdana" panose="020B0604030504040204" pitchFamily="34" charset="0"/>
+                <a:cs typeface="Verdana" panose="020B0604030504040204" pitchFamily="34" charset="0"/>
+              </a:rPr>
+              <a:t>1 5 6.0</a:t>
+            </a:r>
+          </a:p>
+          <a:p>
+            <a:r>
+              <a:rPr lang="pt-BR" sz="1600" dirty="0">
+                <a:latin typeface="Verdana" panose="020B0604030504040204" pitchFamily="34" charset="0"/>
+                <a:ea typeface="Verdana" panose="020B0604030504040204" pitchFamily="34" charset="0"/>
+                <a:cs typeface="Verdana" panose="020B0604030504040204" pitchFamily="34" charset="0"/>
+              </a:rPr>
+              <a:t>1 6 9.0</a:t>
+            </a:r>
+          </a:p>
+          <a:p>
+            <a:r>
+              <a:rPr lang="pt-BR" sz="1600" dirty="0">
+                <a:latin typeface="Verdana" panose="020B0604030504040204" pitchFamily="34" charset="0"/>
+                <a:ea typeface="Verdana" panose="020B0604030504040204" pitchFamily="34" charset="0"/>
+                <a:cs typeface="Verdana" panose="020B0604030504040204" pitchFamily="34" charset="0"/>
+              </a:rPr>
+              <a:t>1 7 2.0</a:t>
+            </a:r>
+          </a:p>
+          <a:p>
+            <a:r>
+              <a:rPr lang="pt-BR" sz="1600" dirty="0">
+                <a:latin typeface="Verdana" panose="020B0604030504040204" pitchFamily="34" charset="0"/>
+                <a:ea typeface="Verdana" panose="020B0604030504040204" pitchFamily="34" charset="0"/>
+                <a:cs typeface="Verdana" panose="020B0604030504040204" pitchFamily="34" charset="0"/>
+              </a:rPr>
+              <a:t>1 8 6.0</a:t>
+            </a:r>
+          </a:p>
+          <a:p>
+            <a:r>
+              <a:rPr lang="pt-BR" sz="1600" dirty="0">
+                <a:latin typeface="Verdana" panose="020B0604030504040204" pitchFamily="34" charset="0"/>
+                <a:ea typeface="Verdana" panose="020B0604030504040204" pitchFamily="34" charset="0"/>
+                <a:cs typeface="Verdana" panose="020B0604030504040204" pitchFamily="34" charset="0"/>
+              </a:rPr>
+              <a:t>1 9 4.0</a:t>
+            </a:r>
+          </a:p>
+          <a:p>
+            <a:r>
+              <a:rPr lang="pt-BR" sz="1600" dirty="0">
+                <a:latin typeface="Verdana" panose="020B0604030504040204" pitchFamily="34" charset="0"/>
+                <a:ea typeface="Verdana" panose="020B0604030504040204" pitchFamily="34" charset="0"/>
+                <a:cs typeface="Verdana" panose="020B0604030504040204" pitchFamily="34" charset="0"/>
+              </a:rPr>
+              <a:t>1 10 7.0</a:t>
+            </a:r>
+          </a:p>
+          <a:p>
+            <a:r>
+              <a:rPr lang="pt-BR" sz="1600" dirty="0">
+                <a:latin typeface="Verdana" panose="020B0604030504040204" pitchFamily="34" charset="0"/>
+                <a:ea typeface="Verdana" panose="020B0604030504040204" pitchFamily="34" charset="0"/>
+                <a:cs typeface="Verdana" panose="020B0604030504040204" pitchFamily="34" charset="0"/>
+              </a:rPr>
+              <a:t>1 11 7.0</a:t>
+            </a:r>
+          </a:p>
+          <a:p>
+            <a:r>
+              <a:rPr lang="pt-BR" sz="1600" dirty="0">
+                <a:latin typeface="Verdana" panose="020B0604030504040204" pitchFamily="34" charset="0"/>
+                <a:ea typeface="Verdana" panose="020B0604030504040204" pitchFamily="34" charset="0"/>
+                <a:cs typeface="Verdana" panose="020B0604030504040204" pitchFamily="34" charset="0"/>
+              </a:rPr>
+              <a:t>1 12 4.0</a:t>
+            </a:r>
+          </a:p>
+          <a:p>
+            <a:r>
+              <a:rPr lang="pt-BR" sz="1600" dirty="0">
+                <a:latin typeface="Verdana" panose="020B0604030504040204" pitchFamily="34" charset="0"/>
+                <a:ea typeface="Verdana" panose="020B0604030504040204" pitchFamily="34" charset="0"/>
+                <a:cs typeface="Verdana" panose="020B0604030504040204" pitchFamily="34" charset="0"/>
+              </a:rPr>
+              <a:t>1 13 5.0</a:t>
+            </a:r>
+          </a:p>
+          <a:p>
+            <a:r>
+              <a:rPr lang="pt-BR" sz="1600" dirty="0">
+                <a:latin typeface="Verdana" panose="020B0604030504040204" pitchFamily="34" charset="0"/>
+                <a:ea typeface="Verdana" panose="020B0604030504040204" pitchFamily="34" charset="0"/>
+                <a:cs typeface="Verdana" panose="020B0604030504040204" pitchFamily="34" charset="0"/>
+              </a:rPr>
+              <a:t>1 14 5.0</a:t>
+            </a:r>
+          </a:p>
+          <a:p>
+            <a:r>
+              <a:rPr lang="pt-BR" sz="1600" dirty="0">
+                <a:latin typeface="Verdana" panose="020B0604030504040204" pitchFamily="34" charset="0"/>
+                <a:ea typeface="Verdana" panose="020B0604030504040204" pitchFamily="34" charset="0"/>
+                <a:cs typeface="Verdana" panose="020B0604030504040204" pitchFamily="34" charset="0"/>
+              </a:rPr>
+              <a:t>1 15 5.0</a:t>
+            </a:r>
+          </a:p>
+          <a:p>
+            <a:r>
+              <a:rPr lang="pt-BR" sz="1600" dirty="0">
+                <a:latin typeface="Verdana" panose="020B0604030504040204" pitchFamily="34" charset="0"/>
+                <a:ea typeface="Verdana" panose="020B0604030504040204" pitchFamily="34" charset="0"/>
+                <a:cs typeface="Verdana" panose="020B0604030504040204" pitchFamily="34" charset="0"/>
+              </a:rPr>
+              <a:t>1 16 3.0</a:t>
+            </a:r>
+          </a:p>
+          <a:p>
+            <a:r>
+              <a:rPr lang="pt-BR" sz="1600" dirty="0">
+                <a:latin typeface="Verdana" panose="020B0604030504040204" pitchFamily="34" charset="0"/>
+                <a:ea typeface="Verdana" panose="020B0604030504040204" pitchFamily="34" charset="0"/>
+                <a:cs typeface="Verdana" panose="020B0604030504040204" pitchFamily="34" charset="0"/>
+              </a:rPr>
+              <a:t>1 17 0.0</a:t>
+            </a:r>
+          </a:p>
+          <a:p>
+            <a:r>
+              <a:rPr lang="pt-BR" sz="1600" dirty="0">
+                <a:latin typeface="Verdana" panose="020B0604030504040204" pitchFamily="34" charset="0"/>
+                <a:ea typeface="Verdana" panose="020B0604030504040204" pitchFamily="34" charset="0"/>
+                <a:cs typeface="Verdana" panose="020B0604030504040204" pitchFamily="34" charset="0"/>
+              </a:rPr>
+              <a:t>1 18 1.0</a:t>
+            </a:r>
+          </a:p>
+          <a:p>
+            <a:r>
+              <a:rPr lang="pt-BR" sz="1600" dirty="0">
+                <a:latin typeface="Verdana" panose="020B0604030504040204" pitchFamily="34" charset="0"/>
+                <a:ea typeface="Verdana" panose="020B0604030504040204" pitchFamily="34" charset="0"/>
+                <a:cs typeface="Verdana" panose="020B0604030504040204" pitchFamily="34" charset="0"/>
+              </a:rPr>
+              <a:t>1 19 8.0</a:t>
+            </a:r>
+          </a:p>
+          <a:p>
+            <a:r>
+              <a:rPr lang="pt-BR" sz="1600" dirty="0">
+                <a:latin typeface="Verdana" panose="020B0604030504040204" pitchFamily="34" charset="0"/>
+                <a:ea typeface="Verdana" panose="020B0604030504040204" pitchFamily="34" charset="0"/>
+                <a:cs typeface="Verdana" panose="020B0604030504040204" pitchFamily="34" charset="0"/>
+              </a:rPr>
+              <a:t>1 20 6.0</a:t>
+            </a:r>
+          </a:p>
+          <a:p>
+            <a:r>
+              <a:rPr lang="pt-BR" sz="1600" dirty="0">
+                <a:latin typeface="Verdana" panose="020B0604030504040204" pitchFamily="34" charset="0"/>
+                <a:ea typeface="Verdana" panose="020B0604030504040204" pitchFamily="34" charset="0"/>
+                <a:cs typeface="Verdana" panose="020B0604030504040204" pitchFamily="34" charset="0"/>
+              </a:rPr>
+              <a:t>1 21 7.0</a:t>
+            </a:r>
+          </a:p>
+          <a:p>
+            <a:r>
+              <a:rPr lang="pt-BR" sz="1600" dirty="0">
+                <a:latin typeface="Verdana" panose="020B0604030504040204" pitchFamily="34" charset="0"/>
+                <a:ea typeface="Verdana" panose="020B0604030504040204" pitchFamily="34" charset="0"/>
+                <a:cs typeface="Verdana" panose="020B0604030504040204" pitchFamily="34" charset="0"/>
+              </a:rPr>
+              <a:t>1 22 9.0</a:t>
+            </a:r>
+          </a:p>
+          <a:p>
+            <a:r>
+              <a:rPr lang="pt-BR" sz="1600" dirty="0">
+                <a:latin typeface="Verdana" panose="020B0604030504040204" pitchFamily="34" charset="0"/>
+                <a:ea typeface="Verdana" panose="020B0604030504040204" pitchFamily="34" charset="0"/>
+                <a:cs typeface="Verdana" panose="020B0604030504040204" pitchFamily="34" charset="0"/>
+              </a:rPr>
+              <a:t>1 23 6.0</a:t>
+            </a:r>
+          </a:p>
+          <a:p>
+            <a:r>
+              <a:rPr lang="pt-BR" sz="1600" dirty="0">
+                <a:latin typeface="Verdana" panose="020B0604030504040204" pitchFamily="34" charset="0"/>
+                <a:ea typeface="Verdana" panose="020B0604030504040204" pitchFamily="34" charset="0"/>
+                <a:cs typeface="Verdana" panose="020B0604030504040204" pitchFamily="34" charset="0"/>
+              </a:rPr>
+              <a:t>1 24 9.0</a:t>
+            </a:r>
+          </a:p>
+        </p:txBody>
+      </p:sp>
     </p:spTree>
     <p:extLst>
       <p:ext uri="{BB962C8B-B14F-4D97-AF65-F5344CB8AC3E}">
-        <p14:creationId xmlns:p14="http://schemas.microsoft.com/office/powerpoint/2010/main" val="3232817111"/>
+        <p14:creationId xmlns:p14="http://schemas.microsoft.com/office/powerpoint/2010/main" val="1307030985"/>
       </p:ext>
     </p:extLst>
   </p:cSld>
@@ -6079,7 +8825,7 @@
         <p:spPr>
           <a:xfrm>
             <a:off x="971600" y="1700808"/>
-            <a:ext cx="5688632" cy="1569660"/>
+            <a:ext cx="5688632" cy="2308324"/>
           </a:xfrm>
           <a:prstGeom prst="rect">
             <a:avLst/>
@@ -6102,7 +8848,7 @@
                 <a:ea typeface="Verdana" panose="020B0604030504040204" pitchFamily="34" charset="0"/>
                 <a:cs typeface="Verdana" panose="020B0604030504040204" pitchFamily="34" charset="0"/>
               </a:rPr>
-              <a:t>Objetivo: </a:t>
+              <a:t>Construção: </a:t>
             </a:r>
             <a:r>
               <a:rPr lang="pt-BR" sz="1600" dirty="0">
@@ -6110,43 +8856,35 @@
                 <a:ea typeface="Verdana" panose="020B0604030504040204" pitchFamily="34" charset="0"/>
                 <a:cs typeface="Verdana" panose="020B0604030504040204" pitchFamily="34" charset="0"/>
               </a:rPr>
-              <a:t>obter resultados melhores que as heurísticas tradicionais.</a:t>
-            </a:r>
+              <a:t>Solução ao acaso, selecionando ou removendo elementos iterativamente.</a:t>
+            </a:r>
+          </a:p>
+          <a:p>
+            <a:endParaRPr lang="en-US" sz="1600" b="1" dirty="0">
+              <a:latin typeface="Verdana" panose="020B0604030504040204" pitchFamily="34" charset="0"/>
+              <a:ea typeface="Verdana" panose="020B0604030504040204" pitchFamily="34" charset="0"/>
+              <a:cs typeface="Verdana" panose="020B0604030504040204" pitchFamily="34" charset="0"/>
+            </a:endParaRPr>
+          </a:p>
+          <a:p>
+            <a:endParaRPr lang="pt-BR" sz="1600" b="1" dirty="0">
+              <a:latin typeface="Verdana" panose="020B0604030504040204" pitchFamily="34" charset="0"/>
+              <a:ea typeface="Verdana" panose="020B0604030504040204" pitchFamily="34" charset="0"/>
+              <a:cs typeface="Verdana" panose="020B0604030504040204" pitchFamily="34" charset="0"/>
+            </a:endParaRPr>
           </a:p>
           <a:p>
             <a:pPr marL="285750" indent="-285750">
               <a:buFont typeface="Arial" panose="020B0604020202020204" pitchFamily="34" charset="0"/>
               <a:buChar char="•"/>
             </a:pPr>
-            <a:endParaRPr lang="pt-BR" sz="1600" dirty="0">
-              <a:latin typeface="Verdana" panose="020B0604030504040204" pitchFamily="34" charset="0"/>
-              <a:ea typeface="Verdana" panose="020B0604030504040204" pitchFamily="34" charset="0"/>
-              <a:cs typeface="Verdana" panose="020B0604030504040204" pitchFamily="34" charset="0"/>
-            </a:endParaRPr>
-          </a:p>
-          <a:p>
-            <a:pPr marL="285750" indent="-285750">
-              <a:buFont typeface="Arial" panose="020B0604020202020204" pitchFamily="34" charset="0"/>
-              <a:buChar char="•"/>
-            </a:pPr>
-            <a:endParaRPr lang="pt-BR" sz="1600" dirty="0">
-              <a:latin typeface="Verdana" panose="020B0604030504040204" pitchFamily="34" charset="0"/>
-              <a:ea typeface="Verdana" panose="020B0604030504040204" pitchFamily="34" charset="0"/>
-              <a:cs typeface="Verdana" panose="020B0604030504040204" pitchFamily="34" charset="0"/>
-            </a:endParaRPr>
-          </a:p>
-          <a:p>
-            <a:pPr marL="285750" indent="-285750">
-              <a:buFont typeface="Arial" panose="020B0604020202020204" pitchFamily="34" charset="0"/>
-              <a:buChar char="•"/>
-            </a:pPr>
             <a:r>
               <a:rPr lang="pt-BR" sz="1600" b="1" dirty="0">
                 <a:latin typeface="Verdana" panose="020B0604030504040204" pitchFamily="34" charset="0"/>
                 <a:ea typeface="Verdana" panose="020B0604030504040204" pitchFamily="34" charset="0"/>
                 <a:cs typeface="Verdana" panose="020B0604030504040204" pitchFamily="34" charset="0"/>
               </a:rPr>
-              <a:t>Enfrentando problema de otimização: </a:t>
+              <a:t>Melhoria:</a:t>
             </a:r>
             <a:r>
               <a:rPr lang="pt-BR" sz="1600" dirty="0">
@@ -6154,7 +8892,17 @@
                 <a:ea typeface="Verdana" panose="020B0604030504040204" pitchFamily="34" charset="0"/>
                 <a:cs typeface="Verdana" panose="020B0604030504040204" pitchFamily="34" charset="0"/>
               </a:rPr>
-              <a:t>soluções aproximadas.	 </a:t>
+              <a:t> Iniciam por uma heurística de construção e iterativamente escolhem, usualmente, um elemento que incremente a solução.</a:t>
+            </a:r>
+          </a:p>
+          <a:p>
+            <a:r>
+              <a:rPr lang="pt-BR" sz="1600" dirty="0">
+                <a:latin typeface="Verdana" panose="020B0604030504040204" pitchFamily="34" charset="0"/>
+                <a:ea typeface="Verdana" panose="020B0604030504040204" pitchFamily="34" charset="0"/>
+                <a:cs typeface="Verdana" panose="020B0604030504040204" pitchFamily="34" charset="0"/>
+              </a:rPr>
+              <a:t> </a:t>
             </a:r>
           </a:p>
         </p:txBody>
@@ -6217,7 +8965,7 @@
                 <a:ea typeface="Verdana" panose="020B0604030504040204" pitchFamily="34" charset="0"/>
                 <a:cs typeface="Verdana" panose="020B0604030504040204" pitchFamily="34" charset="0"/>
               </a:rPr>
-              <a:t>Metaheurísticas</a:t>
+              <a:t>Heurísticas</a:t>
             </a:r>
             <a:endParaRPr lang="pt-BR" sz="3600" b="1" dirty="0">
               <a:latin typeface="Verdana" panose="020B0604030504040204" pitchFamily="34" charset="0"/>
@@ -6276,7 +9024,7 @@
     </p:spTree>
     <p:extLst>
       <p:ext uri="{BB962C8B-B14F-4D97-AF65-F5344CB8AC3E}">
-        <p14:creationId xmlns:p14="http://schemas.microsoft.com/office/powerpoint/2010/main" val="842391489"/>
+        <p14:creationId xmlns:p14="http://schemas.microsoft.com/office/powerpoint/2010/main" val="3232817111"/>
       </p:ext>
     </p:extLst>
   </p:cSld>
@@ -6312,7 +9060,7 @@
         <p:spPr>
           <a:xfrm>
             <a:off x="971600" y="1700808"/>
-            <a:ext cx="5688632" cy="3785652"/>
+            <a:ext cx="5688632" cy="1569660"/>
           </a:xfrm>
           <a:prstGeom prst="rect">
             <a:avLst/>
@@ -6330,12 +9078,20 @@
               <a:buChar char="•"/>
             </a:pPr>
             <a:r>
-              <a:rPr lang="en-US" sz="1600" b="1" dirty="0">
-                <a:latin typeface="Verdana" panose="020B0604030504040204" pitchFamily="34" charset="0"/>
-                <a:ea typeface="Verdana" panose="020B0604030504040204" pitchFamily="34" charset="0"/>
-                <a:cs typeface="Verdana" panose="020B0604030504040204" pitchFamily="34" charset="0"/>
-              </a:rPr>
-              <a:t>A</a:t>
+              <a:rPr lang="pt-BR" sz="1600" b="1" dirty="0">
+                <a:latin typeface="Verdana" panose="020B0604030504040204" pitchFamily="34" charset="0"/>
+                <a:ea typeface="Verdana" panose="020B0604030504040204" pitchFamily="34" charset="0"/>
+                <a:cs typeface="Verdana" panose="020B0604030504040204" pitchFamily="34" charset="0"/>
+              </a:rPr>
+              <a:t>Objetivo: </a:t>
+            </a:r>
+            <a:r>
+              <a:rPr lang="pt-BR" sz="1600" dirty="0">
+                <a:latin typeface="Verdana" panose="020B0604030504040204" pitchFamily="34" charset="0"/>
+                <a:ea typeface="Verdana" panose="020B0604030504040204" pitchFamily="34" charset="0"/>
+                <a:cs typeface="Verdana" panose="020B0604030504040204" pitchFamily="34" charset="0"/>
+              </a:rPr>
+              <a:t>obter resultados melhores que as heurísticas tradicionais.</a:t>
             </a:r>
           </a:p>
           <a:p>
@@ -6343,7 +9099,7 @@
               <a:buFont typeface="Arial" panose="020B0604020202020204" pitchFamily="34" charset="0"/>
               <a:buChar char="•"/>
             </a:pPr>
-            <a:endParaRPr lang="en-US" sz="1600" b="1" dirty="0">
+            <a:endParaRPr lang="pt-BR" sz="1600" dirty="0">
               <a:latin typeface="Verdana" panose="020B0604030504040204" pitchFamily="34" charset="0"/>
               <a:ea typeface="Verdana" panose="020B0604030504040204" pitchFamily="34" charset="0"/>
               <a:cs typeface="Verdana" panose="020B0604030504040204" pitchFamily="34" charset="0"/>
@@ -6354,160 +9110,33 @@
               <a:buFont typeface="Arial" panose="020B0604020202020204" pitchFamily="34" charset="0"/>
               <a:buChar char="•"/>
             </a:pPr>
-            <a:r>
-              <a:rPr lang="en-US" sz="1600" b="1" dirty="0">
-                <a:latin typeface="Verdana" panose="020B0604030504040204" pitchFamily="34" charset="0"/>
-                <a:ea typeface="Verdana" panose="020B0604030504040204" pitchFamily="34" charset="0"/>
-                <a:cs typeface="Verdana" panose="020B0604030504040204" pitchFamily="34" charset="0"/>
-              </a:rPr>
-              <a:t>B</a:t>
-            </a:r>
+            <a:endParaRPr lang="pt-BR" sz="1600" dirty="0">
+              <a:latin typeface="Verdana" panose="020B0604030504040204" pitchFamily="34" charset="0"/>
+              <a:ea typeface="Verdana" panose="020B0604030504040204" pitchFamily="34" charset="0"/>
+              <a:cs typeface="Verdana" panose="020B0604030504040204" pitchFamily="34" charset="0"/>
+            </a:endParaRPr>
           </a:p>
           <a:p>
             <a:pPr marL="285750" indent="-285750">
               <a:buFont typeface="Arial" panose="020B0604020202020204" pitchFamily="34" charset="0"/>
               <a:buChar char="•"/>
             </a:pPr>
-            <a:endParaRPr lang="en-US" sz="1600" b="1" dirty="0">
-              <a:latin typeface="Verdana" panose="020B0604030504040204" pitchFamily="34" charset="0"/>
-              <a:ea typeface="Verdana" panose="020B0604030504040204" pitchFamily="34" charset="0"/>
-              <a:cs typeface="Verdana" panose="020B0604030504040204" pitchFamily="34" charset="0"/>
-            </a:endParaRPr>
-          </a:p>
-          <a:p>
-            <a:pPr marL="285750" indent="-285750">
-              <a:buFont typeface="Arial" panose="020B0604020202020204" pitchFamily="34" charset="0"/>
-              <a:buChar char="•"/>
-            </a:pPr>
-            <a:r>
-              <a:rPr lang="en-US" sz="1600" b="1" dirty="0">
-                <a:latin typeface="Verdana" panose="020B0604030504040204" pitchFamily="34" charset="0"/>
-                <a:ea typeface="Verdana" panose="020B0604030504040204" pitchFamily="34" charset="0"/>
-                <a:cs typeface="Verdana" panose="020B0604030504040204" pitchFamily="34" charset="0"/>
-              </a:rPr>
-              <a:t>C</a:t>
-            </a:r>
-          </a:p>
-          <a:p>
-            <a:pPr marL="285750" indent="-285750">
-              <a:buFont typeface="Arial" panose="020B0604020202020204" pitchFamily="34" charset="0"/>
-              <a:buChar char="•"/>
-            </a:pPr>
-            <a:endParaRPr lang="en-US" sz="1600" b="1" dirty="0">
-              <a:latin typeface="Verdana" panose="020B0604030504040204" pitchFamily="34" charset="0"/>
-              <a:ea typeface="Verdana" panose="020B0604030504040204" pitchFamily="34" charset="0"/>
-              <a:cs typeface="Verdana" panose="020B0604030504040204" pitchFamily="34" charset="0"/>
-            </a:endParaRPr>
-          </a:p>
-          <a:p>
-            <a:pPr marL="285750" indent="-285750">
-              <a:buFont typeface="Arial" panose="020B0604020202020204" pitchFamily="34" charset="0"/>
-              <a:buChar char="•"/>
-            </a:pPr>
-            <a:r>
-              <a:rPr lang="en-US" sz="1600" b="1" dirty="0">
-                <a:latin typeface="Verdana" panose="020B0604030504040204" pitchFamily="34" charset="0"/>
-                <a:ea typeface="Verdana" panose="020B0604030504040204" pitchFamily="34" charset="0"/>
-                <a:cs typeface="Verdana" panose="020B0604030504040204" pitchFamily="34" charset="0"/>
-              </a:rPr>
-              <a:t>D</a:t>
-            </a:r>
-          </a:p>
-          <a:p>
-            <a:pPr marL="285750" indent="-285750">
-              <a:buFont typeface="Arial" panose="020B0604020202020204" pitchFamily="34" charset="0"/>
-              <a:buChar char="•"/>
-            </a:pPr>
-            <a:endParaRPr lang="en-US" sz="1600" b="1" dirty="0">
-              <a:latin typeface="Verdana" panose="020B0604030504040204" pitchFamily="34" charset="0"/>
-              <a:ea typeface="Verdana" panose="020B0604030504040204" pitchFamily="34" charset="0"/>
-              <a:cs typeface="Verdana" panose="020B0604030504040204" pitchFamily="34" charset="0"/>
-            </a:endParaRPr>
-          </a:p>
-          <a:p>
-            <a:pPr marL="285750" indent="-285750">
-              <a:buFont typeface="Arial" panose="020B0604020202020204" pitchFamily="34" charset="0"/>
-              <a:buChar char="•"/>
-            </a:pPr>
-            <a:r>
-              <a:rPr lang="en-US" sz="1600" b="1">
-                <a:latin typeface="Verdana" panose="020B0604030504040204" pitchFamily="34" charset="0"/>
-                <a:ea typeface="Verdana" panose="020B0604030504040204" pitchFamily="34" charset="0"/>
-                <a:cs typeface="Verdana" panose="020B0604030504040204" pitchFamily="34" charset="0"/>
-              </a:rPr>
-              <a:t>E</a:t>
-            </a:r>
-            <a:endParaRPr lang="en-US" sz="1600" dirty="0">
-              <a:latin typeface="Verdana" panose="020B0604030504040204" pitchFamily="34" charset="0"/>
-              <a:ea typeface="Verdana" panose="020B0604030504040204" pitchFamily="34" charset="0"/>
-              <a:cs typeface="Verdana" panose="020B0604030504040204" pitchFamily="34" charset="0"/>
-            </a:endParaRPr>
-          </a:p>
-          <a:p>
-            <a:pPr marL="285750" indent="-285750">
-              <a:buFont typeface="Arial" panose="020B0604020202020204" pitchFamily="34" charset="0"/>
-              <a:buChar char="•"/>
-            </a:pPr>
-            <a:endParaRPr lang="en-US" sz="1600" b="1" dirty="0">
-              <a:latin typeface="Verdana" panose="020B0604030504040204" pitchFamily="34" charset="0"/>
-              <a:ea typeface="Verdana" panose="020B0604030504040204" pitchFamily="34" charset="0"/>
-              <a:cs typeface="Verdana" panose="020B0604030504040204" pitchFamily="34" charset="0"/>
-            </a:endParaRPr>
-          </a:p>
-          <a:p>
-            <a:pPr marL="285750" indent="-285750">
-              <a:buFont typeface="Arial" panose="020B0604020202020204" pitchFamily="34" charset="0"/>
-              <a:buChar char="•"/>
-            </a:pPr>
-            <a:endParaRPr lang="en-US" sz="1600" b="1" dirty="0">
-              <a:latin typeface="Verdana" panose="020B0604030504040204" pitchFamily="34" charset="0"/>
-              <a:ea typeface="Verdana" panose="020B0604030504040204" pitchFamily="34" charset="0"/>
-              <a:cs typeface="Verdana" panose="020B0604030504040204" pitchFamily="34" charset="0"/>
-            </a:endParaRPr>
-          </a:p>
-          <a:p>
-            <a:pPr marL="285750" indent="-285750">
-              <a:buFont typeface="Arial" panose="020B0604020202020204" pitchFamily="34" charset="0"/>
-              <a:buChar char="•"/>
-            </a:pPr>
-            <a:endParaRPr lang="en-US" sz="1600" b="1" dirty="0">
-              <a:latin typeface="Verdana" panose="020B0604030504040204" pitchFamily="34" charset="0"/>
-              <a:ea typeface="Verdana" panose="020B0604030504040204" pitchFamily="34" charset="0"/>
-              <a:cs typeface="Verdana" panose="020B0604030504040204" pitchFamily="34" charset="0"/>
-            </a:endParaRPr>
-          </a:p>
-          <a:p>
-            <a:pPr marL="285750" indent="-285750">
-              <a:buFont typeface="Arial" panose="020B0604020202020204" pitchFamily="34" charset="0"/>
-              <a:buChar char="•"/>
-            </a:pPr>
-            <a:endParaRPr lang="en-US" sz="1600" b="1" dirty="0">
-              <a:latin typeface="Verdana" panose="020B0604030504040204" pitchFamily="34" charset="0"/>
-              <a:ea typeface="Verdana" panose="020B0604030504040204" pitchFamily="34" charset="0"/>
-              <a:cs typeface="Verdana" panose="020B0604030504040204" pitchFamily="34" charset="0"/>
-            </a:endParaRPr>
-          </a:p>
-          <a:p>
-            <a:pPr marL="285750" indent="-285750">
-              <a:buFont typeface="Arial" panose="020B0604020202020204" pitchFamily="34" charset="0"/>
-              <a:buChar char="•"/>
-            </a:pPr>
-            <a:endParaRPr lang="en-US" sz="1600" b="1" dirty="0">
-              <a:latin typeface="Verdana" panose="020B0604030504040204" pitchFamily="34" charset="0"/>
-              <a:ea typeface="Verdana" panose="020B0604030504040204" pitchFamily="34" charset="0"/>
-              <a:cs typeface="Verdana" panose="020B0604030504040204" pitchFamily="34" charset="0"/>
-            </a:endParaRPr>
-          </a:p>
-          <a:p>
-            <a:pPr marL="285750" indent="-285750">
-              <a:buFont typeface="Arial" panose="020B0604020202020204" pitchFamily="34" charset="0"/>
-              <a:buChar char="•"/>
-            </a:pPr>
-            <a:endParaRPr lang="pt-BR" sz="1600" b="1" dirty="0">
-              <a:latin typeface="Verdana" panose="020B0604030504040204" pitchFamily="34" charset="0"/>
-              <a:ea typeface="Verdana" panose="020B0604030504040204" pitchFamily="34" charset="0"/>
-              <a:cs typeface="Verdana" panose="020B0604030504040204" pitchFamily="34" charset="0"/>
-            </a:endParaRPr>
+            <a:r>
+              <a:rPr lang="pt-BR" sz="1600" b="1" dirty="0">
+                <a:latin typeface="Verdana" panose="020B0604030504040204" pitchFamily="34" charset="0"/>
+                <a:ea typeface="Verdana" panose="020B0604030504040204" pitchFamily="34" charset="0"/>
+                <a:cs typeface="Verdana" panose="020B0604030504040204" pitchFamily="34" charset="0"/>
+              </a:rPr>
+              <a:t>Enfrentando problema de otimização: </a:t>
+            </a:r>
+            <a:r>
+              <a:rPr lang="pt-BR" sz="1600" dirty="0">
+                <a:latin typeface="Verdana" panose="020B0604030504040204" pitchFamily="34" charset="0"/>
+                <a:ea typeface="Verdana" panose="020B0604030504040204" pitchFamily="34" charset="0"/>
+                <a:cs typeface="Verdana" panose="020B0604030504040204" pitchFamily="34" charset="0"/>
+              </a:rPr>
+              <a:t>soluções aproximadas.	 </a:t>
+            </a:r>
           </a:p>
         </p:txBody>
       </p:sp>
@@ -6549,8 +9178,8 @@
         </p:nvSpPr>
         <p:spPr>
           <a:xfrm>
-            <a:off x="393549" y="333523"/>
-            <a:ext cx="6192688" cy="646331"/>
+            <a:off x="393548" y="333523"/>
+            <a:ext cx="8066884" cy="646331"/>
           </a:xfrm>
           <a:prstGeom prst="rect">
             <a:avLst/>
@@ -6564,20 +9193,12 @@
           <a:lstStyle/>
           <a:p>
             <a:r>
-              <a:rPr lang="en-US" sz="3600" b="1" dirty="0">
-                <a:latin typeface="Verdana" panose="020B0604030504040204" pitchFamily="34" charset="0"/>
-                <a:ea typeface="Verdana" panose="020B0604030504040204" pitchFamily="34" charset="0"/>
-                <a:cs typeface="Verdana" panose="020B0604030504040204" pitchFamily="34" charset="0"/>
-              </a:rPr>
-              <a:t>Estado da </a:t>
-            </a:r>
-            <a:r>
               <a:rPr lang="en-US" sz="3600" b="1" dirty="0" err="1">
                 <a:latin typeface="Verdana" panose="020B0604030504040204" pitchFamily="34" charset="0"/>
                 <a:ea typeface="Verdana" panose="020B0604030504040204" pitchFamily="34" charset="0"/>
                 <a:cs typeface="Verdana" panose="020B0604030504040204" pitchFamily="34" charset="0"/>
               </a:rPr>
-              <a:t>arte</a:t>
+              <a:t>Metaheurísticas</a:t>
             </a:r>
             <a:endParaRPr lang="pt-BR" sz="3600" b="1" dirty="0">
               <a:latin typeface="Verdana" panose="020B0604030504040204" pitchFamily="34" charset="0"/>
@@ -6636,7 +9257,7 @@
     </p:spTree>
     <p:extLst>
       <p:ext uri="{BB962C8B-B14F-4D97-AF65-F5344CB8AC3E}">
-        <p14:creationId xmlns:p14="http://schemas.microsoft.com/office/powerpoint/2010/main" val="772612620"/>
+        <p14:creationId xmlns:p14="http://schemas.microsoft.com/office/powerpoint/2010/main" val="842391489"/>
       </p:ext>
     </p:extLst>
   </p:cSld>

</xml_diff>

<commit_message>
Terminei a minha parte da apresentação
</commit_message>
<xml_diff>
--- a/Guia e Tarefas/Apresentação Primeira Entrega.pptx
+++ b/Guia e Tarefas/Apresentação Primeira Entrega.pptx
@@ -486,6 +486,90 @@
     </a:lvl9pPr>
   </p:notesStyle>
 </p:notesMaster>
+</file>
+
+<file path=ppt/notesSlides/notesSlide1.xml><?xml version="1.0" encoding="utf-8"?>
+<p:notes xmlns:a="http://schemas.openxmlformats.org/drawingml/2006/main" xmlns:r="http://schemas.openxmlformats.org/officeDocument/2006/relationships" xmlns:p="http://schemas.openxmlformats.org/presentationml/2006/main">
+  <p:cSld>
+    <p:spTree>
+      <p:nvGrpSpPr>
+        <p:cNvPr id="1" name=""/>
+        <p:cNvGrpSpPr/>
+        <p:nvPr/>
+      </p:nvGrpSpPr>
+      <p:grpSpPr>
+        <a:xfrm>
+          <a:off x="0" y="0"/>
+          <a:ext cx="0" cy="0"/>
+          <a:chOff x="0" y="0"/>
+          <a:chExt cx="0" cy="0"/>
+        </a:xfrm>
+      </p:grpSpPr>
+      <p:sp>
+        <p:nvSpPr>
+          <p:cNvPr id="2" name="Espaço Reservado para Imagem de Slide 1"/>
+          <p:cNvSpPr>
+            <a:spLocks noGrp="1" noRot="1" noChangeAspect="1"/>
+          </p:cNvSpPr>
+          <p:nvPr>
+            <p:ph type="sldImg"/>
+          </p:nvPr>
+        </p:nvSpPr>
+        <p:spPr/>
+      </p:sp>
+      <p:sp>
+        <p:nvSpPr>
+          <p:cNvPr id="3" name="Espaço Reservado para Anotações 2"/>
+          <p:cNvSpPr>
+            <a:spLocks noGrp="1"/>
+          </p:cNvSpPr>
+          <p:nvPr>
+            <p:ph type="body" idx="1"/>
+          </p:nvPr>
+        </p:nvSpPr>
+        <p:spPr/>
+        <p:txBody>
+          <a:bodyPr/>
+          <a:lstStyle/>
+          <a:p>
+            <a:endParaRPr lang="pt-BR" dirty="0"/>
+          </a:p>
+        </p:txBody>
+      </p:sp>
+      <p:sp>
+        <p:nvSpPr>
+          <p:cNvPr id="4" name="Espaço Reservado para Número de Slide 3"/>
+          <p:cNvSpPr>
+            <a:spLocks noGrp="1"/>
+          </p:cNvSpPr>
+          <p:nvPr>
+            <p:ph type="sldNum" sz="quarter" idx="10"/>
+          </p:nvPr>
+        </p:nvSpPr>
+        <p:spPr/>
+        <p:txBody>
+          <a:bodyPr/>
+          <a:lstStyle/>
+          <a:p>
+            <a:fld id="{4D9D351C-CD6A-4EE7-B691-C83BC0E42DF7}" type="slidenum">
+              <a:rPr lang="pt-BR" smtClean="0"/>
+              <a:t>4</a:t>
+            </a:fld>
+            <a:endParaRPr lang="pt-BR" dirty="0"/>
+          </a:p>
+        </p:txBody>
+      </p:sp>
+    </p:spTree>
+    <p:extLst>
+      <p:ext uri="{BB962C8B-B14F-4D97-AF65-F5344CB8AC3E}">
+        <p14:creationId xmlns:p14="http://schemas.microsoft.com/office/powerpoint/2010/main" val="707366990"/>
+      </p:ext>
+    </p:extLst>
+  </p:cSld>
+  <p:clrMapOvr>
+    <a:masterClrMapping/>
+  </p:clrMapOvr>
+</p:notes>
 </file>
 
 <file path=ppt/slideLayouts/slideLayout1.xml><?xml version="1.0" encoding="utf-8"?>
@@ -3726,6 +3810,13 @@
   <p:clrMapOvr>
     <a:masterClrMapping/>
   </p:clrMapOvr>
+  <p:timing>
+    <p:tnLst>
+      <p:par>
+        <p:cTn id="1" dur="indefinite" restart="never" nodeType="tmRoot"/>
+      </p:par>
+    </p:tnLst>
+  </p:timing>
 </p:sld>
 </file>
 
@@ -4236,6 +4327,13 @@
   <p:clrMapOvr>
     <a:masterClrMapping/>
   </p:clrMapOvr>
+  <p:timing>
+    <p:tnLst>
+      <p:par>
+        <p:cTn id="1" dur="indefinite" restart="never" nodeType="tmRoot"/>
+      </p:par>
+    </p:tnLst>
+  </p:timing>
 </p:sld>
 </file>
 
@@ -4981,6 +5079,13 @@
   <p:clrMapOvr>
     <a:masterClrMapping/>
   </p:clrMapOvr>
+  <p:timing>
+    <p:tnLst>
+      <p:par>
+        <p:cTn id="1" dur="indefinite" restart="never" nodeType="tmRoot"/>
+      </p:par>
+    </p:tnLst>
+  </p:timing>
 </p:sld>
 </file>
 
@@ -6198,6 +6303,13 @@
   <p:clrMapOvr>
     <a:masterClrMapping/>
   </p:clrMapOvr>
+  <p:timing>
+    <p:tnLst>
+      <p:par>
+        <p:cTn id="1" dur="indefinite" restart="never" nodeType="tmRoot"/>
+      </p:par>
+    </p:tnLst>
+  </p:timing>
 </p:sld>
 </file>
 
@@ -6446,6 +6558,13 @@
   <p:clrMapOvr>
     <a:masterClrMapping/>
   </p:clrMapOvr>
+  <p:timing>
+    <p:tnLst>
+      <p:par>
+        <p:cTn id="1" dur="indefinite" restart="never" nodeType="tmRoot"/>
+      </p:par>
+    </p:tnLst>
+  </p:timing>
 </p:sld>
 </file>
 
@@ -6505,7 +6624,7 @@
         <p:spPr>
           <a:xfrm>
             <a:off x="4644008" y="836712"/>
-            <a:ext cx="6192688" cy="707886"/>
+            <a:ext cx="3384376" cy="707886"/>
           </a:xfrm>
           <a:prstGeom prst="rect">
             <a:avLst/>
@@ -6525,72 +6644,6 @@
                 <a:cs typeface="Verdana" panose="020B0604030504040204" pitchFamily="34" charset="0"/>
               </a:rPr>
               <a:t>Obrigado</a:t>
-            </a:r>
-          </a:p>
-        </p:txBody>
-      </p:sp>
-      <p:sp>
-        <p:nvSpPr>
-          <p:cNvPr id="12" name="Retângulo 11"/>
-          <p:cNvSpPr/>
-          <p:nvPr/>
-        </p:nvSpPr>
-        <p:spPr>
-          <a:xfrm>
-            <a:off x="4751513" y="1986453"/>
-            <a:ext cx="3780927" cy="1384995"/>
-          </a:xfrm>
-          <a:prstGeom prst="rect">
-            <a:avLst/>
-          </a:prstGeom>
-        </p:spPr>
-        <p:txBody>
-          <a:bodyPr wrap="square">
-            <a:spAutoFit/>
-          </a:bodyPr>
-          <a:lstStyle/>
-          <a:p>
-            <a:r>
-              <a:rPr lang="pt-BR" sz="1400" b="1" dirty="0">
-                <a:latin typeface="Verdana" panose="020B0604030504040204" pitchFamily="34" charset="0"/>
-                <a:ea typeface="Verdana" panose="020B0604030504040204" pitchFamily="34" charset="0"/>
-                <a:cs typeface="Verdana" panose="020B0604030504040204" pitchFamily="34" charset="0"/>
-              </a:rPr>
-              <a:t>UDESC – Universidade do Estado de Santa Catarina</a:t>
-            </a:r>
-          </a:p>
-          <a:p>
-            <a:endParaRPr lang="pt-BR" sz="1400" dirty="0">
-              <a:latin typeface="Verdana" panose="020B0604030504040204" pitchFamily="34" charset="0"/>
-              <a:ea typeface="Verdana" panose="020B0604030504040204" pitchFamily="34" charset="0"/>
-              <a:cs typeface="Verdana" panose="020B0604030504040204" pitchFamily="34" charset="0"/>
-            </a:endParaRPr>
-          </a:p>
-          <a:p>
-            <a:r>
-              <a:rPr lang="pt-BR" sz="1400" dirty="0">
-                <a:latin typeface="Verdana" panose="020B0604030504040204" pitchFamily="34" charset="0"/>
-                <a:ea typeface="Verdana" panose="020B0604030504040204" pitchFamily="34" charset="0"/>
-                <a:cs typeface="Verdana" panose="020B0604030504040204" pitchFamily="34" charset="0"/>
-              </a:rPr>
-              <a:t>www.udesc.br</a:t>
-            </a:r>
-          </a:p>
-          <a:p>
-            <a:endParaRPr lang="pt-BR" sz="1400" dirty="0">
-              <a:latin typeface="Verdana" panose="020B0604030504040204" pitchFamily="34" charset="0"/>
-              <a:ea typeface="Verdana" panose="020B0604030504040204" pitchFamily="34" charset="0"/>
-              <a:cs typeface="Verdana" panose="020B0604030504040204" pitchFamily="34" charset="0"/>
-            </a:endParaRPr>
-          </a:p>
-          <a:p>
-            <a:r>
-              <a:rPr lang="pt-BR" sz="1400" dirty="0">
-                <a:latin typeface="Verdana" panose="020B0604030504040204" pitchFamily="34" charset="0"/>
-                <a:ea typeface="Verdana" panose="020B0604030504040204" pitchFamily="34" charset="0"/>
-                <a:cs typeface="Verdana" panose="020B0604030504040204" pitchFamily="34" charset="0"/>
-              </a:rPr>
-              <a:t>www.facebook.com/udesc</a:t>
             </a:r>
           </a:p>
         </p:txBody>
@@ -6634,6 +6687,13 @@
   <p:clrMapOvr>
     <a:masterClrMapping/>
   </p:clrMapOvr>
+  <p:timing>
+    <p:tnLst>
+      <p:par>
+        <p:cTn id="1" dur="indefinite" restart="never" nodeType="tmRoot"/>
+      </p:par>
+    </p:tnLst>
+  </p:timing>
 </p:sld>
 </file>
 
@@ -6866,6 +6926,13 @@
   <p:clrMapOvr>
     <a:masterClrMapping/>
   </p:clrMapOvr>
+  <p:timing>
+    <p:tnLst>
+      <p:par>
+        <p:cTn id="1" dur="indefinite" restart="never" nodeType="tmRoot"/>
+      </p:par>
+    </p:tnLst>
+  </p:timing>
 </p:sld>
 </file>
 
@@ -6895,7 +6962,7 @@
         <p:spPr>
           <a:xfrm>
             <a:off x="971600" y="1700808"/>
-            <a:ext cx="5688632" cy="3046988"/>
+            <a:ext cx="5688632" cy="3231654"/>
           </a:xfrm>
           <a:prstGeom prst="rect">
             <a:avLst/>
@@ -6913,175 +6980,175 @@
               <a:buChar char="•"/>
             </a:pPr>
             <a:r>
-              <a:rPr lang="en-US" sz="1600" b="1" dirty="0">
-                <a:latin typeface="Verdana" panose="020B0604030504040204" pitchFamily="34" charset="0"/>
+              <a:rPr lang="en-US" b="1" dirty="0">
+                <a:latin typeface="+mj-lt"/>
                 <a:ea typeface="Verdana" panose="020B0604030504040204" pitchFamily="34" charset="0"/>
                 <a:cs typeface="Verdana" panose="020B0604030504040204" pitchFamily="34" charset="0"/>
               </a:rPr>
               <a:t>Vetor com n </a:t>
             </a:r>
             <a:r>
-              <a:rPr lang="en-US" sz="1600" b="1" dirty="0" err="1">
-                <a:latin typeface="Verdana" panose="020B0604030504040204" pitchFamily="34" charset="0"/>
+              <a:rPr lang="en-US" b="1" dirty="0" err="1">
+                <a:latin typeface="+mj-lt"/>
                 <a:ea typeface="Verdana" panose="020B0604030504040204" pitchFamily="34" charset="0"/>
                 <a:cs typeface="Verdana" panose="020B0604030504040204" pitchFamily="34" charset="0"/>
               </a:rPr>
               <a:t>elementos</a:t>
             </a:r>
             <a:r>
-              <a:rPr lang="en-US" sz="1600" b="1" dirty="0">
-                <a:latin typeface="Verdana" panose="020B0604030504040204" pitchFamily="34" charset="0"/>
+              <a:rPr lang="en-US" b="1" dirty="0">
+                <a:latin typeface="+mj-lt"/>
                 <a:ea typeface="Verdana" panose="020B0604030504040204" pitchFamily="34" charset="0"/>
                 <a:cs typeface="Verdana" panose="020B0604030504040204" pitchFamily="34" charset="0"/>
               </a:rPr>
               <a:t>: </a:t>
             </a:r>
             <a:r>
-              <a:rPr lang="en-US" sz="1600" dirty="0" err="1">
-                <a:latin typeface="Verdana" panose="020B0604030504040204" pitchFamily="34" charset="0"/>
+              <a:rPr lang="en-US" dirty="0" err="1">
+                <a:latin typeface="+mj-lt"/>
                 <a:ea typeface="Verdana" panose="020B0604030504040204" pitchFamily="34" charset="0"/>
                 <a:cs typeface="Verdana" panose="020B0604030504040204" pitchFamily="34" charset="0"/>
               </a:rPr>
               <a:t>onde</a:t>
             </a:r>
             <a:r>
-              <a:rPr lang="en-US" sz="1600" dirty="0">
-                <a:latin typeface="Verdana" panose="020B0604030504040204" pitchFamily="34" charset="0"/>
+              <a:rPr lang="en-US" dirty="0">
+                <a:latin typeface="+mj-lt"/>
                 <a:ea typeface="Verdana" panose="020B0604030504040204" pitchFamily="34" charset="0"/>
                 <a:cs typeface="Verdana" panose="020B0604030504040204" pitchFamily="34" charset="0"/>
               </a:rPr>
               <a:t> m </a:t>
             </a:r>
             <a:r>
-              <a:rPr lang="en-US" sz="1600" dirty="0" err="1">
-                <a:latin typeface="Verdana" panose="020B0604030504040204" pitchFamily="34" charset="0"/>
+              <a:rPr lang="en-US" dirty="0" err="1">
+                <a:latin typeface="+mj-lt"/>
                 <a:ea typeface="Verdana" panose="020B0604030504040204" pitchFamily="34" charset="0"/>
                 <a:cs typeface="Verdana" panose="020B0604030504040204" pitchFamily="34" charset="0"/>
               </a:rPr>
               <a:t>elementos</a:t>
             </a:r>
             <a:r>
-              <a:rPr lang="en-US" sz="1600" dirty="0">
-                <a:latin typeface="Verdana" panose="020B0604030504040204" pitchFamily="34" charset="0"/>
+              <a:rPr lang="en-US" dirty="0">
+                <a:latin typeface="+mj-lt"/>
                 <a:ea typeface="Verdana" panose="020B0604030504040204" pitchFamily="34" charset="0"/>
                 <a:cs typeface="Verdana" panose="020B0604030504040204" pitchFamily="34" charset="0"/>
               </a:rPr>
               <a:t> </a:t>
             </a:r>
             <a:r>
-              <a:rPr lang="en-US" sz="1600" dirty="0" err="1">
-                <a:latin typeface="Verdana" panose="020B0604030504040204" pitchFamily="34" charset="0"/>
+              <a:rPr lang="en-US" dirty="0" err="1">
+                <a:latin typeface="+mj-lt"/>
                 <a:ea typeface="Verdana" panose="020B0604030504040204" pitchFamily="34" charset="0"/>
                 <a:cs typeface="Verdana" panose="020B0604030504040204" pitchFamily="34" charset="0"/>
               </a:rPr>
               <a:t>são</a:t>
             </a:r>
             <a:r>
-              <a:rPr lang="en-US" sz="1600" dirty="0">
-                <a:latin typeface="Verdana" panose="020B0604030504040204" pitchFamily="34" charset="0"/>
+              <a:rPr lang="en-US" dirty="0">
+                <a:latin typeface="+mj-lt"/>
                 <a:ea typeface="Verdana" panose="020B0604030504040204" pitchFamily="34" charset="0"/>
                 <a:cs typeface="Verdana" panose="020B0604030504040204" pitchFamily="34" charset="0"/>
               </a:rPr>
               <a:t> </a:t>
             </a:r>
             <a:r>
-              <a:rPr lang="en-US" sz="1600" dirty="0" err="1">
-                <a:latin typeface="Verdana" panose="020B0604030504040204" pitchFamily="34" charset="0"/>
+              <a:rPr lang="en-US" dirty="0" err="1">
+                <a:latin typeface="+mj-lt"/>
                 <a:ea typeface="Verdana" panose="020B0604030504040204" pitchFamily="34" charset="0"/>
                 <a:cs typeface="Verdana" panose="020B0604030504040204" pitchFamily="34" charset="0"/>
               </a:rPr>
               <a:t>marcados</a:t>
             </a:r>
             <a:r>
-              <a:rPr lang="en-US" sz="1600" dirty="0">
-                <a:latin typeface="Verdana" panose="020B0604030504040204" pitchFamily="34" charset="0"/>
+              <a:rPr lang="en-US" dirty="0">
+                <a:latin typeface="+mj-lt"/>
                 <a:ea typeface="Verdana" panose="020B0604030504040204" pitchFamily="34" charset="0"/>
                 <a:cs typeface="Verdana" panose="020B0604030504040204" pitchFamily="34" charset="0"/>
               </a:rPr>
               <a:t> </a:t>
             </a:r>
             <a:r>
-              <a:rPr lang="en-US" sz="1600" dirty="0" err="1">
-                <a:latin typeface="Verdana" panose="020B0604030504040204" pitchFamily="34" charset="0"/>
+              <a:rPr lang="en-US" dirty="0" err="1">
+                <a:latin typeface="+mj-lt"/>
                 <a:ea typeface="Verdana" panose="020B0604030504040204" pitchFamily="34" charset="0"/>
                 <a:cs typeface="Verdana" panose="020B0604030504040204" pitchFamily="34" charset="0"/>
               </a:rPr>
               <a:t>como</a:t>
             </a:r>
             <a:r>
-              <a:rPr lang="en-US" sz="1600" dirty="0">
-                <a:latin typeface="Verdana" panose="020B0604030504040204" pitchFamily="34" charset="0"/>
+              <a:rPr lang="en-US" dirty="0">
+                <a:latin typeface="+mj-lt"/>
                 <a:ea typeface="Verdana" panose="020B0604030504040204" pitchFamily="34" charset="0"/>
                 <a:cs typeface="Verdana" panose="020B0604030504040204" pitchFamily="34" charset="0"/>
               </a:rPr>
               <a:t> </a:t>
             </a:r>
             <a:r>
-              <a:rPr lang="en-US" sz="1600" dirty="0" err="1">
-                <a:latin typeface="Verdana" panose="020B0604030504040204" pitchFamily="34" charset="0"/>
+              <a:rPr lang="en-US" dirty="0" err="1">
+                <a:latin typeface="+mj-lt"/>
                 <a:ea typeface="Verdana" panose="020B0604030504040204" pitchFamily="34" charset="0"/>
                 <a:cs typeface="Verdana" panose="020B0604030504040204" pitchFamily="34" charset="0"/>
               </a:rPr>
               <a:t>selecionados</a:t>
             </a:r>
             <a:r>
-              <a:rPr lang="en-US" sz="1600" dirty="0">
-                <a:latin typeface="Verdana" panose="020B0604030504040204" pitchFamily="34" charset="0"/>
+              <a:rPr lang="en-US" dirty="0">
+                <a:latin typeface="+mj-lt"/>
                 <a:ea typeface="Verdana" panose="020B0604030504040204" pitchFamily="34" charset="0"/>
                 <a:cs typeface="Verdana" panose="020B0604030504040204" pitchFamily="34" charset="0"/>
               </a:rPr>
               <a:t> e n-m </a:t>
             </a:r>
             <a:r>
-              <a:rPr lang="en-US" sz="1600" dirty="0" err="1">
-                <a:latin typeface="Verdana" panose="020B0604030504040204" pitchFamily="34" charset="0"/>
+              <a:rPr lang="en-US" dirty="0" err="1">
+                <a:latin typeface="+mj-lt"/>
                 <a:ea typeface="Verdana" panose="020B0604030504040204" pitchFamily="34" charset="0"/>
                 <a:cs typeface="Verdana" panose="020B0604030504040204" pitchFamily="34" charset="0"/>
               </a:rPr>
               <a:t>como</a:t>
             </a:r>
             <a:r>
-              <a:rPr lang="en-US" sz="1600" dirty="0">
-                <a:latin typeface="Verdana" panose="020B0604030504040204" pitchFamily="34" charset="0"/>
+              <a:rPr lang="en-US" dirty="0">
+                <a:latin typeface="+mj-lt"/>
                 <a:ea typeface="Verdana" panose="020B0604030504040204" pitchFamily="34" charset="0"/>
                 <a:cs typeface="Verdana" panose="020B0604030504040204" pitchFamily="34" charset="0"/>
               </a:rPr>
               <a:t> </a:t>
             </a:r>
             <a:r>
-              <a:rPr lang="en-US" sz="1600" dirty="0" err="1">
-                <a:latin typeface="Verdana" panose="020B0604030504040204" pitchFamily="34" charset="0"/>
+              <a:rPr lang="en-US" dirty="0" err="1">
+                <a:latin typeface="+mj-lt"/>
                 <a:ea typeface="Verdana" panose="020B0604030504040204" pitchFamily="34" charset="0"/>
                 <a:cs typeface="Verdana" panose="020B0604030504040204" pitchFamily="34" charset="0"/>
               </a:rPr>
               <a:t>não</a:t>
             </a:r>
             <a:r>
-              <a:rPr lang="en-US" sz="1600" dirty="0">
-                <a:latin typeface="Verdana" panose="020B0604030504040204" pitchFamily="34" charset="0"/>
+              <a:rPr lang="en-US" dirty="0">
+                <a:latin typeface="+mj-lt"/>
                 <a:ea typeface="Verdana" panose="020B0604030504040204" pitchFamily="34" charset="0"/>
                 <a:cs typeface="Verdana" panose="020B0604030504040204" pitchFamily="34" charset="0"/>
               </a:rPr>
               <a:t> </a:t>
             </a:r>
             <a:r>
-              <a:rPr lang="en-US" sz="1600" dirty="0" err="1">
-                <a:latin typeface="Verdana" panose="020B0604030504040204" pitchFamily="34" charset="0"/>
+              <a:rPr lang="en-US" dirty="0" err="1">
+                <a:latin typeface="+mj-lt"/>
                 <a:ea typeface="Verdana" panose="020B0604030504040204" pitchFamily="34" charset="0"/>
                 <a:cs typeface="Verdana" panose="020B0604030504040204" pitchFamily="34" charset="0"/>
               </a:rPr>
               <a:t>selecionados</a:t>
             </a:r>
             <a:r>
-              <a:rPr lang="en-US" sz="1600" dirty="0">
-                <a:latin typeface="Verdana" panose="020B0604030504040204" pitchFamily="34" charset="0"/>
+              <a:rPr lang="en-US" dirty="0">
+                <a:latin typeface="+mj-lt"/>
                 <a:ea typeface="Verdana" panose="020B0604030504040204" pitchFamily="34" charset="0"/>
                 <a:cs typeface="Verdana" panose="020B0604030504040204" pitchFamily="34" charset="0"/>
               </a:rPr>
               <a:t>.</a:t>
             </a:r>
-            <a:endParaRPr lang="en-US" sz="1600" b="1" dirty="0">
-              <a:latin typeface="Verdana" panose="020B0604030504040204" pitchFamily="34" charset="0"/>
+            <a:endParaRPr lang="en-US" b="1" dirty="0">
+              <a:latin typeface="+mj-lt"/>
               <a:ea typeface="Verdana" panose="020B0604030504040204" pitchFamily="34" charset="0"/>
               <a:cs typeface="Verdana" panose="020B0604030504040204" pitchFamily="34" charset="0"/>
             </a:endParaRPr>
@@ -7091,8 +7158,8 @@
               <a:buFont typeface="Arial" panose="020B0604020202020204" pitchFamily="34" charset="0"/>
               <a:buChar char="•"/>
             </a:pPr>
-            <a:endParaRPr lang="en-US" sz="1600" b="1" dirty="0">
-              <a:latin typeface="Verdana" panose="020B0604030504040204" pitchFamily="34" charset="0"/>
+            <a:endParaRPr lang="en-US" b="1" dirty="0">
+              <a:latin typeface="+mj-lt"/>
               <a:ea typeface="Verdana" panose="020B0604030504040204" pitchFamily="34" charset="0"/>
               <a:cs typeface="Verdana" panose="020B0604030504040204" pitchFamily="34" charset="0"/>
             </a:endParaRPr>
@@ -7103,112 +7170,112 @@
               <a:buChar char="•"/>
             </a:pPr>
             <a:r>
-              <a:rPr lang="en-US" sz="1600" b="1" dirty="0" err="1">
-                <a:latin typeface="Verdana" panose="020B0604030504040204" pitchFamily="34" charset="0"/>
+              <a:rPr lang="en-US" b="1" dirty="0" err="1">
+                <a:latin typeface="+mj-lt"/>
                 <a:ea typeface="Verdana" panose="020B0604030504040204" pitchFamily="34" charset="0"/>
                 <a:cs typeface="Verdana" panose="020B0604030504040204" pitchFamily="34" charset="0"/>
               </a:rPr>
               <a:t>Matriz</a:t>
             </a:r>
             <a:r>
-              <a:rPr lang="en-US" sz="1600" b="1" dirty="0">
-                <a:latin typeface="Verdana" panose="020B0604030504040204" pitchFamily="34" charset="0"/>
+              <a:rPr lang="en-US" b="1" dirty="0">
+                <a:latin typeface="+mj-lt"/>
                 <a:ea typeface="Verdana" panose="020B0604030504040204" pitchFamily="34" charset="0"/>
                 <a:cs typeface="Verdana" panose="020B0604030504040204" pitchFamily="34" charset="0"/>
               </a:rPr>
               <a:t> </a:t>
             </a:r>
             <a:r>
-              <a:rPr lang="en-US" sz="1600" b="1" dirty="0" err="1">
-                <a:latin typeface="Verdana" panose="020B0604030504040204" pitchFamily="34" charset="0"/>
+              <a:rPr lang="en-US" b="1" dirty="0" err="1">
+                <a:latin typeface="+mj-lt"/>
                 <a:ea typeface="Verdana" panose="020B0604030504040204" pitchFamily="34" charset="0"/>
                 <a:cs typeface="Verdana" panose="020B0604030504040204" pitchFamily="34" charset="0"/>
               </a:rPr>
               <a:t>diversidade</a:t>
             </a:r>
             <a:r>
-              <a:rPr lang="en-US" sz="1600" b="1" dirty="0">
-                <a:latin typeface="Verdana" panose="020B0604030504040204" pitchFamily="34" charset="0"/>
+              <a:rPr lang="en-US" b="1" dirty="0">
+                <a:latin typeface="+mj-lt"/>
                 <a:ea typeface="Verdana" panose="020B0604030504040204" pitchFamily="34" charset="0"/>
                 <a:cs typeface="Verdana" panose="020B0604030504040204" pitchFamily="34" charset="0"/>
               </a:rPr>
               <a:t>: </a:t>
             </a:r>
             <a:r>
-              <a:rPr lang="en-US" sz="1600" dirty="0" err="1">
-                <a:latin typeface="Verdana" panose="020B0604030504040204" pitchFamily="34" charset="0"/>
+              <a:rPr lang="en-US" dirty="0" err="1">
+                <a:latin typeface="+mj-lt"/>
                 <a:ea typeface="Verdana" panose="020B0604030504040204" pitchFamily="34" charset="0"/>
                 <a:cs typeface="Verdana" panose="020B0604030504040204" pitchFamily="34" charset="0"/>
               </a:rPr>
               <a:t>matriz</a:t>
             </a:r>
             <a:r>
-              <a:rPr lang="en-US" sz="1600" dirty="0">
-                <a:latin typeface="Verdana" panose="020B0604030504040204" pitchFamily="34" charset="0"/>
+              <a:rPr lang="en-US" dirty="0">
+                <a:latin typeface="+mj-lt"/>
                 <a:ea typeface="Verdana" panose="020B0604030504040204" pitchFamily="34" charset="0"/>
                 <a:cs typeface="Verdana" panose="020B0604030504040204" pitchFamily="34" charset="0"/>
               </a:rPr>
               <a:t> n x n </a:t>
             </a:r>
             <a:r>
-              <a:rPr lang="en-US" sz="1600" dirty="0" err="1">
-                <a:latin typeface="Verdana" panose="020B0604030504040204" pitchFamily="34" charset="0"/>
+              <a:rPr lang="en-US" dirty="0" err="1">
+                <a:latin typeface="+mj-lt"/>
                 <a:ea typeface="Verdana" panose="020B0604030504040204" pitchFamily="34" charset="0"/>
                 <a:cs typeface="Verdana" panose="020B0604030504040204" pitchFamily="34" charset="0"/>
               </a:rPr>
               <a:t>informando</a:t>
             </a:r>
             <a:r>
-              <a:rPr lang="en-US" sz="1600" dirty="0">
-                <a:latin typeface="Verdana" panose="020B0604030504040204" pitchFamily="34" charset="0"/>
+              <a:rPr lang="en-US" dirty="0">
+                <a:latin typeface="+mj-lt"/>
                 <a:ea typeface="Verdana" panose="020B0604030504040204" pitchFamily="34" charset="0"/>
                 <a:cs typeface="Verdana" panose="020B0604030504040204" pitchFamily="34" charset="0"/>
               </a:rPr>
               <a:t> o valor da </a:t>
             </a:r>
             <a:r>
-              <a:rPr lang="en-US" sz="1600" dirty="0" err="1">
-                <a:latin typeface="Verdana" panose="020B0604030504040204" pitchFamily="34" charset="0"/>
+              <a:rPr lang="en-US" dirty="0" err="1">
+                <a:latin typeface="+mj-lt"/>
                 <a:ea typeface="Verdana" panose="020B0604030504040204" pitchFamily="34" charset="0"/>
                 <a:cs typeface="Verdana" panose="020B0604030504040204" pitchFamily="34" charset="0"/>
               </a:rPr>
               <a:t>diferença</a:t>
             </a:r>
             <a:r>
-              <a:rPr lang="en-US" sz="1600" dirty="0">
-                <a:latin typeface="Verdana" panose="020B0604030504040204" pitchFamily="34" charset="0"/>
+              <a:rPr lang="en-US" dirty="0">
+                <a:latin typeface="+mj-lt"/>
                 <a:ea typeface="Verdana" panose="020B0604030504040204" pitchFamily="34" charset="0"/>
                 <a:cs typeface="Verdana" panose="020B0604030504040204" pitchFamily="34" charset="0"/>
               </a:rPr>
               <a:t> de </a:t>
             </a:r>
             <a:r>
-              <a:rPr lang="en-US" sz="1600" dirty="0" err="1">
-                <a:latin typeface="Verdana" panose="020B0604030504040204" pitchFamily="34" charset="0"/>
+              <a:rPr lang="en-US" dirty="0" err="1">
+                <a:latin typeface="+mj-lt"/>
                 <a:ea typeface="Verdana" panose="020B0604030504040204" pitchFamily="34" charset="0"/>
                 <a:cs typeface="Verdana" panose="020B0604030504040204" pitchFamily="34" charset="0"/>
               </a:rPr>
               <a:t>todos</a:t>
             </a:r>
             <a:r>
-              <a:rPr lang="en-US" sz="1600" dirty="0">
-                <a:latin typeface="Verdana" panose="020B0604030504040204" pitchFamily="34" charset="0"/>
+              <a:rPr lang="en-US" dirty="0">
+                <a:latin typeface="+mj-lt"/>
                 <a:ea typeface="Verdana" panose="020B0604030504040204" pitchFamily="34" charset="0"/>
                 <a:cs typeface="Verdana" panose="020B0604030504040204" pitchFamily="34" charset="0"/>
               </a:rPr>
               <a:t> para </a:t>
             </a:r>
             <a:r>
-              <a:rPr lang="en-US" sz="1600" dirty="0" err="1">
-                <a:latin typeface="Verdana" panose="020B0604030504040204" pitchFamily="34" charset="0"/>
+              <a:rPr lang="en-US" dirty="0" err="1">
+                <a:latin typeface="+mj-lt"/>
                 <a:ea typeface="Verdana" panose="020B0604030504040204" pitchFamily="34" charset="0"/>
                 <a:cs typeface="Verdana" panose="020B0604030504040204" pitchFamily="34" charset="0"/>
               </a:rPr>
               <a:t>todos</a:t>
             </a:r>
             <a:r>
-              <a:rPr lang="en-US" sz="1600" dirty="0">
-                <a:latin typeface="Verdana" panose="020B0604030504040204" pitchFamily="34" charset="0"/>
+              <a:rPr lang="en-US" dirty="0">
+                <a:latin typeface="+mj-lt"/>
                 <a:ea typeface="Verdana" panose="020B0604030504040204" pitchFamily="34" charset="0"/>
                 <a:cs typeface="Verdana" panose="020B0604030504040204" pitchFamily="34" charset="0"/>
               </a:rPr>
@@ -7415,6 +7482,13 @@
   <p:clrMapOvr>
     <a:masterClrMapping/>
   </p:clrMapOvr>
+  <p:timing>
+    <p:tnLst>
+      <p:par>
+        <p:cTn id="1" dur="indefinite" restart="never" nodeType="tmRoot"/>
+      </p:par>
+    </p:tnLst>
+  </p:timing>
 </p:sld>
 </file>
 
@@ -7435,84 +7509,6 @@
           <a:chExt cx="0" cy="0"/>
         </a:xfrm>
       </p:grpSpPr>
-      <p:sp>
-        <p:nvSpPr>
-          <p:cNvPr id="8" name="CaixaDeTexto 7"/>
-          <p:cNvSpPr txBox="1"/>
-          <p:nvPr/>
-        </p:nvSpPr>
-        <p:spPr>
-          <a:xfrm>
-            <a:off x="899592" y="1340768"/>
-            <a:ext cx="5688632" cy="1323439"/>
-          </a:xfrm>
-          <a:prstGeom prst="rect">
-            <a:avLst/>
-          </a:prstGeom>
-          <a:noFill/>
-        </p:spPr>
-        <p:txBody>
-          <a:bodyPr wrap="square" rtlCol="0">
-            <a:spAutoFit/>
-          </a:bodyPr>
-          <a:lstStyle/>
-          <a:p>
-            <a:pPr marL="285750" indent="-285750">
-              <a:buFont typeface="Arial" panose="020B0604020202020204" pitchFamily="34" charset="0"/>
-              <a:buChar char="•"/>
-            </a:pPr>
-            <a:endParaRPr lang="en-US" sz="1600" b="1" dirty="0">
-              <a:latin typeface="Verdana" panose="020B0604030504040204" pitchFamily="34" charset="0"/>
-              <a:ea typeface="Verdana" panose="020B0604030504040204" pitchFamily="34" charset="0"/>
-              <a:cs typeface="Verdana" panose="020B0604030504040204" pitchFamily="34" charset="0"/>
-            </a:endParaRPr>
-          </a:p>
-          <a:p>
-            <a:pPr marL="285750" indent="-285750">
-              <a:buFont typeface="Arial" panose="020B0604020202020204" pitchFamily="34" charset="0"/>
-              <a:buChar char="•"/>
-            </a:pPr>
-            <a:endParaRPr lang="en-US" sz="1600" b="1" dirty="0">
-              <a:latin typeface="Verdana" panose="020B0604030504040204" pitchFamily="34" charset="0"/>
-              <a:ea typeface="Verdana" panose="020B0604030504040204" pitchFamily="34" charset="0"/>
-              <a:cs typeface="Verdana" panose="020B0604030504040204" pitchFamily="34" charset="0"/>
-            </a:endParaRPr>
-          </a:p>
-          <a:p>
-            <a:pPr marL="285750" indent="-285750">
-              <a:buFont typeface="Arial" panose="020B0604020202020204" pitchFamily="34" charset="0"/>
-              <a:buChar char="•"/>
-            </a:pPr>
-            <a:endParaRPr lang="en-US" sz="1600" b="1" dirty="0">
-              <a:latin typeface="Verdana" panose="020B0604030504040204" pitchFamily="34" charset="0"/>
-              <a:ea typeface="Verdana" panose="020B0604030504040204" pitchFamily="34" charset="0"/>
-              <a:cs typeface="Verdana" panose="020B0604030504040204" pitchFamily="34" charset="0"/>
-            </a:endParaRPr>
-          </a:p>
-          <a:p>
-            <a:pPr marL="285750" indent="-285750">
-              <a:buFont typeface="Arial" panose="020B0604020202020204" pitchFamily="34" charset="0"/>
-              <a:buChar char="•"/>
-            </a:pPr>
-            <a:endParaRPr lang="en-US" sz="1600" b="1" dirty="0">
-              <a:latin typeface="Verdana" panose="020B0604030504040204" pitchFamily="34" charset="0"/>
-              <a:ea typeface="Verdana" panose="020B0604030504040204" pitchFamily="34" charset="0"/>
-              <a:cs typeface="Verdana" panose="020B0604030504040204" pitchFamily="34" charset="0"/>
-            </a:endParaRPr>
-          </a:p>
-          <a:p>
-            <a:pPr marL="285750" indent="-285750">
-              <a:buFont typeface="Arial" panose="020B0604020202020204" pitchFamily="34" charset="0"/>
-              <a:buChar char="•"/>
-            </a:pPr>
-            <a:endParaRPr lang="pt-BR" sz="1600" b="1" dirty="0">
-              <a:latin typeface="Verdana" panose="020B0604030504040204" pitchFamily="34" charset="0"/>
-              <a:ea typeface="Verdana" panose="020B0604030504040204" pitchFamily="34" charset="0"/>
-              <a:cs typeface="Verdana" panose="020B0604030504040204" pitchFamily="34" charset="0"/>
-            </a:endParaRPr>
-          </a:p>
-        </p:txBody>
-      </p:sp>
       <p:pic>
         <p:nvPicPr>
           <p:cNvPr id="7" name="Imagem 6"/>
@@ -7522,7 +7518,7 @@
           <p:nvPr/>
         </p:nvPicPr>
         <p:blipFill>
-          <a:blip r:embed="rId2" cstate="print">
+          <a:blip r:embed="rId3" cstate="print">
             <a:extLst>
               <a:ext uri="{28A0092B-C50C-407E-A947-70E740481C1C}">
                 <a14:useLocalDpi xmlns:a14="http://schemas.microsoft.com/office/drawing/2010/main" val="0"/>
@@ -7572,21 +7568,8 @@
                 <a:ea typeface="Verdana" panose="020B0604030504040204" pitchFamily="34" charset="0"/>
                 <a:cs typeface="Verdana" panose="020B0604030504040204" pitchFamily="34" charset="0"/>
               </a:rPr>
-              <a:t>O que é </a:t>
-            </a:r>
-            <a:r>
-              <a:rPr lang="pt-BR" sz="3600" b="1">
-                <a:latin typeface="Verdana" panose="020B0604030504040204" pitchFamily="34" charset="0"/>
-                <a:ea typeface="Verdana" panose="020B0604030504040204" pitchFamily="34" charset="0"/>
-                <a:cs typeface="Verdana" panose="020B0604030504040204" pitchFamily="34" charset="0"/>
-              </a:rPr>
-              <a:t>essa diferença?</a:t>
-            </a:r>
-            <a:endParaRPr lang="pt-BR" sz="3600" b="1" dirty="0">
-              <a:latin typeface="Verdana" panose="020B0604030504040204" pitchFamily="34" charset="0"/>
-              <a:ea typeface="Verdana" panose="020B0604030504040204" pitchFamily="34" charset="0"/>
-              <a:cs typeface="Verdana" panose="020B0604030504040204" pitchFamily="34" charset="0"/>
-            </a:endParaRPr>
+              <a:t>O que é essa diferença?</a:t>
+            </a:r>
           </a:p>
         </p:txBody>
       </p:sp>
@@ -7636,6 +7619,949 @@
           </a:p>
         </p:txBody>
       </p:sp>
+      <p:sp>
+        <p:nvSpPr>
+          <p:cNvPr id="10" name="CaixaDeTexto 9">
+            <a:extLst>
+              <a:ext uri="{FF2B5EF4-FFF2-40B4-BE49-F238E27FC236}">
+                <a16:creationId xmlns:a16="http://schemas.microsoft.com/office/drawing/2014/main" id="{44B9EEE7-99EC-42C2-9AB1-6D8FD829670B}"/>
+              </a:ext>
+            </a:extLst>
+          </p:cNvPr>
+          <p:cNvSpPr txBox="1"/>
+          <p:nvPr/>
+        </p:nvSpPr>
+        <p:spPr>
+          <a:xfrm>
+            <a:off x="1403648" y="1196752"/>
+            <a:ext cx="6552728" cy="5078313"/>
+          </a:xfrm>
+          <a:prstGeom prst="rect">
+            <a:avLst/>
+          </a:prstGeom>
+          <a:noFill/>
+        </p:spPr>
+        <p:txBody>
+          <a:bodyPr wrap="square" rtlCol="0">
+            <a:spAutoFit/>
+          </a:bodyPr>
+          <a:lstStyle/>
+          <a:p>
+            <a:pPr marL="285750" indent="-285750">
+              <a:buFont typeface="Arial" panose="020B0604020202020204" pitchFamily="34" charset="0"/>
+              <a:buChar char="•"/>
+            </a:pPr>
+            <a:r>
+              <a:rPr lang="en-US" dirty="0" err="1" smtClean="0">
+                <a:latin typeface="+mj-lt"/>
+                <a:ea typeface="Verdana" panose="020B0604030504040204" pitchFamily="34" charset="0"/>
+              </a:rPr>
+              <a:t>Distância</a:t>
+            </a:r>
+            <a:r>
+              <a:rPr lang="en-US" dirty="0" smtClean="0">
+                <a:latin typeface="+mj-lt"/>
+                <a:ea typeface="Verdana" panose="020B0604030504040204" pitchFamily="34" charset="0"/>
+              </a:rPr>
+              <a:t> </a:t>
+            </a:r>
+            <a:r>
+              <a:rPr lang="en-US" dirty="0" err="1" smtClean="0">
+                <a:latin typeface="+mj-lt"/>
+                <a:ea typeface="Verdana" panose="020B0604030504040204" pitchFamily="34" charset="0"/>
+              </a:rPr>
+              <a:t>euclidiana</a:t>
+            </a:r>
+            <a:r>
+              <a:rPr lang="en-US" dirty="0" smtClean="0">
+                <a:latin typeface="+mj-lt"/>
+                <a:ea typeface="Verdana" panose="020B0604030504040204" pitchFamily="34" charset="0"/>
+              </a:rPr>
+              <a:t> entre </a:t>
+            </a:r>
+            <a:r>
+              <a:rPr lang="en-US" dirty="0" err="1" smtClean="0">
+                <a:latin typeface="+mj-lt"/>
+                <a:ea typeface="Verdana" panose="020B0604030504040204" pitchFamily="34" charset="0"/>
+              </a:rPr>
+              <a:t>os</a:t>
+            </a:r>
+            <a:r>
+              <a:rPr lang="en-US" dirty="0" smtClean="0">
+                <a:latin typeface="+mj-lt"/>
+                <a:ea typeface="Verdana" panose="020B0604030504040204" pitchFamily="34" charset="0"/>
+              </a:rPr>
+              <a:t> </a:t>
+            </a:r>
+            <a:r>
+              <a:rPr lang="en-US" dirty="0" err="1" smtClean="0">
+                <a:latin typeface="+mj-lt"/>
+                <a:ea typeface="Verdana" panose="020B0604030504040204" pitchFamily="34" charset="0"/>
+              </a:rPr>
+              <a:t>atributos</a:t>
+            </a:r>
+            <a:r>
+              <a:rPr lang="en-US" dirty="0" smtClean="0">
+                <a:latin typeface="+mj-lt"/>
+                <a:ea typeface="Verdana" panose="020B0604030504040204" pitchFamily="34" charset="0"/>
+              </a:rPr>
+              <a:t> </a:t>
+            </a:r>
+            <a:r>
+              <a:rPr lang="en-US" dirty="0" err="1" smtClean="0">
+                <a:latin typeface="+mj-lt"/>
+                <a:ea typeface="Verdana" panose="020B0604030504040204" pitchFamily="34" charset="0"/>
+              </a:rPr>
+              <a:t>relevantes</a:t>
+            </a:r>
+            <a:r>
+              <a:rPr lang="en-US" dirty="0" smtClean="0">
+                <a:latin typeface="+mj-lt"/>
+                <a:ea typeface="Verdana" panose="020B0604030504040204" pitchFamily="34" charset="0"/>
+              </a:rPr>
+              <a:t> para o </a:t>
+            </a:r>
+            <a:r>
+              <a:rPr lang="en-US" dirty="0" err="1" smtClean="0">
+                <a:latin typeface="+mj-lt"/>
+                <a:ea typeface="Verdana" panose="020B0604030504040204" pitchFamily="34" charset="0"/>
+              </a:rPr>
+              <a:t>problema</a:t>
+            </a:r>
+            <a:r>
+              <a:rPr lang="en-US" dirty="0" smtClean="0">
+                <a:latin typeface="+mj-lt"/>
+                <a:ea typeface="Verdana" panose="020B0604030504040204" pitchFamily="34" charset="0"/>
+              </a:rPr>
+              <a:t>.</a:t>
+            </a:r>
+          </a:p>
+          <a:p>
+            <a:pPr marL="285750" indent="-285750">
+              <a:buFont typeface="Arial" panose="020B0604020202020204" pitchFamily="34" charset="0"/>
+              <a:buChar char="•"/>
+            </a:pPr>
+            <a:endParaRPr lang="en-US" dirty="0" smtClean="0">
+              <a:latin typeface="+mj-lt"/>
+              <a:ea typeface="Verdana" panose="020B0604030504040204" pitchFamily="34" charset="0"/>
+            </a:endParaRPr>
+          </a:p>
+          <a:p>
+            <a:pPr marL="285750" indent="-285750">
+              <a:buFont typeface="Arial" panose="020B0604020202020204" pitchFamily="34" charset="0"/>
+              <a:buChar char="•"/>
+            </a:pPr>
+            <a:r>
+              <a:rPr lang="en-US" b="1" dirty="0" err="1" smtClean="0">
+                <a:latin typeface="+mj-lt"/>
+                <a:ea typeface="Verdana" panose="020B0604030504040204" pitchFamily="34" charset="0"/>
+              </a:rPr>
+              <a:t>Exemplo</a:t>
+            </a:r>
+            <a:r>
+              <a:rPr lang="en-US" dirty="0" smtClean="0">
+                <a:latin typeface="+mj-lt"/>
+                <a:ea typeface="Verdana" panose="020B0604030504040204" pitchFamily="34" charset="0"/>
+              </a:rPr>
+              <a:t>: Para </a:t>
+            </a:r>
+            <a:r>
+              <a:rPr lang="en-US" dirty="0" err="1" smtClean="0">
+                <a:latin typeface="+mj-lt"/>
+                <a:ea typeface="Verdana" panose="020B0604030504040204" pitchFamily="34" charset="0"/>
+              </a:rPr>
+              <a:t>selecionar</a:t>
+            </a:r>
+            <a:r>
+              <a:rPr lang="en-US" dirty="0" smtClean="0">
+                <a:latin typeface="+mj-lt"/>
+                <a:ea typeface="Verdana" panose="020B0604030504040204" pitchFamily="34" charset="0"/>
+              </a:rPr>
+              <a:t> </a:t>
+            </a:r>
+            <a:r>
+              <a:rPr lang="en-US" dirty="0" err="1" smtClean="0">
+                <a:latin typeface="+mj-lt"/>
+                <a:ea typeface="Verdana" panose="020B0604030504040204" pitchFamily="34" charset="0"/>
+              </a:rPr>
+              <a:t>alunos</a:t>
+            </a:r>
+            <a:r>
+              <a:rPr lang="en-US" dirty="0" smtClean="0">
+                <a:latin typeface="+mj-lt"/>
+                <a:ea typeface="Verdana" panose="020B0604030504040204" pitchFamily="34" charset="0"/>
+              </a:rPr>
+              <a:t> para </a:t>
+            </a:r>
+            <a:r>
+              <a:rPr lang="en-US" dirty="0" err="1" smtClean="0">
+                <a:latin typeface="+mj-lt"/>
+                <a:ea typeface="Verdana" panose="020B0604030504040204" pitchFamily="34" charset="0"/>
+              </a:rPr>
+              <a:t>representar</a:t>
+            </a:r>
+            <a:r>
+              <a:rPr lang="en-US" dirty="0" smtClean="0">
+                <a:latin typeface="+mj-lt"/>
+                <a:ea typeface="Verdana" panose="020B0604030504040204" pitchFamily="34" charset="0"/>
+              </a:rPr>
+              <a:t> </a:t>
+            </a:r>
+            <a:r>
+              <a:rPr lang="en-US" dirty="0" err="1" smtClean="0">
+                <a:latin typeface="+mj-lt"/>
+                <a:ea typeface="Verdana" panose="020B0604030504040204" pitchFamily="34" charset="0"/>
+              </a:rPr>
+              <a:t>uma</a:t>
+            </a:r>
+            <a:r>
+              <a:rPr lang="en-US" dirty="0" smtClean="0">
+                <a:latin typeface="+mj-lt"/>
+                <a:ea typeface="Verdana" panose="020B0604030504040204" pitchFamily="34" charset="0"/>
+              </a:rPr>
+              <a:t> </a:t>
+            </a:r>
+            <a:r>
+              <a:rPr lang="en-US" dirty="0" err="1" smtClean="0">
+                <a:latin typeface="+mj-lt"/>
+                <a:ea typeface="Verdana" panose="020B0604030504040204" pitchFamily="34" charset="0"/>
+              </a:rPr>
+              <a:t>universidade</a:t>
+            </a:r>
+            <a:r>
+              <a:rPr lang="en-US" dirty="0" smtClean="0">
+                <a:latin typeface="+mj-lt"/>
+                <a:ea typeface="Verdana" panose="020B0604030504040204" pitchFamily="34" charset="0"/>
+              </a:rPr>
+              <a:t> </a:t>
+            </a:r>
+            <a:r>
+              <a:rPr lang="en-US" dirty="0" err="1" smtClean="0">
+                <a:latin typeface="+mj-lt"/>
+                <a:ea typeface="Verdana" panose="020B0604030504040204" pitchFamily="34" charset="0"/>
+              </a:rPr>
+              <a:t>pública</a:t>
+            </a:r>
+            <a:r>
+              <a:rPr lang="en-US" dirty="0" smtClean="0">
+                <a:latin typeface="+mj-lt"/>
+                <a:ea typeface="Verdana" panose="020B0604030504040204" pitchFamily="34" charset="0"/>
+              </a:rPr>
+              <a:t> </a:t>
+            </a:r>
+            <a:r>
+              <a:rPr lang="en-US" dirty="0" err="1" smtClean="0">
+                <a:latin typeface="+mj-lt"/>
+                <a:ea typeface="Verdana" panose="020B0604030504040204" pitchFamily="34" charset="0"/>
+              </a:rPr>
+              <a:t>em</a:t>
+            </a:r>
+            <a:r>
+              <a:rPr lang="en-US" dirty="0" smtClean="0">
+                <a:latin typeface="+mj-lt"/>
+                <a:ea typeface="Verdana" panose="020B0604030504040204" pitchFamily="34" charset="0"/>
+              </a:rPr>
+              <a:t> um </a:t>
+            </a:r>
+            <a:r>
+              <a:rPr lang="en-US" dirty="0" err="1" smtClean="0">
+                <a:latin typeface="+mj-lt"/>
+                <a:ea typeface="Verdana" panose="020B0604030504040204" pitchFamily="34" charset="0"/>
+              </a:rPr>
+              <a:t>evento</a:t>
+            </a:r>
+            <a:r>
+              <a:rPr lang="en-US" dirty="0" smtClean="0">
+                <a:latin typeface="+mj-lt"/>
+                <a:ea typeface="Verdana" panose="020B0604030504040204" pitchFamily="34" charset="0"/>
+              </a:rPr>
+              <a:t>.</a:t>
+            </a:r>
+          </a:p>
+          <a:p>
+            <a:pPr marL="285750" indent="-285750">
+              <a:buFont typeface="Arial" panose="020B0604020202020204" pitchFamily="34" charset="0"/>
+              <a:buChar char="•"/>
+            </a:pPr>
+            <a:endParaRPr lang="en-US" dirty="0" smtClean="0">
+              <a:latin typeface="+mj-lt"/>
+              <a:ea typeface="Verdana" panose="020B0604030504040204" pitchFamily="34" charset="0"/>
+            </a:endParaRPr>
+          </a:p>
+          <a:p>
+            <a:pPr marL="285750" indent="-285750">
+              <a:buFont typeface="Arial" panose="020B0604020202020204" pitchFamily="34" charset="0"/>
+              <a:buChar char="•"/>
+            </a:pPr>
+            <a:r>
+              <a:rPr lang="en-US" dirty="0" err="1" smtClean="0">
+                <a:latin typeface="+mj-lt"/>
+                <a:ea typeface="Verdana" panose="020B0604030504040204" pitchFamily="34" charset="0"/>
+              </a:rPr>
+              <a:t>Atributos</a:t>
+            </a:r>
+            <a:r>
+              <a:rPr lang="en-US" dirty="0" smtClean="0">
+                <a:latin typeface="+mj-lt"/>
+                <a:ea typeface="Verdana" panose="020B0604030504040204" pitchFamily="34" charset="0"/>
+              </a:rPr>
+              <a:t> </a:t>
+            </a:r>
+            <a:r>
+              <a:rPr lang="en-US" dirty="0" err="1" smtClean="0">
+                <a:latin typeface="+mj-lt"/>
+                <a:ea typeface="Verdana" panose="020B0604030504040204" pitchFamily="34" charset="0"/>
+              </a:rPr>
+              <a:t>importantes</a:t>
+            </a:r>
+            <a:r>
+              <a:rPr lang="en-US" dirty="0" smtClean="0">
+                <a:latin typeface="+mj-lt"/>
+                <a:ea typeface="Verdana" panose="020B0604030504040204" pitchFamily="34" charset="0"/>
+              </a:rPr>
+              <a:t>: </a:t>
+            </a:r>
+            <a:r>
+              <a:rPr lang="en-US" dirty="0" err="1" smtClean="0">
+                <a:latin typeface="+mj-lt"/>
+                <a:ea typeface="Verdana" panose="020B0604030504040204" pitchFamily="34" charset="0"/>
+              </a:rPr>
+              <a:t>sexo</a:t>
+            </a:r>
+            <a:r>
+              <a:rPr lang="en-US" dirty="0" smtClean="0">
+                <a:latin typeface="+mj-lt"/>
+                <a:ea typeface="Verdana" panose="020B0604030504040204" pitchFamily="34" charset="0"/>
+              </a:rPr>
+              <a:t>, </a:t>
+            </a:r>
+            <a:r>
+              <a:rPr lang="en-US" dirty="0" err="1" smtClean="0">
+                <a:latin typeface="+mj-lt"/>
+                <a:ea typeface="Verdana" panose="020B0604030504040204" pitchFamily="34" charset="0"/>
+              </a:rPr>
+              <a:t>idade</a:t>
+            </a:r>
+            <a:r>
+              <a:rPr lang="en-US" dirty="0" smtClean="0">
+                <a:latin typeface="+mj-lt"/>
+                <a:ea typeface="Verdana" panose="020B0604030504040204" pitchFamily="34" charset="0"/>
+              </a:rPr>
+              <a:t>, </a:t>
+            </a:r>
+            <a:r>
+              <a:rPr lang="en-US" dirty="0" err="1" smtClean="0">
+                <a:latin typeface="+mj-lt"/>
+                <a:ea typeface="Verdana" panose="020B0604030504040204" pitchFamily="34" charset="0"/>
+              </a:rPr>
+              <a:t>região</a:t>
+            </a:r>
+            <a:r>
+              <a:rPr lang="en-US" dirty="0" smtClean="0">
+                <a:latin typeface="+mj-lt"/>
+                <a:ea typeface="Verdana" panose="020B0604030504040204" pitchFamily="34" charset="0"/>
+              </a:rPr>
+              <a:t> do </a:t>
+            </a:r>
+            <a:r>
+              <a:rPr lang="en-US" dirty="0" err="1" smtClean="0">
+                <a:latin typeface="+mj-lt"/>
+                <a:ea typeface="Verdana" panose="020B0604030504040204" pitchFamily="34" charset="0"/>
+              </a:rPr>
+              <a:t>pais</a:t>
+            </a:r>
+            <a:r>
+              <a:rPr lang="en-US" dirty="0" smtClean="0">
+                <a:latin typeface="+mj-lt"/>
+                <a:ea typeface="Verdana" panose="020B0604030504040204" pitchFamily="34" charset="0"/>
+              </a:rPr>
+              <a:t>, </a:t>
+            </a:r>
+            <a:r>
+              <a:rPr lang="en-US" dirty="0" err="1" smtClean="0">
+                <a:latin typeface="+mj-lt"/>
+                <a:ea typeface="Verdana" panose="020B0604030504040204" pitchFamily="34" charset="0"/>
+              </a:rPr>
+              <a:t>áreas</a:t>
+            </a:r>
+            <a:r>
+              <a:rPr lang="en-US" dirty="0" smtClean="0">
+                <a:latin typeface="+mj-lt"/>
+                <a:ea typeface="Verdana" panose="020B0604030504040204" pitchFamily="34" charset="0"/>
+              </a:rPr>
+              <a:t> de </a:t>
+            </a:r>
+            <a:r>
+              <a:rPr lang="en-US" dirty="0" err="1" smtClean="0">
+                <a:latin typeface="+mj-lt"/>
+                <a:ea typeface="Verdana" panose="020B0604030504040204" pitchFamily="34" charset="0"/>
+              </a:rPr>
+              <a:t>conhecimentos</a:t>
+            </a:r>
+            <a:r>
+              <a:rPr lang="en-US" dirty="0" smtClean="0">
+                <a:latin typeface="+mj-lt"/>
+                <a:ea typeface="Verdana" panose="020B0604030504040204" pitchFamily="34" charset="0"/>
+              </a:rPr>
+              <a:t>, </a:t>
+            </a:r>
+            <a:r>
+              <a:rPr lang="en-US" dirty="0" err="1" smtClean="0">
+                <a:latin typeface="+mj-lt"/>
+                <a:ea typeface="Verdana" panose="020B0604030504040204" pitchFamily="34" charset="0"/>
+              </a:rPr>
+              <a:t>remuneração</a:t>
+            </a:r>
+            <a:r>
+              <a:rPr lang="en-US" dirty="0" smtClean="0">
+                <a:latin typeface="+mj-lt"/>
+                <a:ea typeface="Verdana" panose="020B0604030504040204" pitchFamily="34" charset="0"/>
+              </a:rPr>
+              <a:t> familiar.</a:t>
+            </a:r>
+          </a:p>
+          <a:p>
+            <a:pPr marL="285750" indent="-285750">
+              <a:buFont typeface="Arial" panose="020B0604020202020204" pitchFamily="34" charset="0"/>
+              <a:buChar char="•"/>
+            </a:pPr>
+            <a:endParaRPr lang="en-US" dirty="0" smtClean="0">
+              <a:latin typeface="+mj-lt"/>
+              <a:ea typeface="Verdana" panose="020B0604030504040204" pitchFamily="34" charset="0"/>
+            </a:endParaRPr>
+          </a:p>
+          <a:p>
+            <a:pPr marL="285750" indent="-285750">
+              <a:buFont typeface="Arial" panose="020B0604020202020204" pitchFamily="34" charset="0"/>
+              <a:buChar char="•"/>
+            </a:pPr>
+            <a:r>
+              <a:rPr lang="en-US" dirty="0" smtClean="0">
+                <a:latin typeface="+mj-lt"/>
+                <a:ea typeface="Verdana" panose="020B0604030504040204" pitchFamily="34" charset="0"/>
+              </a:rPr>
+              <a:t>Para </a:t>
+            </a:r>
+            <a:r>
+              <a:rPr lang="en-US" dirty="0" err="1" smtClean="0">
+                <a:latin typeface="+mj-lt"/>
+                <a:ea typeface="Verdana" panose="020B0604030504040204" pitchFamily="34" charset="0"/>
+              </a:rPr>
+              <a:t>os</a:t>
+            </a:r>
+            <a:r>
+              <a:rPr lang="en-US" dirty="0" smtClean="0">
+                <a:latin typeface="+mj-lt"/>
+                <a:ea typeface="Verdana" panose="020B0604030504040204" pitchFamily="34" charset="0"/>
+              </a:rPr>
+              <a:t> </a:t>
+            </a:r>
+            <a:r>
+              <a:rPr lang="en-US" dirty="0" err="1" smtClean="0">
+                <a:latin typeface="+mj-lt"/>
+                <a:ea typeface="Verdana" panose="020B0604030504040204" pitchFamily="34" charset="0"/>
+              </a:rPr>
+              <a:t>atributos</a:t>
+            </a:r>
+            <a:r>
+              <a:rPr lang="en-US" dirty="0" smtClean="0">
+                <a:latin typeface="+mj-lt"/>
+                <a:ea typeface="Verdana" panose="020B0604030504040204" pitchFamily="34" charset="0"/>
+              </a:rPr>
+              <a:t> que </a:t>
+            </a:r>
+            <a:r>
+              <a:rPr lang="en-US" dirty="0" err="1" smtClean="0">
+                <a:latin typeface="+mj-lt"/>
+                <a:ea typeface="Verdana" panose="020B0604030504040204" pitchFamily="34" charset="0"/>
+              </a:rPr>
+              <a:t>não</a:t>
+            </a:r>
+            <a:r>
+              <a:rPr lang="en-US" dirty="0" smtClean="0">
+                <a:latin typeface="+mj-lt"/>
+                <a:ea typeface="Verdana" panose="020B0604030504040204" pitchFamily="34" charset="0"/>
+              </a:rPr>
+              <a:t> </a:t>
+            </a:r>
+            <a:r>
+              <a:rPr lang="en-US" dirty="0" err="1" smtClean="0">
+                <a:latin typeface="+mj-lt"/>
+                <a:ea typeface="Verdana" panose="020B0604030504040204" pitchFamily="34" charset="0"/>
+              </a:rPr>
+              <a:t>são</a:t>
+            </a:r>
+            <a:r>
+              <a:rPr lang="en-US" dirty="0" smtClean="0">
+                <a:latin typeface="+mj-lt"/>
+                <a:ea typeface="Verdana" panose="020B0604030504040204" pitchFamily="34" charset="0"/>
+              </a:rPr>
+              <a:t> </a:t>
+            </a:r>
+            <a:r>
+              <a:rPr lang="en-US" dirty="0" err="1" smtClean="0">
+                <a:latin typeface="+mj-lt"/>
+                <a:ea typeface="Verdana" panose="020B0604030504040204" pitchFamily="34" charset="0"/>
+              </a:rPr>
+              <a:t>númericos</a:t>
+            </a:r>
+            <a:r>
+              <a:rPr lang="en-US" dirty="0" smtClean="0">
+                <a:latin typeface="+mj-lt"/>
+                <a:ea typeface="Verdana" panose="020B0604030504040204" pitchFamily="34" charset="0"/>
+              </a:rPr>
+              <a:t>, </a:t>
+            </a:r>
+            <a:r>
+              <a:rPr lang="en-US" dirty="0" err="1" smtClean="0">
+                <a:latin typeface="+mj-lt"/>
+                <a:ea typeface="Verdana" panose="020B0604030504040204" pitchFamily="34" charset="0"/>
+              </a:rPr>
+              <a:t>podemos</a:t>
+            </a:r>
+            <a:r>
+              <a:rPr lang="en-US" dirty="0" smtClean="0">
+                <a:latin typeface="+mj-lt"/>
+                <a:ea typeface="Verdana" panose="020B0604030504040204" pitchFamily="34" charset="0"/>
+              </a:rPr>
+              <a:t> </a:t>
+            </a:r>
+            <a:r>
+              <a:rPr lang="en-US" dirty="0" err="1" smtClean="0">
+                <a:latin typeface="+mj-lt"/>
+                <a:ea typeface="Verdana" panose="020B0604030504040204" pitchFamily="34" charset="0"/>
+              </a:rPr>
+              <a:t>atribuir</a:t>
+            </a:r>
+            <a:r>
+              <a:rPr lang="en-US" dirty="0" smtClean="0">
+                <a:latin typeface="+mj-lt"/>
+                <a:ea typeface="Verdana" panose="020B0604030504040204" pitchFamily="34" charset="0"/>
+              </a:rPr>
+              <a:t> um valor </a:t>
+            </a:r>
+            <a:r>
+              <a:rPr lang="en-US" dirty="0" err="1" smtClean="0">
+                <a:latin typeface="+mj-lt"/>
+                <a:ea typeface="Verdana" panose="020B0604030504040204" pitchFamily="34" charset="0"/>
+              </a:rPr>
+              <a:t>inteiro</a:t>
+            </a:r>
+            <a:r>
+              <a:rPr lang="en-US" dirty="0" smtClean="0">
+                <a:latin typeface="+mj-lt"/>
+                <a:ea typeface="Verdana" panose="020B0604030504040204" pitchFamily="34" charset="0"/>
+              </a:rPr>
+              <a:t> para </a:t>
+            </a:r>
+            <a:r>
+              <a:rPr lang="en-US" dirty="0" err="1" smtClean="0">
+                <a:latin typeface="+mj-lt"/>
+                <a:ea typeface="Verdana" panose="020B0604030504040204" pitchFamily="34" charset="0"/>
+              </a:rPr>
+              <a:t>cada</a:t>
+            </a:r>
+            <a:r>
+              <a:rPr lang="en-US" dirty="0" smtClean="0">
+                <a:latin typeface="+mj-lt"/>
+                <a:ea typeface="Verdana" panose="020B0604030504040204" pitchFamily="34" charset="0"/>
+              </a:rPr>
+              <a:t> um dos </a:t>
+            </a:r>
+            <a:r>
+              <a:rPr lang="en-US" dirty="0" err="1" smtClean="0">
+                <a:latin typeface="+mj-lt"/>
+                <a:ea typeface="Verdana" panose="020B0604030504040204" pitchFamily="34" charset="0"/>
+              </a:rPr>
+              <a:t>possíveis</a:t>
+            </a:r>
+            <a:r>
+              <a:rPr lang="en-US" dirty="0" smtClean="0">
+                <a:latin typeface="+mj-lt"/>
+                <a:ea typeface="Verdana" panose="020B0604030504040204" pitchFamily="34" charset="0"/>
+              </a:rPr>
+              <a:t> </a:t>
+            </a:r>
+            <a:r>
+              <a:rPr lang="en-US" dirty="0" err="1" smtClean="0">
+                <a:latin typeface="+mj-lt"/>
+                <a:ea typeface="Verdana" panose="020B0604030504040204" pitchFamily="34" charset="0"/>
+              </a:rPr>
+              <a:t>valores</a:t>
+            </a:r>
+            <a:r>
+              <a:rPr lang="en-US" dirty="0" smtClean="0">
+                <a:latin typeface="+mj-lt"/>
+                <a:ea typeface="Verdana" panose="020B0604030504040204" pitchFamily="34" charset="0"/>
+              </a:rPr>
+              <a:t> (1 para </a:t>
+            </a:r>
+            <a:r>
+              <a:rPr lang="en-US" dirty="0" err="1" smtClean="0">
+                <a:latin typeface="+mj-lt"/>
+                <a:ea typeface="Verdana" panose="020B0604030504040204" pitchFamily="34" charset="0"/>
+              </a:rPr>
+              <a:t>para</a:t>
+            </a:r>
+            <a:r>
+              <a:rPr lang="en-US" dirty="0" smtClean="0">
+                <a:latin typeface="+mj-lt"/>
+                <a:ea typeface="Verdana" panose="020B0604030504040204" pitchFamily="34" charset="0"/>
+              </a:rPr>
+              <a:t> </a:t>
+            </a:r>
+            <a:r>
+              <a:rPr lang="en-US" dirty="0" err="1" smtClean="0">
+                <a:latin typeface="+mj-lt"/>
+                <a:ea typeface="Verdana" panose="020B0604030504040204" pitchFamily="34" charset="0"/>
+              </a:rPr>
+              <a:t>sexo</a:t>
+            </a:r>
+            <a:r>
+              <a:rPr lang="en-US" dirty="0" smtClean="0">
+                <a:latin typeface="+mj-lt"/>
+                <a:ea typeface="Verdana" panose="020B0604030504040204" pitchFamily="34" charset="0"/>
+              </a:rPr>
+              <a:t> masculine e 2 para o </a:t>
+            </a:r>
+            <a:r>
+              <a:rPr lang="en-US" dirty="0" err="1" smtClean="0">
+                <a:latin typeface="+mj-lt"/>
+                <a:ea typeface="Verdana" panose="020B0604030504040204" pitchFamily="34" charset="0"/>
+              </a:rPr>
+              <a:t>sexo</a:t>
+            </a:r>
+            <a:r>
+              <a:rPr lang="en-US" dirty="0" smtClean="0">
+                <a:latin typeface="+mj-lt"/>
+                <a:ea typeface="Verdana" panose="020B0604030504040204" pitchFamily="34" charset="0"/>
+              </a:rPr>
+              <a:t> </a:t>
+            </a:r>
+            <a:r>
+              <a:rPr lang="en-US" dirty="0" err="1" smtClean="0">
+                <a:latin typeface="+mj-lt"/>
+                <a:ea typeface="Verdana" panose="020B0604030504040204" pitchFamily="34" charset="0"/>
+              </a:rPr>
+              <a:t>feminino</a:t>
+            </a:r>
+            <a:r>
+              <a:rPr lang="en-US" dirty="0" smtClean="0">
+                <a:latin typeface="+mj-lt"/>
+                <a:ea typeface="Verdana" panose="020B0604030504040204" pitchFamily="34" charset="0"/>
+              </a:rPr>
+              <a:t>).</a:t>
+            </a:r>
+          </a:p>
+          <a:p>
+            <a:pPr marL="285750" indent="-285750">
+              <a:buFont typeface="Arial" panose="020B0604020202020204" pitchFamily="34" charset="0"/>
+              <a:buChar char="•"/>
+            </a:pPr>
+            <a:endParaRPr lang="en-US" dirty="0">
+              <a:latin typeface="+mj-lt"/>
+              <a:ea typeface="Verdana" panose="020B0604030504040204" pitchFamily="34" charset="0"/>
+            </a:endParaRPr>
+          </a:p>
+          <a:p>
+            <a:pPr marL="285750" indent="-285750">
+              <a:buFont typeface="Arial" panose="020B0604020202020204" pitchFamily="34" charset="0"/>
+              <a:buChar char="•"/>
+            </a:pPr>
+            <a:r>
+              <a:rPr lang="en-US" dirty="0" err="1" smtClean="0">
+                <a:latin typeface="+mj-lt"/>
+                <a:ea typeface="Verdana" panose="020B0604030504040204" pitchFamily="34" charset="0"/>
+              </a:rPr>
+              <a:t>Atributos</a:t>
+            </a:r>
+            <a:r>
+              <a:rPr lang="en-US" dirty="0" smtClean="0">
+                <a:latin typeface="+mj-lt"/>
+                <a:ea typeface="Verdana" panose="020B0604030504040204" pitchFamily="34" charset="0"/>
+              </a:rPr>
+              <a:t> </a:t>
+            </a:r>
+            <a:r>
+              <a:rPr lang="en-US" dirty="0" err="1" smtClean="0">
+                <a:latin typeface="+mj-lt"/>
+                <a:ea typeface="Verdana" panose="020B0604030504040204" pitchFamily="34" charset="0"/>
+              </a:rPr>
+              <a:t>númericos</a:t>
+            </a:r>
+            <a:r>
+              <a:rPr lang="en-US" dirty="0" smtClean="0">
+                <a:latin typeface="+mj-lt"/>
+                <a:ea typeface="Verdana" panose="020B0604030504040204" pitchFamily="34" charset="0"/>
+              </a:rPr>
+              <a:t> </a:t>
+            </a:r>
+            <a:r>
+              <a:rPr lang="en-US" dirty="0" err="1" smtClean="0">
+                <a:latin typeface="+mj-lt"/>
+                <a:ea typeface="Verdana" panose="020B0604030504040204" pitchFamily="34" charset="0"/>
+              </a:rPr>
+              <a:t>podemos</a:t>
+            </a:r>
+            <a:r>
+              <a:rPr lang="en-US" dirty="0" smtClean="0">
+                <a:latin typeface="+mj-lt"/>
+                <a:ea typeface="Verdana" panose="020B0604030504040204" pitchFamily="34" charset="0"/>
+              </a:rPr>
+              <a:t> </a:t>
+            </a:r>
+            <a:r>
+              <a:rPr lang="en-US" dirty="0" err="1" smtClean="0">
+                <a:latin typeface="+mj-lt"/>
+                <a:ea typeface="Verdana" panose="020B0604030504040204" pitchFamily="34" charset="0"/>
+              </a:rPr>
+              <a:t>criar</a:t>
+            </a:r>
+            <a:r>
+              <a:rPr lang="en-US" dirty="0" smtClean="0">
+                <a:latin typeface="+mj-lt"/>
+                <a:ea typeface="Verdana" panose="020B0604030504040204" pitchFamily="34" charset="0"/>
+              </a:rPr>
+              <a:t> </a:t>
+            </a:r>
+            <a:r>
+              <a:rPr lang="en-US" dirty="0" err="1" smtClean="0">
+                <a:latin typeface="+mj-lt"/>
+                <a:ea typeface="Verdana" panose="020B0604030504040204" pitchFamily="34" charset="0"/>
+              </a:rPr>
+              <a:t>intervalos</a:t>
+            </a:r>
+            <a:r>
+              <a:rPr lang="en-US" dirty="0" smtClean="0">
+                <a:latin typeface="+mj-lt"/>
+                <a:ea typeface="Verdana" panose="020B0604030504040204" pitchFamily="34" charset="0"/>
+              </a:rPr>
+              <a:t> de </a:t>
+            </a:r>
+            <a:r>
+              <a:rPr lang="en-US" dirty="0" err="1" smtClean="0">
+                <a:latin typeface="+mj-lt"/>
+                <a:ea typeface="Verdana" panose="020B0604030504040204" pitchFamily="34" charset="0"/>
+              </a:rPr>
+              <a:t>valores</a:t>
+            </a:r>
+            <a:r>
+              <a:rPr lang="en-US" dirty="0" smtClean="0">
+                <a:latin typeface="+mj-lt"/>
+                <a:ea typeface="Verdana" panose="020B0604030504040204" pitchFamily="34" charset="0"/>
+              </a:rPr>
+              <a:t> e </a:t>
+            </a:r>
+            <a:r>
+              <a:rPr lang="en-US" dirty="0" err="1" smtClean="0">
+                <a:latin typeface="+mj-lt"/>
+                <a:ea typeface="Verdana" panose="020B0604030504040204" pitchFamily="34" charset="0"/>
+              </a:rPr>
+              <a:t>atribuir</a:t>
+            </a:r>
+            <a:r>
+              <a:rPr lang="en-US" dirty="0" smtClean="0">
+                <a:latin typeface="+mj-lt"/>
+                <a:ea typeface="Verdana" panose="020B0604030504040204" pitchFamily="34" charset="0"/>
+              </a:rPr>
+              <a:t> um valor </a:t>
+            </a:r>
+            <a:r>
+              <a:rPr lang="en-US" dirty="0" err="1" smtClean="0">
+                <a:latin typeface="+mj-lt"/>
+                <a:ea typeface="Verdana" panose="020B0604030504040204" pitchFamily="34" charset="0"/>
+              </a:rPr>
+              <a:t>inteiro</a:t>
+            </a:r>
+            <a:r>
+              <a:rPr lang="en-US" dirty="0" smtClean="0">
+                <a:latin typeface="+mj-lt"/>
+                <a:ea typeface="Verdana" panose="020B0604030504040204" pitchFamily="34" charset="0"/>
+              </a:rPr>
+              <a:t> para </a:t>
+            </a:r>
+            <a:r>
+              <a:rPr lang="en-US" dirty="0" err="1" smtClean="0">
+                <a:latin typeface="+mj-lt"/>
+                <a:ea typeface="Verdana" panose="020B0604030504040204" pitchFamily="34" charset="0"/>
+              </a:rPr>
+              <a:t>cada</a:t>
+            </a:r>
+            <a:r>
+              <a:rPr lang="en-US" dirty="0" smtClean="0">
+                <a:latin typeface="+mj-lt"/>
+                <a:ea typeface="Verdana" panose="020B0604030504040204" pitchFamily="34" charset="0"/>
+              </a:rPr>
+              <a:t> </a:t>
+            </a:r>
+            <a:r>
+              <a:rPr lang="en-US" dirty="0" err="1" smtClean="0">
+                <a:latin typeface="+mj-lt"/>
+                <a:ea typeface="Verdana" panose="020B0604030504040204" pitchFamily="34" charset="0"/>
+              </a:rPr>
+              <a:t>intervalo</a:t>
+            </a:r>
+            <a:r>
+              <a:rPr lang="en-US" dirty="0" smtClean="0">
+                <a:latin typeface="+mj-lt"/>
+                <a:ea typeface="Verdana" panose="020B0604030504040204" pitchFamily="34" charset="0"/>
+              </a:rPr>
+              <a:t>   ( </a:t>
+            </a:r>
+            <a:r>
+              <a:rPr lang="en-US" dirty="0" err="1" smtClean="0">
+                <a:latin typeface="+mj-lt"/>
+                <a:ea typeface="Verdana" panose="020B0604030504040204" pitchFamily="34" charset="0"/>
+              </a:rPr>
+              <a:t>remuneração</a:t>
+            </a:r>
+            <a:r>
+              <a:rPr lang="en-US" dirty="0" smtClean="0">
+                <a:latin typeface="+mj-lt"/>
+                <a:ea typeface="Verdana" panose="020B0604030504040204" pitchFamily="34" charset="0"/>
+              </a:rPr>
+              <a:t> familiar, </a:t>
+            </a:r>
+            <a:r>
+              <a:rPr lang="en-US" dirty="0" err="1" smtClean="0">
+                <a:latin typeface="+mj-lt"/>
+                <a:ea typeface="Verdana" panose="020B0604030504040204" pitchFamily="34" charset="0"/>
+              </a:rPr>
+              <a:t>até</a:t>
+            </a:r>
+            <a:r>
+              <a:rPr lang="en-US" dirty="0" smtClean="0">
+                <a:latin typeface="+mj-lt"/>
+                <a:ea typeface="Verdana" panose="020B0604030504040204" pitchFamily="34" charset="0"/>
+              </a:rPr>
+              <a:t> 2 </a:t>
+            </a:r>
+            <a:r>
+              <a:rPr lang="en-US" dirty="0" err="1" smtClean="0">
+                <a:latin typeface="+mj-lt"/>
+                <a:ea typeface="Verdana" panose="020B0604030504040204" pitchFamily="34" charset="0"/>
+              </a:rPr>
+              <a:t>salários</a:t>
+            </a:r>
+            <a:r>
+              <a:rPr lang="en-US" dirty="0" smtClean="0">
+                <a:latin typeface="+mj-lt"/>
+                <a:ea typeface="Verdana" panose="020B0604030504040204" pitchFamily="34" charset="0"/>
+              </a:rPr>
+              <a:t> </a:t>
+            </a:r>
+            <a:r>
+              <a:rPr lang="en-US" dirty="0" err="1" smtClean="0">
+                <a:latin typeface="+mj-lt"/>
+                <a:ea typeface="Verdana" panose="020B0604030504040204" pitchFamily="34" charset="0"/>
+              </a:rPr>
+              <a:t>recebe</a:t>
+            </a:r>
+            <a:r>
+              <a:rPr lang="en-US" dirty="0" smtClean="0">
+                <a:latin typeface="+mj-lt"/>
+                <a:ea typeface="Verdana" panose="020B0604030504040204" pitchFamily="34" charset="0"/>
+              </a:rPr>
+              <a:t> o valor 1, de 3 </a:t>
+            </a:r>
+            <a:r>
+              <a:rPr lang="en-US" dirty="0" err="1" smtClean="0">
+                <a:latin typeface="+mj-lt"/>
+                <a:ea typeface="Verdana" panose="020B0604030504040204" pitchFamily="34" charset="0"/>
+              </a:rPr>
+              <a:t>até</a:t>
+            </a:r>
+            <a:r>
+              <a:rPr lang="en-US" dirty="0" smtClean="0">
+                <a:latin typeface="+mj-lt"/>
+                <a:ea typeface="Verdana" panose="020B0604030504040204" pitchFamily="34" charset="0"/>
+              </a:rPr>
+              <a:t> 5 </a:t>
+            </a:r>
+            <a:r>
+              <a:rPr lang="en-US" dirty="0" err="1" smtClean="0">
+                <a:latin typeface="+mj-lt"/>
+                <a:ea typeface="Verdana" panose="020B0604030504040204" pitchFamily="34" charset="0"/>
+              </a:rPr>
+              <a:t>salários</a:t>
+            </a:r>
+            <a:r>
+              <a:rPr lang="en-US" dirty="0" smtClean="0">
+                <a:latin typeface="+mj-lt"/>
+                <a:ea typeface="Verdana" panose="020B0604030504040204" pitchFamily="34" charset="0"/>
+              </a:rPr>
+              <a:t> </a:t>
+            </a:r>
+            <a:r>
+              <a:rPr lang="en-US" dirty="0" err="1" smtClean="0">
+                <a:latin typeface="+mj-lt"/>
+                <a:ea typeface="Verdana" panose="020B0604030504040204" pitchFamily="34" charset="0"/>
+              </a:rPr>
+              <a:t>recebe</a:t>
+            </a:r>
+            <a:r>
+              <a:rPr lang="en-US" dirty="0" smtClean="0">
+                <a:latin typeface="+mj-lt"/>
+                <a:ea typeface="Verdana" panose="020B0604030504040204" pitchFamily="34" charset="0"/>
+              </a:rPr>
+              <a:t> o valor 2, e </a:t>
+            </a:r>
+            <a:r>
+              <a:rPr lang="en-US" dirty="0" err="1" smtClean="0">
+                <a:latin typeface="+mj-lt"/>
+                <a:ea typeface="Verdana" panose="020B0604030504040204" pitchFamily="34" charset="0"/>
+              </a:rPr>
+              <a:t>assim</a:t>
+            </a:r>
+            <a:r>
+              <a:rPr lang="en-US" dirty="0" smtClean="0">
+                <a:latin typeface="+mj-lt"/>
+                <a:ea typeface="Verdana" panose="020B0604030504040204" pitchFamily="34" charset="0"/>
+              </a:rPr>
+              <a:t> </a:t>
+            </a:r>
+            <a:r>
+              <a:rPr lang="en-US" dirty="0" err="1" smtClean="0">
+                <a:latin typeface="+mj-lt"/>
+                <a:ea typeface="Verdana" panose="020B0604030504040204" pitchFamily="34" charset="0"/>
+              </a:rPr>
+              <a:t>por</a:t>
+            </a:r>
+            <a:r>
+              <a:rPr lang="en-US" dirty="0" smtClean="0">
+                <a:latin typeface="+mj-lt"/>
+                <a:ea typeface="Verdana" panose="020B0604030504040204" pitchFamily="34" charset="0"/>
+              </a:rPr>
+              <a:t> </a:t>
+            </a:r>
+            <a:r>
+              <a:rPr lang="en-US" dirty="0" err="1" smtClean="0">
+                <a:latin typeface="+mj-lt"/>
+                <a:ea typeface="Verdana" panose="020B0604030504040204" pitchFamily="34" charset="0"/>
+              </a:rPr>
+              <a:t>diante</a:t>
+            </a:r>
+            <a:r>
+              <a:rPr lang="en-US" dirty="0" smtClean="0">
+                <a:latin typeface="+mj-lt"/>
+                <a:ea typeface="Verdana" panose="020B0604030504040204" pitchFamily="34" charset="0"/>
+              </a:rPr>
+              <a:t>).</a:t>
+            </a:r>
+            <a:endParaRPr lang="en-US" dirty="0">
+              <a:latin typeface="+mj-lt"/>
+              <a:ea typeface="Verdana" panose="020B0604030504040204" pitchFamily="34" charset="0"/>
+            </a:endParaRPr>
+          </a:p>
+          <a:p>
+            <a:pPr marL="285750" indent="-285750">
+              <a:buFont typeface="Arial" panose="020B0604020202020204" pitchFamily="34" charset="0"/>
+              <a:buChar char="•"/>
+            </a:pPr>
+            <a:endParaRPr lang="pt-BR" dirty="0"/>
+          </a:p>
+        </p:txBody>
+      </p:sp>
     </p:spTree>
     <p:extLst>
       <p:ext uri="{BB962C8B-B14F-4D97-AF65-F5344CB8AC3E}">
@@ -7646,6 +8572,13 @@
   <p:clrMapOvr>
     <a:masterClrMapping/>
   </p:clrMapOvr>
+  <p:timing>
+    <p:tnLst>
+      <p:par>
+        <p:cTn id="1" dur="indefinite" restart="never" nodeType="tmRoot"/>
+      </p:par>
+    </p:tnLst>
+  </p:timing>
 </p:sld>
 </file>
 
@@ -7803,7 +8736,7 @@
         </p:blipFill>
         <p:spPr>
           <a:xfrm>
-            <a:off x="393548" y="2406475"/>
+            <a:off x="1959394" y="1044265"/>
             <a:ext cx="4270166" cy="2045049"/>
           </a:xfrm>
           <a:prstGeom prst="rect">
@@ -7825,8 +8758,8 @@
         </p:nvSpPr>
         <p:spPr>
           <a:xfrm>
-            <a:off x="5004048" y="1988840"/>
-            <a:ext cx="3096344" cy="3108543"/>
+            <a:off x="862592" y="3501008"/>
+            <a:ext cx="7165791" cy="1754326"/>
           </a:xfrm>
           <a:prstGeom prst="rect">
             <a:avLst/>
@@ -7844,11 +8777,151 @@
               <a:buChar char="•"/>
             </a:pPr>
             <a:r>
-              <a:rPr lang="en-US" sz="1600" b="1" dirty="0">
-                <a:latin typeface="Verdana" panose="020B0604030504040204" pitchFamily="34" charset="0"/>
-                <a:ea typeface="Verdana" panose="020B0604030504040204" pitchFamily="34" charset="0"/>
-              </a:rPr>
-              <a:t>A</a:t>
+              <a:rPr lang="en-US" dirty="0" smtClean="0">
+                <a:latin typeface="+mj-lt"/>
+                <a:ea typeface="Verdana" panose="020B0604030504040204" pitchFamily="34" charset="0"/>
+              </a:rPr>
+              <a:t>Para </a:t>
+            </a:r>
+            <a:r>
+              <a:rPr lang="en-US" dirty="0" err="1" smtClean="0">
+                <a:latin typeface="+mj-lt"/>
+                <a:ea typeface="Verdana" panose="020B0604030504040204" pitchFamily="34" charset="0"/>
+              </a:rPr>
+              <a:t>selecionar</a:t>
+            </a:r>
+            <a:r>
+              <a:rPr lang="en-US" dirty="0" smtClean="0">
+                <a:latin typeface="+mj-lt"/>
+                <a:ea typeface="Verdana" panose="020B0604030504040204" pitchFamily="34" charset="0"/>
+              </a:rPr>
+              <a:t> um </a:t>
+            </a:r>
+            <a:r>
+              <a:rPr lang="en-US" dirty="0" err="1" smtClean="0">
+                <a:latin typeface="+mj-lt"/>
+                <a:ea typeface="Verdana" panose="020B0604030504040204" pitchFamily="34" charset="0"/>
+              </a:rPr>
+              <a:t>elemento</a:t>
+            </a:r>
+            <a:r>
+              <a:rPr lang="en-US" dirty="0" smtClean="0">
+                <a:latin typeface="+mj-lt"/>
+                <a:ea typeface="Verdana" panose="020B0604030504040204" pitchFamily="34" charset="0"/>
+              </a:rPr>
+              <a:t>, a </a:t>
+            </a:r>
+            <a:r>
+              <a:rPr lang="en-US" dirty="0" err="1" smtClean="0">
+                <a:latin typeface="+mj-lt"/>
+                <a:ea typeface="Verdana" panose="020B0604030504040204" pitchFamily="34" charset="0"/>
+              </a:rPr>
+              <a:t>sua</a:t>
+            </a:r>
+            <a:r>
+              <a:rPr lang="en-US" dirty="0" smtClean="0">
+                <a:latin typeface="+mj-lt"/>
+                <a:ea typeface="Verdana" panose="020B0604030504040204" pitchFamily="34" charset="0"/>
+              </a:rPr>
+              <a:t> soma das </a:t>
+            </a:r>
+            <a:r>
+              <a:rPr lang="en-US" dirty="0" err="1" smtClean="0">
+                <a:latin typeface="+mj-lt"/>
+                <a:ea typeface="Verdana" panose="020B0604030504040204" pitchFamily="34" charset="0"/>
+              </a:rPr>
+              <a:t>distâncias</a:t>
+            </a:r>
+            <a:r>
+              <a:rPr lang="en-US" dirty="0" smtClean="0">
+                <a:latin typeface="+mj-lt"/>
+                <a:ea typeface="Verdana" panose="020B0604030504040204" pitchFamily="34" charset="0"/>
+              </a:rPr>
+              <a:t> para </a:t>
+            </a:r>
+            <a:r>
+              <a:rPr lang="en-US" dirty="0" err="1" smtClean="0">
+                <a:latin typeface="+mj-lt"/>
+                <a:ea typeface="Verdana" panose="020B0604030504040204" pitchFamily="34" charset="0"/>
+              </a:rPr>
+              <a:t>todos</a:t>
+            </a:r>
+            <a:r>
+              <a:rPr lang="en-US" dirty="0" smtClean="0">
+                <a:latin typeface="+mj-lt"/>
+                <a:ea typeface="Verdana" panose="020B0604030504040204" pitchFamily="34" charset="0"/>
+              </a:rPr>
+              <a:t> </a:t>
+            </a:r>
+            <a:r>
+              <a:rPr lang="en-US" dirty="0" err="1" smtClean="0">
+                <a:latin typeface="+mj-lt"/>
+                <a:ea typeface="Verdana" panose="020B0604030504040204" pitchFamily="34" charset="0"/>
+              </a:rPr>
+              <a:t>os</a:t>
+            </a:r>
+            <a:r>
+              <a:rPr lang="en-US" dirty="0" smtClean="0">
+                <a:latin typeface="+mj-lt"/>
+                <a:ea typeface="Verdana" panose="020B0604030504040204" pitchFamily="34" charset="0"/>
+              </a:rPr>
+              <a:t> outros </a:t>
+            </a:r>
+            <a:r>
+              <a:rPr lang="en-US" dirty="0" err="1" smtClean="0">
+                <a:latin typeface="+mj-lt"/>
+                <a:ea typeface="Verdana" panose="020B0604030504040204" pitchFamily="34" charset="0"/>
+              </a:rPr>
+              <a:t>elementos</a:t>
+            </a:r>
+            <a:r>
+              <a:rPr lang="en-US" dirty="0" smtClean="0">
+                <a:latin typeface="+mj-lt"/>
+                <a:ea typeface="Verdana" panose="020B0604030504040204" pitchFamily="34" charset="0"/>
+              </a:rPr>
+              <a:t> tem que </a:t>
+            </a:r>
+            <a:r>
+              <a:rPr lang="en-US" dirty="0" err="1" smtClean="0">
+                <a:latin typeface="+mj-lt"/>
+                <a:ea typeface="Verdana" panose="020B0604030504040204" pitchFamily="34" charset="0"/>
+              </a:rPr>
+              <a:t>ser</a:t>
+            </a:r>
+            <a:r>
+              <a:rPr lang="en-US" dirty="0" smtClean="0">
+                <a:latin typeface="+mj-lt"/>
+                <a:ea typeface="Verdana" panose="020B0604030504040204" pitchFamily="34" charset="0"/>
+              </a:rPr>
+              <a:t> a </a:t>
+            </a:r>
+            <a:r>
+              <a:rPr lang="en-US" dirty="0" err="1" smtClean="0">
+                <a:latin typeface="+mj-lt"/>
+                <a:ea typeface="Verdana" panose="020B0604030504040204" pitchFamily="34" charset="0"/>
+              </a:rPr>
+              <a:t>maior</a:t>
+            </a:r>
+            <a:r>
+              <a:rPr lang="en-US" dirty="0" smtClean="0">
+                <a:latin typeface="+mj-lt"/>
+                <a:ea typeface="Verdana" panose="020B0604030504040204" pitchFamily="34" charset="0"/>
+              </a:rPr>
+              <a:t> </a:t>
+            </a:r>
+            <a:r>
+              <a:rPr lang="en-US" dirty="0" err="1" smtClean="0">
+                <a:latin typeface="+mj-lt"/>
+                <a:ea typeface="Verdana" panose="020B0604030504040204" pitchFamily="34" charset="0"/>
+              </a:rPr>
+              <a:t>possível</a:t>
+            </a:r>
+            <a:r>
+              <a:rPr lang="en-US" dirty="0" smtClean="0">
+                <a:latin typeface="+mj-lt"/>
+                <a:ea typeface="Verdana" panose="020B0604030504040204" pitchFamily="34" charset="0"/>
+              </a:rPr>
+              <a:t>.</a:t>
             </a:r>
           </a:p>
           <a:p>
@@ -7856,8 +8929,8 @@
               <a:buFont typeface="Arial" panose="020B0604020202020204" pitchFamily="34" charset="0"/>
               <a:buChar char="•"/>
             </a:pPr>
-            <a:endParaRPr lang="en-US" sz="1600" b="1" dirty="0">
-              <a:latin typeface="Verdana" panose="020B0604030504040204" pitchFamily="34" charset="0"/>
+            <a:endParaRPr lang="en-US" dirty="0">
+              <a:latin typeface="+mj-lt"/>
               <a:ea typeface="Verdana" panose="020B0604030504040204" pitchFamily="34" charset="0"/>
             </a:endParaRPr>
           </a:p>
@@ -7867,106 +8940,182 @@
               <a:buChar char="•"/>
             </a:pPr>
             <a:r>
-              <a:rPr lang="en-US" sz="1600" b="1" dirty="0">
-                <a:latin typeface="Verdana" panose="020B0604030504040204" pitchFamily="34" charset="0"/>
-                <a:ea typeface="Verdana" panose="020B0604030504040204" pitchFamily="34" charset="0"/>
-              </a:rPr>
-              <a:t>B</a:t>
-            </a:r>
-          </a:p>
-          <a:p>
-            <a:pPr marL="285750" indent="-285750">
-              <a:buFont typeface="Arial" panose="020B0604020202020204" pitchFamily="34" charset="0"/>
-              <a:buChar char="•"/>
-            </a:pPr>
-            <a:endParaRPr lang="en-US" sz="1600" b="1" dirty="0">
-              <a:latin typeface="Verdana" panose="020B0604030504040204" pitchFamily="34" charset="0"/>
-              <a:ea typeface="Verdana" panose="020B0604030504040204" pitchFamily="34" charset="0"/>
-            </a:endParaRPr>
-          </a:p>
-          <a:p>
-            <a:pPr marL="285750" indent="-285750">
-              <a:buFont typeface="Arial" panose="020B0604020202020204" pitchFamily="34" charset="0"/>
-              <a:buChar char="•"/>
-            </a:pPr>
-            <a:r>
-              <a:rPr lang="en-US" sz="1600" b="1" dirty="0">
-                <a:latin typeface="Verdana" panose="020B0604030504040204" pitchFamily="34" charset="0"/>
-                <a:ea typeface="Verdana" panose="020B0604030504040204" pitchFamily="34" charset="0"/>
-              </a:rPr>
-              <a:t>C</a:t>
-            </a:r>
-          </a:p>
-          <a:p>
-            <a:pPr marL="285750" indent="-285750">
-              <a:buFont typeface="Arial" panose="020B0604020202020204" pitchFamily="34" charset="0"/>
-              <a:buChar char="•"/>
-            </a:pPr>
-            <a:endParaRPr lang="en-US" sz="1600" b="1" dirty="0">
-              <a:latin typeface="Verdana" panose="020B0604030504040204" pitchFamily="34" charset="0"/>
-              <a:ea typeface="Verdana" panose="020B0604030504040204" pitchFamily="34" charset="0"/>
-            </a:endParaRPr>
-          </a:p>
-          <a:p>
-            <a:pPr marL="285750" indent="-285750">
-              <a:buFont typeface="Arial" panose="020B0604020202020204" pitchFamily="34" charset="0"/>
-              <a:buChar char="•"/>
-            </a:pPr>
-            <a:r>
-              <a:rPr lang="en-US" sz="1600" b="1" dirty="0">
-                <a:latin typeface="Verdana" panose="020B0604030504040204" pitchFamily="34" charset="0"/>
-                <a:ea typeface="Verdana" panose="020B0604030504040204" pitchFamily="34" charset="0"/>
-              </a:rPr>
-              <a:t>D</a:t>
-            </a:r>
-          </a:p>
-          <a:p>
-            <a:pPr marL="285750" indent="-285750">
-              <a:buFont typeface="Arial" panose="020B0604020202020204" pitchFamily="34" charset="0"/>
-              <a:buChar char="•"/>
-            </a:pPr>
-            <a:endParaRPr lang="en-US" sz="1600" b="1" dirty="0">
-              <a:latin typeface="Verdana" panose="020B0604030504040204" pitchFamily="34" charset="0"/>
-              <a:ea typeface="Verdana" panose="020B0604030504040204" pitchFamily="34" charset="0"/>
-            </a:endParaRPr>
-          </a:p>
-          <a:p>
-            <a:pPr marL="285750" indent="-285750">
-              <a:buFont typeface="Arial" panose="020B0604020202020204" pitchFamily="34" charset="0"/>
-              <a:buChar char="•"/>
-            </a:pPr>
-            <a:r>
-              <a:rPr lang="en-US" sz="1600" b="1" dirty="0">
-                <a:latin typeface="Verdana" panose="020B0604030504040204" pitchFamily="34" charset="0"/>
-                <a:ea typeface="Verdana" panose="020B0604030504040204" pitchFamily="34" charset="0"/>
-              </a:rPr>
-              <a:t>E</a:t>
-            </a:r>
-          </a:p>
-          <a:p>
-            <a:pPr marL="285750" indent="-285750">
-              <a:buFont typeface="Arial" panose="020B0604020202020204" pitchFamily="34" charset="0"/>
-              <a:buChar char="•"/>
-            </a:pPr>
-            <a:endParaRPr lang="en-US" sz="1600" b="1" dirty="0">
-              <a:latin typeface="Verdana" panose="020B0604030504040204" pitchFamily="34" charset="0"/>
-              <a:ea typeface="Verdana" panose="020B0604030504040204" pitchFamily="34" charset="0"/>
-            </a:endParaRPr>
-          </a:p>
-          <a:p>
-            <a:pPr marL="285750" indent="-285750">
-              <a:buFont typeface="Arial" panose="020B0604020202020204" pitchFamily="34" charset="0"/>
-              <a:buChar char="•"/>
-            </a:pPr>
-            <a:r>
-              <a:rPr lang="en-US" sz="1600" b="1" dirty="0">
-                <a:latin typeface="Verdana" panose="020B0604030504040204" pitchFamily="34" charset="0"/>
-                <a:ea typeface="Verdana" panose="020B0604030504040204" pitchFamily="34" charset="0"/>
-              </a:rPr>
-              <a:t>F</a:t>
-            </a:r>
-            <a:endParaRPr lang="en-US" b="1" dirty="0">
-              <a:latin typeface="Verdana" panose="020B0604030504040204" pitchFamily="34" charset="0"/>
+              <a:rPr lang="en-US" dirty="0" smtClean="0">
+                <a:latin typeface="+mj-lt"/>
+                <a:ea typeface="Verdana" panose="020B0604030504040204" pitchFamily="34" charset="0"/>
+              </a:rPr>
+              <a:t>Para resolver o </a:t>
+            </a:r>
+            <a:r>
+              <a:rPr lang="en-US" dirty="0" err="1" smtClean="0">
+                <a:latin typeface="+mj-lt"/>
+                <a:ea typeface="Verdana" panose="020B0604030504040204" pitchFamily="34" charset="0"/>
+              </a:rPr>
+              <a:t>problema</a:t>
+            </a:r>
+            <a:r>
+              <a:rPr lang="en-US" dirty="0" smtClean="0">
+                <a:latin typeface="+mj-lt"/>
+                <a:ea typeface="Verdana" panose="020B0604030504040204" pitchFamily="34" charset="0"/>
+              </a:rPr>
+              <a:t> da </a:t>
+            </a:r>
+            <a:r>
+              <a:rPr lang="en-US" dirty="0" err="1" smtClean="0">
+                <a:latin typeface="+mj-lt"/>
+                <a:ea typeface="Verdana" panose="020B0604030504040204" pitchFamily="34" charset="0"/>
+              </a:rPr>
+              <a:t>diversidade</a:t>
+            </a:r>
+            <a:r>
+              <a:rPr lang="en-US" dirty="0" smtClean="0">
+                <a:latin typeface="+mj-lt"/>
+                <a:ea typeface="Verdana" panose="020B0604030504040204" pitchFamily="34" charset="0"/>
+              </a:rPr>
+              <a:t> </a:t>
+            </a:r>
+            <a:r>
+              <a:rPr lang="en-US" dirty="0" err="1" smtClean="0">
+                <a:latin typeface="+mj-lt"/>
+                <a:ea typeface="Verdana" panose="020B0604030504040204" pitchFamily="34" charset="0"/>
+              </a:rPr>
+              <a:t>máxima</a:t>
+            </a:r>
+            <a:r>
+              <a:rPr lang="en-US" dirty="0" smtClean="0">
+                <a:latin typeface="+mj-lt"/>
+                <a:ea typeface="Verdana" panose="020B0604030504040204" pitchFamily="34" charset="0"/>
+              </a:rPr>
+              <a:t>, a soma dos </a:t>
+            </a:r>
+            <a:r>
+              <a:rPr lang="en-US" dirty="0" err="1" smtClean="0">
+                <a:latin typeface="+mj-lt"/>
+                <a:ea typeface="Verdana" panose="020B0604030504040204" pitchFamily="34" charset="0"/>
+              </a:rPr>
+              <a:t>valores</a:t>
+            </a:r>
+            <a:r>
+              <a:rPr lang="en-US" dirty="0" smtClean="0">
+                <a:latin typeface="+mj-lt"/>
+                <a:ea typeface="Verdana" panose="020B0604030504040204" pitchFamily="34" charset="0"/>
+              </a:rPr>
+              <a:t> do </a:t>
+            </a:r>
+            <a:r>
+              <a:rPr lang="en-US" dirty="0" err="1" smtClean="0">
+                <a:latin typeface="+mj-lt"/>
+                <a:ea typeface="Verdana" panose="020B0604030504040204" pitchFamily="34" charset="0"/>
+              </a:rPr>
+              <a:t>somatório</a:t>
+            </a:r>
+            <a:r>
+              <a:rPr lang="en-US" dirty="0" smtClean="0">
+                <a:latin typeface="+mj-lt"/>
+                <a:ea typeface="Verdana" panose="020B0604030504040204" pitchFamily="34" charset="0"/>
+              </a:rPr>
+              <a:t> de </a:t>
+            </a:r>
+            <a:r>
+              <a:rPr lang="en-US" dirty="0" err="1" smtClean="0">
+                <a:latin typeface="+mj-lt"/>
+                <a:ea typeface="Verdana" panose="020B0604030504040204" pitchFamily="34" charset="0"/>
+              </a:rPr>
+              <a:t>cada</a:t>
+            </a:r>
+            <a:r>
+              <a:rPr lang="en-US" dirty="0" smtClean="0">
+                <a:latin typeface="+mj-lt"/>
+                <a:ea typeface="Verdana" panose="020B0604030504040204" pitchFamily="34" charset="0"/>
+              </a:rPr>
+              <a:t> </a:t>
+            </a:r>
+            <a:r>
+              <a:rPr lang="en-US" dirty="0" err="1" smtClean="0">
+                <a:latin typeface="+mj-lt"/>
+                <a:ea typeface="Verdana" panose="020B0604030504040204" pitchFamily="34" charset="0"/>
+              </a:rPr>
+              <a:t>elemento</a:t>
+            </a:r>
+            <a:r>
+              <a:rPr lang="en-US" dirty="0" smtClean="0">
+                <a:latin typeface="+mj-lt"/>
+                <a:ea typeface="Verdana" panose="020B0604030504040204" pitchFamily="34" charset="0"/>
+              </a:rPr>
+              <a:t> </a:t>
+            </a:r>
+            <a:r>
+              <a:rPr lang="en-US" dirty="0" err="1" smtClean="0">
+                <a:latin typeface="+mj-lt"/>
+                <a:ea typeface="Verdana" panose="020B0604030504040204" pitchFamily="34" charset="0"/>
+              </a:rPr>
+              <a:t>selecionado</a:t>
+            </a:r>
+            <a:r>
+              <a:rPr lang="en-US" dirty="0" smtClean="0">
+                <a:latin typeface="+mj-lt"/>
+                <a:ea typeface="Verdana" panose="020B0604030504040204" pitchFamily="34" charset="0"/>
+              </a:rPr>
+              <a:t> </a:t>
+            </a:r>
+            <a:r>
+              <a:rPr lang="en-US" dirty="0" err="1" smtClean="0">
+                <a:latin typeface="+mj-lt"/>
+                <a:ea typeface="Verdana" panose="020B0604030504040204" pitchFamily="34" charset="0"/>
+              </a:rPr>
+              <a:t>deve</a:t>
+            </a:r>
+            <a:r>
+              <a:rPr lang="en-US" dirty="0" smtClean="0">
+                <a:latin typeface="+mj-lt"/>
+                <a:ea typeface="Verdana" panose="020B0604030504040204" pitchFamily="34" charset="0"/>
+              </a:rPr>
+              <a:t> </a:t>
+            </a:r>
+            <a:r>
+              <a:rPr lang="en-US" dirty="0" err="1" smtClean="0">
+                <a:latin typeface="+mj-lt"/>
+                <a:ea typeface="Verdana" panose="020B0604030504040204" pitchFamily="34" charset="0"/>
+              </a:rPr>
+              <a:t>ser</a:t>
+            </a:r>
+            <a:r>
+              <a:rPr lang="en-US" dirty="0" smtClean="0">
+                <a:latin typeface="+mj-lt"/>
+                <a:ea typeface="Verdana" panose="020B0604030504040204" pitchFamily="34" charset="0"/>
+              </a:rPr>
+              <a:t> o </a:t>
+            </a:r>
+            <a:r>
+              <a:rPr lang="en-US" dirty="0" err="1" smtClean="0">
+                <a:latin typeface="+mj-lt"/>
+                <a:ea typeface="Verdana" panose="020B0604030504040204" pitchFamily="34" charset="0"/>
+              </a:rPr>
+              <a:t>maior</a:t>
+            </a:r>
+            <a:r>
+              <a:rPr lang="en-US" dirty="0" smtClean="0">
+                <a:latin typeface="+mj-lt"/>
+                <a:ea typeface="Verdana" panose="020B0604030504040204" pitchFamily="34" charset="0"/>
+              </a:rPr>
+              <a:t> </a:t>
+            </a:r>
+            <a:r>
+              <a:rPr lang="en-US" dirty="0" err="1" smtClean="0">
+                <a:latin typeface="+mj-lt"/>
+                <a:ea typeface="Verdana" panose="020B0604030504040204" pitchFamily="34" charset="0"/>
+              </a:rPr>
+              <a:t>possível</a:t>
+            </a:r>
+            <a:r>
+              <a:rPr lang="en-US" dirty="0" smtClean="0">
+                <a:latin typeface="+mj-lt"/>
+                <a:ea typeface="Verdana" panose="020B0604030504040204" pitchFamily="34" charset="0"/>
+              </a:rPr>
+              <a:t>.</a:t>
+            </a:r>
+            <a:endParaRPr lang="en-US" dirty="0">
+              <a:latin typeface="+mj-lt"/>
               <a:ea typeface="Verdana" panose="020B0604030504040204" pitchFamily="34" charset="0"/>
             </a:endParaRPr>
           </a:p>
@@ -7989,6 +9138,13 @@
   <p:clrMapOvr>
     <a:masterClrMapping/>
   </p:clrMapOvr>
+  <p:timing>
+    <p:tnLst>
+      <p:par>
+        <p:cTn id="1" dur="indefinite" restart="never" nodeType="tmRoot"/>
+      </p:par>
+    </p:tnLst>
+  </p:timing>
 </p:sld>
 </file>
 
@@ -8269,6 +9425,13 @@
   <p:clrMapOvr>
     <a:masterClrMapping/>
   </p:clrMapOvr>
+  <p:timing>
+    <p:tnLst>
+      <p:par>
+        <p:cTn id="1" dur="indefinite" restart="never" nodeType="tmRoot"/>
+      </p:par>
+    </p:tnLst>
+  </p:timing>
 </p:sld>
 </file>
 
@@ -8946,6 +10109,13 @@
   <p:clrMapOvr>
     <a:masterClrMapping/>
   </p:clrMapOvr>
+  <p:timing>
+    <p:tnLst>
+      <p:par>
+        <p:cTn id="1" dur="indefinite" restart="never" nodeType="tmRoot"/>
+      </p:par>
+    </p:tnLst>
+  </p:timing>
 </p:sld>
 </file>
 
@@ -9181,6 +10351,13 @@
   <p:clrMapOvr>
     <a:masterClrMapping/>
   </p:clrMapOvr>
+  <p:timing>
+    <p:tnLst>
+      <p:par>
+        <p:cTn id="1" dur="indefinite" restart="never" nodeType="tmRoot"/>
+      </p:par>
+    </p:tnLst>
+  </p:timing>
 </p:sld>
 </file>
 
@@ -9414,6 +10591,13 @@
   <p:clrMapOvr>
     <a:masterClrMapping/>
   </p:clrMapOvr>
+  <p:timing>
+    <p:tnLst>
+      <p:par>
+        <p:cTn id="1" dur="indefinite" restart="never" nodeType="tmRoot"/>
+      </p:par>
+    </p:tnLst>
+  </p:timing>
 </p:sld>
 </file>
 

</xml_diff>

<commit_message>
Algoritmo K-Guloso já escolhe o primeiro elemento corretamente
</commit_message>
<xml_diff>
--- a/Guia e Tarefas/Apresentação Primeira Entrega.pptx
+++ b/Guia e Tarefas/Apresentação Primeira Entrega.pptx
@@ -3810,13 +3810,6 @@
   <p:clrMapOvr>
     <a:masterClrMapping/>
   </p:clrMapOvr>
-  <p:timing>
-    <p:tnLst>
-      <p:par>
-        <p:cTn id="1" dur="indefinite" restart="never" nodeType="tmRoot"/>
-      </p:par>
-    </p:tnLst>
-  </p:timing>
 </p:sld>
 </file>
 
@@ -3846,7 +3839,7 @@
         <p:spPr>
           <a:xfrm>
             <a:off x="971600" y="1700808"/>
-            <a:ext cx="7992888" cy="4093428"/>
+            <a:ext cx="7992888" cy="2246769"/>
           </a:xfrm>
           <a:prstGeom prst="rect">
             <a:avLst/>
@@ -3949,18 +3942,6 @@
             </a:r>
           </a:p>
           <a:p>
-            <a:pPr lvl="1"/>
-            <a:endParaRPr lang="en-US" sz="2000" dirty="0">
-              <a:latin typeface="Arial" panose="020B0604020202020204" pitchFamily="34" charset="0"/>
-              <a:ea typeface="Verdana" panose="020B0604030504040204" pitchFamily="34" charset="0"/>
-              <a:cs typeface="Arial" panose="020B0604020202020204" pitchFamily="34" charset="0"/>
-            </a:endParaRPr>
-          </a:p>
-          <a:p>
-            <a:pPr marL="285750" indent="-285750">
-              <a:buFont typeface="Arial" panose="020B0604020202020204" pitchFamily="34" charset="0"/>
-              <a:buChar char="•"/>
-            </a:pPr>
             <a:endParaRPr lang="en-US" sz="2000" b="1" dirty="0">
               <a:latin typeface="Arial" panose="020B0604020202020204" pitchFamily="34" charset="0"/>
               <a:ea typeface="Verdana" panose="020B0604030504040204" pitchFamily="34" charset="0"/>
@@ -3968,17 +3949,13 @@
             </a:endParaRPr>
           </a:p>
           <a:p>
-            <a:pPr marL="285750" indent="-285750">
-              <a:buFont typeface="Arial" panose="020B0604020202020204" pitchFamily="34" charset="0"/>
-              <a:buChar char="•"/>
-            </a:pPr>
             <a:r>
               <a:rPr lang="en-US" sz="2000" b="1" dirty="0" err="1">
                 <a:latin typeface="Arial" panose="020B0604020202020204" pitchFamily="34" charset="0"/>
                 <a:ea typeface="Verdana" panose="020B0604030504040204" pitchFamily="34" charset="0"/>
                 <a:cs typeface="Arial" panose="020B0604020202020204" pitchFamily="34" charset="0"/>
               </a:rPr>
-              <a:t>Métodos</a:t>
+              <a:t>Tabu</a:t>
             </a:r>
             <a:r>
               <a:rPr lang="en-US" sz="2000" b="1" dirty="0">
@@ -3986,98 +3963,10 @@
                 <a:ea typeface="Verdana" panose="020B0604030504040204" pitchFamily="34" charset="0"/>
                 <a:cs typeface="Arial" panose="020B0604020202020204" pitchFamily="34" charset="0"/>
               </a:rPr>
-              <a:t> </a:t>
-            </a:r>
-            <a:r>
-              <a:rPr lang="en-US" sz="2000" b="1" dirty="0" err="1">
-                <a:latin typeface="Arial" panose="020B0604020202020204" pitchFamily="34" charset="0"/>
-                <a:ea typeface="Verdana" panose="020B0604030504040204" pitchFamily="34" charset="0"/>
-                <a:cs typeface="Arial" panose="020B0604020202020204" pitchFamily="34" charset="0"/>
-              </a:rPr>
-              <a:t>baseados</a:t>
-            </a:r>
-            <a:r>
-              <a:rPr lang="en-US" sz="2000" b="1" dirty="0">
-                <a:latin typeface="Arial" panose="020B0604020202020204" pitchFamily="34" charset="0"/>
-                <a:ea typeface="Verdana" panose="020B0604030504040204" pitchFamily="34" charset="0"/>
-                <a:cs typeface="Arial" panose="020B0604020202020204" pitchFamily="34" charset="0"/>
-              </a:rPr>
-              <a:t> </a:t>
-            </a:r>
-            <a:r>
-              <a:rPr lang="en-US" sz="2000" b="1" dirty="0" err="1">
-                <a:latin typeface="Arial" panose="020B0604020202020204" pitchFamily="34" charset="0"/>
-                <a:ea typeface="Verdana" panose="020B0604030504040204" pitchFamily="34" charset="0"/>
-                <a:cs typeface="Arial" panose="020B0604020202020204" pitchFamily="34" charset="0"/>
-              </a:rPr>
-              <a:t>em</a:t>
-            </a:r>
-            <a:r>
-              <a:rPr lang="en-US" sz="2000" b="1" dirty="0">
-                <a:latin typeface="Arial" panose="020B0604020202020204" pitchFamily="34" charset="0"/>
-                <a:ea typeface="Verdana" panose="020B0604030504040204" pitchFamily="34" charset="0"/>
-                <a:cs typeface="Arial" panose="020B0604020202020204" pitchFamily="34" charset="0"/>
-              </a:rPr>
-              <a:t> </a:t>
-            </a:r>
-            <a:r>
-              <a:rPr lang="en-US" sz="2000" b="1" dirty="0" err="1">
-                <a:latin typeface="Arial" panose="020B0604020202020204" pitchFamily="34" charset="0"/>
-                <a:ea typeface="Verdana" panose="020B0604030504040204" pitchFamily="34" charset="0"/>
-                <a:cs typeface="Arial" panose="020B0604020202020204" pitchFamily="34" charset="0"/>
-              </a:rPr>
-              <a:t>busca</a:t>
-            </a:r>
-            <a:r>
-              <a:rPr lang="en-US" sz="2000" b="1" dirty="0">
-                <a:latin typeface="Arial" panose="020B0604020202020204" pitchFamily="34" charset="0"/>
-                <a:ea typeface="Verdana" panose="020B0604030504040204" pitchFamily="34" charset="0"/>
-                <a:cs typeface="Arial" panose="020B0604020202020204" pitchFamily="34" charset="0"/>
-              </a:rPr>
-              <a:t> local</a:t>
-            </a:r>
-          </a:p>
-          <a:p>
-            <a:pPr marL="742950" lvl="1" indent="-285750">
-              <a:buFont typeface="Arial" panose="020B0604020202020204" pitchFamily="34" charset="0"/>
-              <a:buChar char="•"/>
-            </a:pPr>
-            <a:r>
-              <a:rPr lang="en-US" sz="2000" dirty="0" err="1">
-                <a:latin typeface="Arial" panose="020B0604020202020204" pitchFamily="34" charset="0"/>
-                <a:ea typeface="Verdana" panose="020B0604030504040204" pitchFamily="34" charset="0"/>
-                <a:cs typeface="Arial" panose="020B0604020202020204" pitchFamily="34" charset="0"/>
-              </a:rPr>
-              <a:t>Tabu</a:t>
-            </a:r>
-            <a:r>
-              <a:rPr lang="en-US" sz="2000" dirty="0">
-                <a:latin typeface="Arial" panose="020B0604020202020204" pitchFamily="34" charset="0"/>
-                <a:ea typeface="Verdana" panose="020B0604030504040204" pitchFamily="34" charset="0"/>
-                <a:cs typeface="Arial" panose="020B0604020202020204" pitchFamily="34" charset="0"/>
-              </a:rPr>
               <a:t> Search</a:t>
             </a:r>
           </a:p>
           <a:p>
-            <a:pPr marL="742950" lvl="1" indent="-285750">
-              <a:buFont typeface="Arial" panose="020B0604020202020204" pitchFamily="34" charset="0"/>
-              <a:buChar char="•"/>
-            </a:pPr>
-            <a:r>
-              <a:rPr lang="en-US" sz="2000" dirty="0">
-                <a:latin typeface="Arial" panose="020B0604020202020204" pitchFamily="34" charset="0"/>
-                <a:ea typeface="Verdana" panose="020B0604030504040204" pitchFamily="34" charset="0"/>
-                <a:cs typeface="Arial" panose="020B0604020202020204" pitchFamily="34" charset="0"/>
-              </a:rPr>
-              <a:t>Variable Neighborhood Search</a:t>
-            </a:r>
-          </a:p>
-          <a:p>
-            <a:pPr marL="285750" indent="-285750">
-              <a:buFont typeface="Arial" panose="020B0604020202020204" pitchFamily="34" charset="0"/>
-              <a:buChar char="•"/>
-            </a:pPr>
             <a:endParaRPr lang="en-US" sz="2000" b="1" dirty="0">
               <a:latin typeface="Arial" panose="020B0604020202020204" pitchFamily="34" charset="0"/>
               <a:ea typeface="Verdana" panose="020B0604030504040204" pitchFamily="34" charset="0"/>
@@ -4085,112 +3974,13 @@
             </a:endParaRPr>
           </a:p>
           <a:p>
-            <a:pPr marL="285750" indent="-285750">
-              <a:buFont typeface="Arial" panose="020B0604020202020204" pitchFamily="34" charset="0"/>
-              <a:buChar char="•"/>
-            </a:pPr>
-            <a:endParaRPr lang="en-US" sz="2000" b="1" dirty="0">
-              <a:latin typeface="Arial" panose="020B0604020202020204" pitchFamily="34" charset="0"/>
-              <a:ea typeface="Verdana" panose="020B0604030504040204" pitchFamily="34" charset="0"/>
-              <a:cs typeface="Arial" panose="020B0604020202020204" pitchFamily="34" charset="0"/>
-            </a:endParaRPr>
-          </a:p>
-          <a:p>
-            <a:pPr marL="285750" indent="-285750">
-              <a:buFont typeface="Arial" panose="020B0604020202020204" pitchFamily="34" charset="0"/>
-              <a:buChar char="•"/>
-            </a:pPr>
-            <a:r>
-              <a:rPr lang="en-US" sz="2000" b="1" dirty="0" err="1">
-                <a:latin typeface="Arial" panose="020B0604020202020204" pitchFamily="34" charset="0"/>
-                <a:ea typeface="Verdana" panose="020B0604030504040204" pitchFamily="34" charset="0"/>
-                <a:cs typeface="Arial" panose="020B0604020202020204" pitchFamily="34" charset="0"/>
-              </a:rPr>
-              <a:t>Métodos</a:t>
-            </a:r>
             <a:r>
               <a:rPr lang="en-US" sz="2000" b="1" dirty="0">
                 <a:latin typeface="Arial" panose="020B0604020202020204" pitchFamily="34" charset="0"/>
                 <a:ea typeface="Verdana" panose="020B0604030504040204" pitchFamily="34" charset="0"/>
                 <a:cs typeface="Arial" panose="020B0604020202020204" pitchFamily="34" charset="0"/>
               </a:rPr>
-              <a:t> </a:t>
-            </a:r>
-            <a:r>
-              <a:rPr lang="en-US" sz="2000" b="1" dirty="0" err="1">
-                <a:latin typeface="Arial" panose="020B0604020202020204" pitchFamily="34" charset="0"/>
-                <a:ea typeface="Verdana" panose="020B0604030504040204" pitchFamily="34" charset="0"/>
-                <a:cs typeface="Arial" panose="020B0604020202020204" pitchFamily="34" charset="0"/>
-              </a:rPr>
-              <a:t>baseados</a:t>
-            </a:r>
-            <a:r>
-              <a:rPr lang="en-US" sz="2000" b="1" dirty="0">
-                <a:latin typeface="Arial" panose="020B0604020202020204" pitchFamily="34" charset="0"/>
-                <a:ea typeface="Verdana" panose="020B0604030504040204" pitchFamily="34" charset="0"/>
-                <a:cs typeface="Arial" panose="020B0604020202020204" pitchFamily="34" charset="0"/>
-              </a:rPr>
-              <a:t> </a:t>
-            </a:r>
-            <a:r>
-              <a:rPr lang="en-US" sz="2000" b="1" dirty="0" err="1">
-                <a:latin typeface="Arial" panose="020B0604020202020204" pitchFamily="34" charset="0"/>
-                <a:ea typeface="Verdana" panose="020B0604030504040204" pitchFamily="34" charset="0"/>
-                <a:cs typeface="Arial" panose="020B0604020202020204" pitchFamily="34" charset="0"/>
-              </a:rPr>
-              <a:t>em</a:t>
-            </a:r>
-            <a:r>
-              <a:rPr lang="en-US" sz="2000" b="1" dirty="0">
-                <a:latin typeface="Arial" panose="020B0604020202020204" pitchFamily="34" charset="0"/>
-                <a:ea typeface="Verdana" panose="020B0604030504040204" pitchFamily="34" charset="0"/>
-                <a:cs typeface="Arial" panose="020B0604020202020204" pitchFamily="34" charset="0"/>
-              </a:rPr>
-              <a:t> </a:t>
-            </a:r>
-            <a:r>
-              <a:rPr lang="en-US" sz="2000" b="1" dirty="0" err="1">
-                <a:latin typeface="Arial" panose="020B0604020202020204" pitchFamily="34" charset="0"/>
-                <a:ea typeface="Verdana" panose="020B0604030504040204" pitchFamily="34" charset="0"/>
-                <a:cs typeface="Arial" panose="020B0604020202020204" pitchFamily="34" charset="0"/>
-              </a:rPr>
-              <a:t>população</a:t>
-            </a:r>
-            <a:r>
-              <a:rPr lang="en-US" sz="2000" b="1" dirty="0">
-                <a:latin typeface="Arial" panose="020B0604020202020204" pitchFamily="34" charset="0"/>
-                <a:ea typeface="Verdana" panose="020B0604030504040204" pitchFamily="34" charset="0"/>
-                <a:cs typeface="Arial" panose="020B0604020202020204" pitchFamily="34" charset="0"/>
-              </a:rPr>
-              <a:t>:</a:t>
-            </a:r>
-          </a:p>
-          <a:p>
-            <a:pPr marL="742950" lvl="1" indent="-285750">
-              <a:buFont typeface="Arial" panose="020B0604020202020204" pitchFamily="34" charset="0"/>
-              <a:buChar char="•"/>
-            </a:pPr>
-            <a:r>
-              <a:rPr lang="en-US" sz="2000" dirty="0">
-                <a:latin typeface="Arial" panose="020B0604020202020204" pitchFamily="34" charset="0"/>
-                <a:ea typeface="Verdana" panose="020B0604030504040204" pitchFamily="34" charset="0"/>
-                <a:cs typeface="Arial" panose="020B0604020202020204" pitchFamily="34" charset="0"/>
-              </a:rPr>
-              <a:t>Scatter Search</a:t>
-            </a:r>
-          </a:p>
-          <a:p>
-            <a:pPr marL="742950" lvl="1" indent="-285750">
-              <a:buFont typeface="Arial" panose="020B0604020202020204" pitchFamily="34" charset="0"/>
-              <a:buChar char="•"/>
-            </a:pPr>
-            <a:r>
-              <a:rPr lang="en-US" sz="2000" dirty="0">
-                <a:latin typeface="Arial" panose="020B0604020202020204" pitchFamily="34" charset="0"/>
-                <a:ea typeface="Verdana" panose="020B0604030504040204" pitchFamily="34" charset="0"/>
-                <a:cs typeface="Arial" panose="020B0604020202020204" pitchFamily="34" charset="0"/>
-              </a:rPr>
-              <a:t>Memetic Algorithm</a:t>
+              <a:t>Variable Neighborhood Search</a:t>
             </a:r>
           </a:p>
         </p:txBody>
@@ -4327,13 +4117,6 @@
   <p:clrMapOvr>
     <a:masterClrMapping/>
   </p:clrMapOvr>
-  <p:timing>
-    <p:tnLst>
-      <p:par>
-        <p:cTn id="1" dur="indefinite" restart="never" nodeType="tmRoot"/>
-      </p:par>
-    </p:tnLst>
-  </p:timing>
 </p:sld>
 </file>
 
@@ -5079,13 +4862,6 @@
   <p:clrMapOvr>
     <a:masterClrMapping/>
   </p:clrMapOvr>
-  <p:timing>
-    <p:tnLst>
-      <p:par>
-        <p:cTn id="1" dur="indefinite" restart="never" nodeType="tmRoot"/>
-      </p:par>
-    </p:tnLst>
-  </p:timing>
 </p:sld>
 </file>
 
@@ -6303,13 +6079,6 @@
   <p:clrMapOvr>
     <a:masterClrMapping/>
   </p:clrMapOvr>
-  <p:timing>
-    <p:tnLst>
-      <p:par>
-        <p:cTn id="1" dur="indefinite" restart="never" nodeType="tmRoot"/>
-      </p:par>
-    </p:tnLst>
-  </p:timing>
 </p:sld>
 </file>
 
@@ -6558,13 +6327,6 @@
   <p:clrMapOvr>
     <a:masterClrMapping/>
   </p:clrMapOvr>
-  <p:timing>
-    <p:tnLst>
-      <p:par>
-        <p:cTn id="1" dur="indefinite" restart="never" nodeType="tmRoot"/>
-      </p:par>
-    </p:tnLst>
-  </p:timing>
 </p:sld>
 </file>
 
@@ -6687,13 +6449,6 @@
   <p:clrMapOvr>
     <a:masterClrMapping/>
   </p:clrMapOvr>
-  <p:timing>
-    <p:tnLst>
-      <p:par>
-        <p:cTn id="1" dur="indefinite" restart="never" nodeType="tmRoot"/>
-      </p:par>
-    </p:tnLst>
-  </p:timing>
 </p:sld>
 </file>
 
@@ -6926,13 +6681,6 @@
   <p:clrMapOvr>
     <a:masterClrMapping/>
   </p:clrMapOvr>
-  <p:timing>
-    <p:tnLst>
-      <p:par>
-        <p:cTn id="1" dur="indefinite" restart="never" nodeType="tmRoot"/>
-      </p:par>
-    </p:tnLst>
-  </p:timing>
 </p:sld>
 </file>
 
@@ -7482,13 +7230,6 @@
   <p:clrMapOvr>
     <a:masterClrMapping/>
   </p:clrMapOvr>
-  <p:timing>
-    <p:tnLst>
-      <p:par>
-        <p:cTn id="1" dur="indefinite" restart="never" nodeType="tmRoot"/>
-      </p:par>
-    </p:tnLst>
-  </p:timing>
 </p:sld>
 </file>
 
@@ -7652,605 +7393,88 @@
               <a:buChar char="•"/>
             </a:pPr>
             <a:r>
-              <a:rPr lang="en-US" dirty="0" err="1" smtClean="0">
+              <a:rPr lang="en-US" dirty="0" err="1">
                 <a:latin typeface="+mj-lt"/>
                 <a:ea typeface="Verdana" panose="020B0604030504040204" pitchFamily="34" charset="0"/>
               </a:rPr>
               <a:t>Distância</a:t>
             </a:r>
             <a:r>
-              <a:rPr lang="en-US" dirty="0" smtClean="0">
+              <a:rPr lang="en-US" dirty="0">
                 <a:latin typeface="+mj-lt"/>
                 <a:ea typeface="Verdana" panose="020B0604030504040204" pitchFamily="34" charset="0"/>
               </a:rPr>
               <a:t> </a:t>
             </a:r>
             <a:r>
-              <a:rPr lang="en-US" dirty="0" err="1" smtClean="0">
+              <a:rPr lang="en-US" dirty="0" err="1">
                 <a:latin typeface="+mj-lt"/>
                 <a:ea typeface="Verdana" panose="020B0604030504040204" pitchFamily="34" charset="0"/>
               </a:rPr>
               <a:t>euclidiana</a:t>
             </a:r>
             <a:r>
-              <a:rPr lang="en-US" dirty="0" smtClean="0">
+              <a:rPr lang="en-US" dirty="0">
                 <a:latin typeface="+mj-lt"/>
                 <a:ea typeface="Verdana" panose="020B0604030504040204" pitchFamily="34" charset="0"/>
               </a:rPr>
               <a:t> entre </a:t>
             </a:r>
             <a:r>
-              <a:rPr lang="en-US" dirty="0" err="1" smtClean="0">
+              <a:rPr lang="en-US" dirty="0" err="1">
                 <a:latin typeface="+mj-lt"/>
                 <a:ea typeface="Verdana" panose="020B0604030504040204" pitchFamily="34" charset="0"/>
               </a:rPr>
               <a:t>os</a:t>
             </a:r>
             <a:r>
-              <a:rPr lang="en-US" dirty="0" smtClean="0">
+              <a:rPr lang="en-US" dirty="0">
                 <a:latin typeface="+mj-lt"/>
                 <a:ea typeface="Verdana" panose="020B0604030504040204" pitchFamily="34" charset="0"/>
               </a:rPr>
               <a:t> </a:t>
             </a:r>
             <a:r>
-              <a:rPr lang="en-US" dirty="0" err="1" smtClean="0">
+              <a:rPr lang="en-US" dirty="0" err="1">
                 <a:latin typeface="+mj-lt"/>
                 <a:ea typeface="Verdana" panose="020B0604030504040204" pitchFamily="34" charset="0"/>
               </a:rPr>
               <a:t>atributos</a:t>
             </a:r>
             <a:r>
-              <a:rPr lang="en-US" dirty="0" smtClean="0">
+              <a:rPr lang="en-US" dirty="0">
                 <a:latin typeface="+mj-lt"/>
                 <a:ea typeface="Verdana" panose="020B0604030504040204" pitchFamily="34" charset="0"/>
               </a:rPr>
               <a:t> </a:t>
             </a:r>
             <a:r>
-              <a:rPr lang="en-US" dirty="0" err="1" smtClean="0">
+              <a:rPr lang="en-US" dirty="0" err="1">
                 <a:latin typeface="+mj-lt"/>
                 <a:ea typeface="Verdana" panose="020B0604030504040204" pitchFamily="34" charset="0"/>
               </a:rPr>
               <a:t>relevantes</a:t>
             </a:r>
             <a:r>
-              <a:rPr lang="en-US" dirty="0" smtClean="0">
+              <a:rPr lang="en-US" dirty="0">
                 <a:latin typeface="+mj-lt"/>
                 <a:ea typeface="Verdana" panose="020B0604030504040204" pitchFamily="34" charset="0"/>
               </a:rPr>
               <a:t> para o </a:t>
             </a:r>
             <a:r>
-              <a:rPr lang="en-US" dirty="0" err="1" smtClean="0">
+              <a:rPr lang="en-US" dirty="0" err="1">
                 <a:latin typeface="+mj-lt"/>
                 <a:ea typeface="Verdana" panose="020B0604030504040204" pitchFamily="34" charset="0"/>
               </a:rPr>
               <a:t>problema</a:t>
             </a:r>
             <a:r>
-              <a:rPr lang="en-US" dirty="0" smtClean="0">
+              <a:rPr lang="en-US" dirty="0">
                 <a:latin typeface="+mj-lt"/>
                 <a:ea typeface="Verdana" panose="020B0604030504040204" pitchFamily="34" charset="0"/>
               </a:rPr>
               <a:t>.</a:t>
-            </a:r>
-          </a:p>
-          <a:p>
-            <a:pPr marL="285750" indent="-285750">
-              <a:buFont typeface="Arial" panose="020B0604020202020204" pitchFamily="34" charset="0"/>
-              <a:buChar char="•"/>
-            </a:pPr>
-            <a:endParaRPr lang="en-US" dirty="0" smtClean="0">
-              <a:latin typeface="+mj-lt"/>
-              <a:ea typeface="Verdana" panose="020B0604030504040204" pitchFamily="34" charset="0"/>
-            </a:endParaRPr>
-          </a:p>
-          <a:p>
-            <a:pPr marL="285750" indent="-285750">
-              <a:buFont typeface="Arial" panose="020B0604020202020204" pitchFamily="34" charset="0"/>
-              <a:buChar char="•"/>
-            </a:pPr>
-            <a:r>
-              <a:rPr lang="en-US" b="1" dirty="0" err="1" smtClean="0">
-                <a:latin typeface="+mj-lt"/>
-                <a:ea typeface="Verdana" panose="020B0604030504040204" pitchFamily="34" charset="0"/>
-              </a:rPr>
-              <a:t>Exemplo</a:t>
-            </a:r>
-            <a:r>
-              <a:rPr lang="en-US" dirty="0" smtClean="0">
-                <a:latin typeface="+mj-lt"/>
-                <a:ea typeface="Verdana" panose="020B0604030504040204" pitchFamily="34" charset="0"/>
-              </a:rPr>
-              <a:t>: Para </a:t>
-            </a:r>
-            <a:r>
-              <a:rPr lang="en-US" dirty="0" err="1" smtClean="0">
-                <a:latin typeface="+mj-lt"/>
-                <a:ea typeface="Verdana" panose="020B0604030504040204" pitchFamily="34" charset="0"/>
-              </a:rPr>
-              <a:t>selecionar</a:t>
-            </a:r>
-            <a:r>
-              <a:rPr lang="en-US" dirty="0" smtClean="0">
-                <a:latin typeface="+mj-lt"/>
-                <a:ea typeface="Verdana" panose="020B0604030504040204" pitchFamily="34" charset="0"/>
-              </a:rPr>
-              <a:t> </a:t>
-            </a:r>
-            <a:r>
-              <a:rPr lang="en-US" dirty="0" err="1" smtClean="0">
-                <a:latin typeface="+mj-lt"/>
-                <a:ea typeface="Verdana" panose="020B0604030504040204" pitchFamily="34" charset="0"/>
-              </a:rPr>
-              <a:t>alunos</a:t>
-            </a:r>
-            <a:r>
-              <a:rPr lang="en-US" dirty="0" smtClean="0">
-                <a:latin typeface="+mj-lt"/>
-                <a:ea typeface="Verdana" panose="020B0604030504040204" pitchFamily="34" charset="0"/>
-              </a:rPr>
-              <a:t> para </a:t>
-            </a:r>
-            <a:r>
-              <a:rPr lang="en-US" dirty="0" err="1" smtClean="0">
-                <a:latin typeface="+mj-lt"/>
-                <a:ea typeface="Verdana" panose="020B0604030504040204" pitchFamily="34" charset="0"/>
-              </a:rPr>
-              <a:t>representar</a:t>
-            </a:r>
-            <a:r>
-              <a:rPr lang="en-US" dirty="0" smtClean="0">
-                <a:latin typeface="+mj-lt"/>
-                <a:ea typeface="Verdana" panose="020B0604030504040204" pitchFamily="34" charset="0"/>
-              </a:rPr>
-              <a:t> </a:t>
-            </a:r>
-            <a:r>
-              <a:rPr lang="en-US" dirty="0" err="1" smtClean="0">
-                <a:latin typeface="+mj-lt"/>
-                <a:ea typeface="Verdana" panose="020B0604030504040204" pitchFamily="34" charset="0"/>
-              </a:rPr>
-              <a:t>uma</a:t>
-            </a:r>
-            <a:r>
-              <a:rPr lang="en-US" dirty="0" smtClean="0">
-                <a:latin typeface="+mj-lt"/>
-                <a:ea typeface="Verdana" panose="020B0604030504040204" pitchFamily="34" charset="0"/>
-              </a:rPr>
-              <a:t> </a:t>
-            </a:r>
-            <a:r>
-              <a:rPr lang="en-US" dirty="0" err="1" smtClean="0">
-                <a:latin typeface="+mj-lt"/>
-                <a:ea typeface="Verdana" panose="020B0604030504040204" pitchFamily="34" charset="0"/>
-              </a:rPr>
-              <a:t>universidade</a:t>
-            </a:r>
-            <a:r>
-              <a:rPr lang="en-US" dirty="0" smtClean="0">
-                <a:latin typeface="+mj-lt"/>
-                <a:ea typeface="Verdana" panose="020B0604030504040204" pitchFamily="34" charset="0"/>
-              </a:rPr>
-              <a:t> </a:t>
-            </a:r>
-            <a:r>
-              <a:rPr lang="en-US" dirty="0" err="1" smtClean="0">
-                <a:latin typeface="+mj-lt"/>
-                <a:ea typeface="Verdana" panose="020B0604030504040204" pitchFamily="34" charset="0"/>
-              </a:rPr>
-              <a:t>pública</a:t>
-            </a:r>
-            <a:r>
-              <a:rPr lang="en-US" dirty="0" smtClean="0">
-                <a:latin typeface="+mj-lt"/>
-                <a:ea typeface="Verdana" panose="020B0604030504040204" pitchFamily="34" charset="0"/>
-              </a:rPr>
-              <a:t> </a:t>
-            </a:r>
-            <a:r>
-              <a:rPr lang="en-US" dirty="0" err="1" smtClean="0">
-                <a:latin typeface="+mj-lt"/>
-                <a:ea typeface="Verdana" panose="020B0604030504040204" pitchFamily="34" charset="0"/>
-              </a:rPr>
-              <a:t>em</a:t>
-            </a:r>
-            <a:r>
-              <a:rPr lang="en-US" dirty="0" smtClean="0">
-                <a:latin typeface="+mj-lt"/>
-                <a:ea typeface="Verdana" panose="020B0604030504040204" pitchFamily="34" charset="0"/>
-              </a:rPr>
-              <a:t> um </a:t>
-            </a:r>
-            <a:r>
-              <a:rPr lang="en-US" dirty="0" err="1" smtClean="0">
-                <a:latin typeface="+mj-lt"/>
-                <a:ea typeface="Verdana" panose="020B0604030504040204" pitchFamily="34" charset="0"/>
-              </a:rPr>
-              <a:t>evento</a:t>
-            </a:r>
-            <a:r>
-              <a:rPr lang="en-US" dirty="0" smtClean="0">
-                <a:latin typeface="+mj-lt"/>
-                <a:ea typeface="Verdana" panose="020B0604030504040204" pitchFamily="34" charset="0"/>
-              </a:rPr>
-              <a:t>.</a:t>
-            </a:r>
-          </a:p>
-          <a:p>
-            <a:pPr marL="285750" indent="-285750">
-              <a:buFont typeface="Arial" panose="020B0604020202020204" pitchFamily="34" charset="0"/>
-              <a:buChar char="•"/>
-            </a:pPr>
-            <a:endParaRPr lang="en-US" dirty="0" smtClean="0">
-              <a:latin typeface="+mj-lt"/>
-              <a:ea typeface="Verdana" panose="020B0604030504040204" pitchFamily="34" charset="0"/>
-            </a:endParaRPr>
-          </a:p>
-          <a:p>
-            <a:pPr marL="285750" indent="-285750">
-              <a:buFont typeface="Arial" panose="020B0604020202020204" pitchFamily="34" charset="0"/>
-              <a:buChar char="•"/>
-            </a:pPr>
-            <a:r>
-              <a:rPr lang="en-US" dirty="0" err="1" smtClean="0">
-                <a:latin typeface="+mj-lt"/>
-                <a:ea typeface="Verdana" panose="020B0604030504040204" pitchFamily="34" charset="0"/>
-              </a:rPr>
-              <a:t>Atributos</a:t>
-            </a:r>
-            <a:r>
-              <a:rPr lang="en-US" dirty="0" smtClean="0">
-                <a:latin typeface="+mj-lt"/>
-                <a:ea typeface="Verdana" panose="020B0604030504040204" pitchFamily="34" charset="0"/>
-              </a:rPr>
-              <a:t> </a:t>
-            </a:r>
-            <a:r>
-              <a:rPr lang="en-US" dirty="0" err="1" smtClean="0">
-                <a:latin typeface="+mj-lt"/>
-                <a:ea typeface="Verdana" panose="020B0604030504040204" pitchFamily="34" charset="0"/>
-              </a:rPr>
-              <a:t>importantes</a:t>
-            </a:r>
-            <a:r>
-              <a:rPr lang="en-US" dirty="0" smtClean="0">
-                <a:latin typeface="+mj-lt"/>
-                <a:ea typeface="Verdana" panose="020B0604030504040204" pitchFamily="34" charset="0"/>
-              </a:rPr>
-              <a:t>: </a:t>
-            </a:r>
-            <a:r>
-              <a:rPr lang="en-US" dirty="0" err="1" smtClean="0">
-                <a:latin typeface="+mj-lt"/>
-                <a:ea typeface="Verdana" panose="020B0604030504040204" pitchFamily="34" charset="0"/>
-              </a:rPr>
-              <a:t>sexo</a:t>
-            </a:r>
-            <a:r>
-              <a:rPr lang="en-US" dirty="0" smtClean="0">
-                <a:latin typeface="+mj-lt"/>
-                <a:ea typeface="Verdana" panose="020B0604030504040204" pitchFamily="34" charset="0"/>
-              </a:rPr>
-              <a:t>, </a:t>
-            </a:r>
-            <a:r>
-              <a:rPr lang="en-US" dirty="0" err="1" smtClean="0">
-                <a:latin typeface="+mj-lt"/>
-                <a:ea typeface="Verdana" panose="020B0604030504040204" pitchFamily="34" charset="0"/>
-              </a:rPr>
-              <a:t>idade</a:t>
-            </a:r>
-            <a:r>
-              <a:rPr lang="en-US" dirty="0" smtClean="0">
-                <a:latin typeface="+mj-lt"/>
-                <a:ea typeface="Verdana" panose="020B0604030504040204" pitchFamily="34" charset="0"/>
-              </a:rPr>
-              <a:t>, </a:t>
-            </a:r>
-            <a:r>
-              <a:rPr lang="en-US" dirty="0" err="1" smtClean="0">
-                <a:latin typeface="+mj-lt"/>
-                <a:ea typeface="Verdana" panose="020B0604030504040204" pitchFamily="34" charset="0"/>
-              </a:rPr>
-              <a:t>região</a:t>
-            </a:r>
-            <a:r>
-              <a:rPr lang="en-US" dirty="0" smtClean="0">
-                <a:latin typeface="+mj-lt"/>
-                <a:ea typeface="Verdana" panose="020B0604030504040204" pitchFamily="34" charset="0"/>
-              </a:rPr>
-              <a:t> do </a:t>
-            </a:r>
-            <a:r>
-              <a:rPr lang="en-US" dirty="0" err="1" smtClean="0">
-                <a:latin typeface="+mj-lt"/>
-                <a:ea typeface="Verdana" panose="020B0604030504040204" pitchFamily="34" charset="0"/>
-              </a:rPr>
-              <a:t>pais</a:t>
-            </a:r>
-            <a:r>
-              <a:rPr lang="en-US" dirty="0" smtClean="0">
-                <a:latin typeface="+mj-lt"/>
-                <a:ea typeface="Verdana" panose="020B0604030504040204" pitchFamily="34" charset="0"/>
-              </a:rPr>
-              <a:t>, </a:t>
-            </a:r>
-            <a:r>
-              <a:rPr lang="en-US" dirty="0" err="1" smtClean="0">
-                <a:latin typeface="+mj-lt"/>
-                <a:ea typeface="Verdana" panose="020B0604030504040204" pitchFamily="34" charset="0"/>
-              </a:rPr>
-              <a:t>áreas</a:t>
-            </a:r>
-            <a:r>
-              <a:rPr lang="en-US" dirty="0" smtClean="0">
-                <a:latin typeface="+mj-lt"/>
-                <a:ea typeface="Verdana" panose="020B0604030504040204" pitchFamily="34" charset="0"/>
-              </a:rPr>
-              <a:t> de </a:t>
-            </a:r>
-            <a:r>
-              <a:rPr lang="en-US" dirty="0" err="1" smtClean="0">
-                <a:latin typeface="+mj-lt"/>
-                <a:ea typeface="Verdana" panose="020B0604030504040204" pitchFamily="34" charset="0"/>
-              </a:rPr>
-              <a:t>conhecimentos</a:t>
-            </a:r>
-            <a:r>
-              <a:rPr lang="en-US" dirty="0" smtClean="0">
-                <a:latin typeface="+mj-lt"/>
-                <a:ea typeface="Verdana" panose="020B0604030504040204" pitchFamily="34" charset="0"/>
-              </a:rPr>
-              <a:t>, </a:t>
-            </a:r>
-            <a:r>
-              <a:rPr lang="en-US" dirty="0" err="1" smtClean="0">
-                <a:latin typeface="+mj-lt"/>
-                <a:ea typeface="Verdana" panose="020B0604030504040204" pitchFamily="34" charset="0"/>
-              </a:rPr>
-              <a:t>remuneração</a:t>
-            </a:r>
-            <a:r>
-              <a:rPr lang="en-US" dirty="0" smtClean="0">
-                <a:latin typeface="+mj-lt"/>
-                <a:ea typeface="Verdana" panose="020B0604030504040204" pitchFamily="34" charset="0"/>
-              </a:rPr>
-              <a:t> familiar.</a:t>
-            </a:r>
-          </a:p>
-          <a:p>
-            <a:pPr marL="285750" indent="-285750">
-              <a:buFont typeface="Arial" panose="020B0604020202020204" pitchFamily="34" charset="0"/>
-              <a:buChar char="•"/>
-            </a:pPr>
-            <a:endParaRPr lang="en-US" dirty="0" smtClean="0">
-              <a:latin typeface="+mj-lt"/>
-              <a:ea typeface="Verdana" panose="020B0604030504040204" pitchFamily="34" charset="0"/>
-            </a:endParaRPr>
-          </a:p>
-          <a:p>
-            <a:pPr marL="285750" indent="-285750">
-              <a:buFont typeface="Arial" panose="020B0604020202020204" pitchFamily="34" charset="0"/>
-              <a:buChar char="•"/>
-            </a:pPr>
-            <a:r>
-              <a:rPr lang="en-US" dirty="0" smtClean="0">
-                <a:latin typeface="+mj-lt"/>
-                <a:ea typeface="Verdana" panose="020B0604030504040204" pitchFamily="34" charset="0"/>
-              </a:rPr>
-              <a:t>Para </a:t>
-            </a:r>
-            <a:r>
-              <a:rPr lang="en-US" dirty="0" err="1" smtClean="0">
-                <a:latin typeface="+mj-lt"/>
-                <a:ea typeface="Verdana" panose="020B0604030504040204" pitchFamily="34" charset="0"/>
-              </a:rPr>
-              <a:t>os</a:t>
-            </a:r>
-            <a:r>
-              <a:rPr lang="en-US" dirty="0" smtClean="0">
-                <a:latin typeface="+mj-lt"/>
-                <a:ea typeface="Verdana" panose="020B0604030504040204" pitchFamily="34" charset="0"/>
-              </a:rPr>
-              <a:t> </a:t>
-            </a:r>
-            <a:r>
-              <a:rPr lang="en-US" dirty="0" err="1" smtClean="0">
-                <a:latin typeface="+mj-lt"/>
-                <a:ea typeface="Verdana" panose="020B0604030504040204" pitchFamily="34" charset="0"/>
-              </a:rPr>
-              <a:t>atributos</a:t>
-            </a:r>
-            <a:r>
-              <a:rPr lang="en-US" dirty="0" smtClean="0">
-                <a:latin typeface="+mj-lt"/>
-                <a:ea typeface="Verdana" panose="020B0604030504040204" pitchFamily="34" charset="0"/>
-              </a:rPr>
-              <a:t> que </a:t>
-            </a:r>
-            <a:r>
-              <a:rPr lang="en-US" dirty="0" err="1" smtClean="0">
-                <a:latin typeface="+mj-lt"/>
-                <a:ea typeface="Verdana" panose="020B0604030504040204" pitchFamily="34" charset="0"/>
-              </a:rPr>
-              <a:t>não</a:t>
-            </a:r>
-            <a:r>
-              <a:rPr lang="en-US" dirty="0" smtClean="0">
-                <a:latin typeface="+mj-lt"/>
-                <a:ea typeface="Verdana" panose="020B0604030504040204" pitchFamily="34" charset="0"/>
-              </a:rPr>
-              <a:t> </a:t>
-            </a:r>
-            <a:r>
-              <a:rPr lang="en-US" dirty="0" err="1" smtClean="0">
-                <a:latin typeface="+mj-lt"/>
-                <a:ea typeface="Verdana" panose="020B0604030504040204" pitchFamily="34" charset="0"/>
-              </a:rPr>
-              <a:t>são</a:t>
-            </a:r>
-            <a:r>
-              <a:rPr lang="en-US" dirty="0" smtClean="0">
-                <a:latin typeface="+mj-lt"/>
-                <a:ea typeface="Verdana" panose="020B0604030504040204" pitchFamily="34" charset="0"/>
-              </a:rPr>
-              <a:t> </a:t>
-            </a:r>
-            <a:r>
-              <a:rPr lang="en-US" dirty="0" err="1" smtClean="0">
-                <a:latin typeface="+mj-lt"/>
-                <a:ea typeface="Verdana" panose="020B0604030504040204" pitchFamily="34" charset="0"/>
-              </a:rPr>
-              <a:t>númericos</a:t>
-            </a:r>
-            <a:r>
-              <a:rPr lang="en-US" dirty="0" smtClean="0">
-                <a:latin typeface="+mj-lt"/>
-                <a:ea typeface="Verdana" panose="020B0604030504040204" pitchFamily="34" charset="0"/>
-              </a:rPr>
-              <a:t>, </a:t>
-            </a:r>
-            <a:r>
-              <a:rPr lang="en-US" dirty="0" err="1" smtClean="0">
-                <a:latin typeface="+mj-lt"/>
-                <a:ea typeface="Verdana" panose="020B0604030504040204" pitchFamily="34" charset="0"/>
-              </a:rPr>
-              <a:t>podemos</a:t>
-            </a:r>
-            <a:r>
-              <a:rPr lang="en-US" dirty="0" smtClean="0">
-                <a:latin typeface="+mj-lt"/>
-                <a:ea typeface="Verdana" panose="020B0604030504040204" pitchFamily="34" charset="0"/>
-              </a:rPr>
-              <a:t> </a:t>
-            </a:r>
-            <a:r>
-              <a:rPr lang="en-US" dirty="0" err="1" smtClean="0">
-                <a:latin typeface="+mj-lt"/>
-                <a:ea typeface="Verdana" panose="020B0604030504040204" pitchFamily="34" charset="0"/>
-              </a:rPr>
-              <a:t>atribuir</a:t>
-            </a:r>
-            <a:r>
-              <a:rPr lang="en-US" dirty="0" smtClean="0">
-                <a:latin typeface="+mj-lt"/>
-                <a:ea typeface="Verdana" panose="020B0604030504040204" pitchFamily="34" charset="0"/>
-              </a:rPr>
-              <a:t> um valor </a:t>
-            </a:r>
-            <a:r>
-              <a:rPr lang="en-US" dirty="0" err="1" smtClean="0">
-                <a:latin typeface="+mj-lt"/>
-                <a:ea typeface="Verdana" panose="020B0604030504040204" pitchFamily="34" charset="0"/>
-              </a:rPr>
-              <a:t>inteiro</a:t>
-            </a:r>
-            <a:r>
-              <a:rPr lang="en-US" dirty="0" smtClean="0">
-                <a:latin typeface="+mj-lt"/>
-                <a:ea typeface="Verdana" panose="020B0604030504040204" pitchFamily="34" charset="0"/>
-              </a:rPr>
-              <a:t> para </a:t>
-            </a:r>
-            <a:r>
-              <a:rPr lang="en-US" dirty="0" err="1" smtClean="0">
-                <a:latin typeface="+mj-lt"/>
-                <a:ea typeface="Verdana" panose="020B0604030504040204" pitchFamily="34" charset="0"/>
-              </a:rPr>
-              <a:t>cada</a:t>
-            </a:r>
-            <a:r>
-              <a:rPr lang="en-US" dirty="0" smtClean="0">
-                <a:latin typeface="+mj-lt"/>
-                <a:ea typeface="Verdana" panose="020B0604030504040204" pitchFamily="34" charset="0"/>
-              </a:rPr>
-              <a:t> um dos </a:t>
-            </a:r>
-            <a:r>
-              <a:rPr lang="en-US" dirty="0" err="1" smtClean="0">
-                <a:latin typeface="+mj-lt"/>
-                <a:ea typeface="Verdana" panose="020B0604030504040204" pitchFamily="34" charset="0"/>
-              </a:rPr>
-              <a:t>possíveis</a:t>
-            </a:r>
-            <a:r>
-              <a:rPr lang="en-US" dirty="0" smtClean="0">
-                <a:latin typeface="+mj-lt"/>
-                <a:ea typeface="Verdana" panose="020B0604030504040204" pitchFamily="34" charset="0"/>
-              </a:rPr>
-              <a:t> </a:t>
-            </a:r>
-            <a:r>
-              <a:rPr lang="en-US" dirty="0" err="1" smtClean="0">
-                <a:latin typeface="+mj-lt"/>
-                <a:ea typeface="Verdana" panose="020B0604030504040204" pitchFamily="34" charset="0"/>
-              </a:rPr>
-              <a:t>valores</a:t>
-            </a:r>
-            <a:r>
-              <a:rPr lang="en-US" dirty="0" smtClean="0">
-                <a:latin typeface="+mj-lt"/>
-                <a:ea typeface="Verdana" panose="020B0604030504040204" pitchFamily="34" charset="0"/>
-              </a:rPr>
-              <a:t> (1 para </a:t>
-            </a:r>
-            <a:r>
-              <a:rPr lang="en-US" dirty="0" err="1" smtClean="0">
-                <a:latin typeface="+mj-lt"/>
-                <a:ea typeface="Verdana" panose="020B0604030504040204" pitchFamily="34" charset="0"/>
-              </a:rPr>
-              <a:t>para</a:t>
-            </a:r>
-            <a:r>
-              <a:rPr lang="en-US" dirty="0" smtClean="0">
-                <a:latin typeface="+mj-lt"/>
-                <a:ea typeface="Verdana" panose="020B0604030504040204" pitchFamily="34" charset="0"/>
-              </a:rPr>
-              <a:t> </a:t>
-            </a:r>
-            <a:r>
-              <a:rPr lang="en-US" dirty="0" err="1" smtClean="0">
-                <a:latin typeface="+mj-lt"/>
-                <a:ea typeface="Verdana" panose="020B0604030504040204" pitchFamily="34" charset="0"/>
-              </a:rPr>
-              <a:t>sexo</a:t>
-            </a:r>
-            <a:r>
-              <a:rPr lang="en-US" dirty="0" smtClean="0">
-                <a:latin typeface="+mj-lt"/>
-                <a:ea typeface="Verdana" panose="020B0604030504040204" pitchFamily="34" charset="0"/>
-              </a:rPr>
-              <a:t> masculine e 2 para o </a:t>
-            </a:r>
-            <a:r>
-              <a:rPr lang="en-US" dirty="0" err="1" smtClean="0">
-                <a:latin typeface="+mj-lt"/>
-                <a:ea typeface="Verdana" panose="020B0604030504040204" pitchFamily="34" charset="0"/>
-              </a:rPr>
-              <a:t>sexo</a:t>
-            </a:r>
-            <a:r>
-              <a:rPr lang="en-US" dirty="0" smtClean="0">
-                <a:latin typeface="+mj-lt"/>
-                <a:ea typeface="Verdana" panose="020B0604030504040204" pitchFamily="34" charset="0"/>
-              </a:rPr>
-              <a:t> </a:t>
-            </a:r>
-            <a:r>
-              <a:rPr lang="en-US" dirty="0" err="1" smtClean="0">
-                <a:latin typeface="+mj-lt"/>
-                <a:ea typeface="Verdana" panose="020B0604030504040204" pitchFamily="34" charset="0"/>
-              </a:rPr>
-              <a:t>feminino</a:t>
-            </a:r>
-            <a:r>
-              <a:rPr lang="en-US" dirty="0" smtClean="0">
-                <a:latin typeface="+mj-lt"/>
-                <a:ea typeface="Verdana" panose="020B0604030504040204" pitchFamily="34" charset="0"/>
-              </a:rPr>
-              <a:t>).</a:t>
             </a:r>
           </a:p>
           <a:p>
@@ -8269,289 +7493,802 @@
               <a:buChar char="•"/>
             </a:pPr>
             <a:r>
-              <a:rPr lang="en-US" dirty="0" err="1" smtClean="0">
-                <a:latin typeface="+mj-lt"/>
-                <a:ea typeface="Verdana" panose="020B0604030504040204" pitchFamily="34" charset="0"/>
-              </a:rPr>
-              <a:t>Atributos</a:t>
-            </a:r>
-            <a:r>
-              <a:rPr lang="en-US" dirty="0" smtClean="0">
+              <a:rPr lang="en-US" b="1" dirty="0" err="1">
+                <a:latin typeface="+mj-lt"/>
+                <a:ea typeface="Verdana" panose="020B0604030504040204" pitchFamily="34" charset="0"/>
+              </a:rPr>
+              <a:t>Exemplo</a:t>
+            </a:r>
+            <a:r>
+              <a:rPr lang="en-US" dirty="0">
+                <a:latin typeface="+mj-lt"/>
+                <a:ea typeface="Verdana" panose="020B0604030504040204" pitchFamily="34" charset="0"/>
+              </a:rPr>
+              <a:t>: Para </a:t>
+            </a:r>
+            <a:r>
+              <a:rPr lang="en-US" dirty="0" err="1">
+                <a:latin typeface="+mj-lt"/>
+                <a:ea typeface="Verdana" panose="020B0604030504040204" pitchFamily="34" charset="0"/>
+              </a:rPr>
+              <a:t>selecionar</a:t>
+            </a:r>
+            <a:r>
+              <a:rPr lang="en-US" dirty="0">
                 <a:latin typeface="+mj-lt"/>
                 <a:ea typeface="Verdana" panose="020B0604030504040204" pitchFamily="34" charset="0"/>
               </a:rPr>
               <a:t> </a:t>
             </a:r>
             <a:r>
-              <a:rPr lang="en-US" dirty="0" err="1" smtClean="0">
-                <a:latin typeface="+mj-lt"/>
-                <a:ea typeface="Verdana" panose="020B0604030504040204" pitchFamily="34" charset="0"/>
-              </a:rPr>
-              <a:t>númericos</a:t>
-            </a:r>
-            <a:r>
-              <a:rPr lang="en-US" dirty="0" smtClean="0">
+              <a:rPr lang="en-US" dirty="0" err="1">
+                <a:latin typeface="+mj-lt"/>
+                <a:ea typeface="Verdana" panose="020B0604030504040204" pitchFamily="34" charset="0"/>
+              </a:rPr>
+              <a:t>alunos</a:t>
+            </a:r>
+            <a:r>
+              <a:rPr lang="en-US" dirty="0">
+                <a:latin typeface="+mj-lt"/>
+                <a:ea typeface="Verdana" panose="020B0604030504040204" pitchFamily="34" charset="0"/>
+              </a:rPr>
+              <a:t> para </a:t>
+            </a:r>
+            <a:r>
+              <a:rPr lang="en-US" dirty="0" err="1">
+                <a:latin typeface="+mj-lt"/>
+                <a:ea typeface="Verdana" panose="020B0604030504040204" pitchFamily="34" charset="0"/>
+              </a:rPr>
+              <a:t>representar</a:t>
+            </a:r>
+            <a:r>
+              <a:rPr lang="en-US" dirty="0">
                 <a:latin typeface="+mj-lt"/>
                 <a:ea typeface="Verdana" panose="020B0604030504040204" pitchFamily="34" charset="0"/>
               </a:rPr>
               <a:t> </a:t>
             </a:r>
             <a:r>
-              <a:rPr lang="en-US" dirty="0" err="1" smtClean="0">
-                <a:latin typeface="+mj-lt"/>
-                <a:ea typeface="Verdana" panose="020B0604030504040204" pitchFamily="34" charset="0"/>
-              </a:rPr>
-              <a:t>podemos</a:t>
-            </a:r>
-            <a:r>
-              <a:rPr lang="en-US" dirty="0" smtClean="0">
+              <a:rPr lang="en-US" dirty="0" err="1">
+                <a:latin typeface="+mj-lt"/>
+                <a:ea typeface="Verdana" panose="020B0604030504040204" pitchFamily="34" charset="0"/>
+              </a:rPr>
+              <a:t>uma</a:t>
+            </a:r>
+            <a:r>
+              <a:rPr lang="en-US" dirty="0">
                 <a:latin typeface="+mj-lt"/>
                 <a:ea typeface="Verdana" panose="020B0604030504040204" pitchFamily="34" charset="0"/>
               </a:rPr>
               <a:t> </a:t>
             </a:r>
             <a:r>
-              <a:rPr lang="en-US" dirty="0" err="1" smtClean="0">
-                <a:latin typeface="+mj-lt"/>
-                <a:ea typeface="Verdana" panose="020B0604030504040204" pitchFamily="34" charset="0"/>
-              </a:rPr>
-              <a:t>criar</a:t>
-            </a:r>
-            <a:r>
-              <a:rPr lang="en-US" dirty="0" smtClean="0">
+              <a:rPr lang="en-US" dirty="0" err="1">
+                <a:latin typeface="+mj-lt"/>
+                <a:ea typeface="Verdana" panose="020B0604030504040204" pitchFamily="34" charset="0"/>
+              </a:rPr>
+              <a:t>universidade</a:t>
+            </a:r>
+            <a:r>
+              <a:rPr lang="en-US" dirty="0">
                 <a:latin typeface="+mj-lt"/>
                 <a:ea typeface="Verdana" panose="020B0604030504040204" pitchFamily="34" charset="0"/>
               </a:rPr>
               <a:t> </a:t>
             </a:r>
             <a:r>
-              <a:rPr lang="en-US" dirty="0" err="1" smtClean="0">
-                <a:latin typeface="+mj-lt"/>
-                <a:ea typeface="Verdana" panose="020B0604030504040204" pitchFamily="34" charset="0"/>
-              </a:rPr>
-              <a:t>intervalos</a:t>
-            </a:r>
-            <a:r>
-              <a:rPr lang="en-US" dirty="0" smtClean="0">
-                <a:latin typeface="+mj-lt"/>
-                <a:ea typeface="Verdana" panose="020B0604030504040204" pitchFamily="34" charset="0"/>
-              </a:rPr>
-              <a:t> de </a:t>
-            </a:r>
-            <a:r>
-              <a:rPr lang="en-US" dirty="0" err="1" smtClean="0">
-                <a:latin typeface="+mj-lt"/>
-                <a:ea typeface="Verdana" panose="020B0604030504040204" pitchFamily="34" charset="0"/>
-              </a:rPr>
-              <a:t>valores</a:t>
-            </a:r>
-            <a:r>
-              <a:rPr lang="en-US" dirty="0" smtClean="0">
-                <a:latin typeface="+mj-lt"/>
-                <a:ea typeface="Verdana" panose="020B0604030504040204" pitchFamily="34" charset="0"/>
-              </a:rPr>
-              <a:t> e </a:t>
-            </a:r>
-            <a:r>
-              <a:rPr lang="en-US" dirty="0" err="1" smtClean="0">
-                <a:latin typeface="+mj-lt"/>
-                <a:ea typeface="Verdana" panose="020B0604030504040204" pitchFamily="34" charset="0"/>
-              </a:rPr>
-              <a:t>atribuir</a:t>
-            </a:r>
-            <a:r>
-              <a:rPr lang="en-US" dirty="0" smtClean="0">
-                <a:latin typeface="+mj-lt"/>
-                <a:ea typeface="Verdana" panose="020B0604030504040204" pitchFamily="34" charset="0"/>
-              </a:rPr>
-              <a:t> um valor </a:t>
-            </a:r>
-            <a:r>
-              <a:rPr lang="en-US" dirty="0" err="1" smtClean="0">
-                <a:latin typeface="+mj-lt"/>
-                <a:ea typeface="Verdana" panose="020B0604030504040204" pitchFamily="34" charset="0"/>
-              </a:rPr>
-              <a:t>inteiro</a:t>
-            </a:r>
-            <a:r>
-              <a:rPr lang="en-US" dirty="0" smtClean="0">
-                <a:latin typeface="+mj-lt"/>
-                <a:ea typeface="Verdana" panose="020B0604030504040204" pitchFamily="34" charset="0"/>
-              </a:rPr>
-              <a:t> para </a:t>
-            </a:r>
-            <a:r>
-              <a:rPr lang="en-US" dirty="0" err="1" smtClean="0">
-                <a:latin typeface="+mj-lt"/>
-                <a:ea typeface="Verdana" panose="020B0604030504040204" pitchFamily="34" charset="0"/>
-              </a:rPr>
-              <a:t>cada</a:t>
-            </a:r>
-            <a:r>
-              <a:rPr lang="en-US" dirty="0" smtClean="0">
+              <a:rPr lang="en-US" dirty="0" err="1">
+                <a:latin typeface="+mj-lt"/>
+                <a:ea typeface="Verdana" panose="020B0604030504040204" pitchFamily="34" charset="0"/>
+              </a:rPr>
+              <a:t>pública</a:t>
+            </a:r>
+            <a:r>
+              <a:rPr lang="en-US" dirty="0">
                 <a:latin typeface="+mj-lt"/>
                 <a:ea typeface="Verdana" panose="020B0604030504040204" pitchFamily="34" charset="0"/>
               </a:rPr>
               <a:t> </a:t>
             </a:r>
             <a:r>
-              <a:rPr lang="en-US" dirty="0" err="1" smtClean="0">
-                <a:latin typeface="+mj-lt"/>
-                <a:ea typeface="Verdana" panose="020B0604030504040204" pitchFamily="34" charset="0"/>
-              </a:rPr>
-              <a:t>intervalo</a:t>
-            </a:r>
-            <a:r>
-              <a:rPr lang="en-US" dirty="0" smtClean="0">
-                <a:latin typeface="+mj-lt"/>
-                <a:ea typeface="Verdana" panose="020B0604030504040204" pitchFamily="34" charset="0"/>
-              </a:rPr>
-              <a:t>   ( </a:t>
-            </a:r>
-            <a:r>
-              <a:rPr lang="en-US" dirty="0" err="1" smtClean="0">
-                <a:latin typeface="+mj-lt"/>
-                <a:ea typeface="Verdana" panose="020B0604030504040204" pitchFamily="34" charset="0"/>
-              </a:rPr>
-              <a:t>remuneração</a:t>
-            </a:r>
-            <a:r>
-              <a:rPr lang="en-US" dirty="0" smtClean="0">
-                <a:latin typeface="+mj-lt"/>
-                <a:ea typeface="Verdana" panose="020B0604030504040204" pitchFamily="34" charset="0"/>
-              </a:rPr>
-              <a:t> familiar, </a:t>
-            </a:r>
-            <a:r>
-              <a:rPr lang="en-US" dirty="0" err="1" smtClean="0">
-                <a:latin typeface="+mj-lt"/>
-                <a:ea typeface="Verdana" panose="020B0604030504040204" pitchFamily="34" charset="0"/>
-              </a:rPr>
-              <a:t>até</a:t>
-            </a:r>
-            <a:r>
-              <a:rPr lang="en-US" dirty="0" smtClean="0">
-                <a:latin typeface="+mj-lt"/>
-                <a:ea typeface="Verdana" panose="020B0604030504040204" pitchFamily="34" charset="0"/>
-              </a:rPr>
-              <a:t> 2 </a:t>
-            </a:r>
-            <a:r>
-              <a:rPr lang="en-US" dirty="0" err="1" smtClean="0">
-                <a:latin typeface="+mj-lt"/>
-                <a:ea typeface="Verdana" panose="020B0604030504040204" pitchFamily="34" charset="0"/>
-              </a:rPr>
-              <a:t>salários</a:t>
-            </a:r>
-            <a:r>
-              <a:rPr lang="en-US" dirty="0" smtClean="0">
-                <a:latin typeface="+mj-lt"/>
-                <a:ea typeface="Verdana" panose="020B0604030504040204" pitchFamily="34" charset="0"/>
-              </a:rPr>
-              <a:t> </a:t>
-            </a:r>
-            <a:r>
-              <a:rPr lang="en-US" dirty="0" err="1" smtClean="0">
-                <a:latin typeface="+mj-lt"/>
-                <a:ea typeface="Verdana" panose="020B0604030504040204" pitchFamily="34" charset="0"/>
-              </a:rPr>
-              <a:t>recebe</a:t>
-            </a:r>
-            <a:r>
-              <a:rPr lang="en-US" dirty="0" smtClean="0">
-                <a:latin typeface="+mj-lt"/>
-                <a:ea typeface="Verdana" panose="020B0604030504040204" pitchFamily="34" charset="0"/>
-              </a:rPr>
-              <a:t> o valor 1, de 3 </a:t>
-            </a:r>
-            <a:r>
-              <a:rPr lang="en-US" dirty="0" err="1" smtClean="0">
-                <a:latin typeface="+mj-lt"/>
-                <a:ea typeface="Verdana" panose="020B0604030504040204" pitchFamily="34" charset="0"/>
-              </a:rPr>
-              <a:t>até</a:t>
-            </a:r>
-            <a:r>
-              <a:rPr lang="en-US" dirty="0" smtClean="0">
-                <a:latin typeface="+mj-lt"/>
-                <a:ea typeface="Verdana" panose="020B0604030504040204" pitchFamily="34" charset="0"/>
-              </a:rPr>
-              <a:t> 5 </a:t>
-            </a:r>
-            <a:r>
-              <a:rPr lang="en-US" dirty="0" err="1" smtClean="0">
-                <a:latin typeface="+mj-lt"/>
-                <a:ea typeface="Verdana" panose="020B0604030504040204" pitchFamily="34" charset="0"/>
-              </a:rPr>
-              <a:t>salários</a:t>
-            </a:r>
-            <a:r>
-              <a:rPr lang="en-US" dirty="0" smtClean="0">
-                <a:latin typeface="+mj-lt"/>
-                <a:ea typeface="Verdana" panose="020B0604030504040204" pitchFamily="34" charset="0"/>
-              </a:rPr>
-              <a:t> </a:t>
-            </a:r>
-            <a:r>
-              <a:rPr lang="en-US" dirty="0" err="1" smtClean="0">
-                <a:latin typeface="+mj-lt"/>
-                <a:ea typeface="Verdana" panose="020B0604030504040204" pitchFamily="34" charset="0"/>
-              </a:rPr>
-              <a:t>recebe</a:t>
-            </a:r>
-            <a:r>
-              <a:rPr lang="en-US" dirty="0" smtClean="0">
-                <a:latin typeface="+mj-lt"/>
-                <a:ea typeface="Verdana" panose="020B0604030504040204" pitchFamily="34" charset="0"/>
-              </a:rPr>
-              <a:t> o valor 2, e </a:t>
-            </a:r>
-            <a:r>
-              <a:rPr lang="en-US" dirty="0" err="1" smtClean="0">
-                <a:latin typeface="+mj-lt"/>
-                <a:ea typeface="Verdana" panose="020B0604030504040204" pitchFamily="34" charset="0"/>
-              </a:rPr>
-              <a:t>assim</a:t>
-            </a:r>
-            <a:r>
-              <a:rPr lang="en-US" dirty="0" smtClean="0">
-                <a:latin typeface="+mj-lt"/>
-                <a:ea typeface="Verdana" panose="020B0604030504040204" pitchFamily="34" charset="0"/>
-              </a:rPr>
-              <a:t> </a:t>
-            </a:r>
-            <a:r>
-              <a:rPr lang="en-US" dirty="0" err="1" smtClean="0">
-                <a:latin typeface="+mj-lt"/>
-                <a:ea typeface="Verdana" panose="020B0604030504040204" pitchFamily="34" charset="0"/>
-              </a:rPr>
-              <a:t>por</a:t>
-            </a:r>
-            <a:r>
-              <a:rPr lang="en-US" dirty="0" smtClean="0">
-                <a:latin typeface="+mj-lt"/>
-                <a:ea typeface="Verdana" panose="020B0604030504040204" pitchFamily="34" charset="0"/>
-              </a:rPr>
-              <a:t> </a:t>
-            </a:r>
-            <a:r>
-              <a:rPr lang="en-US" dirty="0" err="1" smtClean="0">
-                <a:latin typeface="+mj-lt"/>
-                <a:ea typeface="Verdana" panose="020B0604030504040204" pitchFamily="34" charset="0"/>
-              </a:rPr>
-              <a:t>diante</a:t>
-            </a:r>
-            <a:r>
-              <a:rPr lang="en-US" dirty="0" smtClean="0">
-                <a:latin typeface="+mj-lt"/>
-                <a:ea typeface="Verdana" panose="020B0604030504040204" pitchFamily="34" charset="0"/>
-              </a:rPr>
-              <a:t>).</a:t>
-            </a:r>
+              <a:rPr lang="en-US" dirty="0" err="1">
+                <a:latin typeface="+mj-lt"/>
+                <a:ea typeface="Verdana" panose="020B0604030504040204" pitchFamily="34" charset="0"/>
+              </a:rPr>
+              <a:t>em</a:t>
+            </a:r>
+            <a:r>
+              <a:rPr lang="en-US" dirty="0">
+                <a:latin typeface="+mj-lt"/>
+                <a:ea typeface="Verdana" panose="020B0604030504040204" pitchFamily="34" charset="0"/>
+              </a:rPr>
+              <a:t> um </a:t>
+            </a:r>
+            <a:r>
+              <a:rPr lang="en-US" dirty="0" err="1">
+                <a:latin typeface="+mj-lt"/>
+                <a:ea typeface="Verdana" panose="020B0604030504040204" pitchFamily="34" charset="0"/>
+              </a:rPr>
+              <a:t>evento</a:t>
+            </a:r>
+            <a:r>
+              <a:rPr lang="en-US" dirty="0">
+                <a:latin typeface="+mj-lt"/>
+                <a:ea typeface="Verdana" panose="020B0604030504040204" pitchFamily="34" charset="0"/>
+              </a:rPr>
+              <a:t>.</a:t>
+            </a:r>
+          </a:p>
+          <a:p>
+            <a:pPr marL="285750" indent="-285750">
+              <a:buFont typeface="Arial" panose="020B0604020202020204" pitchFamily="34" charset="0"/>
+              <a:buChar char="•"/>
+            </a:pPr>
             <a:endParaRPr lang="en-US" dirty="0">
               <a:latin typeface="+mj-lt"/>
               <a:ea typeface="Verdana" panose="020B0604030504040204" pitchFamily="34" charset="0"/>
             </a:endParaRPr>
+          </a:p>
+          <a:p>
+            <a:pPr marL="285750" indent="-285750">
+              <a:buFont typeface="Arial" panose="020B0604020202020204" pitchFamily="34" charset="0"/>
+              <a:buChar char="•"/>
+            </a:pPr>
+            <a:r>
+              <a:rPr lang="en-US" dirty="0" err="1">
+                <a:latin typeface="+mj-lt"/>
+                <a:ea typeface="Verdana" panose="020B0604030504040204" pitchFamily="34" charset="0"/>
+              </a:rPr>
+              <a:t>Atributos</a:t>
+            </a:r>
+            <a:r>
+              <a:rPr lang="en-US" dirty="0">
+                <a:latin typeface="+mj-lt"/>
+                <a:ea typeface="Verdana" panose="020B0604030504040204" pitchFamily="34" charset="0"/>
+              </a:rPr>
+              <a:t> </a:t>
+            </a:r>
+            <a:r>
+              <a:rPr lang="en-US" dirty="0" err="1">
+                <a:latin typeface="+mj-lt"/>
+                <a:ea typeface="Verdana" panose="020B0604030504040204" pitchFamily="34" charset="0"/>
+              </a:rPr>
+              <a:t>importantes</a:t>
+            </a:r>
+            <a:r>
+              <a:rPr lang="en-US" dirty="0">
+                <a:latin typeface="+mj-lt"/>
+                <a:ea typeface="Verdana" panose="020B0604030504040204" pitchFamily="34" charset="0"/>
+              </a:rPr>
+              <a:t>: </a:t>
+            </a:r>
+            <a:r>
+              <a:rPr lang="en-US" dirty="0" err="1">
+                <a:latin typeface="+mj-lt"/>
+                <a:ea typeface="Verdana" panose="020B0604030504040204" pitchFamily="34" charset="0"/>
+              </a:rPr>
+              <a:t>sexo</a:t>
+            </a:r>
+            <a:r>
+              <a:rPr lang="en-US" dirty="0">
+                <a:latin typeface="+mj-lt"/>
+                <a:ea typeface="Verdana" panose="020B0604030504040204" pitchFamily="34" charset="0"/>
+              </a:rPr>
+              <a:t>, </a:t>
+            </a:r>
+            <a:r>
+              <a:rPr lang="en-US" dirty="0" err="1">
+                <a:latin typeface="+mj-lt"/>
+                <a:ea typeface="Verdana" panose="020B0604030504040204" pitchFamily="34" charset="0"/>
+              </a:rPr>
+              <a:t>idade</a:t>
+            </a:r>
+            <a:r>
+              <a:rPr lang="en-US" dirty="0">
+                <a:latin typeface="+mj-lt"/>
+                <a:ea typeface="Verdana" panose="020B0604030504040204" pitchFamily="34" charset="0"/>
+              </a:rPr>
+              <a:t>, </a:t>
+            </a:r>
+            <a:r>
+              <a:rPr lang="en-US" dirty="0" err="1">
+                <a:latin typeface="+mj-lt"/>
+                <a:ea typeface="Verdana" panose="020B0604030504040204" pitchFamily="34" charset="0"/>
+              </a:rPr>
+              <a:t>região</a:t>
+            </a:r>
+            <a:r>
+              <a:rPr lang="en-US" dirty="0">
+                <a:latin typeface="+mj-lt"/>
+                <a:ea typeface="Verdana" panose="020B0604030504040204" pitchFamily="34" charset="0"/>
+              </a:rPr>
+              <a:t> do </a:t>
+            </a:r>
+            <a:r>
+              <a:rPr lang="en-US" dirty="0" err="1">
+                <a:latin typeface="+mj-lt"/>
+                <a:ea typeface="Verdana" panose="020B0604030504040204" pitchFamily="34" charset="0"/>
+              </a:rPr>
+              <a:t>pais</a:t>
+            </a:r>
+            <a:r>
+              <a:rPr lang="en-US" dirty="0">
+                <a:latin typeface="+mj-lt"/>
+                <a:ea typeface="Verdana" panose="020B0604030504040204" pitchFamily="34" charset="0"/>
+              </a:rPr>
+              <a:t>, </a:t>
+            </a:r>
+            <a:r>
+              <a:rPr lang="en-US" dirty="0" err="1">
+                <a:latin typeface="+mj-lt"/>
+                <a:ea typeface="Verdana" panose="020B0604030504040204" pitchFamily="34" charset="0"/>
+              </a:rPr>
+              <a:t>áreas</a:t>
+            </a:r>
+            <a:r>
+              <a:rPr lang="en-US" dirty="0">
+                <a:latin typeface="+mj-lt"/>
+                <a:ea typeface="Verdana" panose="020B0604030504040204" pitchFamily="34" charset="0"/>
+              </a:rPr>
+              <a:t> de </a:t>
+            </a:r>
+            <a:r>
+              <a:rPr lang="en-US" dirty="0" err="1">
+                <a:latin typeface="+mj-lt"/>
+                <a:ea typeface="Verdana" panose="020B0604030504040204" pitchFamily="34" charset="0"/>
+              </a:rPr>
+              <a:t>conhecimentos</a:t>
+            </a:r>
+            <a:r>
+              <a:rPr lang="en-US" dirty="0">
+                <a:latin typeface="+mj-lt"/>
+                <a:ea typeface="Verdana" panose="020B0604030504040204" pitchFamily="34" charset="0"/>
+              </a:rPr>
+              <a:t>, </a:t>
+            </a:r>
+            <a:r>
+              <a:rPr lang="en-US" dirty="0" err="1">
+                <a:latin typeface="+mj-lt"/>
+                <a:ea typeface="Verdana" panose="020B0604030504040204" pitchFamily="34" charset="0"/>
+              </a:rPr>
+              <a:t>remuneração</a:t>
+            </a:r>
+            <a:r>
+              <a:rPr lang="en-US" dirty="0">
+                <a:latin typeface="+mj-lt"/>
+                <a:ea typeface="Verdana" panose="020B0604030504040204" pitchFamily="34" charset="0"/>
+              </a:rPr>
+              <a:t> familiar.</a:t>
+            </a:r>
+          </a:p>
+          <a:p>
+            <a:pPr marL="285750" indent="-285750">
+              <a:buFont typeface="Arial" panose="020B0604020202020204" pitchFamily="34" charset="0"/>
+              <a:buChar char="•"/>
+            </a:pPr>
+            <a:endParaRPr lang="en-US" dirty="0">
+              <a:latin typeface="+mj-lt"/>
+              <a:ea typeface="Verdana" panose="020B0604030504040204" pitchFamily="34" charset="0"/>
+            </a:endParaRPr>
+          </a:p>
+          <a:p>
+            <a:pPr marL="285750" indent="-285750">
+              <a:buFont typeface="Arial" panose="020B0604020202020204" pitchFamily="34" charset="0"/>
+              <a:buChar char="•"/>
+            </a:pPr>
+            <a:r>
+              <a:rPr lang="en-US" dirty="0">
+                <a:latin typeface="+mj-lt"/>
+                <a:ea typeface="Verdana" panose="020B0604030504040204" pitchFamily="34" charset="0"/>
+              </a:rPr>
+              <a:t>Para </a:t>
+            </a:r>
+            <a:r>
+              <a:rPr lang="en-US" dirty="0" err="1">
+                <a:latin typeface="+mj-lt"/>
+                <a:ea typeface="Verdana" panose="020B0604030504040204" pitchFamily="34" charset="0"/>
+              </a:rPr>
+              <a:t>os</a:t>
+            </a:r>
+            <a:r>
+              <a:rPr lang="en-US" dirty="0">
+                <a:latin typeface="+mj-lt"/>
+                <a:ea typeface="Verdana" panose="020B0604030504040204" pitchFamily="34" charset="0"/>
+              </a:rPr>
+              <a:t> </a:t>
+            </a:r>
+            <a:r>
+              <a:rPr lang="en-US" dirty="0" err="1">
+                <a:latin typeface="+mj-lt"/>
+                <a:ea typeface="Verdana" panose="020B0604030504040204" pitchFamily="34" charset="0"/>
+              </a:rPr>
+              <a:t>atributos</a:t>
+            </a:r>
+            <a:r>
+              <a:rPr lang="en-US" dirty="0">
+                <a:latin typeface="+mj-lt"/>
+                <a:ea typeface="Verdana" panose="020B0604030504040204" pitchFamily="34" charset="0"/>
+              </a:rPr>
+              <a:t> que </a:t>
+            </a:r>
+            <a:r>
+              <a:rPr lang="en-US" dirty="0" err="1">
+                <a:latin typeface="+mj-lt"/>
+                <a:ea typeface="Verdana" panose="020B0604030504040204" pitchFamily="34" charset="0"/>
+              </a:rPr>
+              <a:t>não</a:t>
+            </a:r>
+            <a:r>
+              <a:rPr lang="en-US" dirty="0">
+                <a:latin typeface="+mj-lt"/>
+                <a:ea typeface="Verdana" panose="020B0604030504040204" pitchFamily="34" charset="0"/>
+              </a:rPr>
+              <a:t> </a:t>
+            </a:r>
+            <a:r>
+              <a:rPr lang="en-US" dirty="0" err="1">
+                <a:latin typeface="+mj-lt"/>
+                <a:ea typeface="Verdana" panose="020B0604030504040204" pitchFamily="34" charset="0"/>
+              </a:rPr>
+              <a:t>são</a:t>
+            </a:r>
+            <a:r>
+              <a:rPr lang="en-US" dirty="0">
+                <a:latin typeface="+mj-lt"/>
+                <a:ea typeface="Verdana" panose="020B0604030504040204" pitchFamily="34" charset="0"/>
+              </a:rPr>
+              <a:t> </a:t>
+            </a:r>
+            <a:r>
+              <a:rPr lang="en-US" dirty="0" err="1">
+                <a:latin typeface="+mj-lt"/>
+                <a:ea typeface="Verdana" panose="020B0604030504040204" pitchFamily="34" charset="0"/>
+              </a:rPr>
+              <a:t>númericos</a:t>
+            </a:r>
+            <a:r>
+              <a:rPr lang="en-US" dirty="0">
+                <a:latin typeface="+mj-lt"/>
+                <a:ea typeface="Verdana" panose="020B0604030504040204" pitchFamily="34" charset="0"/>
+              </a:rPr>
+              <a:t>, </a:t>
+            </a:r>
+            <a:r>
+              <a:rPr lang="en-US" dirty="0" err="1">
+                <a:latin typeface="+mj-lt"/>
+                <a:ea typeface="Verdana" panose="020B0604030504040204" pitchFamily="34" charset="0"/>
+              </a:rPr>
+              <a:t>podemos</a:t>
+            </a:r>
+            <a:r>
+              <a:rPr lang="en-US" dirty="0">
+                <a:latin typeface="+mj-lt"/>
+                <a:ea typeface="Verdana" panose="020B0604030504040204" pitchFamily="34" charset="0"/>
+              </a:rPr>
+              <a:t> </a:t>
+            </a:r>
+            <a:r>
+              <a:rPr lang="en-US" dirty="0" err="1">
+                <a:latin typeface="+mj-lt"/>
+                <a:ea typeface="Verdana" panose="020B0604030504040204" pitchFamily="34" charset="0"/>
+              </a:rPr>
+              <a:t>atribuir</a:t>
+            </a:r>
+            <a:r>
+              <a:rPr lang="en-US" dirty="0">
+                <a:latin typeface="+mj-lt"/>
+                <a:ea typeface="Verdana" panose="020B0604030504040204" pitchFamily="34" charset="0"/>
+              </a:rPr>
+              <a:t> um valor </a:t>
+            </a:r>
+            <a:r>
+              <a:rPr lang="en-US" dirty="0" err="1">
+                <a:latin typeface="+mj-lt"/>
+                <a:ea typeface="Verdana" panose="020B0604030504040204" pitchFamily="34" charset="0"/>
+              </a:rPr>
+              <a:t>inteiro</a:t>
+            </a:r>
+            <a:r>
+              <a:rPr lang="en-US" dirty="0">
+                <a:latin typeface="+mj-lt"/>
+                <a:ea typeface="Verdana" panose="020B0604030504040204" pitchFamily="34" charset="0"/>
+              </a:rPr>
+              <a:t> para </a:t>
+            </a:r>
+            <a:r>
+              <a:rPr lang="en-US" dirty="0" err="1">
+                <a:latin typeface="+mj-lt"/>
+                <a:ea typeface="Verdana" panose="020B0604030504040204" pitchFamily="34" charset="0"/>
+              </a:rPr>
+              <a:t>cada</a:t>
+            </a:r>
+            <a:r>
+              <a:rPr lang="en-US" dirty="0">
+                <a:latin typeface="+mj-lt"/>
+                <a:ea typeface="Verdana" panose="020B0604030504040204" pitchFamily="34" charset="0"/>
+              </a:rPr>
+              <a:t> um dos </a:t>
+            </a:r>
+            <a:r>
+              <a:rPr lang="en-US" dirty="0" err="1">
+                <a:latin typeface="+mj-lt"/>
+                <a:ea typeface="Verdana" panose="020B0604030504040204" pitchFamily="34" charset="0"/>
+              </a:rPr>
+              <a:t>possíveis</a:t>
+            </a:r>
+            <a:r>
+              <a:rPr lang="en-US" dirty="0">
+                <a:latin typeface="+mj-lt"/>
+                <a:ea typeface="Verdana" panose="020B0604030504040204" pitchFamily="34" charset="0"/>
+              </a:rPr>
+              <a:t> </a:t>
+            </a:r>
+            <a:r>
+              <a:rPr lang="en-US" dirty="0" err="1">
+                <a:latin typeface="+mj-lt"/>
+                <a:ea typeface="Verdana" panose="020B0604030504040204" pitchFamily="34" charset="0"/>
+              </a:rPr>
+              <a:t>valores</a:t>
+            </a:r>
+            <a:r>
+              <a:rPr lang="en-US" dirty="0">
+                <a:latin typeface="+mj-lt"/>
+                <a:ea typeface="Verdana" panose="020B0604030504040204" pitchFamily="34" charset="0"/>
+              </a:rPr>
+              <a:t> (1 para </a:t>
+            </a:r>
+            <a:r>
+              <a:rPr lang="en-US" dirty="0" err="1">
+                <a:latin typeface="+mj-lt"/>
+                <a:ea typeface="Verdana" panose="020B0604030504040204" pitchFamily="34" charset="0"/>
+              </a:rPr>
+              <a:t>para</a:t>
+            </a:r>
+            <a:r>
+              <a:rPr lang="en-US" dirty="0">
+                <a:latin typeface="+mj-lt"/>
+                <a:ea typeface="Verdana" panose="020B0604030504040204" pitchFamily="34" charset="0"/>
+              </a:rPr>
+              <a:t> </a:t>
+            </a:r>
+            <a:r>
+              <a:rPr lang="en-US" dirty="0" err="1">
+                <a:latin typeface="+mj-lt"/>
+                <a:ea typeface="Verdana" panose="020B0604030504040204" pitchFamily="34" charset="0"/>
+              </a:rPr>
+              <a:t>sexo</a:t>
+            </a:r>
+            <a:r>
+              <a:rPr lang="en-US" dirty="0">
+                <a:latin typeface="+mj-lt"/>
+                <a:ea typeface="Verdana" panose="020B0604030504040204" pitchFamily="34" charset="0"/>
+              </a:rPr>
+              <a:t> masculine e 2 para o </a:t>
+            </a:r>
+            <a:r>
+              <a:rPr lang="en-US" dirty="0" err="1">
+                <a:latin typeface="+mj-lt"/>
+                <a:ea typeface="Verdana" panose="020B0604030504040204" pitchFamily="34" charset="0"/>
+              </a:rPr>
+              <a:t>sexo</a:t>
+            </a:r>
+            <a:r>
+              <a:rPr lang="en-US" dirty="0">
+                <a:latin typeface="+mj-lt"/>
+                <a:ea typeface="Verdana" panose="020B0604030504040204" pitchFamily="34" charset="0"/>
+              </a:rPr>
+              <a:t> </a:t>
+            </a:r>
+            <a:r>
+              <a:rPr lang="en-US" dirty="0" err="1">
+                <a:latin typeface="+mj-lt"/>
+                <a:ea typeface="Verdana" panose="020B0604030504040204" pitchFamily="34" charset="0"/>
+              </a:rPr>
+              <a:t>feminino</a:t>
+            </a:r>
+            <a:r>
+              <a:rPr lang="en-US" dirty="0">
+                <a:latin typeface="+mj-lt"/>
+                <a:ea typeface="Verdana" panose="020B0604030504040204" pitchFamily="34" charset="0"/>
+              </a:rPr>
+              <a:t>).</a:t>
+            </a:r>
+          </a:p>
+          <a:p>
+            <a:pPr marL="285750" indent="-285750">
+              <a:buFont typeface="Arial" panose="020B0604020202020204" pitchFamily="34" charset="0"/>
+              <a:buChar char="•"/>
+            </a:pPr>
+            <a:endParaRPr lang="en-US" dirty="0">
+              <a:latin typeface="+mj-lt"/>
+              <a:ea typeface="Verdana" panose="020B0604030504040204" pitchFamily="34" charset="0"/>
+            </a:endParaRPr>
+          </a:p>
+          <a:p>
+            <a:pPr marL="285750" indent="-285750">
+              <a:buFont typeface="Arial" panose="020B0604020202020204" pitchFamily="34" charset="0"/>
+              <a:buChar char="•"/>
+            </a:pPr>
+            <a:r>
+              <a:rPr lang="en-US" dirty="0" err="1">
+                <a:latin typeface="+mj-lt"/>
+                <a:ea typeface="Verdana" panose="020B0604030504040204" pitchFamily="34" charset="0"/>
+              </a:rPr>
+              <a:t>Atributos</a:t>
+            </a:r>
+            <a:r>
+              <a:rPr lang="en-US" dirty="0">
+                <a:latin typeface="+mj-lt"/>
+                <a:ea typeface="Verdana" panose="020B0604030504040204" pitchFamily="34" charset="0"/>
+              </a:rPr>
+              <a:t> </a:t>
+            </a:r>
+            <a:r>
+              <a:rPr lang="en-US" dirty="0" err="1">
+                <a:latin typeface="+mj-lt"/>
+                <a:ea typeface="Verdana" panose="020B0604030504040204" pitchFamily="34" charset="0"/>
+              </a:rPr>
+              <a:t>númericos</a:t>
+            </a:r>
+            <a:r>
+              <a:rPr lang="en-US" dirty="0">
+                <a:latin typeface="+mj-lt"/>
+                <a:ea typeface="Verdana" panose="020B0604030504040204" pitchFamily="34" charset="0"/>
+              </a:rPr>
+              <a:t> </a:t>
+            </a:r>
+            <a:r>
+              <a:rPr lang="en-US" dirty="0" err="1">
+                <a:latin typeface="+mj-lt"/>
+                <a:ea typeface="Verdana" panose="020B0604030504040204" pitchFamily="34" charset="0"/>
+              </a:rPr>
+              <a:t>podemos</a:t>
+            </a:r>
+            <a:r>
+              <a:rPr lang="en-US" dirty="0">
+                <a:latin typeface="+mj-lt"/>
+                <a:ea typeface="Verdana" panose="020B0604030504040204" pitchFamily="34" charset="0"/>
+              </a:rPr>
+              <a:t> </a:t>
+            </a:r>
+            <a:r>
+              <a:rPr lang="en-US" dirty="0" err="1">
+                <a:latin typeface="+mj-lt"/>
+                <a:ea typeface="Verdana" panose="020B0604030504040204" pitchFamily="34" charset="0"/>
+              </a:rPr>
+              <a:t>criar</a:t>
+            </a:r>
+            <a:r>
+              <a:rPr lang="en-US" dirty="0">
+                <a:latin typeface="+mj-lt"/>
+                <a:ea typeface="Verdana" panose="020B0604030504040204" pitchFamily="34" charset="0"/>
+              </a:rPr>
+              <a:t> </a:t>
+            </a:r>
+            <a:r>
+              <a:rPr lang="en-US" dirty="0" err="1">
+                <a:latin typeface="+mj-lt"/>
+                <a:ea typeface="Verdana" panose="020B0604030504040204" pitchFamily="34" charset="0"/>
+              </a:rPr>
+              <a:t>intervalos</a:t>
+            </a:r>
+            <a:r>
+              <a:rPr lang="en-US" dirty="0">
+                <a:latin typeface="+mj-lt"/>
+                <a:ea typeface="Verdana" panose="020B0604030504040204" pitchFamily="34" charset="0"/>
+              </a:rPr>
+              <a:t> de </a:t>
+            </a:r>
+            <a:r>
+              <a:rPr lang="en-US" dirty="0" err="1">
+                <a:latin typeface="+mj-lt"/>
+                <a:ea typeface="Verdana" panose="020B0604030504040204" pitchFamily="34" charset="0"/>
+              </a:rPr>
+              <a:t>valores</a:t>
+            </a:r>
+            <a:r>
+              <a:rPr lang="en-US" dirty="0">
+                <a:latin typeface="+mj-lt"/>
+                <a:ea typeface="Verdana" panose="020B0604030504040204" pitchFamily="34" charset="0"/>
+              </a:rPr>
+              <a:t> e </a:t>
+            </a:r>
+            <a:r>
+              <a:rPr lang="en-US" dirty="0" err="1">
+                <a:latin typeface="+mj-lt"/>
+                <a:ea typeface="Verdana" panose="020B0604030504040204" pitchFamily="34" charset="0"/>
+              </a:rPr>
+              <a:t>atribuir</a:t>
+            </a:r>
+            <a:r>
+              <a:rPr lang="en-US" dirty="0">
+                <a:latin typeface="+mj-lt"/>
+                <a:ea typeface="Verdana" panose="020B0604030504040204" pitchFamily="34" charset="0"/>
+              </a:rPr>
+              <a:t> um valor </a:t>
+            </a:r>
+            <a:r>
+              <a:rPr lang="en-US" dirty="0" err="1">
+                <a:latin typeface="+mj-lt"/>
+                <a:ea typeface="Verdana" panose="020B0604030504040204" pitchFamily="34" charset="0"/>
+              </a:rPr>
+              <a:t>inteiro</a:t>
+            </a:r>
+            <a:r>
+              <a:rPr lang="en-US" dirty="0">
+                <a:latin typeface="+mj-lt"/>
+                <a:ea typeface="Verdana" panose="020B0604030504040204" pitchFamily="34" charset="0"/>
+              </a:rPr>
+              <a:t> para </a:t>
+            </a:r>
+            <a:r>
+              <a:rPr lang="en-US" dirty="0" err="1">
+                <a:latin typeface="+mj-lt"/>
+                <a:ea typeface="Verdana" panose="020B0604030504040204" pitchFamily="34" charset="0"/>
+              </a:rPr>
+              <a:t>cada</a:t>
+            </a:r>
+            <a:r>
+              <a:rPr lang="en-US" dirty="0">
+                <a:latin typeface="+mj-lt"/>
+                <a:ea typeface="Verdana" panose="020B0604030504040204" pitchFamily="34" charset="0"/>
+              </a:rPr>
+              <a:t> </a:t>
+            </a:r>
+            <a:r>
+              <a:rPr lang="en-US" dirty="0" err="1">
+                <a:latin typeface="+mj-lt"/>
+                <a:ea typeface="Verdana" panose="020B0604030504040204" pitchFamily="34" charset="0"/>
+              </a:rPr>
+              <a:t>intervalo</a:t>
+            </a:r>
+            <a:r>
+              <a:rPr lang="en-US" dirty="0">
+                <a:latin typeface="+mj-lt"/>
+                <a:ea typeface="Verdana" panose="020B0604030504040204" pitchFamily="34" charset="0"/>
+              </a:rPr>
+              <a:t>   ( </a:t>
+            </a:r>
+            <a:r>
+              <a:rPr lang="en-US" dirty="0" err="1">
+                <a:latin typeface="+mj-lt"/>
+                <a:ea typeface="Verdana" panose="020B0604030504040204" pitchFamily="34" charset="0"/>
+              </a:rPr>
+              <a:t>remuneração</a:t>
+            </a:r>
+            <a:r>
+              <a:rPr lang="en-US" dirty="0">
+                <a:latin typeface="+mj-lt"/>
+                <a:ea typeface="Verdana" panose="020B0604030504040204" pitchFamily="34" charset="0"/>
+              </a:rPr>
+              <a:t> familiar, </a:t>
+            </a:r>
+            <a:r>
+              <a:rPr lang="en-US" dirty="0" err="1">
+                <a:latin typeface="+mj-lt"/>
+                <a:ea typeface="Verdana" panose="020B0604030504040204" pitchFamily="34" charset="0"/>
+              </a:rPr>
+              <a:t>até</a:t>
+            </a:r>
+            <a:r>
+              <a:rPr lang="en-US" dirty="0">
+                <a:latin typeface="+mj-lt"/>
+                <a:ea typeface="Verdana" panose="020B0604030504040204" pitchFamily="34" charset="0"/>
+              </a:rPr>
+              <a:t> 2 </a:t>
+            </a:r>
+            <a:r>
+              <a:rPr lang="en-US" dirty="0" err="1">
+                <a:latin typeface="+mj-lt"/>
+                <a:ea typeface="Verdana" panose="020B0604030504040204" pitchFamily="34" charset="0"/>
+              </a:rPr>
+              <a:t>salários</a:t>
+            </a:r>
+            <a:r>
+              <a:rPr lang="en-US" dirty="0">
+                <a:latin typeface="+mj-lt"/>
+                <a:ea typeface="Verdana" panose="020B0604030504040204" pitchFamily="34" charset="0"/>
+              </a:rPr>
+              <a:t> </a:t>
+            </a:r>
+            <a:r>
+              <a:rPr lang="en-US" dirty="0" err="1">
+                <a:latin typeface="+mj-lt"/>
+                <a:ea typeface="Verdana" panose="020B0604030504040204" pitchFamily="34" charset="0"/>
+              </a:rPr>
+              <a:t>recebe</a:t>
+            </a:r>
+            <a:r>
+              <a:rPr lang="en-US" dirty="0">
+                <a:latin typeface="+mj-lt"/>
+                <a:ea typeface="Verdana" panose="020B0604030504040204" pitchFamily="34" charset="0"/>
+              </a:rPr>
+              <a:t> o valor 1, de 3 </a:t>
+            </a:r>
+            <a:r>
+              <a:rPr lang="en-US" dirty="0" err="1">
+                <a:latin typeface="+mj-lt"/>
+                <a:ea typeface="Verdana" panose="020B0604030504040204" pitchFamily="34" charset="0"/>
+              </a:rPr>
+              <a:t>até</a:t>
+            </a:r>
+            <a:r>
+              <a:rPr lang="en-US" dirty="0">
+                <a:latin typeface="+mj-lt"/>
+                <a:ea typeface="Verdana" panose="020B0604030504040204" pitchFamily="34" charset="0"/>
+              </a:rPr>
+              <a:t> 5 </a:t>
+            </a:r>
+            <a:r>
+              <a:rPr lang="en-US" dirty="0" err="1">
+                <a:latin typeface="+mj-lt"/>
+                <a:ea typeface="Verdana" panose="020B0604030504040204" pitchFamily="34" charset="0"/>
+              </a:rPr>
+              <a:t>salários</a:t>
+            </a:r>
+            <a:r>
+              <a:rPr lang="en-US" dirty="0">
+                <a:latin typeface="+mj-lt"/>
+                <a:ea typeface="Verdana" panose="020B0604030504040204" pitchFamily="34" charset="0"/>
+              </a:rPr>
+              <a:t> </a:t>
+            </a:r>
+            <a:r>
+              <a:rPr lang="en-US" dirty="0" err="1">
+                <a:latin typeface="+mj-lt"/>
+                <a:ea typeface="Verdana" panose="020B0604030504040204" pitchFamily="34" charset="0"/>
+              </a:rPr>
+              <a:t>recebe</a:t>
+            </a:r>
+            <a:r>
+              <a:rPr lang="en-US" dirty="0">
+                <a:latin typeface="+mj-lt"/>
+                <a:ea typeface="Verdana" panose="020B0604030504040204" pitchFamily="34" charset="0"/>
+              </a:rPr>
+              <a:t> o valor 2, e </a:t>
+            </a:r>
+            <a:r>
+              <a:rPr lang="en-US" dirty="0" err="1">
+                <a:latin typeface="+mj-lt"/>
+                <a:ea typeface="Verdana" panose="020B0604030504040204" pitchFamily="34" charset="0"/>
+              </a:rPr>
+              <a:t>assim</a:t>
+            </a:r>
+            <a:r>
+              <a:rPr lang="en-US" dirty="0">
+                <a:latin typeface="+mj-lt"/>
+                <a:ea typeface="Verdana" panose="020B0604030504040204" pitchFamily="34" charset="0"/>
+              </a:rPr>
+              <a:t> </a:t>
+            </a:r>
+            <a:r>
+              <a:rPr lang="en-US" dirty="0" err="1">
+                <a:latin typeface="+mj-lt"/>
+                <a:ea typeface="Verdana" panose="020B0604030504040204" pitchFamily="34" charset="0"/>
+              </a:rPr>
+              <a:t>por</a:t>
+            </a:r>
+            <a:r>
+              <a:rPr lang="en-US" dirty="0">
+                <a:latin typeface="+mj-lt"/>
+                <a:ea typeface="Verdana" panose="020B0604030504040204" pitchFamily="34" charset="0"/>
+              </a:rPr>
+              <a:t> </a:t>
+            </a:r>
+            <a:r>
+              <a:rPr lang="en-US" dirty="0" err="1">
+                <a:latin typeface="+mj-lt"/>
+                <a:ea typeface="Verdana" panose="020B0604030504040204" pitchFamily="34" charset="0"/>
+              </a:rPr>
+              <a:t>diante</a:t>
+            </a:r>
+            <a:r>
+              <a:rPr lang="en-US" dirty="0">
+                <a:latin typeface="+mj-lt"/>
+                <a:ea typeface="Verdana" panose="020B0604030504040204" pitchFamily="34" charset="0"/>
+              </a:rPr>
+              <a:t>).</a:t>
+            </a:r>
           </a:p>
           <a:p>
             <a:pPr marL="285750" indent="-285750">
@@ -8572,13 +8309,6 @@
   <p:clrMapOvr>
     <a:masterClrMapping/>
   </p:clrMapOvr>
-  <p:timing>
-    <p:tnLst>
-      <p:par>
-        <p:cTn id="1" dur="indefinite" restart="never" nodeType="tmRoot"/>
-      </p:par>
-    </p:tnLst>
-  </p:timing>
 </p:sld>
 </file>
 
@@ -8777,147 +8507,147 @@
               <a:buChar char="•"/>
             </a:pPr>
             <a:r>
-              <a:rPr lang="en-US" dirty="0" smtClean="0">
+              <a:rPr lang="en-US" dirty="0">
                 <a:latin typeface="+mj-lt"/>
                 <a:ea typeface="Verdana" panose="020B0604030504040204" pitchFamily="34" charset="0"/>
               </a:rPr>
               <a:t>Para </a:t>
             </a:r>
             <a:r>
-              <a:rPr lang="en-US" dirty="0" err="1" smtClean="0">
+              <a:rPr lang="en-US" dirty="0" err="1">
                 <a:latin typeface="+mj-lt"/>
                 <a:ea typeface="Verdana" panose="020B0604030504040204" pitchFamily="34" charset="0"/>
               </a:rPr>
               <a:t>selecionar</a:t>
             </a:r>
             <a:r>
-              <a:rPr lang="en-US" dirty="0" smtClean="0">
+              <a:rPr lang="en-US" dirty="0">
                 <a:latin typeface="+mj-lt"/>
                 <a:ea typeface="Verdana" panose="020B0604030504040204" pitchFamily="34" charset="0"/>
               </a:rPr>
               <a:t> um </a:t>
             </a:r>
             <a:r>
-              <a:rPr lang="en-US" dirty="0" err="1" smtClean="0">
+              <a:rPr lang="en-US" dirty="0" err="1">
                 <a:latin typeface="+mj-lt"/>
                 <a:ea typeface="Verdana" panose="020B0604030504040204" pitchFamily="34" charset="0"/>
               </a:rPr>
               <a:t>elemento</a:t>
             </a:r>
             <a:r>
-              <a:rPr lang="en-US" dirty="0" smtClean="0">
+              <a:rPr lang="en-US" dirty="0">
                 <a:latin typeface="+mj-lt"/>
                 <a:ea typeface="Verdana" panose="020B0604030504040204" pitchFamily="34" charset="0"/>
               </a:rPr>
               <a:t>, a </a:t>
             </a:r>
             <a:r>
-              <a:rPr lang="en-US" dirty="0" err="1" smtClean="0">
+              <a:rPr lang="en-US" dirty="0" err="1">
                 <a:latin typeface="+mj-lt"/>
                 <a:ea typeface="Verdana" panose="020B0604030504040204" pitchFamily="34" charset="0"/>
               </a:rPr>
               <a:t>sua</a:t>
             </a:r>
             <a:r>
-              <a:rPr lang="en-US" dirty="0" smtClean="0">
+              <a:rPr lang="en-US" dirty="0">
                 <a:latin typeface="+mj-lt"/>
                 <a:ea typeface="Verdana" panose="020B0604030504040204" pitchFamily="34" charset="0"/>
               </a:rPr>
               <a:t> soma das </a:t>
             </a:r>
             <a:r>
-              <a:rPr lang="en-US" dirty="0" err="1" smtClean="0">
+              <a:rPr lang="en-US" dirty="0" err="1">
                 <a:latin typeface="+mj-lt"/>
                 <a:ea typeface="Verdana" panose="020B0604030504040204" pitchFamily="34" charset="0"/>
               </a:rPr>
               <a:t>distâncias</a:t>
             </a:r>
             <a:r>
-              <a:rPr lang="en-US" dirty="0" smtClean="0">
+              <a:rPr lang="en-US" dirty="0">
                 <a:latin typeface="+mj-lt"/>
                 <a:ea typeface="Verdana" panose="020B0604030504040204" pitchFamily="34" charset="0"/>
               </a:rPr>
               <a:t> para </a:t>
             </a:r>
             <a:r>
-              <a:rPr lang="en-US" dirty="0" err="1" smtClean="0">
+              <a:rPr lang="en-US" dirty="0" err="1">
                 <a:latin typeface="+mj-lt"/>
                 <a:ea typeface="Verdana" panose="020B0604030504040204" pitchFamily="34" charset="0"/>
               </a:rPr>
               <a:t>todos</a:t>
             </a:r>
             <a:r>
-              <a:rPr lang="en-US" dirty="0" smtClean="0">
+              <a:rPr lang="en-US" dirty="0">
                 <a:latin typeface="+mj-lt"/>
                 <a:ea typeface="Verdana" panose="020B0604030504040204" pitchFamily="34" charset="0"/>
               </a:rPr>
               <a:t> </a:t>
             </a:r>
             <a:r>
-              <a:rPr lang="en-US" dirty="0" err="1" smtClean="0">
+              <a:rPr lang="en-US" dirty="0" err="1">
                 <a:latin typeface="+mj-lt"/>
                 <a:ea typeface="Verdana" panose="020B0604030504040204" pitchFamily="34" charset="0"/>
               </a:rPr>
               <a:t>os</a:t>
             </a:r>
             <a:r>
-              <a:rPr lang="en-US" dirty="0" smtClean="0">
+              <a:rPr lang="en-US" dirty="0">
                 <a:latin typeface="+mj-lt"/>
                 <a:ea typeface="Verdana" panose="020B0604030504040204" pitchFamily="34" charset="0"/>
               </a:rPr>
               <a:t> outros </a:t>
             </a:r>
             <a:r>
-              <a:rPr lang="en-US" dirty="0" err="1" smtClean="0">
+              <a:rPr lang="en-US" dirty="0" err="1">
                 <a:latin typeface="+mj-lt"/>
                 <a:ea typeface="Verdana" panose="020B0604030504040204" pitchFamily="34" charset="0"/>
               </a:rPr>
               <a:t>elementos</a:t>
             </a:r>
             <a:r>
-              <a:rPr lang="en-US" dirty="0" smtClean="0">
+              <a:rPr lang="en-US" dirty="0">
                 <a:latin typeface="+mj-lt"/>
                 <a:ea typeface="Verdana" panose="020B0604030504040204" pitchFamily="34" charset="0"/>
               </a:rPr>
               <a:t> tem que </a:t>
             </a:r>
             <a:r>
-              <a:rPr lang="en-US" dirty="0" err="1" smtClean="0">
+              <a:rPr lang="en-US" dirty="0" err="1">
                 <a:latin typeface="+mj-lt"/>
                 <a:ea typeface="Verdana" panose="020B0604030504040204" pitchFamily="34" charset="0"/>
               </a:rPr>
               <a:t>ser</a:t>
             </a:r>
             <a:r>
-              <a:rPr lang="en-US" dirty="0" smtClean="0">
+              <a:rPr lang="en-US" dirty="0">
                 <a:latin typeface="+mj-lt"/>
                 <a:ea typeface="Verdana" panose="020B0604030504040204" pitchFamily="34" charset="0"/>
               </a:rPr>
               <a:t> a </a:t>
             </a:r>
             <a:r>
-              <a:rPr lang="en-US" dirty="0" err="1" smtClean="0">
+              <a:rPr lang="en-US" dirty="0" err="1">
                 <a:latin typeface="+mj-lt"/>
                 <a:ea typeface="Verdana" panose="020B0604030504040204" pitchFamily="34" charset="0"/>
               </a:rPr>
               <a:t>maior</a:t>
             </a:r>
             <a:r>
-              <a:rPr lang="en-US" dirty="0" smtClean="0">
+              <a:rPr lang="en-US" dirty="0">
                 <a:latin typeface="+mj-lt"/>
                 <a:ea typeface="Verdana" panose="020B0604030504040204" pitchFamily="34" charset="0"/>
               </a:rPr>
               <a:t> </a:t>
             </a:r>
             <a:r>
-              <a:rPr lang="en-US" dirty="0" err="1" smtClean="0">
+              <a:rPr lang="en-US" dirty="0" err="1">
                 <a:latin typeface="+mj-lt"/>
                 <a:ea typeface="Verdana" panose="020B0604030504040204" pitchFamily="34" charset="0"/>
               </a:rPr>
               <a:t>possível</a:t>
             </a:r>
             <a:r>
-              <a:rPr lang="en-US" dirty="0" smtClean="0">
+              <a:rPr lang="en-US" dirty="0">
                 <a:latin typeface="+mj-lt"/>
                 <a:ea typeface="Verdana" panose="020B0604030504040204" pitchFamily="34" charset="0"/>
               </a:rPr>
@@ -8940,184 +8670,180 @@
               <a:buChar char="•"/>
             </a:pPr>
             <a:r>
-              <a:rPr lang="en-US" dirty="0" smtClean="0">
+              <a:rPr lang="en-US" dirty="0">
                 <a:latin typeface="+mj-lt"/>
                 <a:ea typeface="Verdana" panose="020B0604030504040204" pitchFamily="34" charset="0"/>
               </a:rPr>
               <a:t>Para resolver o </a:t>
             </a:r>
             <a:r>
-              <a:rPr lang="en-US" dirty="0" err="1" smtClean="0">
+              <a:rPr lang="en-US" dirty="0" err="1">
                 <a:latin typeface="+mj-lt"/>
                 <a:ea typeface="Verdana" panose="020B0604030504040204" pitchFamily="34" charset="0"/>
               </a:rPr>
               <a:t>problema</a:t>
             </a:r>
             <a:r>
-              <a:rPr lang="en-US" dirty="0" smtClean="0">
+              <a:rPr lang="en-US" dirty="0">
                 <a:latin typeface="+mj-lt"/>
                 <a:ea typeface="Verdana" panose="020B0604030504040204" pitchFamily="34" charset="0"/>
               </a:rPr>
               <a:t> da </a:t>
             </a:r>
             <a:r>
-              <a:rPr lang="en-US" dirty="0" err="1" smtClean="0">
+              <a:rPr lang="en-US" dirty="0" err="1">
                 <a:latin typeface="+mj-lt"/>
                 <a:ea typeface="Verdana" panose="020B0604030504040204" pitchFamily="34" charset="0"/>
               </a:rPr>
               <a:t>diversidade</a:t>
             </a:r>
             <a:r>
-              <a:rPr lang="en-US" dirty="0" smtClean="0">
+              <a:rPr lang="en-US" dirty="0">
                 <a:latin typeface="+mj-lt"/>
                 <a:ea typeface="Verdana" panose="020B0604030504040204" pitchFamily="34" charset="0"/>
               </a:rPr>
               <a:t> </a:t>
             </a:r>
             <a:r>
-              <a:rPr lang="en-US" dirty="0" err="1" smtClean="0">
+              <a:rPr lang="en-US" dirty="0" err="1">
                 <a:latin typeface="+mj-lt"/>
                 <a:ea typeface="Verdana" panose="020B0604030504040204" pitchFamily="34" charset="0"/>
               </a:rPr>
               <a:t>máxima</a:t>
             </a:r>
             <a:r>
-              <a:rPr lang="en-US" dirty="0" smtClean="0">
+              <a:rPr lang="en-US" dirty="0">
                 <a:latin typeface="+mj-lt"/>
                 <a:ea typeface="Verdana" panose="020B0604030504040204" pitchFamily="34" charset="0"/>
               </a:rPr>
               <a:t>, a soma dos </a:t>
             </a:r>
             <a:r>
-              <a:rPr lang="en-US" dirty="0" err="1" smtClean="0">
+              <a:rPr lang="en-US" dirty="0" err="1">
                 <a:latin typeface="+mj-lt"/>
                 <a:ea typeface="Verdana" panose="020B0604030504040204" pitchFamily="34" charset="0"/>
               </a:rPr>
               <a:t>valores</a:t>
             </a:r>
             <a:r>
-              <a:rPr lang="en-US" dirty="0" smtClean="0">
+              <a:rPr lang="en-US" dirty="0">
                 <a:latin typeface="+mj-lt"/>
                 <a:ea typeface="Verdana" panose="020B0604030504040204" pitchFamily="34" charset="0"/>
               </a:rPr>
               <a:t> do </a:t>
             </a:r>
             <a:r>
-              <a:rPr lang="en-US" dirty="0" err="1" smtClean="0">
+              <a:rPr lang="en-US" dirty="0" err="1">
                 <a:latin typeface="+mj-lt"/>
                 <a:ea typeface="Verdana" panose="020B0604030504040204" pitchFamily="34" charset="0"/>
               </a:rPr>
               <a:t>somatório</a:t>
             </a:r>
             <a:r>
-              <a:rPr lang="en-US" dirty="0" smtClean="0">
+              <a:rPr lang="en-US" dirty="0">
                 <a:latin typeface="+mj-lt"/>
                 <a:ea typeface="Verdana" panose="020B0604030504040204" pitchFamily="34" charset="0"/>
               </a:rPr>
               <a:t> de </a:t>
             </a:r>
             <a:r>
-              <a:rPr lang="en-US" dirty="0" err="1" smtClean="0">
+              <a:rPr lang="en-US" dirty="0" err="1">
                 <a:latin typeface="+mj-lt"/>
                 <a:ea typeface="Verdana" panose="020B0604030504040204" pitchFamily="34" charset="0"/>
               </a:rPr>
               <a:t>cada</a:t>
             </a:r>
             <a:r>
-              <a:rPr lang="en-US" dirty="0" smtClean="0">
+              <a:rPr lang="en-US" dirty="0">
                 <a:latin typeface="+mj-lt"/>
                 <a:ea typeface="Verdana" panose="020B0604030504040204" pitchFamily="34" charset="0"/>
               </a:rPr>
               <a:t> </a:t>
             </a:r>
             <a:r>
-              <a:rPr lang="en-US" dirty="0" err="1" smtClean="0">
+              <a:rPr lang="en-US" dirty="0" err="1">
                 <a:latin typeface="+mj-lt"/>
                 <a:ea typeface="Verdana" panose="020B0604030504040204" pitchFamily="34" charset="0"/>
               </a:rPr>
               <a:t>elemento</a:t>
             </a:r>
             <a:r>
-              <a:rPr lang="en-US" dirty="0" smtClean="0">
+              <a:rPr lang="en-US" dirty="0">
                 <a:latin typeface="+mj-lt"/>
                 <a:ea typeface="Verdana" panose="020B0604030504040204" pitchFamily="34" charset="0"/>
               </a:rPr>
               <a:t> </a:t>
             </a:r>
             <a:r>
-              <a:rPr lang="en-US" dirty="0" err="1" smtClean="0">
+              <a:rPr lang="en-US" dirty="0" err="1">
                 <a:latin typeface="+mj-lt"/>
                 <a:ea typeface="Verdana" panose="020B0604030504040204" pitchFamily="34" charset="0"/>
               </a:rPr>
               <a:t>selecionado</a:t>
             </a:r>
             <a:r>
-              <a:rPr lang="en-US" dirty="0" smtClean="0">
+              <a:rPr lang="en-US" dirty="0">
                 <a:latin typeface="+mj-lt"/>
                 <a:ea typeface="Verdana" panose="020B0604030504040204" pitchFamily="34" charset="0"/>
               </a:rPr>
               <a:t> </a:t>
             </a:r>
             <a:r>
-              <a:rPr lang="en-US" dirty="0" err="1" smtClean="0">
+              <a:rPr lang="en-US" dirty="0" err="1">
                 <a:latin typeface="+mj-lt"/>
                 <a:ea typeface="Verdana" panose="020B0604030504040204" pitchFamily="34" charset="0"/>
               </a:rPr>
               <a:t>deve</a:t>
             </a:r>
             <a:r>
-              <a:rPr lang="en-US" dirty="0" smtClean="0">
+              <a:rPr lang="en-US" dirty="0">
                 <a:latin typeface="+mj-lt"/>
                 <a:ea typeface="Verdana" panose="020B0604030504040204" pitchFamily="34" charset="0"/>
               </a:rPr>
               <a:t> </a:t>
             </a:r>
             <a:r>
-              <a:rPr lang="en-US" dirty="0" err="1" smtClean="0">
+              <a:rPr lang="en-US" dirty="0" err="1">
                 <a:latin typeface="+mj-lt"/>
                 <a:ea typeface="Verdana" panose="020B0604030504040204" pitchFamily="34" charset="0"/>
               </a:rPr>
               <a:t>ser</a:t>
             </a:r>
             <a:r>
-              <a:rPr lang="en-US" dirty="0" smtClean="0">
+              <a:rPr lang="en-US" dirty="0">
                 <a:latin typeface="+mj-lt"/>
                 <a:ea typeface="Verdana" panose="020B0604030504040204" pitchFamily="34" charset="0"/>
               </a:rPr>
               <a:t> o </a:t>
             </a:r>
             <a:r>
-              <a:rPr lang="en-US" dirty="0" err="1" smtClean="0">
+              <a:rPr lang="en-US" dirty="0" err="1">
                 <a:latin typeface="+mj-lt"/>
                 <a:ea typeface="Verdana" panose="020B0604030504040204" pitchFamily="34" charset="0"/>
               </a:rPr>
               <a:t>maior</a:t>
             </a:r>
             <a:r>
-              <a:rPr lang="en-US" dirty="0" smtClean="0">
+              <a:rPr lang="en-US" dirty="0">
                 <a:latin typeface="+mj-lt"/>
                 <a:ea typeface="Verdana" panose="020B0604030504040204" pitchFamily="34" charset="0"/>
               </a:rPr>
               <a:t> </a:t>
             </a:r>
             <a:r>
-              <a:rPr lang="en-US" dirty="0" err="1" smtClean="0">
+              <a:rPr lang="en-US" dirty="0" err="1">
                 <a:latin typeface="+mj-lt"/>
                 <a:ea typeface="Verdana" panose="020B0604030504040204" pitchFamily="34" charset="0"/>
               </a:rPr>
               <a:t>possível</a:t>
             </a:r>
             <a:r>
-              <a:rPr lang="en-US" dirty="0" smtClean="0">
+              <a:rPr lang="en-US" dirty="0">
                 <a:latin typeface="+mj-lt"/>
                 <a:ea typeface="Verdana" panose="020B0604030504040204" pitchFamily="34" charset="0"/>
               </a:rPr>
               <a:t>.</a:t>
             </a:r>
-            <a:endParaRPr lang="en-US" dirty="0">
-              <a:latin typeface="+mj-lt"/>
-              <a:ea typeface="Verdana" panose="020B0604030504040204" pitchFamily="34" charset="0"/>
-            </a:endParaRPr>
           </a:p>
           <a:p>
             <a:pPr marL="285750" indent="-285750">
@@ -9138,13 +8864,6 @@
   <p:clrMapOvr>
     <a:masterClrMapping/>
   </p:clrMapOvr>
-  <p:timing>
-    <p:tnLst>
-      <p:par>
-        <p:cTn id="1" dur="indefinite" restart="never" nodeType="tmRoot"/>
-      </p:par>
-    </p:tnLst>
-  </p:timing>
 </p:sld>
 </file>
 
@@ -9425,13 +9144,6 @@
   <p:clrMapOvr>
     <a:masterClrMapping/>
   </p:clrMapOvr>
-  <p:timing>
-    <p:tnLst>
-      <p:par>
-        <p:cTn id="1" dur="indefinite" restart="never" nodeType="tmRoot"/>
-      </p:par>
-    </p:tnLst>
-  </p:timing>
 </p:sld>
 </file>
 
@@ -10109,13 +9821,6 @@
   <p:clrMapOvr>
     <a:masterClrMapping/>
   </p:clrMapOvr>
-  <p:timing>
-    <p:tnLst>
-      <p:par>
-        <p:cTn id="1" dur="indefinite" restart="never" nodeType="tmRoot"/>
-      </p:par>
-    </p:tnLst>
-  </p:timing>
 </p:sld>
 </file>
 
@@ -10351,13 +10056,6 @@
   <p:clrMapOvr>
     <a:masterClrMapping/>
   </p:clrMapOvr>
-  <p:timing>
-    <p:tnLst>
-      <p:par>
-        <p:cTn id="1" dur="indefinite" restart="never" nodeType="tmRoot"/>
-      </p:par>
-    </p:tnLst>
-  </p:timing>
 </p:sld>
 </file>
 
@@ -10591,13 +10289,6 @@
   <p:clrMapOvr>
     <a:masterClrMapping/>
   </p:clrMapOvr>
-  <p:timing>
-    <p:tnLst>
-      <p:par>
-        <p:cTn id="1" dur="indefinite" restart="never" nodeType="tmRoot"/>
-      </p:par>
-    </p:tnLst>
-  </p:timing>
 </p:sld>
 </file>
 

</xml_diff>